<commit_message>
Slide size reduced (lecture 1 slides)
</commit_message>
<xml_diff>
--- a/slides/Pythonlearn-01-Intro.pptx
+++ b/slides/Pythonlearn-01-Intro.pptx
@@ -1148,7 +1148,7 @@
           </a:ln>
           <a:extLst>
             <a:ext uri="{C572A759-6A51-4108-AA02-DFA0A04FC94B}">
-              <ma14:wrappingTextBoxFlag xmlns="" xmlns:m="http://schemas.openxmlformats.org/officeDocument/2006/math" xmlns:a14="http://schemas.microsoft.com/office/drawing/2010/main" xmlns:ma14="http://schemas.microsoft.com/office/mac/drawingml/2011/main" val="1"/>
+              <ma14:wrappingTextBoxFlag xmlns:ma14="http://schemas.microsoft.com/office/mac/drawingml/2011/main" xmlns:a14="http://schemas.microsoft.com/office/drawing/2010/main" xmlns:m="http://schemas.openxmlformats.org/officeDocument/2006/math" xmlns="" val="1"/>
             </a:ext>
           </a:extLst>
         </p:spPr>
@@ -1187,7 +1187,7 @@
           </a:ln>
           <a:extLst>
             <a:ext uri="{C572A759-6A51-4108-AA02-DFA0A04FC94B}">
-              <ma14:wrappingTextBoxFlag xmlns="" xmlns:m="http://schemas.openxmlformats.org/officeDocument/2006/math" xmlns:a14="http://schemas.microsoft.com/office/drawing/2010/main" xmlns:ma14="http://schemas.microsoft.com/office/mac/drawingml/2011/main" val="1"/>
+              <ma14:wrappingTextBoxFlag xmlns:ma14="http://schemas.microsoft.com/office/mac/drawingml/2011/main" xmlns:a14="http://schemas.microsoft.com/office/drawing/2010/main" xmlns:m="http://schemas.openxmlformats.org/officeDocument/2006/math" xmlns="" val="1"/>
             </a:ext>
           </a:extLst>
         </p:spPr>
@@ -2190,7 +2190,7 @@
           </a:ln>
           <a:extLst>
             <a:ext uri="{C572A759-6A51-4108-AA02-DFA0A04FC94B}">
-              <ma14:wrappingTextBoxFlag xmlns="" xmlns:m="http://schemas.openxmlformats.org/officeDocument/2006/math" xmlns:a14="http://schemas.microsoft.com/office/drawing/2010/main" xmlns:ma14="http://schemas.microsoft.com/office/mac/drawingml/2011/main" val="1"/>
+              <ma14:wrappingTextBoxFlag xmlns:ma14="http://schemas.microsoft.com/office/mac/drawingml/2011/main" xmlns:a14="http://schemas.microsoft.com/office/drawing/2010/main" xmlns:m="http://schemas.openxmlformats.org/officeDocument/2006/math" xmlns="" val="1"/>
             </a:ext>
           </a:extLst>
         </p:spPr>
@@ -2250,8 +2250,12 @@
           <p:nvPr/>
         </p:nvPicPr>
         <p:blipFill>
-          <a:blip r:embed="rId4">
-            <a:extLst/>
+          <a:blip r:embed="rId4" cstate="email">
+            <a:extLst>
+              <a:ext uri="{28A0092B-C50C-407E-A947-70E740481C1C}">
+                <a14:useLocalDpi xmlns:a14="http://schemas.microsoft.com/office/drawing/2010/main"/>
+              </a:ext>
+            </a:extLst>
           </a:blip>
           <a:stretch>
             <a:fillRect/>
@@ -2409,10 +2413,10 @@
           <p:nvPr/>
         </p:nvPicPr>
         <p:blipFill>
-          <a:blip r:embed="rId4">
+          <a:blip r:embed="rId4" cstate="email">
             <a:extLst>
               <a:ext uri="{28A0092B-C50C-407E-A947-70E740481C1C}">
-                <a14:useLocalDpi xmlns:a14="http://schemas.microsoft.com/office/drawing/2010/main" val="0"/>
+                <a14:useLocalDpi xmlns:a14="http://schemas.microsoft.com/office/drawing/2010/main"/>
               </a:ext>
             </a:extLst>
           </a:blip>
@@ -2445,10 +2449,10 @@
           <p:nvPr/>
         </p:nvPicPr>
         <p:blipFill>
-          <a:blip r:embed="rId5">
+          <a:blip r:embed="rId5" cstate="email">
             <a:extLst>
               <a:ext uri="{28A0092B-C50C-407E-A947-70E740481C1C}">
-                <a14:useLocalDpi xmlns:a14="http://schemas.microsoft.com/office/drawing/2010/main" val="0"/>
+                <a14:useLocalDpi xmlns:a14="http://schemas.microsoft.com/office/drawing/2010/main"/>
               </a:ext>
             </a:extLst>
           </a:blip>
@@ -2745,7 +2749,7 @@
           </a:ln>
           <a:extLst>
             <a:ext uri="{C572A759-6A51-4108-AA02-DFA0A04FC94B}">
-              <ma14:wrappingTextBoxFlag xmlns="" xmlns:m="http://schemas.openxmlformats.org/officeDocument/2006/math" xmlns:a14="http://schemas.microsoft.com/office/drawing/2010/main" xmlns:ma14="http://schemas.microsoft.com/office/mac/drawingml/2011/main" val="1"/>
+              <ma14:wrappingTextBoxFlag xmlns:ma14="http://schemas.microsoft.com/office/mac/drawingml/2011/main" xmlns:a14="http://schemas.microsoft.com/office/drawing/2010/main" xmlns:m="http://schemas.openxmlformats.org/officeDocument/2006/math" xmlns="" val="1"/>
             </a:ext>
           </a:extLst>
         </p:spPr>
@@ -2788,8 +2792,12 @@
           <p:nvPr/>
         </p:nvPicPr>
         <p:blipFill>
-          <a:blip r:embed="rId3">
-            <a:extLst/>
+          <a:blip r:embed="rId3" cstate="email">
+            <a:extLst>
+              <a:ext uri="{28A0092B-C50C-407E-A947-70E740481C1C}">
+                <a14:useLocalDpi xmlns:a14="http://schemas.microsoft.com/office/drawing/2010/main"/>
+              </a:ext>
+            </a:extLst>
           </a:blip>
           <a:stretch>
             <a:fillRect/>
@@ -2931,10 +2939,10 @@
           <p:nvPr/>
         </p:nvPicPr>
         <p:blipFill>
-          <a:blip r:embed="rId3">
+          <a:blip r:embed="rId3" cstate="email">
             <a:extLst>
               <a:ext uri="{28A0092B-C50C-407E-A947-70E740481C1C}">
-                <a14:useLocalDpi xmlns:a14="http://schemas.microsoft.com/office/drawing/2010/main" val="0"/>
+                <a14:useLocalDpi xmlns:a14="http://schemas.microsoft.com/office/drawing/2010/main"/>
               </a:ext>
             </a:extLst>
           </a:blip>
@@ -3063,7 +3071,7 @@
             <a:effectLst/>
             <a:extLst>
               <a:ext uri="{C572A759-6A51-4108-AA02-DFA0A04FC94B}">
-                <ma14:wrappingTextBoxFlag xmlns="" xmlns:m="http://schemas.openxmlformats.org/officeDocument/2006/math" xmlns:a14="http://schemas.microsoft.com/office/drawing/2010/main" xmlns:ma14="http://schemas.microsoft.com/office/mac/drawingml/2011/main" val="1"/>
+                <ma14:wrappingTextBoxFlag xmlns:ma14="http://schemas.microsoft.com/office/mac/drawingml/2011/main" xmlns:a14="http://schemas.microsoft.com/office/drawing/2010/main" xmlns:m="http://schemas.openxmlformats.org/officeDocument/2006/math" xmlns="" val="1"/>
               </a:ext>
             </a:extLst>
           </p:spPr>
@@ -3175,7 +3183,7 @@
             <a:effectLst/>
             <a:extLst>
               <a:ext uri="{C572A759-6A51-4108-AA02-DFA0A04FC94B}">
-                <ma14:wrappingTextBoxFlag xmlns="" xmlns:m="http://schemas.openxmlformats.org/officeDocument/2006/math" xmlns:a14="http://schemas.microsoft.com/office/drawing/2010/main" xmlns:ma14="http://schemas.microsoft.com/office/mac/drawingml/2011/main" val="1"/>
+                <ma14:wrappingTextBoxFlag xmlns:ma14="http://schemas.microsoft.com/office/mac/drawingml/2011/main" xmlns:a14="http://schemas.microsoft.com/office/drawing/2010/main" xmlns:m="http://schemas.openxmlformats.org/officeDocument/2006/math" xmlns="" val="1"/>
               </a:ext>
             </a:extLst>
           </p:spPr>
@@ -3310,7 +3318,7 @@
             <a:effectLst/>
             <a:extLst>
               <a:ext uri="{C572A759-6A51-4108-AA02-DFA0A04FC94B}">
-                <ma14:wrappingTextBoxFlag xmlns="" xmlns:m="http://schemas.openxmlformats.org/officeDocument/2006/math" xmlns:a14="http://schemas.microsoft.com/office/drawing/2010/main" xmlns:ma14="http://schemas.microsoft.com/office/mac/drawingml/2011/main" val="1"/>
+                <ma14:wrappingTextBoxFlag xmlns:ma14="http://schemas.microsoft.com/office/mac/drawingml/2011/main" xmlns:a14="http://schemas.microsoft.com/office/drawing/2010/main" xmlns:m="http://schemas.openxmlformats.org/officeDocument/2006/math" xmlns="" val="1"/>
               </a:ext>
             </a:extLst>
           </p:spPr>
@@ -3445,7 +3453,7 @@
             <a:effectLst/>
             <a:extLst>
               <a:ext uri="{C572A759-6A51-4108-AA02-DFA0A04FC94B}">
-                <ma14:wrappingTextBoxFlag xmlns="" xmlns:m="http://schemas.openxmlformats.org/officeDocument/2006/math" xmlns:a14="http://schemas.microsoft.com/office/drawing/2010/main" xmlns:ma14="http://schemas.microsoft.com/office/mac/drawingml/2011/main" val="1"/>
+                <ma14:wrappingTextBoxFlag xmlns:ma14="http://schemas.microsoft.com/office/mac/drawingml/2011/main" xmlns:a14="http://schemas.microsoft.com/office/drawing/2010/main" xmlns:m="http://schemas.openxmlformats.org/officeDocument/2006/math" xmlns="" val="1"/>
               </a:ext>
             </a:extLst>
           </p:spPr>
@@ -3563,7 +3571,7 @@
             <a:effectLst/>
             <a:extLst>
               <a:ext uri="{C572A759-6A51-4108-AA02-DFA0A04FC94B}">
-                <ma14:wrappingTextBoxFlag xmlns="" xmlns:m="http://schemas.openxmlformats.org/officeDocument/2006/math" xmlns:a14="http://schemas.microsoft.com/office/drawing/2010/main" xmlns:ma14="http://schemas.microsoft.com/office/mac/drawingml/2011/main" val="1"/>
+                <ma14:wrappingTextBoxFlag xmlns:ma14="http://schemas.microsoft.com/office/mac/drawingml/2011/main" xmlns:a14="http://schemas.microsoft.com/office/drawing/2010/main" xmlns:m="http://schemas.openxmlformats.org/officeDocument/2006/math" xmlns="" val="1"/>
               </a:ext>
             </a:extLst>
           </p:spPr>
@@ -3774,7 +3782,7 @@
           </a:ln>
           <a:extLst>
             <a:ext uri="{C572A759-6A51-4108-AA02-DFA0A04FC94B}">
-              <ma14:wrappingTextBoxFlag xmlns="" xmlns:m="http://schemas.openxmlformats.org/officeDocument/2006/math" xmlns:a14="http://schemas.microsoft.com/office/drawing/2010/main" xmlns:ma14="http://schemas.microsoft.com/office/mac/drawingml/2011/main" val="1"/>
+              <ma14:wrappingTextBoxFlag xmlns:ma14="http://schemas.microsoft.com/office/mac/drawingml/2011/main" xmlns:a14="http://schemas.microsoft.com/office/drawing/2010/main" xmlns:m="http://schemas.openxmlformats.org/officeDocument/2006/math" xmlns="" val="1"/>
             </a:ext>
           </a:extLst>
         </p:spPr>
@@ -3846,7 +3854,13 @@
               </a:avLst>
             </a:prstGeom>
             <a:blipFill rotWithShape="1">
-              <a:blip r:embed="rId2"/>
+              <a:blip r:embed="rId2" cstate="email">
+                <a:extLst>
+                  <a:ext uri="{28A0092B-C50C-407E-A947-70E740481C1C}">
+                    <a14:useLocalDpi xmlns:a14="http://schemas.microsoft.com/office/drawing/2010/main"/>
+                  </a:ext>
+                </a:extLst>
+              </a:blip>
               <a:srcRect/>
               <a:tile tx="0" ty="0" sx="100000" sy="100000" flip="none" algn="tl"/>
             </a:blipFill>
@@ -3895,7 +3909,7 @@
             <a:effectLst/>
             <a:extLst>
               <a:ext uri="{C572A759-6A51-4108-AA02-DFA0A04FC94B}">
-                <ma14:wrappingTextBoxFlag xmlns="" xmlns:m="http://schemas.openxmlformats.org/officeDocument/2006/math" xmlns:a14="http://schemas.microsoft.com/office/drawing/2010/main" xmlns:ma14="http://schemas.microsoft.com/office/mac/drawingml/2011/main" val="1"/>
+                <ma14:wrappingTextBoxFlag xmlns:ma14="http://schemas.microsoft.com/office/mac/drawingml/2011/main" xmlns:a14="http://schemas.microsoft.com/office/drawing/2010/main" xmlns:m="http://schemas.openxmlformats.org/officeDocument/2006/math" xmlns="" val="1"/>
               </a:ext>
             </a:extLst>
           </p:spPr>
@@ -4187,8 +4201,12 @@
           <p:nvPr/>
         </p:nvPicPr>
         <p:blipFill>
-          <a:blip r:embed="rId2">
-            <a:extLst/>
+          <a:blip r:embed="rId2" cstate="email">
+            <a:extLst>
+              <a:ext uri="{28A0092B-C50C-407E-A947-70E740481C1C}">
+                <a14:useLocalDpi xmlns:a14="http://schemas.microsoft.com/office/drawing/2010/main"/>
+              </a:ext>
+            </a:extLst>
           </a:blip>
           <a:stretch>
             <a:fillRect/>
@@ -4239,7 +4257,13 @@
               </a:avLst>
             </a:prstGeom>
             <a:blipFill rotWithShape="1">
-              <a:blip r:embed="rId3"/>
+              <a:blip r:embed="rId3" cstate="email">
+                <a:extLst>
+                  <a:ext uri="{28A0092B-C50C-407E-A947-70E740481C1C}">
+                    <a14:useLocalDpi xmlns:a14="http://schemas.microsoft.com/office/drawing/2010/main"/>
+                  </a:ext>
+                </a:extLst>
+              </a:blip>
               <a:srcRect/>
               <a:tile tx="0" ty="0" sx="100000" sy="100000" flip="none" algn="tl"/>
             </a:blipFill>
@@ -4288,7 +4312,7 @@
             <a:effectLst/>
             <a:extLst>
               <a:ext uri="{C572A759-6A51-4108-AA02-DFA0A04FC94B}">
-                <ma14:wrappingTextBoxFlag xmlns="" xmlns:m="http://schemas.openxmlformats.org/officeDocument/2006/math" xmlns:a14="http://schemas.microsoft.com/office/drawing/2010/main" xmlns:ma14="http://schemas.microsoft.com/office/mac/drawingml/2011/main" val="1"/>
+                <ma14:wrappingTextBoxFlag xmlns:ma14="http://schemas.microsoft.com/office/mac/drawingml/2011/main" xmlns:a14="http://schemas.microsoft.com/office/drawing/2010/main" xmlns:m="http://schemas.openxmlformats.org/officeDocument/2006/math" xmlns="" val="1"/>
               </a:ext>
             </a:extLst>
           </p:spPr>
@@ -4430,7 +4454,7 @@
             <a:effectLst/>
             <a:extLst>
               <a:ext uri="{C572A759-6A51-4108-AA02-DFA0A04FC94B}">
-                <ma14:wrappingTextBoxFlag xmlns="" xmlns:m="http://schemas.openxmlformats.org/officeDocument/2006/math" xmlns:a14="http://schemas.microsoft.com/office/drawing/2010/main" xmlns:ma14="http://schemas.microsoft.com/office/mac/drawingml/2011/main" val="1"/>
+                <ma14:wrappingTextBoxFlag xmlns:ma14="http://schemas.microsoft.com/office/mac/drawingml/2011/main" xmlns:a14="http://schemas.microsoft.com/office/drawing/2010/main" xmlns:m="http://schemas.openxmlformats.org/officeDocument/2006/math" xmlns="" val="1"/>
               </a:ext>
             </a:extLst>
           </p:spPr>
@@ -4535,7 +4559,7 @@
             <a:effectLst/>
             <a:extLst>
               <a:ext uri="{C572A759-6A51-4108-AA02-DFA0A04FC94B}">
-                <ma14:wrappingTextBoxFlag xmlns="" xmlns:m="http://schemas.openxmlformats.org/officeDocument/2006/math" xmlns:a14="http://schemas.microsoft.com/office/drawing/2010/main" xmlns:ma14="http://schemas.microsoft.com/office/mac/drawingml/2011/main" val="1"/>
+                <ma14:wrappingTextBoxFlag xmlns:ma14="http://schemas.microsoft.com/office/mac/drawingml/2011/main" xmlns:a14="http://schemas.microsoft.com/office/drawing/2010/main" xmlns:m="http://schemas.openxmlformats.org/officeDocument/2006/math" xmlns="" val="1"/>
               </a:ext>
             </a:extLst>
           </p:spPr>
@@ -4670,7 +4694,7 @@
             <a:effectLst/>
             <a:extLst>
               <a:ext uri="{C572A759-6A51-4108-AA02-DFA0A04FC94B}">
-                <ma14:wrappingTextBoxFlag xmlns="" xmlns:m="http://schemas.openxmlformats.org/officeDocument/2006/math" xmlns:a14="http://schemas.microsoft.com/office/drawing/2010/main" xmlns:ma14="http://schemas.microsoft.com/office/mac/drawingml/2011/main" val="1"/>
+                <ma14:wrappingTextBoxFlag xmlns:ma14="http://schemas.microsoft.com/office/mac/drawingml/2011/main" xmlns:a14="http://schemas.microsoft.com/office/drawing/2010/main" xmlns:m="http://schemas.openxmlformats.org/officeDocument/2006/math" xmlns="" val="1"/>
               </a:ext>
             </a:extLst>
           </p:spPr>
@@ -4805,7 +4829,7 @@
             <a:effectLst/>
             <a:extLst>
               <a:ext uri="{C572A759-6A51-4108-AA02-DFA0A04FC94B}">
-                <ma14:wrappingTextBoxFlag xmlns="" xmlns:m="http://schemas.openxmlformats.org/officeDocument/2006/math" xmlns:a14="http://schemas.microsoft.com/office/drawing/2010/main" xmlns:ma14="http://schemas.microsoft.com/office/mac/drawingml/2011/main" val="1"/>
+                <ma14:wrappingTextBoxFlag xmlns:ma14="http://schemas.microsoft.com/office/mac/drawingml/2011/main" xmlns:a14="http://schemas.microsoft.com/office/drawing/2010/main" xmlns:m="http://schemas.openxmlformats.org/officeDocument/2006/math" xmlns="" val="1"/>
               </a:ext>
             </a:extLst>
           </p:spPr>
@@ -4923,7 +4947,7 @@
             <a:effectLst/>
             <a:extLst>
               <a:ext uri="{C572A759-6A51-4108-AA02-DFA0A04FC94B}">
-                <ma14:wrappingTextBoxFlag xmlns="" xmlns:m="http://schemas.openxmlformats.org/officeDocument/2006/math" xmlns:a14="http://schemas.microsoft.com/office/drawing/2010/main" xmlns:ma14="http://schemas.microsoft.com/office/mac/drawingml/2011/main" val="1"/>
+                <ma14:wrappingTextBoxFlag xmlns:ma14="http://schemas.microsoft.com/office/mac/drawingml/2011/main" xmlns:a14="http://schemas.microsoft.com/office/drawing/2010/main" xmlns:m="http://schemas.openxmlformats.org/officeDocument/2006/math" xmlns="" val="1"/>
               </a:ext>
             </a:extLst>
           </p:spPr>
@@ -5134,7 +5158,7 @@
           </a:ln>
           <a:extLst>
             <a:ext uri="{C572A759-6A51-4108-AA02-DFA0A04FC94B}">
-              <ma14:wrappingTextBoxFlag xmlns="" xmlns:m="http://schemas.openxmlformats.org/officeDocument/2006/math" xmlns:a14="http://schemas.microsoft.com/office/drawing/2010/main" xmlns:ma14="http://schemas.microsoft.com/office/mac/drawingml/2011/main" val="1"/>
+              <ma14:wrappingTextBoxFlag xmlns:ma14="http://schemas.microsoft.com/office/mac/drawingml/2011/main" xmlns:a14="http://schemas.microsoft.com/office/drawing/2010/main" xmlns:m="http://schemas.openxmlformats.org/officeDocument/2006/math" xmlns="" val="1"/>
             </a:ext>
           </a:extLst>
         </p:spPr>
@@ -5206,7 +5230,13 @@
               </a:avLst>
             </a:prstGeom>
             <a:blipFill rotWithShape="1">
-              <a:blip r:embed="rId2"/>
+              <a:blip r:embed="rId2" cstate="email">
+                <a:extLst>
+                  <a:ext uri="{28A0092B-C50C-407E-A947-70E740481C1C}">
+                    <a14:useLocalDpi xmlns:a14="http://schemas.microsoft.com/office/drawing/2010/main"/>
+                  </a:ext>
+                </a:extLst>
+              </a:blip>
               <a:srcRect/>
               <a:tile tx="0" ty="0" sx="100000" sy="100000" flip="none" algn="tl"/>
             </a:blipFill>
@@ -5255,7 +5285,7 @@
             <a:effectLst/>
             <a:extLst>
               <a:ext uri="{C572A759-6A51-4108-AA02-DFA0A04FC94B}">
-                <ma14:wrappingTextBoxFlag xmlns="" xmlns:m="http://schemas.openxmlformats.org/officeDocument/2006/math" xmlns:a14="http://schemas.microsoft.com/office/drawing/2010/main" xmlns:ma14="http://schemas.microsoft.com/office/mac/drawingml/2011/main" val="1"/>
+                <ma14:wrappingTextBoxFlag xmlns:ma14="http://schemas.microsoft.com/office/mac/drawingml/2011/main" xmlns:a14="http://schemas.microsoft.com/office/drawing/2010/main" xmlns:m="http://schemas.openxmlformats.org/officeDocument/2006/math" xmlns="" val="1"/>
               </a:ext>
             </a:extLst>
           </p:spPr>
@@ -5402,7 +5432,7 @@
             <a:effectLst/>
             <a:extLst>
               <a:ext uri="{C572A759-6A51-4108-AA02-DFA0A04FC94B}">
-                <ma14:wrappingTextBoxFlag xmlns="" xmlns:m="http://schemas.openxmlformats.org/officeDocument/2006/math" xmlns:a14="http://schemas.microsoft.com/office/drawing/2010/main" xmlns:ma14="http://schemas.microsoft.com/office/mac/drawingml/2011/main" val="1"/>
+                <ma14:wrappingTextBoxFlag xmlns:ma14="http://schemas.microsoft.com/office/mac/drawingml/2011/main" xmlns:a14="http://schemas.microsoft.com/office/drawing/2010/main" xmlns:m="http://schemas.openxmlformats.org/officeDocument/2006/math" xmlns="" val="1"/>
               </a:ext>
             </a:extLst>
           </p:spPr>
@@ -5533,7 +5563,7 @@
             <a:effectLst/>
             <a:extLst>
               <a:ext uri="{C572A759-6A51-4108-AA02-DFA0A04FC94B}">
-                <ma14:wrappingTextBoxFlag xmlns="" xmlns:m="http://schemas.openxmlformats.org/officeDocument/2006/math" xmlns:a14="http://schemas.microsoft.com/office/drawing/2010/main" xmlns:ma14="http://schemas.microsoft.com/office/mac/drawingml/2011/main" val="1"/>
+                <ma14:wrappingTextBoxFlag xmlns:ma14="http://schemas.microsoft.com/office/mac/drawingml/2011/main" xmlns:a14="http://schemas.microsoft.com/office/drawing/2010/main" xmlns:m="http://schemas.openxmlformats.org/officeDocument/2006/math" xmlns="" val="1"/>
               </a:ext>
             </a:extLst>
           </p:spPr>
@@ -5638,7 +5668,7 @@
             <a:effectLst/>
             <a:extLst>
               <a:ext uri="{C572A759-6A51-4108-AA02-DFA0A04FC94B}">
-                <ma14:wrappingTextBoxFlag xmlns="" xmlns:m="http://schemas.openxmlformats.org/officeDocument/2006/math" xmlns:a14="http://schemas.microsoft.com/office/drawing/2010/main" xmlns:ma14="http://schemas.microsoft.com/office/mac/drawingml/2011/main" val="1"/>
+                <ma14:wrappingTextBoxFlag xmlns:ma14="http://schemas.microsoft.com/office/mac/drawingml/2011/main" xmlns:a14="http://schemas.microsoft.com/office/drawing/2010/main" xmlns:m="http://schemas.openxmlformats.org/officeDocument/2006/math" xmlns="" val="1"/>
               </a:ext>
             </a:extLst>
           </p:spPr>
@@ -5773,7 +5803,7 @@
             <a:effectLst/>
             <a:extLst>
               <a:ext uri="{C572A759-6A51-4108-AA02-DFA0A04FC94B}">
-                <ma14:wrappingTextBoxFlag xmlns="" xmlns:m="http://schemas.openxmlformats.org/officeDocument/2006/math" xmlns:a14="http://schemas.microsoft.com/office/drawing/2010/main" xmlns:ma14="http://schemas.microsoft.com/office/mac/drawingml/2011/main" val="1"/>
+                <ma14:wrappingTextBoxFlag xmlns:ma14="http://schemas.microsoft.com/office/mac/drawingml/2011/main" xmlns:a14="http://schemas.microsoft.com/office/drawing/2010/main" xmlns:m="http://schemas.openxmlformats.org/officeDocument/2006/math" xmlns="" val="1"/>
               </a:ext>
             </a:extLst>
           </p:spPr>
@@ -5908,7 +5938,7 @@
             <a:effectLst/>
             <a:extLst>
               <a:ext uri="{C572A759-6A51-4108-AA02-DFA0A04FC94B}">
-                <ma14:wrappingTextBoxFlag xmlns="" xmlns:m="http://schemas.openxmlformats.org/officeDocument/2006/math" xmlns:a14="http://schemas.microsoft.com/office/drawing/2010/main" xmlns:ma14="http://schemas.microsoft.com/office/mac/drawingml/2011/main" val="1"/>
+                <ma14:wrappingTextBoxFlag xmlns:ma14="http://schemas.microsoft.com/office/mac/drawingml/2011/main" xmlns:a14="http://schemas.microsoft.com/office/drawing/2010/main" xmlns:m="http://schemas.openxmlformats.org/officeDocument/2006/math" xmlns="" val="1"/>
               </a:ext>
             </a:extLst>
           </p:spPr>
@@ -6026,7 +6056,7 @@
             <a:effectLst/>
             <a:extLst>
               <a:ext uri="{C572A759-6A51-4108-AA02-DFA0A04FC94B}">
-                <ma14:wrappingTextBoxFlag xmlns="" xmlns:m="http://schemas.openxmlformats.org/officeDocument/2006/math" xmlns:a14="http://schemas.microsoft.com/office/drawing/2010/main" xmlns:ma14="http://schemas.microsoft.com/office/mac/drawingml/2011/main" val="1"/>
+                <ma14:wrappingTextBoxFlag xmlns:ma14="http://schemas.microsoft.com/office/mac/drawingml/2011/main" xmlns:a14="http://schemas.microsoft.com/office/drawing/2010/main" xmlns:m="http://schemas.openxmlformats.org/officeDocument/2006/math" xmlns="" val="1"/>
               </a:ext>
             </a:extLst>
           </p:spPr>
@@ -6237,7 +6267,7 @@
           </a:ln>
           <a:extLst>
             <a:ext uri="{C572A759-6A51-4108-AA02-DFA0A04FC94B}">
-              <ma14:wrappingTextBoxFlag xmlns="" xmlns:m="http://schemas.openxmlformats.org/officeDocument/2006/math" xmlns:a14="http://schemas.microsoft.com/office/drawing/2010/main" xmlns:ma14="http://schemas.microsoft.com/office/mac/drawingml/2011/main" val="1"/>
+              <ma14:wrappingTextBoxFlag xmlns:ma14="http://schemas.microsoft.com/office/mac/drawingml/2011/main" xmlns:a14="http://schemas.microsoft.com/office/drawing/2010/main" xmlns:m="http://schemas.openxmlformats.org/officeDocument/2006/math" xmlns="" val="1"/>
             </a:ext>
           </a:extLst>
         </p:spPr>
@@ -6309,7 +6339,13 @@
               </a:avLst>
             </a:prstGeom>
             <a:blipFill rotWithShape="1">
-              <a:blip r:embed="rId2"/>
+              <a:blip r:embed="rId2" cstate="email">
+                <a:extLst>
+                  <a:ext uri="{28A0092B-C50C-407E-A947-70E740481C1C}">
+                    <a14:useLocalDpi xmlns:a14="http://schemas.microsoft.com/office/drawing/2010/main"/>
+                  </a:ext>
+                </a:extLst>
+              </a:blip>
               <a:srcRect/>
               <a:tile tx="0" ty="0" sx="100000" sy="100000" flip="none" algn="tl"/>
             </a:blipFill>
@@ -6358,7 +6394,7 @@
             <a:effectLst/>
             <a:extLst>
               <a:ext uri="{C572A759-6A51-4108-AA02-DFA0A04FC94B}">
-                <ma14:wrappingTextBoxFlag xmlns="" xmlns:m="http://schemas.openxmlformats.org/officeDocument/2006/math" xmlns:a14="http://schemas.microsoft.com/office/drawing/2010/main" xmlns:ma14="http://schemas.microsoft.com/office/mac/drawingml/2011/main" val="1"/>
+                <ma14:wrappingTextBoxFlag xmlns:ma14="http://schemas.microsoft.com/office/mac/drawingml/2011/main" xmlns:a14="http://schemas.microsoft.com/office/drawing/2010/main" xmlns:m="http://schemas.openxmlformats.org/officeDocument/2006/math" xmlns="" val="1"/>
               </a:ext>
             </a:extLst>
           </p:spPr>
@@ -6442,7 +6478,7 @@
           </a:ln>
           <a:extLst>
             <a:ext uri="{C572A759-6A51-4108-AA02-DFA0A04FC94B}">
-              <ma14:wrappingTextBoxFlag xmlns="" xmlns:m="http://schemas.openxmlformats.org/officeDocument/2006/math" xmlns:a14="http://schemas.microsoft.com/office/drawing/2010/main" xmlns:ma14="http://schemas.microsoft.com/office/mac/drawingml/2011/main" val="1"/>
+              <ma14:wrappingTextBoxFlag xmlns:ma14="http://schemas.microsoft.com/office/mac/drawingml/2011/main" xmlns:a14="http://schemas.microsoft.com/office/drawing/2010/main" xmlns:m="http://schemas.openxmlformats.org/officeDocument/2006/math" xmlns="" val="1"/>
             </a:ext>
           </a:extLst>
         </p:spPr>
@@ -6564,7 +6600,7 @@
             <a:effectLst/>
             <a:extLst>
               <a:ext uri="{C572A759-6A51-4108-AA02-DFA0A04FC94B}">
-                <ma14:wrappingTextBoxFlag xmlns="" xmlns:m="http://schemas.openxmlformats.org/officeDocument/2006/math" xmlns:a14="http://schemas.microsoft.com/office/drawing/2010/main" xmlns:ma14="http://schemas.microsoft.com/office/mac/drawingml/2011/main" val="1"/>
+                <ma14:wrappingTextBoxFlag xmlns:ma14="http://schemas.microsoft.com/office/mac/drawingml/2011/main" xmlns:a14="http://schemas.microsoft.com/office/drawing/2010/main" xmlns:m="http://schemas.openxmlformats.org/officeDocument/2006/math" xmlns="" val="1"/>
               </a:ext>
             </a:extLst>
           </p:spPr>
@@ -6717,7 +6753,7 @@
           </a:ln>
           <a:extLst>
             <a:ext uri="{C572A759-6A51-4108-AA02-DFA0A04FC94B}">
-              <ma14:wrappingTextBoxFlag xmlns="" xmlns:m="http://schemas.openxmlformats.org/officeDocument/2006/math" xmlns:a14="http://schemas.microsoft.com/office/drawing/2010/main" xmlns:ma14="http://schemas.microsoft.com/office/mac/drawingml/2011/main" val="1"/>
+              <ma14:wrappingTextBoxFlag xmlns:ma14="http://schemas.microsoft.com/office/mac/drawingml/2011/main" xmlns:a14="http://schemas.microsoft.com/office/drawing/2010/main" xmlns:m="http://schemas.openxmlformats.org/officeDocument/2006/math" xmlns="" val="1"/>
             </a:ext>
           </a:extLst>
         </p:spPr>
@@ -7269,7 +7305,7 @@
           </a:ln>
           <a:extLst>
             <a:ext uri="{C572A759-6A51-4108-AA02-DFA0A04FC94B}">
-              <ma14:wrappingTextBoxFlag xmlns="" xmlns:m="http://schemas.openxmlformats.org/officeDocument/2006/math" xmlns:a14="http://schemas.microsoft.com/office/drawing/2010/main" xmlns:ma14="http://schemas.microsoft.com/office/mac/drawingml/2011/main" val="1"/>
+              <ma14:wrappingTextBoxFlag xmlns:ma14="http://schemas.microsoft.com/office/mac/drawingml/2011/main" xmlns:a14="http://schemas.microsoft.com/office/drawing/2010/main" xmlns:m="http://schemas.openxmlformats.org/officeDocument/2006/math" xmlns="" val="1"/>
             </a:ext>
           </a:extLst>
         </p:spPr>
@@ -7370,7 +7406,7 @@
             <a:effectLst/>
             <a:extLst>
               <a:ext uri="{C572A759-6A51-4108-AA02-DFA0A04FC94B}">
-                <ma14:wrappingTextBoxFlag xmlns="" xmlns:m="http://schemas.openxmlformats.org/officeDocument/2006/math" xmlns:a14="http://schemas.microsoft.com/office/drawing/2010/main" xmlns:ma14="http://schemas.microsoft.com/office/mac/drawingml/2011/main" val="1"/>
+                <ma14:wrappingTextBoxFlag xmlns:ma14="http://schemas.microsoft.com/office/mac/drawingml/2011/main" xmlns:a14="http://schemas.microsoft.com/office/drawing/2010/main" xmlns:m="http://schemas.openxmlformats.org/officeDocument/2006/math" xmlns="" val="1"/>
               </a:ext>
             </a:extLst>
           </p:spPr>
@@ -7475,7 +7511,7 @@
           </a:ln>
           <a:extLst>
             <a:ext uri="{C572A759-6A51-4108-AA02-DFA0A04FC94B}">
-              <ma14:wrappingTextBoxFlag xmlns="" xmlns:m="http://schemas.openxmlformats.org/officeDocument/2006/math" xmlns:a14="http://schemas.microsoft.com/office/drawing/2010/main" xmlns:ma14="http://schemas.microsoft.com/office/mac/drawingml/2011/main" val="1"/>
+              <ma14:wrappingTextBoxFlag xmlns:ma14="http://schemas.microsoft.com/office/mac/drawingml/2011/main" xmlns:a14="http://schemas.microsoft.com/office/drawing/2010/main" xmlns:m="http://schemas.openxmlformats.org/officeDocument/2006/math" xmlns="" val="1"/>
             </a:ext>
           </a:extLst>
         </p:spPr>
@@ -7704,7 +7740,7 @@
           </a:ln>
           <a:extLst>
             <a:ext uri="{C572A759-6A51-4108-AA02-DFA0A04FC94B}">
-              <ma14:wrappingTextBoxFlag xmlns="" xmlns:m="http://schemas.openxmlformats.org/officeDocument/2006/math" xmlns:a14="http://schemas.microsoft.com/office/drawing/2010/main" xmlns:ma14="http://schemas.microsoft.com/office/mac/drawingml/2011/main" val="1"/>
+              <ma14:wrappingTextBoxFlag xmlns:ma14="http://schemas.microsoft.com/office/mac/drawingml/2011/main" xmlns:a14="http://schemas.microsoft.com/office/drawing/2010/main" xmlns:m="http://schemas.openxmlformats.org/officeDocument/2006/math" xmlns="" val="1"/>
             </a:ext>
           </a:extLst>
         </p:spPr>
@@ -7986,7 +8022,7 @@
           </a:ln>
           <a:extLst>
             <a:ext uri="{C572A759-6A51-4108-AA02-DFA0A04FC94B}">
-              <ma14:wrappingTextBoxFlag xmlns="" xmlns:m="http://schemas.openxmlformats.org/officeDocument/2006/math" xmlns:a14="http://schemas.microsoft.com/office/drawing/2010/main" xmlns:ma14="http://schemas.microsoft.com/office/mac/drawingml/2011/main" val="1"/>
+              <ma14:wrappingTextBoxFlag xmlns:ma14="http://schemas.microsoft.com/office/mac/drawingml/2011/main" xmlns:a14="http://schemas.microsoft.com/office/drawing/2010/main" xmlns:m="http://schemas.openxmlformats.org/officeDocument/2006/math" xmlns="" val="1"/>
             </a:ext>
           </a:extLst>
         </p:spPr>
@@ -8417,7 +8453,7 @@
             <a:effectLst/>
             <a:extLst>
               <a:ext uri="{C572A759-6A51-4108-AA02-DFA0A04FC94B}">
-                <ma14:wrappingTextBoxFlag xmlns="" xmlns:m="http://schemas.openxmlformats.org/officeDocument/2006/math" xmlns:a14="http://schemas.microsoft.com/office/drawing/2010/main" xmlns:ma14="http://schemas.microsoft.com/office/mac/drawingml/2011/main" val="1"/>
+                <ma14:wrappingTextBoxFlag xmlns:ma14="http://schemas.microsoft.com/office/mac/drawingml/2011/main" xmlns:a14="http://schemas.microsoft.com/office/drawing/2010/main" xmlns:m="http://schemas.openxmlformats.org/officeDocument/2006/math" xmlns="" val="1"/>
               </a:ext>
             </a:extLst>
           </p:spPr>
@@ -8494,7 +8530,7 @@
           </a:ln>
           <a:extLst>
             <a:ext uri="{C572A759-6A51-4108-AA02-DFA0A04FC94B}">
-              <ma14:wrappingTextBoxFlag xmlns="" xmlns:m="http://schemas.openxmlformats.org/officeDocument/2006/math" xmlns:a14="http://schemas.microsoft.com/office/drawing/2010/main" xmlns:ma14="http://schemas.microsoft.com/office/mac/drawingml/2011/main" val="1"/>
+              <ma14:wrappingTextBoxFlag xmlns:ma14="http://schemas.microsoft.com/office/mac/drawingml/2011/main" xmlns:a14="http://schemas.microsoft.com/office/drawing/2010/main" xmlns:m="http://schemas.openxmlformats.org/officeDocument/2006/math" xmlns="" val="1"/>
             </a:ext>
           </a:extLst>
         </p:spPr>
@@ -8670,7 +8706,7 @@
           </a:ln>
           <a:extLst>
             <a:ext uri="{C572A759-6A51-4108-AA02-DFA0A04FC94B}">
-              <ma14:wrappingTextBoxFlag xmlns="" xmlns:m="http://schemas.openxmlformats.org/officeDocument/2006/math" xmlns:a14="http://schemas.microsoft.com/office/drawing/2010/main" xmlns:ma14="http://schemas.microsoft.com/office/mac/drawingml/2011/main" val="1"/>
+              <ma14:wrappingTextBoxFlag xmlns:ma14="http://schemas.microsoft.com/office/mac/drawingml/2011/main" xmlns:a14="http://schemas.microsoft.com/office/drawing/2010/main" xmlns:m="http://schemas.openxmlformats.org/officeDocument/2006/math" xmlns="" val="1"/>
             </a:ext>
           </a:extLst>
         </p:spPr>
@@ -8890,7 +8926,7 @@
           </a:ln>
           <a:extLst>
             <a:ext uri="{C572A759-6A51-4108-AA02-DFA0A04FC94B}">
-              <ma14:wrappingTextBoxFlag xmlns="" xmlns:m="http://schemas.openxmlformats.org/officeDocument/2006/math" xmlns:a14="http://schemas.microsoft.com/office/drawing/2010/main" xmlns:ma14="http://schemas.microsoft.com/office/mac/drawingml/2011/main" val="1"/>
+              <ma14:wrappingTextBoxFlag xmlns:ma14="http://schemas.microsoft.com/office/mac/drawingml/2011/main" xmlns:a14="http://schemas.microsoft.com/office/drawing/2010/main" xmlns:m="http://schemas.openxmlformats.org/officeDocument/2006/math" xmlns="" val="1"/>
             </a:ext>
           </a:extLst>
         </p:spPr>
@@ -9080,7 +9116,7 @@
           </a:ln>
           <a:extLst>
             <a:ext uri="{C572A759-6A51-4108-AA02-DFA0A04FC94B}">
-              <ma14:wrappingTextBoxFlag xmlns="" xmlns:m="http://schemas.openxmlformats.org/officeDocument/2006/math" xmlns:a14="http://schemas.microsoft.com/office/drawing/2010/main" xmlns:ma14="http://schemas.microsoft.com/office/mac/drawingml/2011/main" val="1"/>
+              <ma14:wrappingTextBoxFlag xmlns:ma14="http://schemas.microsoft.com/office/mac/drawingml/2011/main" xmlns:a14="http://schemas.microsoft.com/office/drawing/2010/main" xmlns:m="http://schemas.openxmlformats.org/officeDocument/2006/math" xmlns="" val="1"/>
             </a:ext>
           </a:extLst>
         </p:spPr>
@@ -9123,7 +9159,7 @@
           </a:ln>
           <a:extLst>
             <a:ext uri="{C572A759-6A51-4108-AA02-DFA0A04FC94B}">
-              <ma14:wrappingTextBoxFlag xmlns="" xmlns:m="http://schemas.openxmlformats.org/officeDocument/2006/math" xmlns:a14="http://schemas.microsoft.com/office/drawing/2010/main" xmlns:ma14="http://schemas.microsoft.com/office/mac/drawingml/2011/main" val="1"/>
+              <ma14:wrappingTextBoxFlag xmlns:ma14="http://schemas.microsoft.com/office/mac/drawingml/2011/main" xmlns:a14="http://schemas.microsoft.com/office/drawing/2010/main" xmlns:m="http://schemas.openxmlformats.org/officeDocument/2006/math" xmlns="" val="1"/>
             </a:ext>
           </a:extLst>
         </p:spPr>
@@ -9166,7 +9202,7 @@
           </a:ln>
           <a:extLst>
             <a:ext uri="{C572A759-6A51-4108-AA02-DFA0A04FC94B}">
-              <ma14:wrappingTextBoxFlag xmlns="" xmlns:m="http://schemas.openxmlformats.org/officeDocument/2006/math" xmlns:a14="http://schemas.microsoft.com/office/drawing/2010/main" xmlns:ma14="http://schemas.microsoft.com/office/mac/drawingml/2011/main" val="1"/>
+              <ma14:wrappingTextBoxFlag xmlns:ma14="http://schemas.microsoft.com/office/mac/drawingml/2011/main" xmlns:a14="http://schemas.microsoft.com/office/drawing/2010/main" xmlns:m="http://schemas.openxmlformats.org/officeDocument/2006/math" xmlns="" val="1"/>
             </a:ext>
           </a:extLst>
         </p:spPr>
@@ -9209,7 +9245,7 @@
           </a:ln>
           <a:extLst>
             <a:ext uri="{C572A759-6A51-4108-AA02-DFA0A04FC94B}">
-              <ma14:wrappingTextBoxFlag xmlns="" xmlns:m="http://schemas.openxmlformats.org/officeDocument/2006/math" xmlns:a14="http://schemas.microsoft.com/office/drawing/2010/main" xmlns:ma14="http://schemas.microsoft.com/office/mac/drawingml/2011/main" val="1"/>
+              <ma14:wrappingTextBoxFlag xmlns:ma14="http://schemas.microsoft.com/office/mac/drawingml/2011/main" xmlns:a14="http://schemas.microsoft.com/office/drawing/2010/main" xmlns:m="http://schemas.openxmlformats.org/officeDocument/2006/math" xmlns="" val="1"/>
             </a:ext>
           </a:extLst>
         </p:spPr>
@@ -9252,7 +9288,7 @@
           </a:ln>
           <a:extLst>
             <a:ext uri="{C572A759-6A51-4108-AA02-DFA0A04FC94B}">
-              <ma14:wrappingTextBoxFlag xmlns="" xmlns:m="http://schemas.openxmlformats.org/officeDocument/2006/math" xmlns:a14="http://schemas.microsoft.com/office/drawing/2010/main" xmlns:ma14="http://schemas.microsoft.com/office/mac/drawingml/2011/main" val="1"/>
+              <ma14:wrappingTextBoxFlag xmlns:ma14="http://schemas.microsoft.com/office/mac/drawingml/2011/main" xmlns:a14="http://schemas.microsoft.com/office/drawing/2010/main" xmlns:m="http://schemas.openxmlformats.org/officeDocument/2006/math" xmlns="" val="1"/>
             </a:ext>
           </a:extLst>
         </p:spPr>
@@ -10036,7 +10072,7 @@
           </a:ln>
           <a:extLst>
             <a:ext uri="{C572A759-6A51-4108-AA02-DFA0A04FC94B}">
-              <ma14:wrappingTextBoxFlag xmlns="" xmlns:m="http://schemas.openxmlformats.org/officeDocument/2006/math" xmlns:a14="http://schemas.microsoft.com/office/drawing/2010/main" xmlns:ma14="http://schemas.microsoft.com/office/mac/drawingml/2011/main" val="1"/>
+              <ma14:wrappingTextBoxFlag xmlns:ma14="http://schemas.microsoft.com/office/mac/drawingml/2011/main" xmlns:a14="http://schemas.microsoft.com/office/drawing/2010/main" xmlns:m="http://schemas.openxmlformats.org/officeDocument/2006/math" xmlns="" val="1"/>
             </a:ext>
           </a:extLst>
         </p:spPr>
@@ -10198,7 +10234,7 @@
           </a:ln>
           <a:extLst>
             <a:ext uri="{C572A759-6A51-4108-AA02-DFA0A04FC94B}">
-              <ma14:wrappingTextBoxFlag xmlns="" xmlns:m="http://schemas.openxmlformats.org/officeDocument/2006/math" xmlns:a14="http://schemas.microsoft.com/office/drawing/2010/main" xmlns:ma14="http://schemas.microsoft.com/office/mac/drawingml/2011/main" val="1"/>
+              <ma14:wrappingTextBoxFlag xmlns:ma14="http://schemas.microsoft.com/office/mac/drawingml/2011/main" xmlns:a14="http://schemas.microsoft.com/office/drawing/2010/main" xmlns:m="http://schemas.openxmlformats.org/officeDocument/2006/math" xmlns="" val="1"/>
             </a:ext>
           </a:extLst>
         </p:spPr>
@@ -10346,7 +10382,7 @@
             <a:effectLst/>
             <a:extLst>
               <a:ext uri="{C572A759-6A51-4108-AA02-DFA0A04FC94B}">
-                <ma14:wrappingTextBoxFlag xmlns="" xmlns:m="http://schemas.openxmlformats.org/officeDocument/2006/math" xmlns:a14="http://schemas.microsoft.com/office/drawing/2010/main" xmlns:ma14="http://schemas.microsoft.com/office/mac/drawingml/2011/main" val="1"/>
+                <ma14:wrappingTextBoxFlag xmlns:ma14="http://schemas.microsoft.com/office/mac/drawingml/2011/main" xmlns:a14="http://schemas.microsoft.com/office/drawing/2010/main" xmlns:m="http://schemas.openxmlformats.org/officeDocument/2006/math" xmlns="" val="1"/>
               </a:ext>
             </a:extLst>
           </p:spPr>
@@ -10448,7 +10484,7 @@
             <a:effectLst/>
             <a:extLst>
               <a:ext uri="{C572A759-6A51-4108-AA02-DFA0A04FC94B}">
-                <ma14:wrappingTextBoxFlag xmlns="" xmlns:m="http://schemas.openxmlformats.org/officeDocument/2006/math" xmlns:a14="http://schemas.microsoft.com/office/drawing/2010/main" xmlns:ma14="http://schemas.microsoft.com/office/mac/drawingml/2011/main" val="1"/>
+                <ma14:wrappingTextBoxFlag xmlns:ma14="http://schemas.microsoft.com/office/mac/drawingml/2011/main" xmlns:a14="http://schemas.microsoft.com/office/drawing/2010/main" xmlns:m="http://schemas.openxmlformats.org/officeDocument/2006/math" xmlns="" val="1"/>
               </a:ext>
             </a:extLst>
           </p:spPr>
@@ -10580,7 +10616,7 @@
             <a:effectLst/>
             <a:extLst>
               <a:ext uri="{C572A759-6A51-4108-AA02-DFA0A04FC94B}">
-                <ma14:wrappingTextBoxFlag xmlns="" xmlns:m="http://schemas.openxmlformats.org/officeDocument/2006/math" xmlns:a14="http://schemas.microsoft.com/office/drawing/2010/main" xmlns:ma14="http://schemas.microsoft.com/office/mac/drawingml/2011/main" val="1"/>
+                <ma14:wrappingTextBoxFlag xmlns:ma14="http://schemas.microsoft.com/office/mac/drawingml/2011/main" xmlns:a14="http://schemas.microsoft.com/office/drawing/2010/main" xmlns:m="http://schemas.openxmlformats.org/officeDocument/2006/math" xmlns="" val="1"/>
               </a:ext>
             </a:extLst>
           </p:spPr>
@@ -10712,7 +10748,7 @@
             <a:effectLst/>
             <a:extLst>
               <a:ext uri="{C572A759-6A51-4108-AA02-DFA0A04FC94B}">
-                <ma14:wrappingTextBoxFlag xmlns="" xmlns:m="http://schemas.openxmlformats.org/officeDocument/2006/math" xmlns:a14="http://schemas.microsoft.com/office/drawing/2010/main" xmlns:ma14="http://schemas.microsoft.com/office/mac/drawingml/2011/main" val="1"/>
+                <ma14:wrappingTextBoxFlag xmlns:ma14="http://schemas.microsoft.com/office/mac/drawingml/2011/main" xmlns:a14="http://schemas.microsoft.com/office/drawing/2010/main" xmlns:m="http://schemas.openxmlformats.org/officeDocument/2006/math" xmlns="" val="1"/>
               </a:ext>
             </a:extLst>
           </p:spPr>
@@ -10846,7 +10882,7 @@
           </a:ln>
           <a:extLst>
             <a:ext uri="{C572A759-6A51-4108-AA02-DFA0A04FC94B}">
-              <ma14:wrappingTextBoxFlag xmlns="" xmlns:m="http://schemas.openxmlformats.org/officeDocument/2006/math" xmlns:a14="http://schemas.microsoft.com/office/drawing/2010/main" xmlns:ma14="http://schemas.microsoft.com/office/mac/drawingml/2011/main" val="1"/>
+              <ma14:wrappingTextBoxFlag xmlns:ma14="http://schemas.microsoft.com/office/mac/drawingml/2011/main" xmlns:a14="http://schemas.microsoft.com/office/drawing/2010/main" xmlns:m="http://schemas.openxmlformats.org/officeDocument/2006/math" xmlns="" val="1"/>
             </a:ext>
           </a:extLst>
         </p:spPr>
@@ -10952,7 +10988,7 @@
           </a:ln>
           <a:extLst>
             <a:ext uri="{C572A759-6A51-4108-AA02-DFA0A04FC94B}">
-              <ma14:wrappingTextBoxFlag xmlns="" xmlns:m="http://schemas.openxmlformats.org/officeDocument/2006/math" xmlns:a14="http://schemas.microsoft.com/office/drawing/2010/main" xmlns:ma14="http://schemas.microsoft.com/office/mac/drawingml/2011/main" val="1"/>
+              <ma14:wrappingTextBoxFlag xmlns:ma14="http://schemas.microsoft.com/office/mac/drawingml/2011/main" xmlns:a14="http://schemas.microsoft.com/office/drawing/2010/main" xmlns:m="http://schemas.openxmlformats.org/officeDocument/2006/math" xmlns="" val="1"/>
             </a:ext>
           </a:extLst>
         </p:spPr>
@@ -11042,7 +11078,7 @@
           </a:ln>
           <a:extLst>
             <a:ext uri="{C572A759-6A51-4108-AA02-DFA0A04FC94B}">
-              <ma14:wrappingTextBoxFlag xmlns="" xmlns:m="http://schemas.openxmlformats.org/officeDocument/2006/math" xmlns:a14="http://schemas.microsoft.com/office/drawing/2010/main" xmlns:ma14="http://schemas.microsoft.com/office/mac/drawingml/2011/main" val="1"/>
+              <ma14:wrappingTextBoxFlag xmlns:ma14="http://schemas.microsoft.com/office/mac/drawingml/2011/main" xmlns:a14="http://schemas.microsoft.com/office/drawing/2010/main" xmlns:m="http://schemas.openxmlformats.org/officeDocument/2006/math" xmlns="" val="1"/>
             </a:ext>
           </a:extLst>
         </p:spPr>
@@ -11391,7 +11427,7 @@
             <a:effectLst/>
             <a:extLst>
               <a:ext uri="{C572A759-6A51-4108-AA02-DFA0A04FC94B}">
-                <ma14:wrappingTextBoxFlag xmlns="" xmlns:m="http://schemas.openxmlformats.org/officeDocument/2006/math" xmlns:a14="http://schemas.microsoft.com/office/drawing/2010/main" xmlns:ma14="http://schemas.microsoft.com/office/mac/drawingml/2011/main" val="1"/>
+                <ma14:wrappingTextBoxFlag xmlns:ma14="http://schemas.microsoft.com/office/mac/drawingml/2011/main" xmlns:a14="http://schemas.microsoft.com/office/drawing/2010/main" xmlns:m="http://schemas.openxmlformats.org/officeDocument/2006/math" xmlns="" val="1"/>
               </a:ext>
             </a:extLst>
           </p:spPr>
@@ -11553,7 +11589,7 @@
             <a:effectLst/>
             <a:extLst>
               <a:ext uri="{C572A759-6A51-4108-AA02-DFA0A04FC94B}">
-                <ma14:wrappingTextBoxFlag xmlns="" xmlns:m="http://schemas.openxmlformats.org/officeDocument/2006/math" xmlns:a14="http://schemas.microsoft.com/office/drawing/2010/main" xmlns:ma14="http://schemas.microsoft.com/office/mac/drawingml/2011/main" val="1"/>
+                <ma14:wrappingTextBoxFlag xmlns:ma14="http://schemas.microsoft.com/office/mac/drawingml/2011/main" xmlns:a14="http://schemas.microsoft.com/office/drawing/2010/main" xmlns:m="http://schemas.openxmlformats.org/officeDocument/2006/math" xmlns="" val="1"/>
               </a:ext>
             </a:extLst>
           </p:spPr>
@@ -11685,7 +11721,7 @@
             <a:effectLst/>
             <a:extLst>
               <a:ext uri="{C572A759-6A51-4108-AA02-DFA0A04FC94B}">
-                <ma14:wrappingTextBoxFlag xmlns="" xmlns:m="http://schemas.openxmlformats.org/officeDocument/2006/math" xmlns:a14="http://schemas.microsoft.com/office/drawing/2010/main" xmlns:ma14="http://schemas.microsoft.com/office/mac/drawingml/2011/main" val="1"/>
+                <ma14:wrappingTextBoxFlag xmlns:ma14="http://schemas.microsoft.com/office/mac/drawingml/2011/main" xmlns:a14="http://schemas.microsoft.com/office/drawing/2010/main" xmlns:m="http://schemas.openxmlformats.org/officeDocument/2006/math" xmlns="" val="1"/>
               </a:ext>
             </a:extLst>
           </p:spPr>
@@ -11905,7 +11941,7 @@
             <a:effectLst/>
             <a:extLst>
               <a:ext uri="{C572A759-6A51-4108-AA02-DFA0A04FC94B}">
-                <ma14:wrappingTextBoxFlag xmlns="" xmlns:m="http://schemas.openxmlformats.org/officeDocument/2006/math" xmlns:a14="http://schemas.microsoft.com/office/drawing/2010/main" xmlns:ma14="http://schemas.microsoft.com/office/mac/drawingml/2011/main" val="1"/>
+                <ma14:wrappingTextBoxFlag xmlns:ma14="http://schemas.microsoft.com/office/mac/drawingml/2011/main" xmlns:a14="http://schemas.microsoft.com/office/drawing/2010/main" xmlns:m="http://schemas.openxmlformats.org/officeDocument/2006/math" xmlns="" val="1"/>
               </a:ext>
             </a:extLst>
           </p:spPr>
@@ -12037,7 +12073,7 @@
             <a:effectLst/>
             <a:extLst>
               <a:ext uri="{C572A759-6A51-4108-AA02-DFA0A04FC94B}">
-                <ma14:wrappingTextBoxFlag xmlns="" xmlns:m="http://schemas.openxmlformats.org/officeDocument/2006/math" xmlns:a14="http://schemas.microsoft.com/office/drawing/2010/main" xmlns:ma14="http://schemas.microsoft.com/office/mac/drawingml/2011/main" val="1"/>
+                <ma14:wrappingTextBoxFlag xmlns:ma14="http://schemas.microsoft.com/office/mac/drawingml/2011/main" xmlns:a14="http://schemas.microsoft.com/office/drawing/2010/main" xmlns:m="http://schemas.openxmlformats.org/officeDocument/2006/math" xmlns="" val="1"/>
               </a:ext>
             </a:extLst>
           </p:spPr>
@@ -12287,7 +12323,7 @@
             <a:effectLst/>
             <a:extLst>
               <a:ext uri="{C572A759-6A51-4108-AA02-DFA0A04FC94B}">
-                <ma14:wrappingTextBoxFlag xmlns="" xmlns:m="http://schemas.openxmlformats.org/officeDocument/2006/math" xmlns:a14="http://schemas.microsoft.com/office/drawing/2010/main" xmlns:ma14="http://schemas.microsoft.com/office/mac/drawingml/2011/main" val="1"/>
+                <ma14:wrappingTextBoxFlag xmlns:ma14="http://schemas.microsoft.com/office/mac/drawingml/2011/main" xmlns:a14="http://schemas.microsoft.com/office/drawing/2010/main" xmlns:m="http://schemas.openxmlformats.org/officeDocument/2006/math" xmlns="" val="1"/>
               </a:ext>
             </a:extLst>
           </p:spPr>
@@ -12331,7 +12367,7 @@
           </a:ln>
           <a:extLst>
             <a:ext uri="{C572A759-6A51-4108-AA02-DFA0A04FC94B}">
-              <ma14:wrappingTextBoxFlag xmlns="" xmlns:m="http://schemas.openxmlformats.org/officeDocument/2006/math" xmlns:a14="http://schemas.microsoft.com/office/drawing/2010/main" xmlns:ma14="http://schemas.microsoft.com/office/mac/drawingml/2011/main" val="1"/>
+              <ma14:wrappingTextBoxFlag xmlns:ma14="http://schemas.microsoft.com/office/mac/drawingml/2011/main" xmlns:a14="http://schemas.microsoft.com/office/drawing/2010/main" xmlns:m="http://schemas.openxmlformats.org/officeDocument/2006/math" xmlns="" val="1"/>
             </a:ext>
           </a:extLst>
         </p:spPr>
@@ -12374,7 +12410,7 @@
           </a:ln>
           <a:extLst>
             <a:ext uri="{C572A759-6A51-4108-AA02-DFA0A04FC94B}">
-              <ma14:wrappingTextBoxFlag xmlns="" xmlns:m="http://schemas.openxmlformats.org/officeDocument/2006/math" xmlns:a14="http://schemas.microsoft.com/office/drawing/2010/main" xmlns:ma14="http://schemas.microsoft.com/office/mac/drawingml/2011/main" val="1"/>
+              <ma14:wrappingTextBoxFlag xmlns:ma14="http://schemas.microsoft.com/office/mac/drawingml/2011/main" xmlns:a14="http://schemas.microsoft.com/office/drawing/2010/main" xmlns:m="http://schemas.openxmlformats.org/officeDocument/2006/math" xmlns="" val="1"/>
             </a:ext>
           </a:extLst>
         </p:spPr>
@@ -12417,7 +12453,7 @@
           </a:ln>
           <a:extLst>
             <a:ext uri="{C572A759-6A51-4108-AA02-DFA0A04FC94B}">
-              <ma14:wrappingTextBoxFlag xmlns="" xmlns:m="http://schemas.openxmlformats.org/officeDocument/2006/math" xmlns:a14="http://schemas.microsoft.com/office/drawing/2010/main" xmlns:ma14="http://schemas.microsoft.com/office/mac/drawingml/2011/main" val="1"/>
+              <ma14:wrappingTextBoxFlag xmlns:ma14="http://schemas.microsoft.com/office/mac/drawingml/2011/main" xmlns:a14="http://schemas.microsoft.com/office/drawing/2010/main" xmlns:m="http://schemas.openxmlformats.org/officeDocument/2006/math" xmlns="" val="1"/>
             </a:ext>
           </a:extLst>
         </p:spPr>
@@ -12460,7 +12496,7 @@
           </a:ln>
           <a:extLst>
             <a:ext uri="{C572A759-6A51-4108-AA02-DFA0A04FC94B}">
-              <ma14:wrappingTextBoxFlag xmlns="" xmlns:m="http://schemas.openxmlformats.org/officeDocument/2006/math" xmlns:a14="http://schemas.microsoft.com/office/drawing/2010/main" xmlns:ma14="http://schemas.microsoft.com/office/mac/drawingml/2011/main" val="1"/>
+              <ma14:wrappingTextBoxFlag xmlns:ma14="http://schemas.microsoft.com/office/mac/drawingml/2011/main" xmlns:a14="http://schemas.microsoft.com/office/drawing/2010/main" xmlns:m="http://schemas.openxmlformats.org/officeDocument/2006/math" xmlns="" val="1"/>
             </a:ext>
           </a:extLst>
         </p:spPr>
@@ -12566,7 +12602,7 @@
           </a:ln>
           <a:extLst>
             <a:ext uri="{C572A759-6A51-4108-AA02-DFA0A04FC94B}">
-              <ma14:wrappingTextBoxFlag xmlns="" xmlns:m="http://schemas.openxmlformats.org/officeDocument/2006/math" xmlns:a14="http://schemas.microsoft.com/office/drawing/2010/main" xmlns:ma14="http://schemas.microsoft.com/office/mac/drawingml/2011/main" val="1"/>
+              <ma14:wrappingTextBoxFlag xmlns:ma14="http://schemas.microsoft.com/office/mac/drawingml/2011/main" xmlns:a14="http://schemas.microsoft.com/office/drawing/2010/main" xmlns:m="http://schemas.openxmlformats.org/officeDocument/2006/math" xmlns="" val="1"/>
             </a:ext>
           </a:extLst>
         </p:spPr>
@@ -12724,7 +12760,7 @@
           </a:ln>
           <a:extLst>
             <a:ext uri="{C572A759-6A51-4108-AA02-DFA0A04FC94B}">
-              <ma14:wrappingTextBoxFlag xmlns="" xmlns:m="http://schemas.openxmlformats.org/officeDocument/2006/math" xmlns:a14="http://schemas.microsoft.com/office/drawing/2010/main" xmlns:ma14="http://schemas.microsoft.com/office/mac/drawingml/2011/main" val="1"/>
+              <ma14:wrappingTextBoxFlag xmlns:ma14="http://schemas.microsoft.com/office/mac/drawingml/2011/main" xmlns:a14="http://schemas.microsoft.com/office/drawing/2010/main" xmlns:m="http://schemas.openxmlformats.org/officeDocument/2006/math" xmlns="" val="1"/>
             </a:ext>
           </a:extLst>
         </p:spPr>
@@ -13045,7 +13081,7 @@
             <a:effectLst/>
             <a:extLst>
               <a:ext uri="{C572A759-6A51-4108-AA02-DFA0A04FC94B}">
-                <ma14:wrappingTextBoxFlag xmlns="" xmlns:m="http://schemas.openxmlformats.org/officeDocument/2006/math" xmlns:a14="http://schemas.microsoft.com/office/drawing/2010/main" xmlns:ma14="http://schemas.microsoft.com/office/mac/drawingml/2011/main" val="1"/>
+                <ma14:wrappingTextBoxFlag xmlns:ma14="http://schemas.microsoft.com/office/mac/drawingml/2011/main" xmlns:a14="http://schemas.microsoft.com/office/drawing/2010/main" xmlns:m="http://schemas.openxmlformats.org/officeDocument/2006/math" xmlns="" val="1"/>
               </a:ext>
             </a:extLst>
           </p:spPr>
@@ -13385,7 +13421,7 @@
           </a:ln>
           <a:extLst>
             <a:ext uri="{C572A759-6A51-4108-AA02-DFA0A04FC94B}">
-              <ma14:wrappingTextBoxFlag xmlns="" xmlns:m="http://schemas.openxmlformats.org/officeDocument/2006/math" xmlns:a14="http://schemas.microsoft.com/office/drawing/2010/main" xmlns:ma14="http://schemas.microsoft.com/office/mac/drawingml/2011/main" val="1"/>
+              <ma14:wrappingTextBoxFlag xmlns:ma14="http://schemas.microsoft.com/office/mac/drawingml/2011/main" xmlns:a14="http://schemas.microsoft.com/office/drawing/2010/main" xmlns:m="http://schemas.openxmlformats.org/officeDocument/2006/math" xmlns="" val="1"/>
             </a:ext>
           </a:extLst>
         </p:spPr>
@@ -13446,7 +13482,7 @@
           </a:ln>
           <a:extLst>
             <a:ext uri="{C572A759-6A51-4108-AA02-DFA0A04FC94B}">
-              <ma14:wrappingTextBoxFlag xmlns="" xmlns:m="http://schemas.openxmlformats.org/officeDocument/2006/math" xmlns:a14="http://schemas.microsoft.com/office/drawing/2010/main" xmlns:ma14="http://schemas.microsoft.com/office/mac/drawingml/2011/main" val="1"/>
+              <ma14:wrappingTextBoxFlag xmlns:ma14="http://schemas.microsoft.com/office/mac/drawingml/2011/main" xmlns:a14="http://schemas.microsoft.com/office/drawing/2010/main" xmlns:m="http://schemas.openxmlformats.org/officeDocument/2006/math" xmlns="" val="1"/>
             </a:ext>
           </a:extLst>
         </p:spPr>
@@ -13547,7 +13583,7 @@
             <a:effectLst/>
             <a:extLst>
               <a:ext uri="{C572A759-6A51-4108-AA02-DFA0A04FC94B}">
-                <ma14:wrappingTextBoxFlag xmlns="" xmlns:m="http://schemas.openxmlformats.org/officeDocument/2006/math" xmlns:a14="http://schemas.microsoft.com/office/drawing/2010/main" xmlns:ma14="http://schemas.microsoft.com/office/mac/drawingml/2011/main" val="1"/>
+                <ma14:wrappingTextBoxFlag xmlns:ma14="http://schemas.microsoft.com/office/mac/drawingml/2011/main" xmlns:a14="http://schemas.microsoft.com/office/drawing/2010/main" xmlns:m="http://schemas.openxmlformats.org/officeDocument/2006/math" xmlns="" val="1"/>
               </a:ext>
             </a:extLst>
           </p:spPr>
@@ -13591,7 +13627,7 @@
           </a:ln>
           <a:extLst>
             <a:ext uri="{C572A759-6A51-4108-AA02-DFA0A04FC94B}">
-              <ma14:wrappingTextBoxFlag xmlns="" xmlns:m="http://schemas.openxmlformats.org/officeDocument/2006/math" xmlns:a14="http://schemas.microsoft.com/office/drawing/2010/main" xmlns:ma14="http://schemas.microsoft.com/office/mac/drawingml/2011/main" val="1"/>
+              <ma14:wrappingTextBoxFlag xmlns:ma14="http://schemas.microsoft.com/office/mac/drawingml/2011/main" xmlns:a14="http://schemas.microsoft.com/office/drawing/2010/main" xmlns:m="http://schemas.openxmlformats.org/officeDocument/2006/math" xmlns="" val="1"/>
             </a:ext>
           </a:extLst>
         </p:spPr>
@@ -13692,7 +13728,7 @@
             <a:effectLst/>
             <a:extLst>
               <a:ext uri="{C572A759-6A51-4108-AA02-DFA0A04FC94B}">
-                <ma14:wrappingTextBoxFlag xmlns="" xmlns:m="http://schemas.openxmlformats.org/officeDocument/2006/math" xmlns:a14="http://schemas.microsoft.com/office/drawing/2010/main" xmlns:ma14="http://schemas.microsoft.com/office/mac/drawingml/2011/main" val="1"/>
+                <ma14:wrappingTextBoxFlag xmlns:ma14="http://schemas.microsoft.com/office/mac/drawingml/2011/main" xmlns:a14="http://schemas.microsoft.com/office/drawing/2010/main" xmlns:m="http://schemas.openxmlformats.org/officeDocument/2006/math" xmlns="" val="1"/>
               </a:ext>
             </a:extLst>
           </p:spPr>
@@ -13794,7 +13830,7 @@
             <a:effectLst/>
             <a:extLst>
               <a:ext uri="{C572A759-6A51-4108-AA02-DFA0A04FC94B}">
-                <ma14:wrappingTextBoxFlag xmlns="" xmlns:m="http://schemas.openxmlformats.org/officeDocument/2006/math" xmlns:a14="http://schemas.microsoft.com/office/drawing/2010/main" xmlns:ma14="http://schemas.microsoft.com/office/mac/drawingml/2011/main" val="1"/>
+                <ma14:wrappingTextBoxFlag xmlns:ma14="http://schemas.microsoft.com/office/mac/drawingml/2011/main" xmlns:a14="http://schemas.microsoft.com/office/drawing/2010/main" xmlns:m="http://schemas.openxmlformats.org/officeDocument/2006/math" xmlns="" val="1"/>
               </a:ext>
             </a:extLst>
           </p:spPr>
@@ -13926,7 +13962,7 @@
             <a:effectLst/>
             <a:extLst>
               <a:ext uri="{C572A759-6A51-4108-AA02-DFA0A04FC94B}">
-                <ma14:wrappingTextBoxFlag xmlns="" xmlns:m="http://schemas.openxmlformats.org/officeDocument/2006/math" xmlns:a14="http://schemas.microsoft.com/office/drawing/2010/main" xmlns:ma14="http://schemas.microsoft.com/office/mac/drawingml/2011/main" val="1"/>
+                <ma14:wrappingTextBoxFlag xmlns:ma14="http://schemas.microsoft.com/office/mac/drawingml/2011/main" xmlns:a14="http://schemas.microsoft.com/office/drawing/2010/main" xmlns:m="http://schemas.openxmlformats.org/officeDocument/2006/math" xmlns="" val="1"/>
               </a:ext>
             </a:extLst>
           </p:spPr>
@@ -14053,7 +14089,7 @@
           </a:ln>
           <a:extLst>
             <a:ext uri="{C572A759-6A51-4108-AA02-DFA0A04FC94B}">
-              <ma14:wrappingTextBoxFlag xmlns="" xmlns:m="http://schemas.openxmlformats.org/officeDocument/2006/math" xmlns:a14="http://schemas.microsoft.com/office/drawing/2010/main" xmlns:ma14="http://schemas.microsoft.com/office/mac/drawingml/2011/main" val="1"/>
+              <ma14:wrappingTextBoxFlag xmlns:ma14="http://schemas.microsoft.com/office/mac/drawingml/2011/main" xmlns:a14="http://schemas.microsoft.com/office/drawing/2010/main" xmlns:m="http://schemas.openxmlformats.org/officeDocument/2006/math" xmlns="" val="1"/>
             </a:ext>
           </a:extLst>
         </p:spPr>
@@ -14437,7 +14473,7 @@
           </a:ln>
           <a:extLst>
             <a:ext uri="{C572A759-6A51-4108-AA02-DFA0A04FC94B}">
-              <ma14:wrappingTextBoxFlag xmlns="" xmlns:m="http://schemas.openxmlformats.org/officeDocument/2006/math" xmlns:a14="http://schemas.microsoft.com/office/drawing/2010/main" xmlns:ma14="http://schemas.microsoft.com/office/mac/drawingml/2011/main" val="1"/>
+              <ma14:wrappingTextBoxFlag xmlns:ma14="http://schemas.microsoft.com/office/mac/drawingml/2011/main" xmlns:a14="http://schemas.microsoft.com/office/drawing/2010/main" xmlns:m="http://schemas.openxmlformats.org/officeDocument/2006/math" xmlns="" val="1"/>
             </a:ext>
           </a:extLst>
         </p:spPr>
@@ -14548,7 +14584,7 @@
           </a:ln>
           <a:extLst>
             <a:ext uri="{C572A759-6A51-4108-AA02-DFA0A04FC94B}">
-              <ma14:wrappingTextBoxFlag xmlns="" xmlns:m="http://schemas.openxmlformats.org/officeDocument/2006/math" xmlns:a14="http://schemas.microsoft.com/office/drawing/2010/main" xmlns:ma14="http://schemas.microsoft.com/office/mac/drawingml/2011/main" val="1"/>
+              <ma14:wrappingTextBoxFlag xmlns:ma14="http://schemas.microsoft.com/office/mac/drawingml/2011/main" xmlns:a14="http://schemas.microsoft.com/office/drawing/2010/main" xmlns:m="http://schemas.openxmlformats.org/officeDocument/2006/math" xmlns="" val="1"/>
             </a:ext>
           </a:extLst>
         </p:spPr>
@@ -15009,7 +15045,7 @@
             <a:effectLst/>
             <a:extLst>
               <a:ext uri="{C572A759-6A51-4108-AA02-DFA0A04FC94B}">
-                <ma14:wrappingTextBoxFlag xmlns="" xmlns:m="http://schemas.openxmlformats.org/officeDocument/2006/math" xmlns:a14="http://schemas.microsoft.com/office/drawing/2010/main" xmlns:ma14="http://schemas.microsoft.com/office/mac/drawingml/2011/main" val="1"/>
+                <ma14:wrappingTextBoxFlag xmlns:ma14="http://schemas.microsoft.com/office/mac/drawingml/2011/main" xmlns:a14="http://schemas.microsoft.com/office/drawing/2010/main" xmlns:m="http://schemas.openxmlformats.org/officeDocument/2006/math" xmlns="" val="1"/>
               </a:ext>
             </a:extLst>
           </p:spPr>
@@ -15423,7 +15459,7 @@
           </a:ln>
           <a:extLst>
             <a:ext uri="{C572A759-6A51-4108-AA02-DFA0A04FC94B}">
-              <ma14:wrappingTextBoxFlag xmlns="" xmlns:m="http://schemas.openxmlformats.org/officeDocument/2006/math" xmlns:a14="http://schemas.microsoft.com/office/drawing/2010/main" xmlns:ma14="http://schemas.microsoft.com/office/mac/drawingml/2011/main" val="1"/>
+              <ma14:wrappingTextBoxFlag xmlns:ma14="http://schemas.microsoft.com/office/mac/drawingml/2011/main" xmlns:a14="http://schemas.microsoft.com/office/drawing/2010/main" xmlns:m="http://schemas.openxmlformats.org/officeDocument/2006/math" xmlns="" val="1"/>
             </a:ext>
           </a:extLst>
         </p:spPr>
@@ -15534,8 +15570,12 @@
           <p:nvPr/>
         </p:nvPicPr>
         <p:blipFill>
-          <a:blip r:embed="rId3">
-            <a:extLst/>
+          <a:blip r:embed="rId3" cstate="email">
+            <a:extLst>
+              <a:ext uri="{28A0092B-C50C-407E-A947-70E740481C1C}">
+                <a14:useLocalDpi xmlns:a14="http://schemas.microsoft.com/office/drawing/2010/main"/>
+              </a:ext>
+            </a:extLst>
           </a:blip>
           <a:stretch>
             <a:fillRect/>
@@ -15563,8 +15603,12 @@
           <p:nvPr/>
         </p:nvPicPr>
         <p:blipFill>
-          <a:blip r:embed="rId4">
-            <a:extLst/>
+          <a:blip r:embed="rId4" cstate="email">
+            <a:extLst>
+              <a:ext uri="{28A0092B-C50C-407E-A947-70E740481C1C}">
+                <a14:useLocalDpi xmlns:a14="http://schemas.microsoft.com/office/drawing/2010/main"/>
+              </a:ext>
+            </a:extLst>
           </a:blip>
           <a:stretch>
             <a:fillRect/>
@@ -15717,8 +15761,12 @@
           <p:nvPr/>
         </p:nvPicPr>
         <p:blipFill>
-          <a:blip r:embed="rId2">
-            <a:extLst/>
+          <a:blip r:embed="rId2" cstate="email">
+            <a:extLst>
+              <a:ext uri="{28A0092B-C50C-407E-A947-70E740481C1C}">
+                <a14:useLocalDpi xmlns:a14="http://schemas.microsoft.com/office/drawing/2010/main"/>
+              </a:ext>
+            </a:extLst>
           </a:blip>
           <a:stretch>
             <a:fillRect/>
@@ -15769,7 +15817,13 @@
               </a:avLst>
             </a:prstGeom>
             <a:blipFill rotWithShape="1">
-              <a:blip r:embed="rId3"/>
+              <a:blip r:embed="rId3" cstate="email">
+                <a:extLst>
+                  <a:ext uri="{28A0092B-C50C-407E-A947-70E740481C1C}">
+                    <a14:useLocalDpi xmlns:a14="http://schemas.microsoft.com/office/drawing/2010/main"/>
+                  </a:ext>
+                </a:extLst>
+              </a:blip>
               <a:srcRect/>
               <a:tile tx="0" ty="0" sx="100000" sy="100000" flip="none" algn="tl"/>
             </a:blipFill>
@@ -15818,7 +15872,7 @@
             <a:effectLst/>
             <a:extLst>
               <a:ext uri="{C572A759-6A51-4108-AA02-DFA0A04FC94B}">
-                <ma14:wrappingTextBoxFlag xmlns="" xmlns:m="http://schemas.openxmlformats.org/officeDocument/2006/math" xmlns:a14="http://schemas.microsoft.com/office/drawing/2010/main" xmlns:ma14="http://schemas.microsoft.com/office/mac/drawingml/2011/main" val="1"/>
+                <ma14:wrappingTextBoxFlag xmlns:ma14="http://schemas.microsoft.com/office/mac/drawingml/2011/main" xmlns:a14="http://schemas.microsoft.com/office/drawing/2010/main" xmlns:m="http://schemas.openxmlformats.org/officeDocument/2006/math" xmlns="" val="1"/>
               </a:ext>
             </a:extLst>
           </p:spPr>
@@ -15998,8 +16052,12 @@
           <p:nvPr/>
         </p:nvPicPr>
         <p:blipFill>
-          <a:blip r:embed="rId3">
-            <a:extLst/>
+          <a:blip r:embed="rId3" cstate="email">
+            <a:extLst>
+              <a:ext uri="{28A0092B-C50C-407E-A947-70E740481C1C}">
+                <a14:useLocalDpi xmlns:a14="http://schemas.microsoft.com/office/drawing/2010/main"/>
+              </a:ext>
+            </a:extLst>
           </a:blip>
           <a:stretch>
             <a:fillRect/>
@@ -16050,7 +16108,13 @@
               </a:avLst>
             </a:prstGeom>
             <a:blipFill rotWithShape="1">
-              <a:blip r:embed="rId4"/>
+              <a:blip r:embed="rId4" cstate="email">
+                <a:extLst>
+                  <a:ext uri="{28A0092B-C50C-407E-A947-70E740481C1C}">
+                    <a14:useLocalDpi xmlns:a14="http://schemas.microsoft.com/office/drawing/2010/main"/>
+                  </a:ext>
+                </a:extLst>
+              </a:blip>
               <a:srcRect/>
               <a:tile tx="0" ty="0" sx="100000" sy="100000" flip="none" algn="tl"/>
             </a:blipFill>
@@ -16099,7 +16163,7 @@
             <a:effectLst/>
             <a:extLst>
               <a:ext uri="{C572A759-6A51-4108-AA02-DFA0A04FC94B}">
-                <ma14:wrappingTextBoxFlag xmlns="" xmlns:m="http://schemas.openxmlformats.org/officeDocument/2006/math" xmlns:a14="http://schemas.microsoft.com/office/drawing/2010/main" xmlns:ma14="http://schemas.microsoft.com/office/mac/drawingml/2011/main" val="1"/>
+                <ma14:wrappingTextBoxFlag xmlns:ma14="http://schemas.microsoft.com/office/mac/drawingml/2011/main" xmlns:a14="http://schemas.microsoft.com/office/drawing/2010/main" xmlns:m="http://schemas.openxmlformats.org/officeDocument/2006/math" xmlns="" val="1"/>
               </a:ext>
             </a:extLst>
           </p:spPr>
@@ -16275,7 +16339,7 @@
             <a:effectLst/>
             <a:extLst>
               <a:ext uri="{C572A759-6A51-4108-AA02-DFA0A04FC94B}">
-                <ma14:wrappingTextBoxFlag xmlns="" xmlns:m="http://schemas.openxmlformats.org/officeDocument/2006/math" xmlns:a14="http://schemas.microsoft.com/office/drawing/2010/main" xmlns:ma14="http://schemas.microsoft.com/office/mac/drawingml/2011/main" val="1"/>
+                <ma14:wrappingTextBoxFlag xmlns:ma14="http://schemas.microsoft.com/office/mac/drawingml/2011/main" xmlns:a14="http://schemas.microsoft.com/office/drawing/2010/main" xmlns:m="http://schemas.openxmlformats.org/officeDocument/2006/math" xmlns="" val="1"/>
               </a:ext>
             </a:extLst>
           </p:spPr>
@@ -16719,7 +16783,7 @@
             <a:effectLst/>
             <a:extLst>
               <a:ext uri="{C572A759-6A51-4108-AA02-DFA0A04FC94B}">
-                <ma14:wrappingTextBoxFlag xmlns="" xmlns:m="http://schemas.openxmlformats.org/officeDocument/2006/math" xmlns:a14="http://schemas.microsoft.com/office/drawing/2010/main" xmlns:ma14="http://schemas.microsoft.com/office/mac/drawingml/2011/main" val="1"/>
+                <ma14:wrappingTextBoxFlag xmlns:ma14="http://schemas.microsoft.com/office/mac/drawingml/2011/main" xmlns:a14="http://schemas.microsoft.com/office/drawing/2010/main" xmlns:m="http://schemas.openxmlformats.org/officeDocument/2006/math" xmlns="" val="1"/>
               </a:ext>
             </a:extLst>
           </p:spPr>
@@ -16777,8 +16841,12 @@
           <p:nvPr/>
         </p:nvPicPr>
         <p:blipFill>
-          <a:blip r:embed="rId4">
-            <a:extLst/>
+          <a:blip r:embed="rId4" cstate="email">
+            <a:extLst>
+              <a:ext uri="{28A0092B-C50C-407E-A947-70E740481C1C}">
+                <a14:useLocalDpi xmlns:a14="http://schemas.microsoft.com/office/drawing/2010/main"/>
+              </a:ext>
+            </a:extLst>
           </a:blip>
           <a:stretch>
             <a:fillRect/>
@@ -16806,8 +16874,12 @@
           <p:nvPr/>
         </p:nvPicPr>
         <p:blipFill>
-          <a:blip r:embed="rId5">
-            <a:extLst/>
+          <a:blip r:embed="rId5" cstate="email">
+            <a:extLst>
+              <a:ext uri="{28A0092B-C50C-407E-A947-70E740481C1C}">
+                <a14:useLocalDpi xmlns:a14="http://schemas.microsoft.com/office/drawing/2010/main"/>
+              </a:ext>
+            </a:extLst>
           </a:blip>
           <a:stretch>
             <a:fillRect/>
@@ -16845,7 +16917,7 @@
           </a:ln>
           <a:extLst>
             <a:ext uri="{C572A759-6A51-4108-AA02-DFA0A04FC94B}">
-              <ma14:wrappingTextBoxFlag xmlns="" xmlns:m="http://schemas.openxmlformats.org/officeDocument/2006/math" xmlns:a14="http://schemas.microsoft.com/office/drawing/2010/main" xmlns:ma14="http://schemas.microsoft.com/office/mac/drawingml/2011/main" val="1"/>
+              <ma14:wrappingTextBoxFlag xmlns:ma14="http://schemas.microsoft.com/office/mac/drawingml/2011/main" xmlns:a14="http://schemas.microsoft.com/office/drawing/2010/main" xmlns:m="http://schemas.openxmlformats.org/officeDocument/2006/math" xmlns="" val="1"/>
             </a:ext>
           </a:extLst>
         </p:spPr>
@@ -16888,7 +16960,7 @@
           </a:ln>
           <a:extLst>
             <a:ext uri="{C572A759-6A51-4108-AA02-DFA0A04FC94B}">
-              <ma14:wrappingTextBoxFlag xmlns="" xmlns:m="http://schemas.openxmlformats.org/officeDocument/2006/math" xmlns:a14="http://schemas.microsoft.com/office/drawing/2010/main" xmlns:ma14="http://schemas.microsoft.com/office/mac/drawingml/2011/main" val="1"/>
+              <ma14:wrappingTextBoxFlag xmlns:ma14="http://schemas.microsoft.com/office/mac/drawingml/2011/main" xmlns:a14="http://schemas.microsoft.com/office/drawing/2010/main" xmlns:m="http://schemas.openxmlformats.org/officeDocument/2006/math" xmlns="" val="1"/>
             </a:ext>
           </a:extLst>
         </p:spPr>
@@ -16960,7 +17032,7 @@
           </a:ln>
           <a:extLst>
             <a:ext uri="{C572A759-6A51-4108-AA02-DFA0A04FC94B}">
-              <ma14:wrappingTextBoxFlag xmlns="" xmlns:m="http://schemas.openxmlformats.org/officeDocument/2006/math" xmlns:a14="http://schemas.microsoft.com/office/drawing/2010/main" xmlns:ma14="http://schemas.microsoft.com/office/mac/drawingml/2011/main" val="1"/>
+              <ma14:wrappingTextBoxFlag xmlns:ma14="http://schemas.microsoft.com/office/mac/drawingml/2011/main" xmlns:a14="http://schemas.microsoft.com/office/drawing/2010/main" xmlns:m="http://schemas.openxmlformats.org/officeDocument/2006/math" xmlns="" val="1"/>
             </a:ext>
           </a:extLst>
         </p:spPr>

</xml_diff>

<commit_message>
Updated logo on slides for class 1, added slides for class 2
</commit_message>
<xml_diff>
--- a/slides/Pythonlearn-01-Intro.pptx
+++ b/slides/Pythonlearn-01-Intro.pptx
@@ -540,6 +540,10 @@
           </p:nvPr>
         </p:nvSpPr>
         <p:spPr>
+          <a:xfrm>
+            <a:off x="381000" y="685800"/>
+            <a:ext cx="6096000" cy="3429000"/>
+          </a:xfrm>
           <a:prstGeom prst="rect">
             <a:avLst/>
           </a:prstGeom>
@@ -579,9 +583,7 @@
             </a:lvl1pPr>
           </a:lstStyle>
           <a:p>
-            <a:r>
-              <a:t>Note from Chuck.  If you are using these materials, you can remove the UM logo and replace it with your own, but please retain the CC-BY logo on the first page as well as retain the acknowledgements page(s).</a:t>
-            </a:r>
+            <a:endParaRPr dirty="0"/>
           </a:p>
         </p:txBody>
       </p:sp>
@@ -1148,7 +1150,7 @@
           </a:ln>
           <a:extLst>
             <a:ext uri="{C572A759-6A51-4108-AA02-DFA0A04FC94B}">
-              <ma14:wrappingTextBoxFlag xmlns:ma14="http://schemas.microsoft.com/office/mac/drawingml/2011/main" xmlns:a14="http://schemas.microsoft.com/office/drawing/2010/main" xmlns:m="http://schemas.openxmlformats.org/officeDocument/2006/math" xmlns="" val="1"/>
+              <ma14:wrappingTextBoxFlag xmlns="" xmlns:m="http://schemas.openxmlformats.org/officeDocument/2006/math" xmlns:a14="http://schemas.microsoft.com/office/drawing/2010/main" xmlns:ma14="http://schemas.microsoft.com/office/mac/drawingml/2011/main" val="1"/>
             </a:ext>
           </a:extLst>
         </p:spPr>
@@ -1187,7 +1189,7 @@
           </a:ln>
           <a:extLst>
             <a:ext uri="{C572A759-6A51-4108-AA02-DFA0A04FC94B}">
-              <ma14:wrappingTextBoxFlag xmlns:ma14="http://schemas.microsoft.com/office/mac/drawingml/2011/main" xmlns:a14="http://schemas.microsoft.com/office/drawing/2010/main" xmlns:m="http://schemas.openxmlformats.org/officeDocument/2006/math" xmlns="" val="1"/>
+              <ma14:wrappingTextBoxFlag xmlns="" xmlns:m="http://schemas.openxmlformats.org/officeDocument/2006/math" xmlns:a14="http://schemas.microsoft.com/office/drawing/2010/main" xmlns:ma14="http://schemas.microsoft.com/office/mac/drawingml/2011/main" val="1"/>
             </a:ext>
           </a:extLst>
         </p:spPr>
@@ -2190,7 +2192,7 @@
           </a:ln>
           <a:extLst>
             <a:ext uri="{C572A759-6A51-4108-AA02-DFA0A04FC94B}">
-              <ma14:wrappingTextBoxFlag xmlns:ma14="http://schemas.microsoft.com/office/mac/drawingml/2011/main" xmlns:a14="http://schemas.microsoft.com/office/drawing/2010/main" xmlns:m="http://schemas.openxmlformats.org/officeDocument/2006/math" xmlns="" val="1"/>
+              <ma14:wrappingTextBoxFlag xmlns="" xmlns:m="http://schemas.openxmlformats.org/officeDocument/2006/math" xmlns:a14="http://schemas.microsoft.com/office/drawing/2010/main" xmlns:ma14="http://schemas.microsoft.com/office/mac/drawingml/2011/main" val="1"/>
             </a:ext>
           </a:extLst>
         </p:spPr>
@@ -2749,7 +2751,7 @@
           </a:ln>
           <a:extLst>
             <a:ext uri="{C572A759-6A51-4108-AA02-DFA0A04FC94B}">
-              <ma14:wrappingTextBoxFlag xmlns:ma14="http://schemas.microsoft.com/office/mac/drawingml/2011/main" xmlns:a14="http://schemas.microsoft.com/office/drawing/2010/main" xmlns:m="http://schemas.openxmlformats.org/officeDocument/2006/math" xmlns="" val="1"/>
+              <ma14:wrappingTextBoxFlag xmlns="" xmlns:m="http://schemas.openxmlformats.org/officeDocument/2006/math" xmlns:a14="http://schemas.microsoft.com/office/drawing/2010/main" xmlns:ma14="http://schemas.microsoft.com/office/mac/drawingml/2011/main" val="1"/>
             </a:ext>
           </a:extLst>
         </p:spPr>
@@ -3071,7 +3073,7 @@
             <a:effectLst/>
             <a:extLst>
               <a:ext uri="{C572A759-6A51-4108-AA02-DFA0A04FC94B}">
-                <ma14:wrappingTextBoxFlag xmlns:ma14="http://schemas.microsoft.com/office/mac/drawingml/2011/main" xmlns:a14="http://schemas.microsoft.com/office/drawing/2010/main" xmlns:m="http://schemas.openxmlformats.org/officeDocument/2006/math" xmlns="" val="1"/>
+                <ma14:wrappingTextBoxFlag xmlns="" xmlns:m="http://schemas.openxmlformats.org/officeDocument/2006/math" xmlns:a14="http://schemas.microsoft.com/office/drawing/2010/main" xmlns:ma14="http://schemas.microsoft.com/office/mac/drawingml/2011/main" val="1"/>
               </a:ext>
             </a:extLst>
           </p:spPr>
@@ -3183,7 +3185,7 @@
             <a:effectLst/>
             <a:extLst>
               <a:ext uri="{C572A759-6A51-4108-AA02-DFA0A04FC94B}">
-                <ma14:wrappingTextBoxFlag xmlns:ma14="http://schemas.microsoft.com/office/mac/drawingml/2011/main" xmlns:a14="http://schemas.microsoft.com/office/drawing/2010/main" xmlns:m="http://schemas.openxmlformats.org/officeDocument/2006/math" xmlns="" val="1"/>
+                <ma14:wrappingTextBoxFlag xmlns="" xmlns:m="http://schemas.openxmlformats.org/officeDocument/2006/math" xmlns:a14="http://schemas.microsoft.com/office/drawing/2010/main" xmlns:ma14="http://schemas.microsoft.com/office/mac/drawingml/2011/main" val="1"/>
               </a:ext>
             </a:extLst>
           </p:spPr>
@@ -3318,7 +3320,7 @@
             <a:effectLst/>
             <a:extLst>
               <a:ext uri="{C572A759-6A51-4108-AA02-DFA0A04FC94B}">
-                <ma14:wrappingTextBoxFlag xmlns:ma14="http://schemas.microsoft.com/office/mac/drawingml/2011/main" xmlns:a14="http://schemas.microsoft.com/office/drawing/2010/main" xmlns:m="http://schemas.openxmlformats.org/officeDocument/2006/math" xmlns="" val="1"/>
+                <ma14:wrappingTextBoxFlag xmlns="" xmlns:m="http://schemas.openxmlformats.org/officeDocument/2006/math" xmlns:a14="http://schemas.microsoft.com/office/drawing/2010/main" xmlns:ma14="http://schemas.microsoft.com/office/mac/drawingml/2011/main" val="1"/>
               </a:ext>
             </a:extLst>
           </p:spPr>
@@ -3453,7 +3455,7 @@
             <a:effectLst/>
             <a:extLst>
               <a:ext uri="{C572A759-6A51-4108-AA02-DFA0A04FC94B}">
-                <ma14:wrappingTextBoxFlag xmlns:ma14="http://schemas.microsoft.com/office/mac/drawingml/2011/main" xmlns:a14="http://schemas.microsoft.com/office/drawing/2010/main" xmlns:m="http://schemas.openxmlformats.org/officeDocument/2006/math" xmlns="" val="1"/>
+                <ma14:wrappingTextBoxFlag xmlns="" xmlns:m="http://schemas.openxmlformats.org/officeDocument/2006/math" xmlns:a14="http://schemas.microsoft.com/office/drawing/2010/main" xmlns:ma14="http://schemas.microsoft.com/office/mac/drawingml/2011/main" val="1"/>
               </a:ext>
             </a:extLst>
           </p:spPr>
@@ -3571,7 +3573,7 @@
             <a:effectLst/>
             <a:extLst>
               <a:ext uri="{C572A759-6A51-4108-AA02-DFA0A04FC94B}">
-                <ma14:wrappingTextBoxFlag xmlns:ma14="http://schemas.microsoft.com/office/mac/drawingml/2011/main" xmlns:a14="http://schemas.microsoft.com/office/drawing/2010/main" xmlns:m="http://schemas.openxmlformats.org/officeDocument/2006/math" xmlns="" val="1"/>
+                <ma14:wrappingTextBoxFlag xmlns="" xmlns:m="http://schemas.openxmlformats.org/officeDocument/2006/math" xmlns:a14="http://schemas.microsoft.com/office/drawing/2010/main" xmlns:ma14="http://schemas.microsoft.com/office/mac/drawingml/2011/main" val="1"/>
               </a:ext>
             </a:extLst>
           </p:spPr>
@@ -3782,7 +3784,7 @@
           </a:ln>
           <a:extLst>
             <a:ext uri="{C572A759-6A51-4108-AA02-DFA0A04FC94B}">
-              <ma14:wrappingTextBoxFlag xmlns:ma14="http://schemas.microsoft.com/office/mac/drawingml/2011/main" xmlns:a14="http://schemas.microsoft.com/office/drawing/2010/main" xmlns:m="http://schemas.openxmlformats.org/officeDocument/2006/math" xmlns="" val="1"/>
+              <ma14:wrappingTextBoxFlag xmlns="" xmlns:m="http://schemas.openxmlformats.org/officeDocument/2006/math" xmlns:a14="http://schemas.microsoft.com/office/drawing/2010/main" xmlns:ma14="http://schemas.microsoft.com/office/mac/drawingml/2011/main" val="1"/>
             </a:ext>
           </a:extLst>
         </p:spPr>
@@ -3909,7 +3911,7 @@
             <a:effectLst/>
             <a:extLst>
               <a:ext uri="{C572A759-6A51-4108-AA02-DFA0A04FC94B}">
-                <ma14:wrappingTextBoxFlag xmlns:ma14="http://schemas.microsoft.com/office/mac/drawingml/2011/main" xmlns:a14="http://schemas.microsoft.com/office/drawing/2010/main" xmlns:m="http://schemas.openxmlformats.org/officeDocument/2006/math" xmlns="" val="1"/>
+                <ma14:wrappingTextBoxFlag xmlns="" xmlns:m="http://schemas.openxmlformats.org/officeDocument/2006/math" xmlns:a14="http://schemas.microsoft.com/office/drawing/2010/main" xmlns:ma14="http://schemas.microsoft.com/office/mac/drawingml/2011/main" val="1"/>
               </a:ext>
             </a:extLst>
           </p:spPr>
@@ -4312,7 +4314,7 @@
             <a:effectLst/>
             <a:extLst>
               <a:ext uri="{C572A759-6A51-4108-AA02-DFA0A04FC94B}">
-                <ma14:wrappingTextBoxFlag xmlns:ma14="http://schemas.microsoft.com/office/mac/drawingml/2011/main" xmlns:a14="http://schemas.microsoft.com/office/drawing/2010/main" xmlns:m="http://schemas.openxmlformats.org/officeDocument/2006/math" xmlns="" val="1"/>
+                <ma14:wrappingTextBoxFlag xmlns="" xmlns:m="http://schemas.openxmlformats.org/officeDocument/2006/math" xmlns:a14="http://schemas.microsoft.com/office/drawing/2010/main" xmlns:ma14="http://schemas.microsoft.com/office/mac/drawingml/2011/main" val="1"/>
               </a:ext>
             </a:extLst>
           </p:spPr>
@@ -4454,7 +4456,7 @@
             <a:effectLst/>
             <a:extLst>
               <a:ext uri="{C572A759-6A51-4108-AA02-DFA0A04FC94B}">
-                <ma14:wrappingTextBoxFlag xmlns:ma14="http://schemas.microsoft.com/office/mac/drawingml/2011/main" xmlns:a14="http://schemas.microsoft.com/office/drawing/2010/main" xmlns:m="http://schemas.openxmlformats.org/officeDocument/2006/math" xmlns="" val="1"/>
+                <ma14:wrappingTextBoxFlag xmlns="" xmlns:m="http://schemas.openxmlformats.org/officeDocument/2006/math" xmlns:a14="http://schemas.microsoft.com/office/drawing/2010/main" xmlns:ma14="http://schemas.microsoft.com/office/mac/drawingml/2011/main" val="1"/>
               </a:ext>
             </a:extLst>
           </p:spPr>
@@ -4559,7 +4561,7 @@
             <a:effectLst/>
             <a:extLst>
               <a:ext uri="{C572A759-6A51-4108-AA02-DFA0A04FC94B}">
-                <ma14:wrappingTextBoxFlag xmlns:ma14="http://schemas.microsoft.com/office/mac/drawingml/2011/main" xmlns:a14="http://schemas.microsoft.com/office/drawing/2010/main" xmlns:m="http://schemas.openxmlformats.org/officeDocument/2006/math" xmlns="" val="1"/>
+                <ma14:wrappingTextBoxFlag xmlns="" xmlns:m="http://schemas.openxmlformats.org/officeDocument/2006/math" xmlns:a14="http://schemas.microsoft.com/office/drawing/2010/main" xmlns:ma14="http://schemas.microsoft.com/office/mac/drawingml/2011/main" val="1"/>
               </a:ext>
             </a:extLst>
           </p:spPr>
@@ -4694,7 +4696,7 @@
             <a:effectLst/>
             <a:extLst>
               <a:ext uri="{C572A759-6A51-4108-AA02-DFA0A04FC94B}">
-                <ma14:wrappingTextBoxFlag xmlns:ma14="http://schemas.microsoft.com/office/mac/drawingml/2011/main" xmlns:a14="http://schemas.microsoft.com/office/drawing/2010/main" xmlns:m="http://schemas.openxmlformats.org/officeDocument/2006/math" xmlns="" val="1"/>
+                <ma14:wrappingTextBoxFlag xmlns="" xmlns:m="http://schemas.openxmlformats.org/officeDocument/2006/math" xmlns:a14="http://schemas.microsoft.com/office/drawing/2010/main" xmlns:ma14="http://schemas.microsoft.com/office/mac/drawingml/2011/main" val="1"/>
               </a:ext>
             </a:extLst>
           </p:spPr>
@@ -4829,7 +4831,7 @@
             <a:effectLst/>
             <a:extLst>
               <a:ext uri="{C572A759-6A51-4108-AA02-DFA0A04FC94B}">
-                <ma14:wrappingTextBoxFlag xmlns:ma14="http://schemas.microsoft.com/office/mac/drawingml/2011/main" xmlns:a14="http://schemas.microsoft.com/office/drawing/2010/main" xmlns:m="http://schemas.openxmlformats.org/officeDocument/2006/math" xmlns="" val="1"/>
+                <ma14:wrappingTextBoxFlag xmlns="" xmlns:m="http://schemas.openxmlformats.org/officeDocument/2006/math" xmlns:a14="http://schemas.microsoft.com/office/drawing/2010/main" xmlns:ma14="http://schemas.microsoft.com/office/mac/drawingml/2011/main" val="1"/>
               </a:ext>
             </a:extLst>
           </p:spPr>
@@ -4947,7 +4949,7 @@
             <a:effectLst/>
             <a:extLst>
               <a:ext uri="{C572A759-6A51-4108-AA02-DFA0A04FC94B}">
-                <ma14:wrappingTextBoxFlag xmlns:ma14="http://schemas.microsoft.com/office/mac/drawingml/2011/main" xmlns:a14="http://schemas.microsoft.com/office/drawing/2010/main" xmlns:m="http://schemas.openxmlformats.org/officeDocument/2006/math" xmlns="" val="1"/>
+                <ma14:wrappingTextBoxFlag xmlns="" xmlns:m="http://schemas.openxmlformats.org/officeDocument/2006/math" xmlns:a14="http://schemas.microsoft.com/office/drawing/2010/main" xmlns:ma14="http://schemas.microsoft.com/office/mac/drawingml/2011/main" val="1"/>
               </a:ext>
             </a:extLst>
           </p:spPr>
@@ -5158,7 +5160,7 @@
           </a:ln>
           <a:extLst>
             <a:ext uri="{C572A759-6A51-4108-AA02-DFA0A04FC94B}">
-              <ma14:wrappingTextBoxFlag xmlns:ma14="http://schemas.microsoft.com/office/mac/drawingml/2011/main" xmlns:a14="http://schemas.microsoft.com/office/drawing/2010/main" xmlns:m="http://schemas.openxmlformats.org/officeDocument/2006/math" xmlns="" val="1"/>
+              <ma14:wrappingTextBoxFlag xmlns="" xmlns:m="http://schemas.openxmlformats.org/officeDocument/2006/math" xmlns:a14="http://schemas.microsoft.com/office/drawing/2010/main" xmlns:ma14="http://schemas.microsoft.com/office/mac/drawingml/2011/main" val="1"/>
             </a:ext>
           </a:extLst>
         </p:spPr>
@@ -5285,7 +5287,7 @@
             <a:effectLst/>
             <a:extLst>
               <a:ext uri="{C572A759-6A51-4108-AA02-DFA0A04FC94B}">
-                <ma14:wrappingTextBoxFlag xmlns:ma14="http://schemas.microsoft.com/office/mac/drawingml/2011/main" xmlns:a14="http://schemas.microsoft.com/office/drawing/2010/main" xmlns:m="http://schemas.openxmlformats.org/officeDocument/2006/math" xmlns="" val="1"/>
+                <ma14:wrappingTextBoxFlag xmlns="" xmlns:m="http://schemas.openxmlformats.org/officeDocument/2006/math" xmlns:a14="http://schemas.microsoft.com/office/drawing/2010/main" xmlns:ma14="http://schemas.microsoft.com/office/mac/drawingml/2011/main" val="1"/>
               </a:ext>
             </a:extLst>
           </p:spPr>
@@ -5432,7 +5434,7 @@
             <a:effectLst/>
             <a:extLst>
               <a:ext uri="{C572A759-6A51-4108-AA02-DFA0A04FC94B}">
-                <ma14:wrappingTextBoxFlag xmlns:ma14="http://schemas.microsoft.com/office/mac/drawingml/2011/main" xmlns:a14="http://schemas.microsoft.com/office/drawing/2010/main" xmlns:m="http://schemas.openxmlformats.org/officeDocument/2006/math" xmlns="" val="1"/>
+                <ma14:wrappingTextBoxFlag xmlns="" xmlns:m="http://schemas.openxmlformats.org/officeDocument/2006/math" xmlns:a14="http://schemas.microsoft.com/office/drawing/2010/main" xmlns:ma14="http://schemas.microsoft.com/office/mac/drawingml/2011/main" val="1"/>
               </a:ext>
             </a:extLst>
           </p:spPr>
@@ -5563,7 +5565,7 @@
             <a:effectLst/>
             <a:extLst>
               <a:ext uri="{C572A759-6A51-4108-AA02-DFA0A04FC94B}">
-                <ma14:wrappingTextBoxFlag xmlns:ma14="http://schemas.microsoft.com/office/mac/drawingml/2011/main" xmlns:a14="http://schemas.microsoft.com/office/drawing/2010/main" xmlns:m="http://schemas.openxmlformats.org/officeDocument/2006/math" xmlns="" val="1"/>
+                <ma14:wrappingTextBoxFlag xmlns="" xmlns:m="http://schemas.openxmlformats.org/officeDocument/2006/math" xmlns:a14="http://schemas.microsoft.com/office/drawing/2010/main" xmlns:ma14="http://schemas.microsoft.com/office/mac/drawingml/2011/main" val="1"/>
               </a:ext>
             </a:extLst>
           </p:spPr>
@@ -5668,7 +5670,7 @@
             <a:effectLst/>
             <a:extLst>
               <a:ext uri="{C572A759-6A51-4108-AA02-DFA0A04FC94B}">
-                <ma14:wrappingTextBoxFlag xmlns:ma14="http://schemas.microsoft.com/office/mac/drawingml/2011/main" xmlns:a14="http://schemas.microsoft.com/office/drawing/2010/main" xmlns:m="http://schemas.openxmlformats.org/officeDocument/2006/math" xmlns="" val="1"/>
+                <ma14:wrappingTextBoxFlag xmlns="" xmlns:m="http://schemas.openxmlformats.org/officeDocument/2006/math" xmlns:a14="http://schemas.microsoft.com/office/drawing/2010/main" xmlns:ma14="http://schemas.microsoft.com/office/mac/drawingml/2011/main" val="1"/>
               </a:ext>
             </a:extLst>
           </p:spPr>
@@ -5803,7 +5805,7 @@
             <a:effectLst/>
             <a:extLst>
               <a:ext uri="{C572A759-6A51-4108-AA02-DFA0A04FC94B}">
-                <ma14:wrappingTextBoxFlag xmlns:ma14="http://schemas.microsoft.com/office/mac/drawingml/2011/main" xmlns:a14="http://schemas.microsoft.com/office/drawing/2010/main" xmlns:m="http://schemas.openxmlformats.org/officeDocument/2006/math" xmlns="" val="1"/>
+                <ma14:wrappingTextBoxFlag xmlns="" xmlns:m="http://schemas.openxmlformats.org/officeDocument/2006/math" xmlns:a14="http://schemas.microsoft.com/office/drawing/2010/main" xmlns:ma14="http://schemas.microsoft.com/office/mac/drawingml/2011/main" val="1"/>
               </a:ext>
             </a:extLst>
           </p:spPr>
@@ -5938,7 +5940,7 @@
             <a:effectLst/>
             <a:extLst>
               <a:ext uri="{C572A759-6A51-4108-AA02-DFA0A04FC94B}">
-                <ma14:wrappingTextBoxFlag xmlns:ma14="http://schemas.microsoft.com/office/mac/drawingml/2011/main" xmlns:a14="http://schemas.microsoft.com/office/drawing/2010/main" xmlns:m="http://schemas.openxmlformats.org/officeDocument/2006/math" xmlns="" val="1"/>
+                <ma14:wrappingTextBoxFlag xmlns="" xmlns:m="http://schemas.openxmlformats.org/officeDocument/2006/math" xmlns:a14="http://schemas.microsoft.com/office/drawing/2010/main" xmlns:ma14="http://schemas.microsoft.com/office/mac/drawingml/2011/main" val="1"/>
               </a:ext>
             </a:extLst>
           </p:spPr>
@@ -6056,7 +6058,7 @@
             <a:effectLst/>
             <a:extLst>
               <a:ext uri="{C572A759-6A51-4108-AA02-DFA0A04FC94B}">
-                <ma14:wrappingTextBoxFlag xmlns:ma14="http://schemas.microsoft.com/office/mac/drawingml/2011/main" xmlns:a14="http://schemas.microsoft.com/office/drawing/2010/main" xmlns:m="http://schemas.openxmlformats.org/officeDocument/2006/math" xmlns="" val="1"/>
+                <ma14:wrappingTextBoxFlag xmlns="" xmlns:m="http://schemas.openxmlformats.org/officeDocument/2006/math" xmlns:a14="http://schemas.microsoft.com/office/drawing/2010/main" xmlns:ma14="http://schemas.microsoft.com/office/mac/drawingml/2011/main" val="1"/>
               </a:ext>
             </a:extLst>
           </p:spPr>
@@ -6267,7 +6269,7 @@
           </a:ln>
           <a:extLst>
             <a:ext uri="{C572A759-6A51-4108-AA02-DFA0A04FC94B}">
-              <ma14:wrappingTextBoxFlag xmlns:ma14="http://schemas.microsoft.com/office/mac/drawingml/2011/main" xmlns:a14="http://schemas.microsoft.com/office/drawing/2010/main" xmlns:m="http://schemas.openxmlformats.org/officeDocument/2006/math" xmlns="" val="1"/>
+              <ma14:wrappingTextBoxFlag xmlns="" xmlns:m="http://schemas.openxmlformats.org/officeDocument/2006/math" xmlns:a14="http://schemas.microsoft.com/office/drawing/2010/main" xmlns:ma14="http://schemas.microsoft.com/office/mac/drawingml/2011/main" val="1"/>
             </a:ext>
           </a:extLst>
         </p:spPr>
@@ -6394,7 +6396,7 @@
             <a:effectLst/>
             <a:extLst>
               <a:ext uri="{C572A759-6A51-4108-AA02-DFA0A04FC94B}">
-                <ma14:wrappingTextBoxFlag xmlns:ma14="http://schemas.microsoft.com/office/mac/drawingml/2011/main" xmlns:a14="http://schemas.microsoft.com/office/drawing/2010/main" xmlns:m="http://schemas.openxmlformats.org/officeDocument/2006/math" xmlns="" val="1"/>
+                <ma14:wrappingTextBoxFlag xmlns="" xmlns:m="http://schemas.openxmlformats.org/officeDocument/2006/math" xmlns:a14="http://schemas.microsoft.com/office/drawing/2010/main" xmlns:ma14="http://schemas.microsoft.com/office/mac/drawingml/2011/main" val="1"/>
               </a:ext>
             </a:extLst>
           </p:spPr>
@@ -6478,7 +6480,7 @@
           </a:ln>
           <a:extLst>
             <a:ext uri="{C572A759-6A51-4108-AA02-DFA0A04FC94B}">
-              <ma14:wrappingTextBoxFlag xmlns:ma14="http://schemas.microsoft.com/office/mac/drawingml/2011/main" xmlns:a14="http://schemas.microsoft.com/office/drawing/2010/main" xmlns:m="http://schemas.openxmlformats.org/officeDocument/2006/math" xmlns="" val="1"/>
+              <ma14:wrappingTextBoxFlag xmlns="" xmlns:m="http://schemas.openxmlformats.org/officeDocument/2006/math" xmlns:a14="http://schemas.microsoft.com/office/drawing/2010/main" xmlns:ma14="http://schemas.microsoft.com/office/mac/drawingml/2011/main" val="1"/>
             </a:ext>
           </a:extLst>
         </p:spPr>
@@ -6600,7 +6602,7 @@
             <a:effectLst/>
             <a:extLst>
               <a:ext uri="{C572A759-6A51-4108-AA02-DFA0A04FC94B}">
-                <ma14:wrappingTextBoxFlag xmlns:ma14="http://schemas.microsoft.com/office/mac/drawingml/2011/main" xmlns:a14="http://schemas.microsoft.com/office/drawing/2010/main" xmlns:m="http://schemas.openxmlformats.org/officeDocument/2006/math" xmlns="" val="1"/>
+                <ma14:wrappingTextBoxFlag xmlns="" xmlns:m="http://schemas.openxmlformats.org/officeDocument/2006/math" xmlns:a14="http://schemas.microsoft.com/office/drawing/2010/main" xmlns:ma14="http://schemas.microsoft.com/office/mac/drawingml/2011/main" val="1"/>
               </a:ext>
             </a:extLst>
           </p:spPr>
@@ -6753,7 +6755,7 @@
           </a:ln>
           <a:extLst>
             <a:ext uri="{C572A759-6A51-4108-AA02-DFA0A04FC94B}">
-              <ma14:wrappingTextBoxFlag xmlns:ma14="http://schemas.microsoft.com/office/mac/drawingml/2011/main" xmlns:a14="http://schemas.microsoft.com/office/drawing/2010/main" xmlns:m="http://schemas.openxmlformats.org/officeDocument/2006/math" xmlns="" val="1"/>
+              <ma14:wrappingTextBoxFlag xmlns="" xmlns:m="http://schemas.openxmlformats.org/officeDocument/2006/math" xmlns:a14="http://schemas.microsoft.com/office/drawing/2010/main" xmlns:ma14="http://schemas.microsoft.com/office/mac/drawingml/2011/main" val="1"/>
             </a:ext>
           </a:extLst>
         </p:spPr>
@@ -7305,7 +7307,7 @@
           </a:ln>
           <a:extLst>
             <a:ext uri="{C572A759-6A51-4108-AA02-DFA0A04FC94B}">
-              <ma14:wrappingTextBoxFlag xmlns:ma14="http://schemas.microsoft.com/office/mac/drawingml/2011/main" xmlns:a14="http://schemas.microsoft.com/office/drawing/2010/main" xmlns:m="http://schemas.openxmlformats.org/officeDocument/2006/math" xmlns="" val="1"/>
+              <ma14:wrappingTextBoxFlag xmlns="" xmlns:m="http://schemas.openxmlformats.org/officeDocument/2006/math" xmlns:a14="http://schemas.microsoft.com/office/drawing/2010/main" xmlns:ma14="http://schemas.microsoft.com/office/mac/drawingml/2011/main" val="1"/>
             </a:ext>
           </a:extLst>
         </p:spPr>
@@ -7406,7 +7408,7 @@
             <a:effectLst/>
             <a:extLst>
               <a:ext uri="{C572A759-6A51-4108-AA02-DFA0A04FC94B}">
-                <ma14:wrappingTextBoxFlag xmlns:ma14="http://schemas.microsoft.com/office/mac/drawingml/2011/main" xmlns:a14="http://schemas.microsoft.com/office/drawing/2010/main" xmlns:m="http://schemas.openxmlformats.org/officeDocument/2006/math" xmlns="" val="1"/>
+                <ma14:wrappingTextBoxFlag xmlns="" xmlns:m="http://schemas.openxmlformats.org/officeDocument/2006/math" xmlns:a14="http://schemas.microsoft.com/office/drawing/2010/main" xmlns:ma14="http://schemas.microsoft.com/office/mac/drawingml/2011/main" val="1"/>
               </a:ext>
             </a:extLst>
           </p:spPr>
@@ -7511,7 +7513,7 @@
           </a:ln>
           <a:extLst>
             <a:ext uri="{C572A759-6A51-4108-AA02-DFA0A04FC94B}">
-              <ma14:wrappingTextBoxFlag xmlns:ma14="http://schemas.microsoft.com/office/mac/drawingml/2011/main" xmlns:a14="http://schemas.microsoft.com/office/drawing/2010/main" xmlns:m="http://schemas.openxmlformats.org/officeDocument/2006/math" xmlns="" val="1"/>
+              <ma14:wrappingTextBoxFlag xmlns="" xmlns:m="http://schemas.openxmlformats.org/officeDocument/2006/math" xmlns:a14="http://schemas.microsoft.com/office/drawing/2010/main" xmlns:ma14="http://schemas.microsoft.com/office/mac/drawingml/2011/main" val="1"/>
             </a:ext>
           </a:extLst>
         </p:spPr>
@@ -7740,7 +7742,7 @@
           </a:ln>
           <a:extLst>
             <a:ext uri="{C572A759-6A51-4108-AA02-DFA0A04FC94B}">
-              <ma14:wrappingTextBoxFlag xmlns:ma14="http://schemas.microsoft.com/office/mac/drawingml/2011/main" xmlns:a14="http://schemas.microsoft.com/office/drawing/2010/main" xmlns:m="http://schemas.openxmlformats.org/officeDocument/2006/math" xmlns="" val="1"/>
+              <ma14:wrappingTextBoxFlag xmlns="" xmlns:m="http://schemas.openxmlformats.org/officeDocument/2006/math" xmlns:a14="http://schemas.microsoft.com/office/drawing/2010/main" xmlns:ma14="http://schemas.microsoft.com/office/mac/drawingml/2011/main" val="1"/>
             </a:ext>
           </a:extLst>
         </p:spPr>
@@ -8022,7 +8024,7 @@
           </a:ln>
           <a:extLst>
             <a:ext uri="{C572A759-6A51-4108-AA02-DFA0A04FC94B}">
-              <ma14:wrappingTextBoxFlag xmlns:ma14="http://schemas.microsoft.com/office/mac/drawingml/2011/main" xmlns:a14="http://schemas.microsoft.com/office/drawing/2010/main" xmlns:m="http://schemas.openxmlformats.org/officeDocument/2006/math" xmlns="" val="1"/>
+              <ma14:wrappingTextBoxFlag xmlns="" xmlns:m="http://schemas.openxmlformats.org/officeDocument/2006/math" xmlns:a14="http://schemas.microsoft.com/office/drawing/2010/main" xmlns:ma14="http://schemas.microsoft.com/office/mac/drawingml/2011/main" val="1"/>
             </a:ext>
           </a:extLst>
         </p:spPr>
@@ -8453,7 +8455,7 @@
             <a:effectLst/>
             <a:extLst>
               <a:ext uri="{C572A759-6A51-4108-AA02-DFA0A04FC94B}">
-                <ma14:wrappingTextBoxFlag xmlns:ma14="http://schemas.microsoft.com/office/mac/drawingml/2011/main" xmlns:a14="http://schemas.microsoft.com/office/drawing/2010/main" xmlns:m="http://schemas.openxmlformats.org/officeDocument/2006/math" xmlns="" val="1"/>
+                <ma14:wrappingTextBoxFlag xmlns="" xmlns:m="http://schemas.openxmlformats.org/officeDocument/2006/math" xmlns:a14="http://schemas.microsoft.com/office/drawing/2010/main" xmlns:ma14="http://schemas.microsoft.com/office/mac/drawingml/2011/main" val="1"/>
               </a:ext>
             </a:extLst>
           </p:spPr>
@@ -8530,7 +8532,7 @@
           </a:ln>
           <a:extLst>
             <a:ext uri="{C572A759-6A51-4108-AA02-DFA0A04FC94B}">
-              <ma14:wrappingTextBoxFlag xmlns:ma14="http://schemas.microsoft.com/office/mac/drawingml/2011/main" xmlns:a14="http://schemas.microsoft.com/office/drawing/2010/main" xmlns:m="http://schemas.openxmlformats.org/officeDocument/2006/math" xmlns="" val="1"/>
+              <ma14:wrappingTextBoxFlag xmlns="" xmlns:m="http://schemas.openxmlformats.org/officeDocument/2006/math" xmlns:a14="http://schemas.microsoft.com/office/drawing/2010/main" xmlns:ma14="http://schemas.microsoft.com/office/mac/drawingml/2011/main" val="1"/>
             </a:ext>
           </a:extLst>
         </p:spPr>
@@ -8706,7 +8708,7 @@
           </a:ln>
           <a:extLst>
             <a:ext uri="{C572A759-6A51-4108-AA02-DFA0A04FC94B}">
-              <ma14:wrappingTextBoxFlag xmlns:ma14="http://schemas.microsoft.com/office/mac/drawingml/2011/main" xmlns:a14="http://schemas.microsoft.com/office/drawing/2010/main" xmlns:m="http://schemas.openxmlformats.org/officeDocument/2006/math" xmlns="" val="1"/>
+              <ma14:wrappingTextBoxFlag xmlns="" xmlns:m="http://schemas.openxmlformats.org/officeDocument/2006/math" xmlns:a14="http://schemas.microsoft.com/office/drawing/2010/main" xmlns:ma14="http://schemas.microsoft.com/office/mac/drawingml/2011/main" val="1"/>
             </a:ext>
           </a:extLst>
         </p:spPr>
@@ -8926,7 +8928,7 @@
           </a:ln>
           <a:extLst>
             <a:ext uri="{C572A759-6A51-4108-AA02-DFA0A04FC94B}">
-              <ma14:wrappingTextBoxFlag xmlns:ma14="http://schemas.microsoft.com/office/mac/drawingml/2011/main" xmlns:a14="http://schemas.microsoft.com/office/drawing/2010/main" xmlns:m="http://schemas.openxmlformats.org/officeDocument/2006/math" xmlns="" val="1"/>
+              <ma14:wrappingTextBoxFlag xmlns="" xmlns:m="http://schemas.openxmlformats.org/officeDocument/2006/math" xmlns:a14="http://schemas.microsoft.com/office/drawing/2010/main" xmlns:ma14="http://schemas.microsoft.com/office/mac/drawingml/2011/main" val="1"/>
             </a:ext>
           </a:extLst>
         </p:spPr>
@@ -9116,7 +9118,7 @@
           </a:ln>
           <a:extLst>
             <a:ext uri="{C572A759-6A51-4108-AA02-DFA0A04FC94B}">
-              <ma14:wrappingTextBoxFlag xmlns:ma14="http://schemas.microsoft.com/office/mac/drawingml/2011/main" xmlns:a14="http://schemas.microsoft.com/office/drawing/2010/main" xmlns:m="http://schemas.openxmlformats.org/officeDocument/2006/math" xmlns="" val="1"/>
+              <ma14:wrappingTextBoxFlag xmlns="" xmlns:m="http://schemas.openxmlformats.org/officeDocument/2006/math" xmlns:a14="http://schemas.microsoft.com/office/drawing/2010/main" xmlns:ma14="http://schemas.microsoft.com/office/mac/drawingml/2011/main" val="1"/>
             </a:ext>
           </a:extLst>
         </p:spPr>
@@ -9159,7 +9161,7 @@
           </a:ln>
           <a:extLst>
             <a:ext uri="{C572A759-6A51-4108-AA02-DFA0A04FC94B}">
-              <ma14:wrappingTextBoxFlag xmlns:ma14="http://schemas.microsoft.com/office/mac/drawingml/2011/main" xmlns:a14="http://schemas.microsoft.com/office/drawing/2010/main" xmlns:m="http://schemas.openxmlformats.org/officeDocument/2006/math" xmlns="" val="1"/>
+              <ma14:wrappingTextBoxFlag xmlns="" xmlns:m="http://schemas.openxmlformats.org/officeDocument/2006/math" xmlns:a14="http://schemas.microsoft.com/office/drawing/2010/main" xmlns:ma14="http://schemas.microsoft.com/office/mac/drawingml/2011/main" val="1"/>
             </a:ext>
           </a:extLst>
         </p:spPr>
@@ -9202,7 +9204,7 @@
           </a:ln>
           <a:extLst>
             <a:ext uri="{C572A759-6A51-4108-AA02-DFA0A04FC94B}">
-              <ma14:wrappingTextBoxFlag xmlns:ma14="http://schemas.microsoft.com/office/mac/drawingml/2011/main" xmlns:a14="http://schemas.microsoft.com/office/drawing/2010/main" xmlns:m="http://schemas.openxmlformats.org/officeDocument/2006/math" xmlns="" val="1"/>
+              <ma14:wrappingTextBoxFlag xmlns="" xmlns:m="http://schemas.openxmlformats.org/officeDocument/2006/math" xmlns:a14="http://schemas.microsoft.com/office/drawing/2010/main" xmlns:ma14="http://schemas.microsoft.com/office/mac/drawingml/2011/main" val="1"/>
             </a:ext>
           </a:extLst>
         </p:spPr>
@@ -9245,7 +9247,7 @@
           </a:ln>
           <a:extLst>
             <a:ext uri="{C572A759-6A51-4108-AA02-DFA0A04FC94B}">
-              <ma14:wrappingTextBoxFlag xmlns:ma14="http://schemas.microsoft.com/office/mac/drawingml/2011/main" xmlns:a14="http://schemas.microsoft.com/office/drawing/2010/main" xmlns:m="http://schemas.openxmlformats.org/officeDocument/2006/math" xmlns="" val="1"/>
+              <ma14:wrappingTextBoxFlag xmlns="" xmlns:m="http://schemas.openxmlformats.org/officeDocument/2006/math" xmlns:a14="http://schemas.microsoft.com/office/drawing/2010/main" xmlns:ma14="http://schemas.microsoft.com/office/mac/drawingml/2011/main" val="1"/>
             </a:ext>
           </a:extLst>
         </p:spPr>
@@ -9288,7 +9290,7 @@
           </a:ln>
           <a:extLst>
             <a:ext uri="{C572A759-6A51-4108-AA02-DFA0A04FC94B}">
-              <ma14:wrappingTextBoxFlag xmlns:ma14="http://schemas.microsoft.com/office/mac/drawingml/2011/main" xmlns:a14="http://schemas.microsoft.com/office/drawing/2010/main" xmlns:m="http://schemas.openxmlformats.org/officeDocument/2006/math" xmlns="" val="1"/>
+              <ma14:wrappingTextBoxFlag xmlns="" xmlns:m="http://schemas.openxmlformats.org/officeDocument/2006/math" xmlns:a14="http://schemas.microsoft.com/office/drawing/2010/main" xmlns:ma14="http://schemas.microsoft.com/office/mac/drawingml/2011/main" val="1"/>
             </a:ext>
           </a:extLst>
         </p:spPr>
@@ -10072,7 +10074,7 @@
           </a:ln>
           <a:extLst>
             <a:ext uri="{C572A759-6A51-4108-AA02-DFA0A04FC94B}">
-              <ma14:wrappingTextBoxFlag xmlns:ma14="http://schemas.microsoft.com/office/mac/drawingml/2011/main" xmlns:a14="http://schemas.microsoft.com/office/drawing/2010/main" xmlns:m="http://schemas.openxmlformats.org/officeDocument/2006/math" xmlns="" val="1"/>
+              <ma14:wrappingTextBoxFlag xmlns="" xmlns:m="http://schemas.openxmlformats.org/officeDocument/2006/math" xmlns:a14="http://schemas.microsoft.com/office/drawing/2010/main" xmlns:ma14="http://schemas.microsoft.com/office/mac/drawingml/2011/main" val="1"/>
             </a:ext>
           </a:extLst>
         </p:spPr>
@@ -10234,7 +10236,7 @@
           </a:ln>
           <a:extLst>
             <a:ext uri="{C572A759-6A51-4108-AA02-DFA0A04FC94B}">
-              <ma14:wrappingTextBoxFlag xmlns:ma14="http://schemas.microsoft.com/office/mac/drawingml/2011/main" xmlns:a14="http://schemas.microsoft.com/office/drawing/2010/main" xmlns:m="http://schemas.openxmlformats.org/officeDocument/2006/math" xmlns="" val="1"/>
+              <ma14:wrappingTextBoxFlag xmlns="" xmlns:m="http://schemas.openxmlformats.org/officeDocument/2006/math" xmlns:a14="http://schemas.microsoft.com/office/drawing/2010/main" xmlns:ma14="http://schemas.microsoft.com/office/mac/drawingml/2011/main" val="1"/>
             </a:ext>
           </a:extLst>
         </p:spPr>
@@ -10382,7 +10384,7 @@
             <a:effectLst/>
             <a:extLst>
               <a:ext uri="{C572A759-6A51-4108-AA02-DFA0A04FC94B}">
-                <ma14:wrappingTextBoxFlag xmlns:ma14="http://schemas.microsoft.com/office/mac/drawingml/2011/main" xmlns:a14="http://schemas.microsoft.com/office/drawing/2010/main" xmlns:m="http://schemas.openxmlformats.org/officeDocument/2006/math" xmlns="" val="1"/>
+                <ma14:wrappingTextBoxFlag xmlns="" xmlns:m="http://schemas.openxmlformats.org/officeDocument/2006/math" xmlns:a14="http://schemas.microsoft.com/office/drawing/2010/main" xmlns:ma14="http://schemas.microsoft.com/office/mac/drawingml/2011/main" val="1"/>
               </a:ext>
             </a:extLst>
           </p:spPr>
@@ -10484,7 +10486,7 @@
             <a:effectLst/>
             <a:extLst>
               <a:ext uri="{C572A759-6A51-4108-AA02-DFA0A04FC94B}">
-                <ma14:wrappingTextBoxFlag xmlns:ma14="http://schemas.microsoft.com/office/mac/drawingml/2011/main" xmlns:a14="http://schemas.microsoft.com/office/drawing/2010/main" xmlns:m="http://schemas.openxmlformats.org/officeDocument/2006/math" xmlns="" val="1"/>
+                <ma14:wrappingTextBoxFlag xmlns="" xmlns:m="http://schemas.openxmlformats.org/officeDocument/2006/math" xmlns:a14="http://schemas.microsoft.com/office/drawing/2010/main" xmlns:ma14="http://schemas.microsoft.com/office/mac/drawingml/2011/main" val="1"/>
               </a:ext>
             </a:extLst>
           </p:spPr>
@@ -10616,7 +10618,7 @@
             <a:effectLst/>
             <a:extLst>
               <a:ext uri="{C572A759-6A51-4108-AA02-DFA0A04FC94B}">
-                <ma14:wrappingTextBoxFlag xmlns:ma14="http://schemas.microsoft.com/office/mac/drawingml/2011/main" xmlns:a14="http://schemas.microsoft.com/office/drawing/2010/main" xmlns:m="http://schemas.openxmlformats.org/officeDocument/2006/math" xmlns="" val="1"/>
+                <ma14:wrappingTextBoxFlag xmlns="" xmlns:m="http://schemas.openxmlformats.org/officeDocument/2006/math" xmlns:a14="http://schemas.microsoft.com/office/drawing/2010/main" xmlns:ma14="http://schemas.microsoft.com/office/mac/drawingml/2011/main" val="1"/>
               </a:ext>
             </a:extLst>
           </p:spPr>
@@ -10748,7 +10750,7 @@
             <a:effectLst/>
             <a:extLst>
               <a:ext uri="{C572A759-6A51-4108-AA02-DFA0A04FC94B}">
-                <ma14:wrappingTextBoxFlag xmlns:ma14="http://schemas.microsoft.com/office/mac/drawingml/2011/main" xmlns:a14="http://schemas.microsoft.com/office/drawing/2010/main" xmlns:m="http://schemas.openxmlformats.org/officeDocument/2006/math" xmlns="" val="1"/>
+                <ma14:wrappingTextBoxFlag xmlns="" xmlns:m="http://schemas.openxmlformats.org/officeDocument/2006/math" xmlns:a14="http://schemas.microsoft.com/office/drawing/2010/main" xmlns:ma14="http://schemas.microsoft.com/office/mac/drawingml/2011/main" val="1"/>
               </a:ext>
             </a:extLst>
           </p:spPr>
@@ -10882,7 +10884,7 @@
           </a:ln>
           <a:extLst>
             <a:ext uri="{C572A759-6A51-4108-AA02-DFA0A04FC94B}">
-              <ma14:wrappingTextBoxFlag xmlns:ma14="http://schemas.microsoft.com/office/mac/drawingml/2011/main" xmlns:a14="http://schemas.microsoft.com/office/drawing/2010/main" xmlns:m="http://schemas.openxmlformats.org/officeDocument/2006/math" xmlns="" val="1"/>
+              <ma14:wrappingTextBoxFlag xmlns="" xmlns:m="http://schemas.openxmlformats.org/officeDocument/2006/math" xmlns:a14="http://schemas.microsoft.com/office/drawing/2010/main" xmlns:ma14="http://schemas.microsoft.com/office/mac/drawingml/2011/main" val="1"/>
             </a:ext>
           </a:extLst>
         </p:spPr>
@@ -10988,7 +10990,7 @@
           </a:ln>
           <a:extLst>
             <a:ext uri="{C572A759-6A51-4108-AA02-DFA0A04FC94B}">
-              <ma14:wrappingTextBoxFlag xmlns:ma14="http://schemas.microsoft.com/office/mac/drawingml/2011/main" xmlns:a14="http://schemas.microsoft.com/office/drawing/2010/main" xmlns:m="http://schemas.openxmlformats.org/officeDocument/2006/math" xmlns="" val="1"/>
+              <ma14:wrappingTextBoxFlag xmlns="" xmlns:m="http://schemas.openxmlformats.org/officeDocument/2006/math" xmlns:a14="http://schemas.microsoft.com/office/drawing/2010/main" xmlns:ma14="http://schemas.microsoft.com/office/mac/drawingml/2011/main" val="1"/>
             </a:ext>
           </a:extLst>
         </p:spPr>
@@ -11078,7 +11080,7 @@
           </a:ln>
           <a:extLst>
             <a:ext uri="{C572A759-6A51-4108-AA02-DFA0A04FC94B}">
-              <ma14:wrappingTextBoxFlag xmlns:ma14="http://schemas.microsoft.com/office/mac/drawingml/2011/main" xmlns:a14="http://schemas.microsoft.com/office/drawing/2010/main" xmlns:m="http://schemas.openxmlformats.org/officeDocument/2006/math" xmlns="" val="1"/>
+              <ma14:wrappingTextBoxFlag xmlns="" xmlns:m="http://schemas.openxmlformats.org/officeDocument/2006/math" xmlns:a14="http://schemas.microsoft.com/office/drawing/2010/main" xmlns:ma14="http://schemas.microsoft.com/office/mac/drawingml/2011/main" val="1"/>
             </a:ext>
           </a:extLst>
         </p:spPr>
@@ -11427,7 +11429,7 @@
             <a:effectLst/>
             <a:extLst>
               <a:ext uri="{C572A759-6A51-4108-AA02-DFA0A04FC94B}">
-                <ma14:wrappingTextBoxFlag xmlns:ma14="http://schemas.microsoft.com/office/mac/drawingml/2011/main" xmlns:a14="http://schemas.microsoft.com/office/drawing/2010/main" xmlns:m="http://schemas.openxmlformats.org/officeDocument/2006/math" xmlns="" val="1"/>
+                <ma14:wrappingTextBoxFlag xmlns="" xmlns:m="http://schemas.openxmlformats.org/officeDocument/2006/math" xmlns:a14="http://schemas.microsoft.com/office/drawing/2010/main" xmlns:ma14="http://schemas.microsoft.com/office/mac/drawingml/2011/main" val="1"/>
               </a:ext>
             </a:extLst>
           </p:spPr>
@@ -11589,7 +11591,7 @@
             <a:effectLst/>
             <a:extLst>
               <a:ext uri="{C572A759-6A51-4108-AA02-DFA0A04FC94B}">
-                <ma14:wrappingTextBoxFlag xmlns:ma14="http://schemas.microsoft.com/office/mac/drawingml/2011/main" xmlns:a14="http://schemas.microsoft.com/office/drawing/2010/main" xmlns:m="http://schemas.openxmlformats.org/officeDocument/2006/math" xmlns="" val="1"/>
+                <ma14:wrappingTextBoxFlag xmlns="" xmlns:m="http://schemas.openxmlformats.org/officeDocument/2006/math" xmlns:a14="http://schemas.microsoft.com/office/drawing/2010/main" xmlns:ma14="http://schemas.microsoft.com/office/mac/drawingml/2011/main" val="1"/>
               </a:ext>
             </a:extLst>
           </p:spPr>
@@ -11721,7 +11723,7 @@
             <a:effectLst/>
             <a:extLst>
               <a:ext uri="{C572A759-6A51-4108-AA02-DFA0A04FC94B}">
-                <ma14:wrappingTextBoxFlag xmlns:ma14="http://schemas.microsoft.com/office/mac/drawingml/2011/main" xmlns:a14="http://schemas.microsoft.com/office/drawing/2010/main" xmlns:m="http://schemas.openxmlformats.org/officeDocument/2006/math" xmlns="" val="1"/>
+                <ma14:wrappingTextBoxFlag xmlns="" xmlns:m="http://schemas.openxmlformats.org/officeDocument/2006/math" xmlns:a14="http://schemas.microsoft.com/office/drawing/2010/main" xmlns:ma14="http://schemas.microsoft.com/office/mac/drawingml/2011/main" val="1"/>
               </a:ext>
             </a:extLst>
           </p:spPr>
@@ -11941,7 +11943,7 @@
             <a:effectLst/>
             <a:extLst>
               <a:ext uri="{C572A759-6A51-4108-AA02-DFA0A04FC94B}">
-                <ma14:wrappingTextBoxFlag xmlns:ma14="http://schemas.microsoft.com/office/mac/drawingml/2011/main" xmlns:a14="http://schemas.microsoft.com/office/drawing/2010/main" xmlns:m="http://schemas.openxmlformats.org/officeDocument/2006/math" xmlns="" val="1"/>
+                <ma14:wrappingTextBoxFlag xmlns="" xmlns:m="http://schemas.openxmlformats.org/officeDocument/2006/math" xmlns:a14="http://schemas.microsoft.com/office/drawing/2010/main" xmlns:ma14="http://schemas.microsoft.com/office/mac/drawingml/2011/main" val="1"/>
               </a:ext>
             </a:extLst>
           </p:spPr>
@@ -12073,7 +12075,7 @@
             <a:effectLst/>
             <a:extLst>
               <a:ext uri="{C572A759-6A51-4108-AA02-DFA0A04FC94B}">
-                <ma14:wrappingTextBoxFlag xmlns:ma14="http://schemas.microsoft.com/office/mac/drawingml/2011/main" xmlns:a14="http://schemas.microsoft.com/office/drawing/2010/main" xmlns:m="http://schemas.openxmlformats.org/officeDocument/2006/math" xmlns="" val="1"/>
+                <ma14:wrappingTextBoxFlag xmlns="" xmlns:m="http://schemas.openxmlformats.org/officeDocument/2006/math" xmlns:a14="http://schemas.microsoft.com/office/drawing/2010/main" xmlns:ma14="http://schemas.microsoft.com/office/mac/drawingml/2011/main" val="1"/>
               </a:ext>
             </a:extLst>
           </p:spPr>
@@ -12323,7 +12325,7 @@
             <a:effectLst/>
             <a:extLst>
               <a:ext uri="{C572A759-6A51-4108-AA02-DFA0A04FC94B}">
-                <ma14:wrappingTextBoxFlag xmlns:ma14="http://schemas.microsoft.com/office/mac/drawingml/2011/main" xmlns:a14="http://schemas.microsoft.com/office/drawing/2010/main" xmlns:m="http://schemas.openxmlformats.org/officeDocument/2006/math" xmlns="" val="1"/>
+                <ma14:wrappingTextBoxFlag xmlns="" xmlns:m="http://schemas.openxmlformats.org/officeDocument/2006/math" xmlns:a14="http://schemas.microsoft.com/office/drawing/2010/main" xmlns:ma14="http://schemas.microsoft.com/office/mac/drawingml/2011/main" val="1"/>
               </a:ext>
             </a:extLst>
           </p:spPr>
@@ -12367,7 +12369,7 @@
           </a:ln>
           <a:extLst>
             <a:ext uri="{C572A759-6A51-4108-AA02-DFA0A04FC94B}">
-              <ma14:wrappingTextBoxFlag xmlns:ma14="http://schemas.microsoft.com/office/mac/drawingml/2011/main" xmlns:a14="http://schemas.microsoft.com/office/drawing/2010/main" xmlns:m="http://schemas.openxmlformats.org/officeDocument/2006/math" xmlns="" val="1"/>
+              <ma14:wrappingTextBoxFlag xmlns="" xmlns:m="http://schemas.openxmlformats.org/officeDocument/2006/math" xmlns:a14="http://schemas.microsoft.com/office/drawing/2010/main" xmlns:ma14="http://schemas.microsoft.com/office/mac/drawingml/2011/main" val="1"/>
             </a:ext>
           </a:extLst>
         </p:spPr>
@@ -12410,7 +12412,7 @@
           </a:ln>
           <a:extLst>
             <a:ext uri="{C572A759-6A51-4108-AA02-DFA0A04FC94B}">
-              <ma14:wrappingTextBoxFlag xmlns:ma14="http://schemas.microsoft.com/office/mac/drawingml/2011/main" xmlns:a14="http://schemas.microsoft.com/office/drawing/2010/main" xmlns:m="http://schemas.openxmlformats.org/officeDocument/2006/math" xmlns="" val="1"/>
+              <ma14:wrappingTextBoxFlag xmlns="" xmlns:m="http://schemas.openxmlformats.org/officeDocument/2006/math" xmlns:a14="http://schemas.microsoft.com/office/drawing/2010/main" xmlns:ma14="http://schemas.microsoft.com/office/mac/drawingml/2011/main" val="1"/>
             </a:ext>
           </a:extLst>
         </p:spPr>
@@ -12453,7 +12455,7 @@
           </a:ln>
           <a:extLst>
             <a:ext uri="{C572A759-6A51-4108-AA02-DFA0A04FC94B}">
-              <ma14:wrappingTextBoxFlag xmlns:ma14="http://schemas.microsoft.com/office/mac/drawingml/2011/main" xmlns:a14="http://schemas.microsoft.com/office/drawing/2010/main" xmlns:m="http://schemas.openxmlformats.org/officeDocument/2006/math" xmlns="" val="1"/>
+              <ma14:wrappingTextBoxFlag xmlns="" xmlns:m="http://schemas.openxmlformats.org/officeDocument/2006/math" xmlns:a14="http://schemas.microsoft.com/office/drawing/2010/main" xmlns:ma14="http://schemas.microsoft.com/office/mac/drawingml/2011/main" val="1"/>
             </a:ext>
           </a:extLst>
         </p:spPr>
@@ -12496,7 +12498,7 @@
           </a:ln>
           <a:extLst>
             <a:ext uri="{C572A759-6A51-4108-AA02-DFA0A04FC94B}">
-              <ma14:wrappingTextBoxFlag xmlns:ma14="http://schemas.microsoft.com/office/mac/drawingml/2011/main" xmlns:a14="http://schemas.microsoft.com/office/drawing/2010/main" xmlns:m="http://schemas.openxmlformats.org/officeDocument/2006/math" xmlns="" val="1"/>
+              <ma14:wrappingTextBoxFlag xmlns="" xmlns:m="http://schemas.openxmlformats.org/officeDocument/2006/math" xmlns:a14="http://schemas.microsoft.com/office/drawing/2010/main" xmlns:ma14="http://schemas.microsoft.com/office/mac/drawingml/2011/main" val="1"/>
             </a:ext>
           </a:extLst>
         </p:spPr>
@@ -12602,7 +12604,7 @@
           </a:ln>
           <a:extLst>
             <a:ext uri="{C572A759-6A51-4108-AA02-DFA0A04FC94B}">
-              <ma14:wrappingTextBoxFlag xmlns:ma14="http://schemas.microsoft.com/office/mac/drawingml/2011/main" xmlns:a14="http://schemas.microsoft.com/office/drawing/2010/main" xmlns:m="http://schemas.openxmlformats.org/officeDocument/2006/math" xmlns="" val="1"/>
+              <ma14:wrappingTextBoxFlag xmlns="" xmlns:m="http://schemas.openxmlformats.org/officeDocument/2006/math" xmlns:a14="http://schemas.microsoft.com/office/drawing/2010/main" xmlns:ma14="http://schemas.microsoft.com/office/mac/drawingml/2011/main" val="1"/>
             </a:ext>
           </a:extLst>
         </p:spPr>
@@ -12760,7 +12762,7 @@
           </a:ln>
           <a:extLst>
             <a:ext uri="{C572A759-6A51-4108-AA02-DFA0A04FC94B}">
-              <ma14:wrappingTextBoxFlag xmlns:ma14="http://schemas.microsoft.com/office/mac/drawingml/2011/main" xmlns:a14="http://schemas.microsoft.com/office/drawing/2010/main" xmlns:m="http://schemas.openxmlformats.org/officeDocument/2006/math" xmlns="" val="1"/>
+              <ma14:wrappingTextBoxFlag xmlns="" xmlns:m="http://schemas.openxmlformats.org/officeDocument/2006/math" xmlns:a14="http://schemas.microsoft.com/office/drawing/2010/main" xmlns:ma14="http://schemas.microsoft.com/office/mac/drawingml/2011/main" val="1"/>
             </a:ext>
           </a:extLst>
         </p:spPr>
@@ -13081,7 +13083,7 @@
             <a:effectLst/>
             <a:extLst>
               <a:ext uri="{C572A759-6A51-4108-AA02-DFA0A04FC94B}">
-                <ma14:wrappingTextBoxFlag xmlns:ma14="http://schemas.microsoft.com/office/mac/drawingml/2011/main" xmlns:a14="http://schemas.microsoft.com/office/drawing/2010/main" xmlns:m="http://schemas.openxmlformats.org/officeDocument/2006/math" xmlns="" val="1"/>
+                <ma14:wrappingTextBoxFlag xmlns="" xmlns:m="http://schemas.openxmlformats.org/officeDocument/2006/math" xmlns:a14="http://schemas.microsoft.com/office/drawing/2010/main" xmlns:ma14="http://schemas.microsoft.com/office/mac/drawingml/2011/main" val="1"/>
               </a:ext>
             </a:extLst>
           </p:spPr>
@@ -13421,7 +13423,7 @@
           </a:ln>
           <a:extLst>
             <a:ext uri="{C572A759-6A51-4108-AA02-DFA0A04FC94B}">
-              <ma14:wrappingTextBoxFlag xmlns:ma14="http://schemas.microsoft.com/office/mac/drawingml/2011/main" xmlns:a14="http://schemas.microsoft.com/office/drawing/2010/main" xmlns:m="http://schemas.openxmlformats.org/officeDocument/2006/math" xmlns="" val="1"/>
+              <ma14:wrappingTextBoxFlag xmlns="" xmlns:m="http://schemas.openxmlformats.org/officeDocument/2006/math" xmlns:a14="http://schemas.microsoft.com/office/drawing/2010/main" xmlns:ma14="http://schemas.microsoft.com/office/mac/drawingml/2011/main" val="1"/>
             </a:ext>
           </a:extLst>
         </p:spPr>
@@ -13482,7 +13484,7 @@
           </a:ln>
           <a:extLst>
             <a:ext uri="{C572A759-6A51-4108-AA02-DFA0A04FC94B}">
-              <ma14:wrappingTextBoxFlag xmlns:ma14="http://schemas.microsoft.com/office/mac/drawingml/2011/main" xmlns:a14="http://schemas.microsoft.com/office/drawing/2010/main" xmlns:m="http://schemas.openxmlformats.org/officeDocument/2006/math" xmlns="" val="1"/>
+              <ma14:wrappingTextBoxFlag xmlns="" xmlns:m="http://schemas.openxmlformats.org/officeDocument/2006/math" xmlns:a14="http://schemas.microsoft.com/office/drawing/2010/main" xmlns:ma14="http://schemas.microsoft.com/office/mac/drawingml/2011/main" val="1"/>
             </a:ext>
           </a:extLst>
         </p:spPr>
@@ -13583,7 +13585,7 @@
             <a:effectLst/>
             <a:extLst>
               <a:ext uri="{C572A759-6A51-4108-AA02-DFA0A04FC94B}">
-                <ma14:wrappingTextBoxFlag xmlns:ma14="http://schemas.microsoft.com/office/mac/drawingml/2011/main" xmlns:a14="http://schemas.microsoft.com/office/drawing/2010/main" xmlns:m="http://schemas.openxmlformats.org/officeDocument/2006/math" xmlns="" val="1"/>
+                <ma14:wrappingTextBoxFlag xmlns="" xmlns:m="http://schemas.openxmlformats.org/officeDocument/2006/math" xmlns:a14="http://schemas.microsoft.com/office/drawing/2010/main" xmlns:ma14="http://schemas.microsoft.com/office/mac/drawingml/2011/main" val="1"/>
               </a:ext>
             </a:extLst>
           </p:spPr>
@@ -13627,7 +13629,7 @@
           </a:ln>
           <a:extLst>
             <a:ext uri="{C572A759-6A51-4108-AA02-DFA0A04FC94B}">
-              <ma14:wrappingTextBoxFlag xmlns:ma14="http://schemas.microsoft.com/office/mac/drawingml/2011/main" xmlns:a14="http://schemas.microsoft.com/office/drawing/2010/main" xmlns:m="http://schemas.openxmlformats.org/officeDocument/2006/math" xmlns="" val="1"/>
+              <ma14:wrappingTextBoxFlag xmlns="" xmlns:m="http://schemas.openxmlformats.org/officeDocument/2006/math" xmlns:a14="http://schemas.microsoft.com/office/drawing/2010/main" xmlns:ma14="http://schemas.microsoft.com/office/mac/drawingml/2011/main" val="1"/>
             </a:ext>
           </a:extLst>
         </p:spPr>
@@ -13728,7 +13730,7 @@
             <a:effectLst/>
             <a:extLst>
               <a:ext uri="{C572A759-6A51-4108-AA02-DFA0A04FC94B}">
-                <ma14:wrappingTextBoxFlag xmlns:ma14="http://schemas.microsoft.com/office/mac/drawingml/2011/main" xmlns:a14="http://schemas.microsoft.com/office/drawing/2010/main" xmlns:m="http://schemas.openxmlformats.org/officeDocument/2006/math" xmlns="" val="1"/>
+                <ma14:wrappingTextBoxFlag xmlns="" xmlns:m="http://schemas.openxmlformats.org/officeDocument/2006/math" xmlns:a14="http://schemas.microsoft.com/office/drawing/2010/main" xmlns:ma14="http://schemas.microsoft.com/office/mac/drawingml/2011/main" val="1"/>
               </a:ext>
             </a:extLst>
           </p:spPr>
@@ -13830,7 +13832,7 @@
             <a:effectLst/>
             <a:extLst>
               <a:ext uri="{C572A759-6A51-4108-AA02-DFA0A04FC94B}">
-                <ma14:wrappingTextBoxFlag xmlns:ma14="http://schemas.microsoft.com/office/mac/drawingml/2011/main" xmlns:a14="http://schemas.microsoft.com/office/drawing/2010/main" xmlns:m="http://schemas.openxmlformats.org/officeDocument/2006/math" xmlns="" val="1"/>
+                <ma14:wrappingTextBoxFlag xmlns="" xmlns:m="http://schemas.openxmlformats.org/officeDocument/2006/math" xmlns:a14="http://schemas.microsoft.com/office/drawing/2010/main" xmlns:ma14="http://schemas.microsoft.com/office/mac/drawingml/2011/main" val="1"/>
               </a:ext>
             </a:extLst>
           </p:spPr>
@@ -13962,7 +13964,7 @@
             <a:effectLst/>
             <a:extLst>
               <a:ext uri="{C572A759-6A51-4108-AA02-DFA0A04FC94B}">
-                <ma14:wrappingTextBoxFlag xmlns:ma14="http://schemas.microsoft.com/office/mac/drawingml/2011/main" xmlns:a14="http://schemas.microsoft.com/office/drawing/2010/main" xmlns:m="http://schemas.openxmlformats.org/officeDocument/2006/math" xmlns="" val="1"/>
+                <ma14:wrappingTextBoxFlag xmlns="" xmlns:m="http://schemas.openxmlformats.org/officeDocument/2006/math" xmlns:a14="http://schemas.microsoft.com/office/drawing/2010/main" xmlns:ma14="http://schemas.microsoft.com/office/mac/drawingml/2011/main" val="1"/>
               </a:ext>
             </a:extLst>
           </p:spPr>
@@ -14089,7 +14091,7 @@
           </a:ln>
           <a:extLst>
             <a:ext uri="{C572A759-6A51-4108-AA02-DFA0A04FC94B}">
-              <ma14:wrappingTextBoxFlag xmlns:ma14="http://schemas.microsoft.com/office/mac/drawingml/2011/main" xmlns:a14="http://schemas.microsoft.com/office/drawing/2010/main" xmlns:m="http://schemas.openxmlformats.org/officeDocument/2006/math" xmlns="" val="1"/>
+              <ma14:wrappingTextBoxFlag xmlns="" xmlns:m="http://schemas.openxmlformats.org/officeDocument/2006/math" xmlns:a14="http://schemas.microsoft.com/office/drawing/2010/main" xmlns:ma14="http://schemas.microsoft.com/office/mac/drawingml/2011/main" val="1"/>
             </a:ext>
           </a:extLst>
         </p:spPr>
@@ -14473,7 +14475,7 @@
           </a:ln>
           <a:extLst>
             <a:ext uri="{C572A759-6A51-4108-AA02-DFA0A04FC94B}">
-              <ma14:wrappingTextBoxFlag xmlns:ma14="http://schemas.microsoft.com/office/mac/drawingml/2011/main" xmlns:a14="http://schemas.microsoft.com/office/drawing/2010/main" xmlns:m="http://schemas.openxmlformats.org/officeDocument/2006/math" xmlns="" val="1"/>
+              <ma14:wrappingTextBoxFlag xmlns="" xmlns:m="http://schemas.openxmlformats.org/officeDocument/2006/math" xmlns:a14="http://schemas.microsoft.com/office/drawing/2010/main" xmlns:ma14="http://schemas.microsoft.com/office/mac/drawingml/2011/main" val="1"/>
             </a:ext>
           </a:extLst>
         </p:spPr>
@@ -14584,7 +14586,7 @@
           </a:ln>
           <a:extLst>
             <a:ext uri="{C572A759-6A51-4108-AA02-DFA0A04FC94B}">
-              <ma14:wrappingTextBoxFlag xmlns:ma14="http://schemas.microsoft.com/office/mac/drawingml/2011/main" xmlns:a14="http://schemas.microsoft.com/office/drawing/2010/main" xmlns:m="http://schemas.openxmlformats.org/officeDocument/2006/math" xmlns="" val="1"/>
+              <ma14:wrappingTextBoxFlag xmlns="" xmlns:m="http://schemas.openxmlformats.org/officeDocument/2006/math" xmlns:a14="http://schemas.microsoft.com/office/drawing/2010/main" xmlns:ma14="http://schemas.microsoft.com/office/mac/drawingml/2011/main" val="1"/>
             </a:ext>
           </a:extLst>
         </p:spPr>
@@ -15045,7 +15047,7 @@
             <a:effectLst/>
             <a:extLst>
               <a:ext uri="{C572A759-6A51-4108-AA02-DFA0A04FC94B}">
-                <ma14:wrappingTextBoxFlag xmlns:ma14="http://schemas.microsoft.com/office/mac/drawingml/2011/main" xmlns:a14="http://schemas.microsoft.com/office/drawing/2010/main" xmlns:m="http://schemas.openxmlformats.org/officeDocument/2006/math" xmlns="" val="1"/>
+                <ma14:wrappingTextBoxFlag xmlns="" xmlns:m="http://schemas.openxmlformats.org/officeDocument/2006/math" xmlns:a14="http://schemas.microsoft.com/office/drawing/2010/main" xmlns:ma14="http://schemas.microsoft.com/office/mac/drawingml/2011/main" val="1"/>
               </a:ext>
             </a:extLst>
           </p:spPr>
@@ -15459,7 +15461,7 @@
           </a:ln>
           <a:extLst>
             <a:ext uri="{C572A759-6A51-4108-AA02-DFA0A04FC94B}">
-              <ma14:wrappingTextBoxFlag xmlns:ma14="http://schemas.microsoft.com/office/mac/drawingml/2011/main" xmlns:a14="http://schemas.microsoft.com/office/drawing/2010/main" xmlns:m="http://schemas.openxmlformats.org/officeDocument/2006/math" xmlns="" val="1"/>
+              <ma14:wrappingTextBoxFlag xmlns="" xmlns:m="http://schemas.openxmlformats.org/officeDocument/2006/math" xmlns:a14="http://schemas.microsoft.com/office/drawing/2010/main" xmlns:ma14="http://schemas.microsoft.com/office/mac/drawingml/2011/main" val="1"/>
             </a:ext>
           </a:extLst>
         </p:spPr>
@@ -15561,39 +15563,6 @@
           </a:p>
         </p:txBody>
       </p:sp>
-      <p:pic>
-        <p:nvPicPr>
-          <p:cNvPr id="372" name="Shape 550" descr="Shape 550"/>
-          <p:cNvPicPr>
-            <a:picLocks noChangeAspect="1"/>
-          </p:cNvPicPr>
-          <p:nvPr/>
-        </p:nvPicPr>
-        <p:blipFill>
-          <a:blip r:embed="rId3" cstate="email">
-            <a:extLst>
-              <a:ext uri="{28A0092B-C50C-407E-A947-70E740481C1C}">
-                <a14:useLocalDpi xmlns:a14="http://schemas.microsoft.com/office/drawing/2010/main"/>
-              </a:ext>
-            </a:extLst>
-          </a:blip>
-          <a:stretch>
-            <a:fillRect/>
-          </a:stretch>
-        </p:blipFill>
-        <p:spPr>
-          <a:xfrm>
-            <a:off x="437900" y="991903"/>
-            <a:ext cx="1024801" cy="1024801"/>
-          </a:xfrm>
-          <a:prstGeom prst="rect">
-            <a:avLst/>
-          </a:prstGeom>
-          <a:ln w="12700">
-            <a:miter lim="400000"/>
-          </a:ln>
-        </p:spPr>
-      </p:pic>
       <p:pic>
         <p:nvPicPr>
           <p:cNvPr id="373" name="Shape 551" descr="Shape 551"/>
@@ -15603,7 +15572,7 @@
           <p:nvPr/>
         </p:nvPicPr>
         <p:blipFill>
-          <a:blip r:embed="rId4" cstate="email">
+          <a:blip r:embed="rId3" cstate="email">
             <a:extLst>
               <a:ext uri="{28A0092B-C50C-407E-A947-70E740481C1C}">
                 <a14:useLocalDpi xmlns:a14="http://schemas.microsoft.com/office/drawing/2010/main"/>
@@ -15872,7 +15841,7 @@
             <a:effectLst/>
             <a:extLst>
               <a:ext uri="{C572A759-6A51-4108-AA02-DFA0A04FC94B}">
-                <ma14:wrappingTextBoxFlag xmlns:ma14="http://schemas.microsoft.com/office/mac/drawingml/2011/main" xmlns:a14="http://schemas.microsoft.com/office/drawing/2010/main" xmlns:m="http://schemas.openxmlformats.org/officeDocument/2006/math" xmlns="" val="1"/>
+                <ma14:wrappingTextBoxFlag xmlns="" xmlns:m="http://schemas.openxmlformats.org/officeDocument/2006/math" xmlns:a14="http://schemas.microsoft.com/office/drawing/2010/main" xmlns:ma14="http://schemas.microsoft.com/office/mac/drawingml/2011/main" val="1"/>
               </a:ext>
             </a:extLst>
           </p:spPr>
@@ -16163,7 +16132,7 @@
             <a:effectLst/>
             <a:extLst>
               <a:ext uri="{C572A759-6A51-4108-AA02-DFA0A04FC94B}">
-                <ma14:wrappingTextBoxFlag xmlns:ma14="http://schemas.microsoft.com/office/mac/drawingml/2011/main" xmlns:a14="http://schemas.microsoft.com/office/drawing/2010/main" xmlns:m="http://schemas.openxmlformats.org/officeDocument/2006/math" xmlns="" val="1"/>
+                <ma14:wrappingTextBoxFlag xmlns="" xmlns:m="http://schemas.openxmlformats.org/officeDocument/2006/math" xmlns:a14="http://schemas.microsoft.com/office/drawing/2010/main" xmlns:ma14="http://schemas.microsoft.com/office/mac/drawingml/2011/main" val="1"/>
               </a:ext>
             </a:extLst>
           </p:spPr>
@@ -16339,7 +16308,7 @@
             <a:effectLst/>
             <a:extLst>
               <a:ext uri="{C572A759-6A51-4108-AA02-DFA0A04FC94B}">
-                <ma14:wrappingTextBoxFlag xmlns:ma14="http://schemas.microsoft.com/office/mac/drawingml/2011/main" xmlns:a14="http://schemas.microsoft.com/office/drawing/2010/main" xmlns:m="http://schemas.openxmlformats.org/officeDocument/2006/math" xmlns="" val="1"/>
+                <ma14:wrappingTextBoxFlag xmlns="" xmlns:m="http://schemas.openxmlformats.org/officeDocument/2006/math" xmlns:a14="http://schemas.microsoft.com/office/drawing/2010/main" xmlns:ma14="http://schemas.microsoft.com/office/mac/drawingml/2011/main" val="1"/>
               </a:ext>
             </a:extLst>
           </p:spPr>
@@ -16783,7 +16752,7 @@
             <a:effectLst/>
             <a:extLst>
               <a:ext uri="{C572A759-6A51-4108-AA02-DFA0A04FC94B}">
-                <ma14:wrappingTextBoxFlag xmlns:ma14="http://schemas.microsoft.com/office/mac/drawingml/2011/main" xmlns:a14="http://schemas.microsoft.com/office/drawing/2010/main" xmlns:m="http://schemas.openxmlformats.org/officeDocument/2006/math" xmlns="" val="1"/>
+                <ma14:wrappingTextBoxFlag xmlns="" xmlns:m="http://schemas.openxmlformats.org/officeDocument/2006/math" xmlns:a14="http://schemas.microsoft.com/office/drawing/2010/main" xmlns:ma14="http://schemas.microsoft.com/office/mac/drawingml/2011/main" val="1"/>
               </a:ext>
             </a:extLst>
           </p:spPr>
@@ -16917,7 +16886,7 @@
           </a:ln>
           <a:extLst>
             <a:ext uri="{C572A759-6A51-4108-AA02-DFA0A04FC94B}">
-              <ma14:wrappingTextBoxFlag xmlns:ma14="http://schemas.microsoft.com/office/mac/drawingml/2011/main" xmlns:a14="http://schemas.microsoft.com/office/drawing/2010/main" xmlns:m="http://schemas.openxmlformats.org/officeDocument/2006/math" xmlns="" val="1"/>
+              <ma14:wrappingTextBoxFlag xmlns="" xmlns:m="http://schemas.openxmlformats.org/officeDocument/2006/math" xmlns:a14="http://schemas.microsoft.com/office/drawing/2010/main" xmlns:ma14="http://schemas.microsoft.com/office/mac/drawingml/2011/main" val="1"/>
             </a:ext>
           </a:extLst>
         </p:spPr>
@@ -16960,7 +16929,7 @@
           </a:ln>
           <a:extLst>
             <a:ext uri="{C572A759-6A51-4108-AA02-DFA0A04FC94B}">
-              <ma14:wrappingTextBoxFlag xmlns:ma14="http://schemas.microsoft.com/office/mac/drawingml/2011/main" xmlns:a14="http://schemas.microsoft.com/office/drawing/2010/main" xmlns:m="http://schemas.openxmlformats.org/officeDocument/2006/math" xmlns="" val="1"/>
+              <ma14:wrappingTextBoxFlag xmlns="" xmlns:m="http://schemas.openxmlformats.org/officeDocument/2006/math" xmlns:a14="http://schemas.microsoft.com/office/drawing/2010/main" xmlns:ma14="http://schemas.microsoft.com/office/mac/drawingml/2011/main" val="1"/>
             </a:ext>
           </a:extLst>
         </p:spPr>
@@ -17032,7 +17001,7 @@
           </a:ln>
           <a:extLst>
             <a:ext uri="{C572A759-6A51-4108-AA02-DFA0A04FC94B}">
-              <ma14:wrappingTextBoxFlag xmlns:ma14="http://schemas.microsoft.com/office/mac/drawingml/2011/main" xmlns:a14="http://schemas.microsoft.com/office/drawing/2010/main" xmlns:m="http://schemas.openxmlformats.org/officeDocument/2006/math" xmlns="" val="1"/>
+              <ma14:wrappingTextBoxFlag xmlns="" xmlns:m="http://schemas.openxmlformats.org/officeDocument/2006/math" xmlns:a14="http://schemas.microsoft.com/office/drawing/2010/main" xmlns:ma14="http://schemas.microsoft.com/office/mac/drawingml/2011/main" val="1"/>
             </a:ext>
           </a:extLst>
         </p:spPr>

</xml_diff>

<commit_message>
Reduced class 1 + 2 lecture slide size slightly
</commit_message>
<xml_diff>
--- a/slides/Pythonlearn-01-Intro.pptx
+++ b/slides/Pythonlearn-01-Intro.pptx
@@ -1150,7 +1150,7 @@
           </a:ln>
           <a:extLst>
             <a:ext uri="{C572A759-6A51-4108-AA02-DFA0A04FC94B}">
-              <ma14:wrappingTextBoxFlag xmlns="" xmlns:m="http://schemas.openxmlformats.org/officeDocument/2006/math" xmlns:a14="http://schemas.microsoft.com/office/drawing/2010/main" xmlns:ma14="http://schemas.microsoft.com/office/mac/drawingml/2011/main" val="1"/>
+              <ma14:wrappingTextBoxFlag xmlns:ma14="http://schemas.microsoft.com/office/mac/drawingml/2011/main" xmlns:a14="http://schemas.microsoft.com/office/drawing/2010/main" xmlns:m="http://schemas.openxmlformats.org/officeDocument/2006/math" xmlns="" val="1"/>
             </a:ext>
           </a:extLst>
         </p:spPr>
@@ -1189,7 +1189,7 @@
           </a:ln>
           <a:extLst>
             <a:ext uri="{C572A759-6A51-4108-AA02-DFA0A04FC94B}">
-              <ma14:wrappingTextBoxFlag xmlns="" xmlns:m="http://schemas.openxmlformats.org/officeDocument/2006/math" xmlns:a14="http://schemas.microsoft.com/office/drawing/2010/main" xmlns:ma14="http://schemas.microsoft.com/office/mac/drawingml/2011/main" val="1"/>
+              <ma14:wrappingTextBoxFlag xmlns:ma14="http://schemas.microsoft.com/office/mac/drawingml/2011/main" xmlns:a14="http://schemas.microsoft.com/office/drawing/2010/main" xmlns:m="http://schemas.openxmlformats.org/officeDocument/2006/math" xmlns="" val="1"/>
             </a:ext>
           </a:extLst>
         </p:spPr>
@@ -2192,7 +2192,7 @@
           </a:ln>
           <a:extLst>
             <a:ext uri="{C572A759-6A51-4108-AA02-DFA0A04FC94B}">
-              <ma14:wrappingTextBoxFlag xmlns="" xmlns:m="http://schemas.openxmlformats.org/officeDocument/2006/math" xmlns:a14="http://schemas.microsoft.com/office/drawing/2010/main" xmlns:ma14="http://schemas.microsoft.com/office/mac/drawingml/2011/main" val="1"/>
+              <ma14:wrappingTextBoxFlag xmlns:ma14="http://schemas.microsoft.com/office/mac/drawingml/2011/main" xmlns:a14="http://schemas.microsoft.com/office/drawing/2010/main" xmlns:m="http://schemas.openxmlformats.org/officeDocument/2006/math" xmlns="" val="1"/>
             </a:ext>
           </a:extLst>
         </p:spPr>
@@ -2751,7 +2751,7 @@
           </a:ln>
           <a:extLst>
             <a:ext uri="{C572A759-6A51-4108-AA02-DFA0A04FC94B}">
-              <ma14:wrappingTextBoxFlag xmlns="" xmlns:m="http://schemas.openxmlformats.org/officeDocument/2006/math" xmlns:a14="http://schemas.microsoft.com/office/drawing/2010/main" xmlns:ma14="http://schemas.microsoft.com/office/mac/drawingml/2011/main" val="1"/>
+              <ma14:wrappingTextBoxFlag xmlns:ma14="http://schemas.microsoft.com/office/mac/drawingml/2011/main" xmlns:a14="http://schemas.microsoft.com/office/drawing/2010/main" xmlns:m="http://schemas.openxmlformats.org/officeDocument/2006/math" xmlns="" val="1"/>
             </a:ext>
           </a:extLst>
         </p:spPr>
@@ -3073,7 +3073,7 @@
             <a:effectLst/>
             <a:extLst>
               <a:ext uri="{C572A759-6A51-4108-AA02-DFA0A04FC94B}">
-                <ma14:wrappingTextBoxFlag xmlns="" xmlns:m="http://schemas.openxmlformats.org/officeDocument/2006/math" xmlns:a14="http://schemas.microsoft.com/office/drawing/2010/main" xmlns:ma14="http://schemas.microsoft.com/office/mac/drawingml/2011/main" val="1"/>
+                <ma14:wrappingTextBoxFlag xmlns:ma14="http://schemas.microsoft.com/office/mac/drawingml/2011/main" xmlns:a14="http://schemas.microsoft.com/office/drawing/2010/main" xmlns:m="http://schemas.openxmlformats.org/officeDocument/2006/math" xmlns="" val="1"/>
               </a:ext>
             </a:extLst>
           </p:spPr>
@@ -3185,7 +3185,7 @@
             <a:effectLst/>
             <a:extLst>
               <a:ext uri="{C572A759-6A51-4108-AA02-DFA0A04FC94B}">
-                <ma14:wrappingTextBoxFlag xmlns="" xmlns:m="http://schemas.openxmlformats.org/officeDocument/2006/math" xmlns:a14="http://schemas.microsoft.com/office/drawing/2010/main" xmlns:ma14="http://schemas.microsoft.com/office/mac/drawingml/2011/main" val="1"/>
+                <ma14:wrappingTextBoxFlag xmlns:ma14="http://schemas.microsoft.com/office/mac/drawingml/2011/main" xmlns:a14="http://schemas.microsoft.com/office/drawing/2010/main" xmlns:m="http://schemas.openxmlformats.org/officeDocument/2006/math" xmlns="" val="1"/>
               </a:ext>
             </a:extLst>
           </p:spPr>
@@ -3320,7 +3320,7 @@
             <a:effectLst/>
             <a:extLst>
               <a:ext uri="{C572A759-6A51-4108-AA02-DFA0A04FC94B}">
-                <ma14:wrappingTextBoxFlag xmlns="" xmlns:m="http://schemas.openxmlformats.org/officeDocument/2006/math" xmlns:a14="http://schemas.microsoft.com/office/drawing/2010/main" xmlns:ma14="http://schemas.microsoft.com/office/mac/drawingml/2011/main" val="1"/>
+                <ma14:wrappingTextBoxFlag xmlns:ma14="http://schemas.microsoft.com/office/mac/drawingml/2011/main" xmlns:a14="http://schemas.microsoft.com/office/drawing/2010/main" xmlns:m="http://schemas.openxmlformats.org/officeDocument/2006/math" xmlns="" val="1"/>
               </a:ext>
             </a:extLst>
           </p:spPr>
@@ -3455,7 +3455,7 @@
             <a:effectLst/>
             <a:extLst>
               <a:ext uri="{C572A759-6A51-4108-AA02-DFA0A04FC94B}">
-                <ma14:wrappingTextBoxFlag xmlns="" xmlns:m="http://schemas.openxmlformats.org/officeDocument/2006/math" xmlns:a14="http://schemas.microsoft.com/office/drawing/2010/main" xmlns:ma14="http://schemas.microsoft.com/office/mac/drawingml/2011/main" val="1"/>
+                <ma14:wrappingTextBoxFlag xmlns:ma14="http://schemas.microsoft.com/office/mac/drawingml/2011/main" xmlns:a14="http://schemas.microsoft.com/office/drawing/2010/main" xmlns:m="http://schemas.openxmlformats.org/officeDocument/2006/math" xmlns="" val="1"/>
               </a:ext>
             </a:extLst>
           </p:spPr>
@@ -3573,7 +3573,7 @@
             <a:effectLst/>
             <a:extLst>
               <a:ext uri="{C572A759-6A51-4108-AA02-DFA0A04FC94B}">
-                <ma14:wrappingTextBoxFlag xmlns="" xmlns:m="http://schemas.openxmlformats.org/officeDocument/2006/math" xmlns:a14="http://schemas.microsoft.com/office/drawing/2010/main" xmlns:ma14="http://schemas.microsoft.com/office/mac/drawingml/2011/main" val="1"/>
+                <ma14:wrappingTextBoxFlag xmlns:ma14="http://schemas.microsoft.com/office/mac/drawingml/2011/main" xmlns:a14="http://schemas.microsoft.com/office/drawing/2010/main" xmlns:m="http://schemas.openxmlformats.org/officeDocument/2006/math" xmlns="" val="1"/>
               </a:ext>
             </a:extLst>
           </p:spPr>
@@ -3784,7 +3784,7 @@
           </a:ln>
           <a:extLst>
             <a:ext uri="{C572A759-6A51-4108-AA02-DFA0A04FC94B}">
-              <ma14:wrappingTextBoxFlag xmlns="" xmlns:m="http://schemas.openxmlformats.org/officeDocument/2006/math" xmlns:a14="http://schemas.microsoft.com/office/drawing/2010/main" xmlns:ma14="http://schemas.microsoft.com/office/mac/drawingml/2011/main" val="1"/>
+              <ma14:wrappingTextBoxFlag xmlns:ma14="http://schemas.microsoft.com/office/mac/drawingml/2011/main" xmlns:a14="http://schemas.microsoft.com/office/drawing/2010/main" xmlns:m="http://schemas.openxmlformats.org/officeDocument/2006/math" xmlns="" val="1"/>
             </a:ext>
           </a:extLst>
         </p:spPr>
@@ -3911,7 +3911,7 @@
             <a:effectLst/>
             <a:extLst>
               <a:ext uri="{C572A759-6A51-4108-AA02-DFA0A04FC94B}">
-                <ma14:wrappingTextBoxFlag xmlns="" xmlns:m="http://schemas.openxmlformats.org/officeDocument/2006/math" xmlns:a14="http://schemas.microsoft.com/office/drawing/2010/main" xmlns:ma14="http://schemas.microsoft.com/office/mac/drawingml/2011/main" val="1"/>
+                <ma14:wrappingTextBoxFlag xmlns:ma14="http://schemas.microsoft.com/office/mac/drawingml/2011/main" xmlns:a14="http://schemas.microsoft.com/office/drawing/2010/main" xmlns:m="http://schemas.openxmlformats.org/officeDocument/2006/math" xmlns="" val="1"/>
               </a:ext>
             </a:extLst>
           </p:spPr>
@@ -4314,7 +4314,7 @@
             <a:effectLst/>
             <a:extLst>
               <a:ext uri="{C572A759-6A51-4108-AA02-DFA0A04FC94B}">
-                <ma14:wrappingTextBoxFlag xmlns="" xmlns:m="http://schemas.openxmlformats.org/officeDocument/2006/math" xmlns:a14="http://schemas.microsoft.com/office/drawing/2010/main" xmlns:ma14="http://schemas.microsoft.com/office/mac/drawingml/2011/main" val="1"/>
+                <ma14:wrappingTextBoxFlag xmlns:ma14="http://schemas.microsoft.com/office/mac/drawingml/2011/main" xmlns:a14="http://schemas.microsoft.com/office/drawing/2010/main" xmlns:m="http://schemas.openxmlformats.org/officeDocument/2006/math" xmlns="" val="1"/>
               </a:ext>
             </a:extLst>
           </p:spPr>
@@ -4456,7 +4456,7 @@
             <a:effectLst/>
             <a:extLst>
               <a:ext uri="{C572A759-6A51-4108-AA02-DFA0A04FC94B}">
-                <ma14:wrappingTextBoxFlag xmlns="" xmlns:m="http://schemas.openxmlformats.org/officeDocument/2006/math" xmlns:a14="http://schemas.microsoft.com/office/drawing/2010/main" xmlns:ma14="http://schemas.microsoft.com/office/mac/drawingml/2011/main" val="1"/>
+                <ma14:wrappingTextBoxFlag xmlns:ma14="http://schemas.microsoft.com/office/mac/drawingml/2011/main" xmlns:a14="http://schemas.microsoft.com/office/drawing/2010/main" xmlns:m="http://schemas.openxmlformats.org/officeDocument/2006/math" xmlns="" val="1"/>
               </a:ext>
             </a:extLst>
           </p:spPr>
@@ -4561,7 +4561,7 @@
             <a:effectLst/>
             <a:extLst>
               <a:ext uri="{C572A759-6A51-4108-AA02-DFA0A04FC94B}">
-                <ma14:wrappingTextBoxFlag xmlns="" xmlns:m="http://schemas.openxmlformats.org/officeDocument/2006/math" xmlns:a14="http://schemas.microsoft.com/office/drawing/2010/main" xmlns:ma14="http://schemas.microsoft.com/office/mac/drawingml/2011/main" val="1"/>
+                <ma14:wrappingTextBoxFlag xmlns:ma14="http://schemas.microsoft.com/office/mac/drawingml/2011/main" xmlns:a14="http://schemas.microsoft.com/office/drawing/2010/main" xmlns:m="http://schemas.openxmlformats.org/officeDocument/2006/math" xmlns="" val="1"/>
               </a:ext>
             </a:extLst>
           </p:spPr>
@@ -4696,7 +4696,7 @@
             <a:effectLst/>
             <a:extLst>
               <a:ext uri="{C572A759-6A51-4108-AA02-DFA0A04FC94B}">
-                <ma14:wrappingTextBoxFlag xmlns="" xmlns:m="http://schemas.openxmlformats.org/officeDocument/2006/math" xmlns:a14="http://schemas.microsoft.com/office/drawing/2010/main" xmlns:ma14="http://schemas.microsoft.com/office/mac/drawingml/2011/main" val="1"/>
+                <ma14:wrappingTextBoxFlag xmlns:ma14="http://schemas.microsoft.com/office/mac/drawingml/2011/main" xmlns:a14="http://schemas.microsoft.com/office/drawing/2010/main" xmlns:m="http://schemas.openxmlformats.org/officeDocument/2006/math" xmlns="" val="1"/>
               </a:ext>
             </a:extLst>
           </p:spPr>
@@ -4831,7 +4831,7 @@
             <a:effectLst/>
             <a:extLst>
               <a:ext uri="{C572A759-6A51-4108-AA02-DFA0A04FC94B}">
-                <ma14:wrappingTextBoxFlag xmlns="" xmlns:m="http://schemas.openxmlformats.org/officeDocument/2006/math" xmlns:a14="http://schemas.microsoft.com/office/drawing/2010/main" xmlns:ma14="http://schemas.microsoft.com/office/mac/drawingml/2011/main" val="1"/>
+                <ma14:wrappingTextBoxFlag xmlns:ma14="http://schemas.microsoft.com/office/mac/drawingml/2011/main" xmlns:a14="http://schemas.microsoft.com/office/drawing/2010/main" xmlns:m="http://schemas.openxmlformats.org/officeDocument/2006/math" xmlns="" val="1"/>
               </a:ext>
             </a:extLst>
           </p:spPr>
@@ -4949,7 +4949,7 @@
             <a:effectLst/>
             <a:extLst>
               <a:ext uri="{C572A759-6A51-4108-AA02-DFA0A04FC94B}">
-                <ma14:wrappingTextBoxFlag xmlns="" xmlns:m="http://schemas.openxmlformats.org/officeDocument/2006/math" xmlns:a14="http://schemas.microsoft.com/office/drawing/2010/main" xmlns:ma14="http://schemas.microsoft.com/office/mac/drawingml/2011/main" val="1"/>
+                <ma14:wrappingTextBoxFlag xmlns:ma14="http://schemas.microsoft.com/office/mac/drawingml/2011/main" xmlns:a14="http://schemas.microsoft.com/office/drawing/2010/main" xmlns:m="http://schemas.openxmlformats.org/officeDocument/2006/math" xmlns="" val="1"/>
               </a:ext>
             </a:extLst>
           </p:spPr>
@@ -5160,7 +5160,7 @@
           </a:ln>
           <a:extLst>
             <a:ext uri="{C572A759-6A51-4108-AA02-DFA0A04FC94B}">
-              <ma14:wrappingTextBoxFlag xmlns="" xmlns:m="http://schemas.openxmlformats.org/officeDocument/2006/math" xmlns:a14="http://schemas.microsoft.com/office/drawing/2010/main" xmlns:ma14="http://schemas.microsoft.com/office/mac/drawingml/2011/main" val="1"/>
+              <ma14:wrappingTextBoxFlag xmlns:ma14="http://schemas.microsoft.com/office/mac/drawingml/2011/main" xmlns:a14="http://schemas.microsoft.com/office/drawing/2010/main" xmlns:m="http://schemas.openxmlformats.org/officeDocument/2006/math" xmlns="" val="1"/>
             </a:ext>
           </a:extLst>
         </p:spPr>
@@ -5287,7 +5287,7 @@
             <a:effectLst/>
             <a:extLst>
               <a:ext uri="{C572A759-6A51-4108-AA02-DFA0A04FC94B}">
-                <ma14:wrappingTextBoxFlag xmlns="" xmlns:m="http://schemas.openxmlformats.org/officeDocument/2006/math" xmlns:a14="http://schemas.microsoft.com/office/drawing/2010/main" xmlns:ma14="http://schemas.microsoft.com/office/mac/drawingml/2011/main" val="1"/>
+                <ma14:wrappingTextBoxFlag xmlns:ma14="http://schemas.microsoft.com/office/mac/drawingml/2011/main" xmlns:a14="http://schemas.microsoft.com/office/drawing/2010/main" xmlns:m="http://schemas.openxmlformats.org/officeDocument/2006/math" xmlns="" val="1"/>
               </a:ext>
             </a:extLst>
           </p:spPr>
@@ -5434,7 +5434,7 @@
             <a:effectLst/>
             <a:extLst>
               <a:ext uri="{C572A759-6A51-4108-AA02-DFA0A04FC94B}">
-                <ma14:wrappingTextBoxFlag xmlns="" xmlns:m="http://schemas.openxmlformats.org/officeDocument/2006/math" xmlns:a14="http://schemas.microsoft.com/office/drawing/2010/main" xmlns:ma14="http://schemas.microsoft.com/office/mac/drawingml/2011/main" val="1"/>
+                <ma14:wrappingTextBoxFlag xmlns:ma14="http://schemas.microsoft.com/office/mac/drawingml/2011/main" xmlns:a14="http://schemas.microsoft.com/office/drawing/2010/main" xmlns:m="http://schemas.openxmlformats.org/officeDocument/2006/math" xmlns="" val="1"/>
               </a:ext>
             </a:extLst>
           </p:spPr>
@@ -5565,7 +5565,7 @@
             <a:effectLst/>
             <a:extLst>
               <a:ext uri="{C572A759-6A51-4108-AA02-DFA0A04FC94B}">
-                <ma14:wrappingTextBoxFlag xmlns="" xmlns:m="http://schemas.openxmlformats.org/officeDocument/2006/math" xmlns:a14="http://schemas.microsoft.com/office/drawing/2010/main" xmlns:ma14="http://schemas.microsoft.com/office/mac/drawingml/2011/main" val="1"/>
+                <ma14:wrappingTextBoxFlag xmlns:ma14="http://schemas.microsoft.com/office/mac/drawingml/2011/main" xmlns:a14="http://schemas.microsoft.com/office/drawing/2010/main" xmlns:m="http://schemas.openxmlformats.org/officeDocument/2006/math" xmlns="" val="1"/>
               </a:ext>
             </a:extLst>
           </p:spPr>
@@ -5670,7 +5670,7 @@
             <a:effectLst/>
             <a:extLst>
               <a:ext uri="{C572A759-6A51-4108-AA02-DFA0A04FC94B}">
-                <ma14:wrappingTextBoxFlag xmlns="" xmlns:m="http://schemas.openxmlformats.org/officeDocument/2006/math" xmlns:a14="http://schemas.microsoft.com/office/drawing/2010/main" xmlns:ma14="http://schemas.microsoft.com/office/mac/drawingml/2011/main" val="1"/>
+                <ma14:wrappingTextBoxFlag xmlns:ma14="http://schemas.microsoft.com/office/mac/drawingml/2011/main" xmlns:a14="http://schemas.microsoft.com/office/drawing/2010/main" xmlns:m="http://schemas.openxmlformats.org/officeDocument/2006/math" xmlns="" val="1"/>
               </a:ext>
             </a:extLst>
           </p:spPr>
@@ -5805,7 +5805,7 @@
             <a:effectLst/>
             <a:extLst>
               <a:ext uri="{C572A759-6A51-4108-AA02-DFA0A04FC94B}">
-                <ma14:wrappingTextBoxFlag xmlns="" xmlns:m="http://schemas.openxmlformats.org/officeDocument/2006/math" xmlns:a14="http://schemas.microsoft.com/office/drawing/2010/main" xmlns:ma14="http://schemas.microsoft.com/office/mac/drawingml/2011/main" val="1"/>
+                <ma14:wrappingTextBoxFlag xmlns:ma14="http://schemas.microsoft.com/office/mac/drawingml/2011/main" xmlns:a14="http://schemas.microsoft.com/office/drawing/2010/main" xmlns:m="http://schemas.openxmlformats.org/officeDocument/2006/math" xmlns="" val="1"/>
               </a:ext>
             </a:extLst>
           </p:spPr>
@@ -5940,7 +5940,7 @@
             <a:effectLst/>
             <a:extLst>
               <a:ext uri="{C572A759-6A51-4108-AA02-DFA0A04FC94B}">
-                <ma14:wrappingTextBoxFlag xmlns="" xmlns:m="http://schemas.openxmlformats.org/officeDocument/2006/math" xmlns:a14="http://schemas.microsoft.com/office/drawing/2010/main" xmlns:ma14="http://schemas.microsoft.com/office/mac/drawingml/2011/main" val="1"/>
+                <ma14:wrappingTextBoxFlag xmlns:ma14="http://schemas.microsoft.com/office/mac/drawingml/2011/main" xmlns:a14="http://schemas.microsoft.com/office/drawing/2010/main" xmlns:m="http://schemas.openxmlformats.org/officeDocument/2006/math" xmlns="" val="1"/>
               </a:ext>
             </a:extLst>
           </p:spPr>
@@ -6058,7 +6058,7 @@
             <a:effectLst/>
             <a:extLst>
               <a:ext uri="{C572A759-6A51-4108-AA02-DFA0A04FC94B}">
-                <ma14:wrappingTextBoxFlag xmlns="" xmlns:m="http://schemas.openxmlformats.org/officeDocument/2006/math" xmlns:a14="http://schemas.microsoft.com/office/drawing/2010/main" xmlns:ma14="http://schemas.microsoft.com/office/mac/drawingml/2011/main" val="1"/>
+                <ma14:wrappingTextBoxFlag xmlns:ma14="http://schemas.microsoft.com/office/mac/drawingml/2011/main" xmlns:a14="http://schemas.microsoft.com/office/drawing/2010/main" xmlns:m="http://schemas.openxmlformats.org/officeDocument/2006/math" xmlns="" val="1"/>
               </a:ext>
             </a:extLst>
           </p:spPr>
@@ -6269,7 +6269,7 @@
           </a:ln>
           <a:extLst>
             <a:ext uri="{C572A759-6A51-4108-AA02-DFA0A04FC94B}">
-              <ma14:wrappingTextBoxFlag xmlns="" xmlns:m="http://schemas.openxmlformats.org/officeDocument/2006/math" xmlns:a14="http://schemas.microsoft.com/office/drawing/2010/main" xmlns:ma14="http://schemas.microsoft.com/office/mac/drawingml/2011/main" val="1"/>
+              <ma14:wrappingTextBoxFlag xmlns:ma14="http://schemas.microsoft.com/office/mac/drawingml/2011/main" xmlns:a14="http://schemas.microsoft.com/office/drawing/2010/main" xmlns:m="http://schemas.openxmlformats.org/officeDocument/2006/math" xmlns="" val="1"/>
             </a:ext>
           </a:extLst>
         </p:spPr>
@@ -6396,7 +6396,7 @@
             <a:effectLst/>
             <a:extLst>
               <a:ext uri="{C572A759-6A51-4108-AA02-DFA0A04FC94B}">
-                <ma14:wrappingTextBoxFlag xmlns="" xmlns:m="http://schemas.openxmlformats.org/officeDocument/2006/math" xmlns:a14="http://schemas.microsoft.com/office/drawing/2010/main" xmlns:ma14="http://schemas.microsoft.com/office/mac/drawingml/2011/main" val="1"/>
+                <ma14:wrappingTextBoxFlag xmlns:ma14="http://schemas.microsoft.com/office/mac/drawingml/2011/main" xmlns:a14="http://schemas.microsoft.com/office/drawing/2010/main" xmlns:m="http://schemas.openxmlformats.org/officeDocument/2006/math" xmlns="" val="1"/>
               </a:ext>
             </a:extLst>
           </p:spPr>
@@ -6480,7 +6480,7 @@
           </a:ln>
           <a:extLst>
             <a:ext uri="{C572A759-6A51-4108-AA02-DFA0A04FC94B}">
-              <ma14:wrappingTextBoxFlag xmlns="" xmlns:m="http://schemas.openxmlformats.org/officeDocument/2006/math" xmlns:a14="http://schemas.microsoft.com/office/drawing/2010/main" xmlns:ma14="http://schemas.microsoft.com/office/mac/drawingml/2011/main" val="1"/>
+              <ma14:wrappingTextBoxFlag xmlns:ma14="http://schemas.microsoft.com/office/mac/drawingml/2011/main" xmlns:a14="http://schemas.microsoft.com/office/drawing/2010/main" xmlns:m="http://schemas.openxmlformats.org/officeDocument/2006/math" xmlns="" val="1"/>
             </a:ext>
           </a:extLst>
         </p:spPr>
@@ -6602,7 +6602,7 @@
             <a:effectLst/>
             <a:extLst>
               <a:ext uri="{C572A759-6A51-4108-AA02-DFA0A04FC94B}">
-                <ma14:wrappingTextBoxFlag xmlns="" xmlns:m="http://schemas.openxmlformats.org/officeDocument/2006/math" xmlns:a14="http://schemas.microsoft.com/office/drawing/2010/main" xmlns:ma14="http://schemas.microsoft.com/office/mac/drawingml/2011/main" val="1"/>
+                <ma14:wrappingTextBoxFlag xmlns:ma14="http://schemas.microsoft.com/office/mac/drawingml/2011/main" xmlns:a14="http://schemas.microsoft.com/office/drawing/2010/main" xmlns:m="http://schemas.openxmlformats.org/officeDocument/2006/math" xmlns="" val="1"/>
               </a:ext>
             </a:extLst>
           </p:spPr>
@@ -6755,7 +6755,7 @@
           </a:ln>
           <a:extLst>
             <a:ext uri="{C572A759-6A51-4108-AA02-DFA0A04FC94B}">
-              <ma14:wrappingTextBoxFlag xmlns="" xmlns:m="http://schemas.openxmlformats.org/officeDocument/2006/math" xmlns:a14="http://schemas.microsoft.com/office/drawing/2010/main" xmlns:ma14="http://schemas.microsoft.com/office/mac/drawingml/2011/main" val="1"/>
+              <ma14:wrappingTextBoxFlag xmlns:ma14="http://schemas.microsoft.com/office/mac/drawingml/2011/main" xmlns:a14="http://schemas.microsoft.com/office/drawing/2010/main" xmlns:m="http://schemas.openxmlformats.org/officeDocument/2006/math" xmlns="" val="1"/>
             </a:ext>
           </a:extLst>
         </p:spPr>
@@ -7307,7 +7307,7 @@
           </a:ln>
           <a:extLst>
             <a:ext uri="{C572A759-6A51-4108-AA02-DFA0A04FC94B}">
-              <ma14:wrappingTextBoxFlag xmlns="" xmlns:m="http://schemas.openxmlformats.org/officeDocument/2006/math" xmlns:a14="http://schemas.microsoft.com/office/drawing/2010/main" xmlns:ma14="http://schemas.microsoft.com/office/mac/drawingml/2011/main" val="1"/>
+              <ma14:wrappingTextBoxFlag xmlns:ma14="http://schemas.microsoft.com/office/mac/drawingml/2011/main" xmlns:a14="http://schemas.microsoft.com/office/drawing/2010/main" xmlns:m="http://schemas.openxmlformats.org/officeDocument/2006/math" xmlns="" val="1"/>
             </a:ext>
           </a:extLst>
         </p:spPr>
@@ -7408,7 +7408,7 @@
             <a:effectLst/>
             <a:extLst>
               <a:ext uri="{C572A759-6A51-4108-AA02-DFA0A04FC94B}">
-                <ma14:wrappingTextBoxFlag xmlns="" xmlns:m="http://schemas.openxmlformats.org/officeDocument/2006/math" xmlns:a14="http://schemas.microsoft.com/office/drawing/2010/main" xmlns:ma14="http://schemas.microsoft.com/office/mac/drawingml/2011/main" val="1"/>
+                <ma14:wrappingTextBoxFlag xmlns:ma14="http://schemas.microsoft.com/office/mac/drawingml/2011/main" xmlns:a14="http://schemas.microsoft.com/office/drawing/2010/main" xmlns:m="http://schemas.openxmlformats.org/officeDocument/2006/math" xmlns="" val="1"/>
               </a:ext>
             </a:extLst>
           </p:spPr>
@@ -7513,7 +7513,7 @@
           </a:ln>
           <a:extLst>
             <a:ext uri="{C572A759-6A51-4108-AA02-DFA0A04FC94B}">
-              <ma14:wrappingTextBoxFlag xmlns="" xmlns:m="http://schemas.openxmlformats.org/officeDocument/2006/math" xmlns:a14="http://schemas.microsoft.com/office/drawing/2010/main" xmlns:ma14="http://schemas.microsoft.com/office/mac/drawingml/2011/main" val="1"/>
+              <ma14:wrappingTextBoxFlag xmlns:ma14="http://schemas.microsoft.com/office/mac/drawingml/2011/main" xmlns:a14="http://schemas.microsoft.com/office/drawing/2010/main" xmlns:m="http://schemas.openxmlformats.org/officeDocument/2006/math" xmlns="" val="1"/>
             </a:ext>
           </a:extLst>
         </p:spPr>
@@ -7742,7 +7742,7 @@
           </a:ln>
           <a:extLst>
             <a:ext uri="{C572A759-6A51-4108-AA02-DFA0A04FC94B}">
-              <ma14:wrappingTextBoxFlag xmlns="" xmlns:m="http://schemas.openxmlformats.org/officeDocument/2006/math" xmlns:a14="http://schemas.microsoft.com/office/drawing/2010/main" xmlns:ma14="http://schemas.microsoft.com/office/mac/drawingml/2011/main" val="1"/>
+              <ma14:wrappingTextBoxFlag xmlns:ma14="http://schemas.microsoft.com/office/mac/drawingml/2011/main" xmlns:a14="http://schemas.microsoft.com/office/drawing/2010/main" xmlns:m="http://schemas.openxmlformats.org/officeDocument/2006/math" xmlns="" val="1"/>
             </a:ext>
           </a:extLst>
         </p:spPr>
@@ -8024,7 +8024,7 @@
           </a:ln>
           <a:extLst>
             <a:ext uri="{C572A759-6A51-4108-AA02-DFA0A04FC94B}">
-              <ma14:wrappingTextBoxFlag xmlns="" xmlns:m="http://schemas.openxmlformats.org/officeDocument/2006/math" xmlns:a14="http://schemas.microsoft.com/office/drawing/2010/main" xmlns:ma14="http://schemas.microsoft.com/office/mac/drawingml/2011/main" val="1"/>
+              <ma14:wrappingTextBoxFlag xmlns:ma14="http://schemas.microsoft.com/office/mac/drawingml/2011/main" xmlns:a14="http://schemas.microsoft.com/office/drawing/2010/main" xmlns:m="http://schemas.openxmlformats.org/officeDocument/2006/math" xmlns="" val="1"/>
             </a:ext>
           </a:extLst>
         </p:spPr>
@@ -8455,7 +8455,7 @@
             <a:effectLst/>
             <a:extLst>
               <a:ext uri="{C572A759-6A51-4108-AA02-DFA0A04FC94B}">
-                <ma14:wrappingTextBoxFlag xmlns="" xmlns:m="http://schemas.openxmlformats.org/officeDocument/2006/math" xmlns:a14="http://schemas.microsoft.com/office/drawing/2010/main" xmlns:ma14="http://schemas.microsoft.com/office/mac/drawingml/2011/main" val="1"/>
+                <ma14:wrappingTextBoxFlag xmlns:ma14="http://schemas.microsoft.com/office/mac/drawingml/2011/main" xmlns:a14="http://schemas.microsoft.com/office/drawing/2010/main" xmlns:m="http://schemas.openxmlformats.org/officeDocument/2006/math" xmlns="" val="1"/>
               </a:ext>
             </a:extLst>
           </p:spPr>
@@ -8532,7 +8532,7 @@
           </a:ln>
           <a:extLst>
             <a:ext uri="{C572A759-6A51-4108-AA02-DFA0A04FC94B}">
-              <ma14:wrappingTextBoxFlag xmlns="" xmlns:m="http://schemas.openxmlformats.org/officeDocument/2006/math" xmlns:a14="http://schemas.microsoft.com/office/drawing/2010/main" xmlns:ma14="http://schemas.microsoft.com/office/mac/drawingml/2011/main" val="1"/>
+              <ma14:wrappingTextBoxFlag xmlns:ma14="http://schemas.microsoft.com/office/mac/drawingml/2011/main" xmlns:a14="http://schemas.microsoft.com/office/drawing/2010/main" xmlns:m="http://schemas.openxmlformats.org/officeDocument/2006/math" xmlns="" val="1"/>
             </a:ext>
           </a:extLst>
         </p:spPr>
@@ -8708,7 +8708,7 @@
           </a:ln>
           <a:extLst>
             <a:ext uri="{C572A759-6A51-4108-AA02-DFA0A04FC94B}">
-              <ma14:wrappingTextBoxFlag xmlns="" xmlns:m="http://schemas.openxmlformats.org/officeDocument/2006/math" xmlns:a14="http://schemas.microsoft.com/office/drawing/2010/main" xmlns:ma14="http://schemas.microsoft.com/office/mac/drawingml/2011/main" val="1"/>
+              <ma14:wrappingTextBoxFlag xmlns:ma14="http://schemas.microsoft.com/office/mac/drawingml/2011/main" xmlns:a14="http://schemas.microsoft.com/office/drawing/2010/main" xmlns:m="http://schemas.openxmlformats.org/officeDocument/2006/math" xmlns="" val="1"/>
             </a:ext>
           </a:extLst>
         </p:spPr>
@@ -8928,7 +8928,7 @@
           </a:ln>
           <a:extLst>
             <a:ext uri="{C572A759-6A51-4108-AA02-DFA0A04FC94B}">
-              <ma14:wrappingTextBoxFlag xmlns="" xmlns:m="http://schemas.openxmlformats.org/officeDocument/2006/math" xmlns:a14="http://schemas.microsoft.com/office/drawing/2010/main" xmlns:ma14="http://schemas.microsoft.com/office/mac/drawingml/2011/main" val="1"/>
+              <ma14:wrappingTextBoxFlag xmlns:ma14="http://schemas.microsoft.com/office/mac/drawingml/2011/main" xmlns:a14="http://schemas.microsoft.com/office/drawing/2010/main" xmlns:m="http://schemas.openxmlformats.org/officeDocument/2006/math" xmlns="" val="1"/>
             </a:ext>
           </a:extLst>
         </p:spPr>
@@ -9118,7 +9118,7 @@
           </a:ln>
           <a:extLst>
             <a:ext uri="{C572A759-6A51-4108-AA02-DFA0A04FC94B}">
-              <ma14:wrappingTextBoxFlag xmlns="" xmlns:m="http://schemas.openxmlformats.org/officeDocument/2006/math" xmlns:a14="http://schemas.microsoft.com/office/drawing/2010/main" xmlns:ma14="http://schemas.microsoft.com/office/mac/drawingml/2011/main" val="1"/>
+              <ma14:wrappingTextBoxFlag xmlns:ma14="http://schemas.microsoft.com/office/mac/drawingml/2011/main" xmlns:a14="http://schemas.microsoft.com/office/drawing/2010/main" xmlns:m="http://schemas.openxmlformats.org/officeDocument/2006/math" xmlns="" val="1"/>
             </a:ext>
           </a:extLst>
         </p:spPr>
@@ -9161,7 +9161,7 @@
           </a:ln>
           <a:extLst>
             <a:ext uri="{C572A759-6A51-4108-AA02-DFA0A04FC94B}">
-              <ma14:wrappingTextBoxFlag xmlns="" xmlns:m="http://schemas.openxmlformats.org/officeDocument/2006/math" xmlns:a14="http://schemas.microsoft.com/office/drawing/2010/main" xmlns:ma14="http://schemas.microsoft.com/office/mac/drawingml/2011/main" val="1"/>
+              <ma14:wrappingTextBoxFlag xmlns:ma14="http://schemas.microsoft.com/office/mac/drawingml/2011/main" xmlns:a14="http://schemas.microsoft.com/office/drawing/2010/main" xmlns:m="http://schemas.openxmlformats.org/officeDocument/2006/math" xmlns="" val="1"/>
             </a:ext>
           </a:extLst>
         </p:spPr>
@@ -9204,7 +9204,7 @@
           </a:ln>
           <a:extLst>
             <a:ext uri="{C572A759-6A51-4108-AA02-DFA0A04FC94B}">
-              <ma14:wrappingTextBoxFlag xmlns="" xmlns:m="http://schemas.openxmlformats.org/officeDocument/2006/math" xmlns:a14="http://schemas.microsoft.com/office/drawing/2010/main" xmlns:ma14="http://schemas.microsoft.com/office/mac/drawingml/2011/main" val="1"/>
+              <ma14:wrappingTextBoxFlag xmlns:ma14="http://schemas.microsoft.com/office/mac/drawingml/2011/main" xmlns:a14="http://schemas.microsoft.com/office/drawing/2010/main" xmlns:m="http://schemas.openxmlformats.org/officeDocument/2006/math" xmlns="" val="1"/>
             </a:ext>
           </a:extLst>
         </p:spPr>
@@ -9247,7 +9247,7 @@
           </a:ln>
           <a:extLst>
             <a:ext uri="{C572A759-6A51-4108-AA02-DFA0A04FC94B}">
-              <ma14:wrappingTextBoxFlag xmlns="" xmlns:m="http://schemas.openxmlformats.org/officeDocument/2006/math" xmlns:a14="http://schemas.microsoft.com/office/drawing/2010/main" xmlns:ma14="http://schemas.microsoft.com/office/mac/drawingml/2011/main" val="1"/>
+              <ma14:wrappingTextBoxFlag xmlns:ma14="http://schemas.microsoft.com/office/mac/drawingml/2011/main" xmlns:a14="http://schemas.microsoft.com/office/drawing/2010/main" xmlns:m="http://schemas.openxmlformats.org/officeDocument/2006/math" xmlns="" val="1"/>
             </a:ext>
           </a:extLst>
         </p:spPr>
@@ -9290,7 +9290,7 @@
           </a:ln>
           <a:extLst>
             <a:ext uri="{C572A759-6A51-4108-AA02-DFA0A04FC94B}">
-              <ma14:wrappingTextBoxFlag xmlns="" xmlns:m="http://schemas.openxmlformats.org/officeDocument/2006/math" xmlns:a14="http://schemas.microsoft.com/office/drawing/2010/main" xmlns:ma14="http://schemas.microsoft.com/office/mac/drawingml/2011/main" val="1"/>
+              <ma14:wrappingTextBoxFlag xmlns:ma14="http://schemas.microsoft.com/office/mac/drawingml/2011/main" xmlns:a14="http://schemas.microsoft.com/office/drawing/2010/main" xmlns:m="http://schemas.openxmlformats.org/officeDocument/2006/math" xmlns="" val="1"/>
             </a:ext>
           </a:extLst>
         </p:spPr>
@@ -10074,7 +10074,7 @@
           </a:ln>
           <a:extLst>
             <a:ext uri="{C572A759-6A51-4108-AA02-DFA0A04FC94B}">
-              <ma14:wrappingTextBoxFlag xmlns="" xmlns:m="http://schemas.openxmlformats.org/officeDocument/2006/math" xmlns:a14="http://schemas.microsoft.com/office/drawing/2010/main" xmlns:ma14="http://schemas.microsoft.com/office/mac/drawingml/2011/main" val="1"/>
+              <ma14:wrappingTextBoxFlag xmlns:ma14="http://schemas.microsoft.com/office/mac/drawingml/2011/main" xmlns:a14="http://schemas.microsoft.com/office/drawing/2010/main" xmlns:m="http://schemas.openxmlformats.org/officeDocument/2006/math" xmlns="" val="1"/>
             </a:ext>
           </a:extLst>
         </p:spPr>
@@ -10236,7 +10236,7 @@
           </a:ln>
           <a:extLst>
             <a:ext uri="{C572A759-6A51-4108-AA02-DFA0A04FC94B}">
-              <ma14:wrappingTextBoxFlag xmlns="" xmlns:m="http://schemas.openxmlformats.org/officeDocument/2006/math" xmlns:a14="http://schemas.microsoft.com/office/drawing/2010/main" xmlns:ma14="http://schemas.microsoft.com/office/mac/drawingml/2011/main" val="1"/>
+              <ma14:wrappingTextBoxFlag xmlns:ma14="http://schemas.microsoft.com/office/mac/drawingml/2011/main" xmlns:a14="http://schemas.microsoft.com/office/drawing/2010/main" xmlns:m="http://schemas.openxmlformats.org/officeDocument/2006/math" xmlns="" val="1"/>
             </a:ext>
           </a:extLst>
         </p:spPr>
@@ -10384,7 +10384,7 @@
             <a:effectLst/>
             <a:extLst>
               <a:ext uri="{C572A759-6A51-4108-AA02-DFA0A04FC94B}">
-                <ma14:wrappingTextBoxFlag xmlns="" xmlns:m="http://schemas.openxmlformats.org/officeDocument/2006/math" xmlns:a14="http://schemas.microsoft.com/office/drawing/2010/main" xmlns:ma14="http://schemas.microsoft.com/office/mac/drawingml/2011/main" val="1"/>
+                <ma14:wrappingTextBoxFlag xmlns:ma14="http://schemas.microsoft.com/office/mac/drawingml/2011/main" xmlns:a14="http://schemas.microsoft.com/office/drawing/2010/main" xmlns:m="http://schemas.openxmlformats.org/officeDocument/2006/math" xmlns="" val="1"/>
               </a:ext>
             </a:extLst>
           </p:spPr>
@@ -10486,7 +10486,7 @@
             <a:effectLst/>
             <a:extLst>
               <a:ext uri="{C572A759-6A51-4108-AA02-DFA0A04FC94B}">
-                <ma14:wrappingTextBoxFlag xmlns="" xmlns:m="http://schemas.openxmlformats.org/officeDocument/2006/math" xmlns:a14="http://schemas.microsoft.com/office/drawing/2010/main" xmlns:ma14="http://schemas.microsoft.com/office/mac/drawingml/2011/main" val="1"/>
+                <ma14:wrappingTextBoxFlag xmlns:ma14="http://schemas.microsoft.com/office/mac/drawingml/2011/main" xmlns:a14="http://schemas.microsoft.com/office/drawing/2010/main" xmlns:m="http://schemas.openxmlformats.org/officeDocument/2006/math" xmlns="" val="1"/>
               </a:ext>
             </a:extLst>
           </p:spPr>
@@ -10618,7 +10618,7 @@
             <a:effectLst/>
             <a:extLst>
               <a:ext uri="{C572A759-6A51-4108-AA02-DFA0A04FC94B}">
-                <ma14:wrappingTextBoxFlag xmlns="" xmlns:m="http://schemas.openxmlformats.org/officeDocument/2006/math" xmlns:a14="http://schemas.microsoft.com/office/drawing/2010/main" xmlns:ma14="http://schemas.microsoft.com/office/mac/drawingml/2011/main" val="1"/>
+                <ma14:wrappingTextBoxFlag xmlns:ma14="http://schemas.microsoft.com/office/mac/drawingml/2011/main" xmlns:a14="http://schemas.microsoft.com/office/drawing/2010/main" xmlns:m="http://schemas.openxmlformats.org/officeDocument/2006/math" xmlns="" val="1"/>
               </a:ext>
             </a:extLst>
           </p:spPr>
@@ -10750,7 +10750,7 @@
             <a:effectLst/>
             <a:extLst>
               <a:ext uri="{C572A759-6A51-4108-AA02-DFA0A04FC94B}">
-                <ma14:wrappingTextBoxFlag xmlns="" xmlns:m="http://schemas.openxmlformats.org/officeDocument/2006/math" xmlns:a14="http://schemas.microsoft.com/office/drawing/2010/main" xmlns:ma14="http://schemas.microsoft.com/office/mac/drawingml/2011/main" val="1"/>
+                <ma14:wrappingTextBoxFlag xmlns:ma14="http://schemas.microsoft.com/office/mac/drawingml/2011/main" xmlns:a14="http://schemas.microsoft.com/office/drawing/2010/main" xmlns:m="http://schemas.openxmlformats.org/officeDocument/2006/math" xmlns="" val="1"/>
               </a:ext>
             </a:extLst>
           </p:spPr>
@@ -10884,7 +10884,7 @@
           </a:ln>
           <a:extLst>
             <a:ext uri="{C572A759-6A51-4108-AA02-DFA0A04FC94B}">
-              <ma14:wrappingTextBoxFlag xmlns="" xmlns:m="http://schemas.openxmlformats.org/officeDocument/2006/math" xmlns:a14="http://schemas.microsoft.com/office/drawing/2010/main" xmlns:ma14="http://schemas.microsoft.com/office/mac/drawingml/2011/main" val="1"/>
+              <ma14:wrappingTextBoxFlag xmlns:ma14="http://schemas.microsoft.com/office/mac/drawingml/2011/main" xmlns:a14="http://schemas.microsoft.com/office/drawing/2010/main" xmlns:m="http://schemas.openxmlformats.org/officeDocument/2006/math" xmlns="" val="1"/>
             </a:ext>
           </a:extLst>
         </p:spPr>
@@ -10990,7 +10990,7 @@
           </a:ln>
           <a:extLst>
             <a:ext uri="{C572A759-6A51-4108-AA02-DFA0A04FC94B}">
-              <ma14:wrappingTextBoxFlag xmlns="" xmlns:m="http://schemas.openxmlformats.org/officeDocument/2006/math" xmlns:a14="http://schemas.microsoft.com/office/drawing/2010/main" xmlns:ma14="http://schemas.microsoft.com/office/mac/drawingml/2011/main" val="1"/>
+              <ma14:wrappingTextBoxFlag xmlns:ma14="http://schemas.microsoft.com/office/mac/drawingml/2011/main" xmlns:a14="http://schemas.microsoft.com/office/drawing/2010/main" xmlns:m="http://schemas.openxmlformats.org/officeDocument/2006/math" xmlns="" val="1"/>
             </a:ext>
           </a:extLst>
         </p:spPr>
@@ -11080,7 +11080,7 @@
           </a:ln>
           <a:extLst>
             <a:ext uri="{C572A759-6A51-4108-AA02-DFA0A04FC94B}">
-              <ma14:wrappingTextBoxFlag xmlns="" xmlns:m="http://schemas.openxmlformats.org/officeDocument/2006/math" xmlns:a14="http://schemas.microsoft.com/office/drawing/2010/main" xmlns:ma14="http://schemas.microsoft.com/office/mac/drawingml/2011/main" val="1"/>
+              <ma14:wrappingTextBoxFlag xmlns:ma14="http://schemas.microsoft.com/office/mac/drawingml/2011/main" xmlns:a14="http://schemas.microsoft.com/office/drawing/2010/main" xmlns:m="http://schemas.openxmlformats.org/officeDocument/2006/math" xmlns="" val="1"/>
             </a:ext>
           </a:extLst>
         </p:spPr>
@@ -11429,7 +11429,7 @@
             <a:effectLst/>
             <a:extLst>
               <a:ext uri="{C572A759-6A51-4108-AA02-DFA0A04FC94B}">
-                <ma14:wrappingTextBoxFlag xmlns="" xmlns:m="http://schemas.openxmlformats.org/officeDocument/2006/math" xmlns:a14="http://schemas.microsoft.com/office/drawing/2010/main" xmlns:ma14="http://schemas.microsoft.com/office/mac/drawingml/2011/main" val="1"/>
+                <ma14:wrappingTextBoxFlag xmlns:ma14="http://schemas.microsoft.com/office/mac/drawingml/2011/main" xmlns:a14="http://schemas.microsoft.com/office/drawing/2010/main" xmlns:m="http://schemas.openxmlformats.org/officeDocument/2006/math" xmlns="" val="1"/>
               </a:ext>
             </a:extLst>
           </p:spPr>
@@ -11591,7 +11591,7 @@
             <a:effectLst/>
             <a:extLst>
               <a:ext uri="{C572A759-6A51-4108-AA02-DFA0A04FC94B}">
-                <ma14:wrappingTextBoxFlag xmlns="" xmlns:m="http://schemas.openxmlformats.org/officeDocument/2006/math" xmlns:a14="http://schemas.microsoft.com/office/drawing/2010/main" xmlns:ma14="http://schemas.microsoft.com/office/mac/drawingml/2011/main" val="1"/>
+                <ma14:wrappingTextBoxFlag xmlns:ma14="http://schemas.microsoft.com/office/mac/drawingml/2011/main" xmlns:a14="http://schemas.microsoft.com/office/drawing/2010/main" xmlns:m="http://schemas.openxmlformats.org/officeDocument/2006/math" xmlns="" val="1"/>
               </a:ext>
             </a:extLst>
           </p:spPr>
@@ -11723,7 +11723,7 @@
             <a:effectLst/>
             <a:extLst>
               <a:ext uri="{C572A759-6A51-4108-AA02-DFA0A04FC94B}">
-                <ma14:wrappingTextBoxFlag xmlns="" xmlns:m="http://schemas.openxmlformats.org/officeDocument/2006/math" xmlns:a14="http://schemas.microsoft.com/office/drawing/2010/main" xmlns:ma14="http://schemas.microsoft.com/office/mac/drawingml/2011/main" val="1"/>
+                <ma14:wrappingTextBoxFlag xmlns:ma14="http://schemas.microsoft.com/office/mac/drawingml/2011/main" xmlns:a14="http://schemas.microsoft.com/office/drawing/2010/main" xmlns:m="http://schemas.openxmlformats.org/officeDocument/2006/math" xmlns="" val="1"/>
               </a:ext>
             </a:extLst>
           </p:spPr>
@@ -11943,7 +11943,7 @@
             <a:effectLst/>
             <a:extLst>
               <a:ext uri="{C572A759-6A51-4108-AA02-DFA0A04FC94B}">
-                <ma14:wrappingTextBoxFlag xmlns="" xmlns:m="http://schemas.openxmlformats.org/officeDocument/2006/math" xmlns:a14="http://schemas.microsoft.com/office/drawing/2010/main" xmlns:ma14="http://schemas.microsoft.com/office/mac/drawingml/2011/main" val="1"/>
+                <ma14:wrappingTextBoxFlag xmlns:ma14="http://schemas.microsoft.com/office/mac/drawingml/2011/main" xmlns:a14="http://schemas.microsoft.com/office/drawing/2010/main" xmlns:m="http://schemas.openxmlformats.org/officeDocument/2006/math" xmlns="" val="1"/>
               </a:ext>
             </a:extLst>
           </p:spPr>
@@ -12075,7 +12075,7 @@
             <a:effectLst/>
             <a:extLst>
               <a:ext uri="{C572A759-6A51-4108-AA02-DFA0A04FC94B}">
-                <ma14:wrappingTextBoxFlag xmlns="" xmlns:m="http://schemas.openxmlformats.org/officeDocument/2006/math" xmlns:a14="http://schemas.microsoft.com/office/drawing/2010/main" xmlns:ma14="http://schemas.microsoft.com/office/mac/drawingml/2011/main" val="1"/>
+                <ma14:wrappingTextBoxFlag xmlns:ma14="http://schemas.microsoft.com/office/mac/drawingml/2011/main" xmlns:a14="http://schemas.microsoft.com/office/drawing/2010/main" xmlns:m="http://schemas.openxmlformats.org/officeDocument/2006/math" xmlns="" val="1"/>
               </a:ext>
             </a:extLst>
           </p:spPr>
@@ -12325,7 +12325,7 @@
             <a:effectLst/>
             <a:extLst>
               <a:ext uri="{C572A759-6A51-4108-AA02-DFA0A04FC94B}">
-                <ma14:wrappingTextBoxFlag xmlns="" xmlns:m="http://schemas.openxmlformats.org/officeDocument/2006/math" xmlns:a14="http://schemas.microsoft.com/office/drawing/2010/main" xmlns:ma14="http://schemas.microsoft.com/office/mac/drawingml/2011/main" val="1"/>
+                <ma14:wrappingTextBoxFlag xmlns:ma14="http://schemas.microsoft.com/office/mac/drawingml/2011/main" xmlns:a14="http://schemas.microsoft.com/office/drawing/2010/main" xmlns:m="http://schemas.openxmlformats.org/officeDocument/2006/math" xmlns="" val="1"/>
               </a:ext>
             </a:extLst>
           </p:spPr>
@@ -12369,7 +12369,7 @@
           </a:ln>
           <a:extLst>
             <a:ext uri="{C572A759-6A51-4108-AA02-DFA0A04FC94B}">
-              <ma14:wrappingTextBoxFlag xmlns="" xmlns:m="http://schemas.openxmlformats.org/officeDocument/2006/math" xmlns:a14="http://schemas.microsoft.com/office/drawing/2010/main" xmlns:ma14="http://schemas.microsoft.com/office/mac/drawingml/2011/main" val="1"/>
+              <ma14:wrappingTextBoxFlag xmlns:ma14="http://schemas.microsoft.com/office/mac/drawingml/2011/main" xmlns:a14="http://schemas.microsoft.com/office/drawing/2010/main" xmlns:m="http://schemas.openxmlformats.org/officeDocument/2006/math" xmlns="" val="1"/>
             </a:ext>
           </a:extLst>
         </p:spPr>
@@ -12412,7 +12412,7 @@
           </a:ln>
           <a:extLst>
             <a:ext uri="{C572A759-6A51-4108-AA02-DFA0A04FC94B}">
-              <ma14:wrappingTextBoxFlag xmlns="" xmlns:m="http://schemas.openxmlformats.org/officeDocument/2006/math" xmlns:a14="http://schemas.microsoft.com/office/drawing/2010/main" xmlns:ma14="http://schemas.microsoft.com/office/mac/drawingml/2011/main" val="1"/>
+              <ma14:wrappingTextBoxFlag xmlns:ma14="http://schemas.microsoft.com/office/mac/drawingml/2011/main" xmlns:a14="http://schemas.microsoft.com/office/drawing/2010/main" xmlns:m="http://schemas.openxmlformats.org/officeDocument/2006/math" xmlns="" val="1"/>
             </a:ext>
           </a:extLst>
         </p:spPr>
@@ -12455,7 +12455,7 @@
           </a:ln>
           <a:extLst>
             <a:ext uri="{C572A759-6A51-4108-AA02-DFA0A04FC94B}">
-              <ma14:wrappingTextBoxFlag xmlns="" xmlns:m="http://schemas.openxmlformats.org/officeDocument/2006/math" xmlns:a14="http://schemas.microsoft.com/office/drawing/2010/main" xmlns:ma14="http://schemas.microsoft.com/office/mac/drawingml/2011/main" val="1"/>
+              <ma14:wrappingTextBoxFlag xmlns:ma14="http://schemas.microsoft.com/office/mac/drawingml/2011/main" xmlns:a14="http://schemas.microsoft.com/office/drawing/2010/main" xmlns:m="http://schemas.openxmlformats.org/officeDocument/2006/math" xmlns="" val="1"/>
             </a:ext>
           </a:extLst>
         </p:spPr>
@@ -12498,7 +12498,7 @@
           </a:ln>
           <a:extLst>
             <a:ext uri="{C572A759-6A51-4108-AA02-DFA0A04FC94B}">
-              <ma14:wrappingTextBoxFlag xmlns="" xmlns:m="http://schemas.openxmlformats.org/officeDocument/2006/math" xmlns:a14="http://schemas.microsoft.com/office/drawing/2010/main" xmlns:ma14="http://schemas.microsoft.com/office/mac/drawingml/2011/main" val="1"/>
+              <ma14:wrappingTextBoxFlag xmlns:ma14="http://schemas.microsoft.com/office/mac/drawingml/2011/main" xmlns:a14="http://schemas.microsoft.com/office/drawing/2010/main" xmlns:m="http://schemas.openxmlformats.org/officeDocument/2006/math" xmlns="" val="1"/>
             </a:ext>
           </a:extLst>
         </p:spPr>
@@ -12604,7 +12604,7 @@
           </a:ln>
           <a:extLst>
             <a:ext uri="{C572A759-6A51-4108-AA02-DFA0A04FC94B}">
-              <ma14:wrappingTextBoxFlag xmlns="" xmlns:m="http://schemas.openxmlformats.org/officeDocument/2006/math" xmlns:a14="http://schemas.microsoft.com/office/drawing/2010/main" xmlns:ma14="http://schemas.microsoft.com/office/mac/drawingml/2011/main" val="1"/>
+              <ma14:wrappingTextBoxFlag xmlns:ma14="http://schemas.microsoft.com/office/mac/drawingml/2011/main" xmlns:a14="http://schemas.microsoft.com/office/drawing/2010/main" xmlns:m="http://schemas.openxmlformats.org/officeDocument/2006/math" xmlns="" val="1"/>
             </a:ext>
           </a:extLst>
         </p:spPr>
@@ -12762,7 +12762,7 @@
           </a:ln>
           <a:extLst>
             <a:ext uri="{C572A759-6A51-4108-AA02-DFA0A04FC94B}">
-              <ma14:wrappingTextBoxFlag xmlns="" xmlns:m="http://schemas.openxmlformats.org/officeDocument/2006/math" xmlns:a14="http://schemas.microsoft.com/office/drawing/2010/main" xmlns:ma14="http://schemas.microsoft.com/office/mac/drawingml/2011/main" val="1"/>
+              <ma14:wrappingTextBoxFlag xmlns:ma14="http://schemas.microsoft.com/office/mac/drawingml/2011/main" xmlns:a14="http://schemas.microsoft.com/office/drawing/2010/main" xmlns:m="http://schemas.openxmlformats.org/officeDocument/2006/math" xmlns="" val="1"/>
             </a:ext>
           </a:extLst>
         </p:spPr>
@@ -13083,7 +13083,7 @@
             <a:effectLst/>
             <a:extLst>
               <a:ext uri="{C572A759-6A51-4108-AA02-DFA0A04FC94B}">
-                <ma14:wrappingTextBoxFlag xmlns="" xmlns:m="http://schemas.openxmlformats.org/officeDocument/2006/math" xmlns:a14="http://schemas.microsoft.com/office/drawing/2010/main" xmlns:ma14="http://schemas.microsoft.com/office/mac/drawingml/2011/main" val="1"/>
+                <ma14:wrappingTextBoxFlag xmlns:ma14="http://schemas.microsoft.com/office/mac/drawingml/2011/main" xmlns:a14="http://schemas.microsoft.com/office/drawing/2010/main" xmlns:m="http://schemas.openxmlformats.org/officeDocument/2006/math" xmlns="" val="1"/>
               </a:ext>
             </a:extLst>
           </p:spPr>
@@ -13423,7 +13423,7 @@
           </a:ln>
           <a:extLst>
             <a:ext uri="{C572A759-6A51-4108-AA02-DFA0A04FC94B}">
-              <ma14:wrappingTextBoxFlag xmlns="" xmlns:m="http://schemas.openxmlformats.org/officeDocument/2006/math" xmlns:a14="http://schemas.microsoft.com/office/drawing/2010/main" xmlns:ma14="http://schemas.microsoft.com/office/mac/drawingml/2011/main" val="1"/>
+              <ma14:wrappingTextBoxFlag xmlns:ma14="http://schemas.microsoft.com/office/mac/drawingml/2011/main" xmlns:a14="http://schemas.microsoft.com/office/drawing/2010/main" xmlns:m="http://schemas.openxmlformats.org/officeDocument/2006/math" xmlns="" val="1"/>
             </a:ext>
           </a:extLst>
         </p:spPr>
@@ -13484,7 +13484,7 @@
           </a:ln>
           <a:extLst>
             <a:ext uri="{C572A759-6A51-4108-AA02-DFA0A04FC94B}">
-              <ma14:wrappingTextBoxFlag xmlns="" xmlns:m="http://schemas.openxmlformats.org/officeDocument/2006/math" xmlns:a14="http://schemas.microsoft.com/office/drawing/2010/main" xmlns:ma14="http://schemas.microsoft.com/office/mac/drawingml/2011/main" val="1"/>
+              <ma14:wrappingTextBoxFlag xmlns:ma14="http://schemas.microsoft.com/office/mac/drawingml/2011/main" xmlns:a14="http://schemas.microsoft.com/office/drawing/2010/main" xmlns:m="http://schemas.openxmlformats.org/officeDocument/2006/math" xmlns="" val="1"/>
             </a:ext>
           </a:extLst>
         </p:spPr>
@@ -13585,7 +13585,7 @@
             <a:effectLst/>
             <a:extLst>
               <a:ext uri="{C572A759-6A51-4108-AA02-DFA0A04FC94B}">
-                <ma14:wrappingTextBoxFlag xmlns="" xmlns:m="http://schemas.openxmlformats.org/officeDocument/2006/math" xmlns:a14="http://schemas.microsoft.com/office/drawing/2010/main" xmlns:ma14="http://schemas.microsoft.com/office/mac/drawingml/2011/main" val="1"/>
+                <ma14:wrappingTextBoxFlag xmlns:ma14="http://schemas.microsoft.com/office/mac/drawingml/2011/main" xmlns:a14="http://schemas.microsoft.com/office/drawing/2010/main" xmlns:m="http://schemas.openxmlformats.org/officeDocument/2006/math" xmlns="" val="1"/>
               </a:ext>
             </a:extLst>
           </p:spPr>
@@ -13629,7 +13629,7 @@
           </a:ln>
           <a:extLst>
             <a:ext uri="{C572A759-6A51-4108-AA02-DFA0A04FC94B}">
-              <ma14:wrappingTextBoxFlag xmlns="" xmlns:m="http://schemas.openxmlformats.org/officeDocument/2006/math" xmlns:a14="http://schemas.microsoft.com/office/drawing/2010/main" xmlns:ma14="http://schemas.microsoft.com/office/mac/drawingml/2011/main" val="1"/>
+              <ma14:wrappingTextBoxFlag xmlns:ma14="http://schemas.microsoft.com/office/mac/drawingml/2011/main" xmlns:a14="http://schemas.microsoft.com/office/drawing/2010/main" xmlns:m="http://schemas.openxmlformats.org/officeDocument/2006/math" xmlns="" val="1"/>
             </a:ext>
           </a:extLst>
         </p:spPr>
@@ -13730,7 +13730,7 @@
             <a:effectLst/>
             <a:extLst>
               <a:ext uri="{C572A759-6A51-4108-AA02-DFA0A04FC94B}">
-                <ma14:wrappingTextBoxFlag xmlns="" xmlns:m="http://schemas.openxmlformats.org/officeDocument/2006/math" xmlns:a14="http://schemas.microsoft.com/office/drawing/2010/main" xmlns:ma14="http://schemas.microsoft.com/office/mac/drawingml/2011/main" val="1"/>
+                <ma14:wrappingTextBoxFlag xmlns:ma14="http://schemas.microsoft.com/office/mac/drawingml/2011/main" xmlns:a14="http://schemas.microsoft.com/office/drawing/2010/main" xmlns:m="http://schemas.openxmlformats.org/officeDocument/2006/math" xmlns="" val="1"/>
               </a:ext>
             </a:extLst>
           </p:spPr>
@@ -13832,7 +13832,7 @@
             <a:effectLst/>
             <a:extLst>
               <a:ext uri="{C572A759-6A51-4108-AA02-DFA0A04FC94B}">
-                <ma14:wrappingTextBoxFlag xmlns="" xmlns:m="http://schemas.openxmlformats.org/officeDocument/2006/math" xmlns:a14="http://schemas.microsoft.com/office/drawing/2010/main" xmlns:ma14="http://schemas.microsoft.com/office/mac/drawingml/2011/main" val="1"/>
+                <ma14:wrappingTextBoxFlag xmlns:ma14="http://schemas.microsoft.com/office/mac/drawingml/2011/main" xmlns:a14="http://schemas.microsoft.com/office/drawing/2010/main" xmlns:m="http://schemas.openxmlformats.org/officeDocument/2006/math" xmlns="" val="1"/>
               </a:ext>
             </a:extLst>
           </p:spPr>
@@ -13964,7 +13964,7 @@
             <a:effectLst/>
             <a:extLst>
               <a:ext uri="{C572A759-6A51-4108-AA02-DFA0A04FC94B}">
-                <ma14:wrappingTextBoxFlag xmlns="" xmlns:m="http://schemas.openxmlformats.org/officeDocument/2006/math" xmlns:a14="http://schemas.microsoft.com/office/drawing/2010/main" xmlns:ma14="http://schemas.microsoft.com/office/mac/drawingml/2011/main" val="1"/>
+                <ma14:wrappingTextBoxFlag xmlns:ma14="http://schemas.microsoft.com/office/mac/drawingml/2011/main" xmlns:a14="http://schemas.microsoft.com/office/drawing/2010/main" xmlns:m="http://schemas.openxmlformats.org/officeDocument/2006/math" xmlns="" val="1"/>
               </a:ext>
             </a:extLst>
           </p:spPr>
@@ -14091,7 +14091,7 @@
           </a:ln>
           <a:extLst>
             <a:ext uri="{C572A759-6A51-4108-AA02-DFA0A04FC94B}">
-              <ma14:wrappingTextBoxFlag xmlns="" xmlns:m="http://schemas.openxmlformats.org/officeDocument/2006/math" xmlns:a14="http://schemas.microsoft.com/office/drawing/2010/main" xmlns:ma14="http://schemas.microsoft.com/office/mac/drawingml/2011/main" val="1"/>
+              <ma14:wrappingTextBoxFlag xmlns:ma14="http://schemas.microsoft.com/office/mac/drawingml/2011/main" xmlns:a14="http://schemas.microsoft.com/office/drawing/2010/main" xmlns:m="http://schemas.openxmlformats.org/officeDocument/2006/math" xmlns="" val="1"/>
             </a:ext>
           </a:extLst>
         </p:spPr>
@@ -14475,7 +14475,7 @@
           </a:ln>
           <a:extLst>
             <a:ext uri="{C572A759-6A51-4108-AA02-DFA0A04FC94B}">
-              <ma14:wrappingTextBoxFlag xmlns="" xmlns:m="http://schemas.openxmlformats.org/officeDocument/2006/math" xmlns:a14="http://schemas.microsoft.com/office/drawing/2010/main" xmlns:ma14="http://schemas.microsoft.com/office/mac/drawingml/2011/main" val="1"/>
+              <ma14:wrappingTextBoxFlag xmlns:ma14="http://schemas.microsoft.com/office/mac/drawingml/2011/main" xmlns:a14="http://schemas.microsoft.com/office/drawing/2010/main" xmlns:m="http://schemas.openxmlformats.org/officeDocument/2006/math" xmlns="" val="1"/>
             </a:ext>
           </a:extLst>
         </p:spPr>
@@ -14586,7 +14586,7 @@
           </a:ln>
           <a:extLst>
             <a:ext uri="{C572A759-6A51-4108-AA02-DFA0A04FC94B}">
-              <ma14:wrappingTextBoxFlag xmlns="" xmlns:m="http://schemas.openxmlformats.org/officeDocument/2006/math" xmlns:a14="http://schemas.microsoft.com/office/drawing/2010/main" xmlns:ma14="http://schemas.microsoft.com/office/mac/drawingml/2011/main" val="1"/>
+              <ma14:wrappingTextBoxFlag xmlns:ma14="http://schemas.microsoft.com/office/mac/drawingml/2011/main" xmlns:a14="http://schemas.microsoft.com/office/drawing/2010/main" xmlns:m="http://schemas.openxmlformats.org/officeDocument/2006/math" xmlns="" val="1"/>
             </a:ext>
           </a:extLst>
         </p:spPr>
@@ -15047,7 +15047,7 @@
             <a:effectLst/>
             <a:extLst>
               <a:ext uri="{C572A759-6A51-4108-AA02-DFA0A04FC94B}">
-                <ma14:wrappingTextBoxFlag xmlns="" xmlns:m="http://schemas.openxmlformats.org/officeDocument/2006/math" xmlns:a14="http://schemas.microsoft.com/office/drawing/2010/main" xmlns:ma14="http://schemas.microsoft.com/office/mac/drawingml/2011/main" val="1"/>
+                <ma14:wrappingTextBoxFlag xmlns:ma14="http://schemas.microsoft.com/office/mac/drawingml/2011/main" xmlns:a14="http://schemas.microsoft.com/office/drawing/2010/main" xmlns:m="http://schemas.openxmlformats.org/officeDocument/2006/math" xmlns="" val="1"/>
               </a:ext>
             </a:extLst>
           </p:spPr>
@@ -15461,7 +15461,7 @@
           </a:ln>
           <a:extLst>
             <a:ext uri="{C572A759-6A51-4108-AA02-DFA0A04FC94B}">
-              <ma14:wrappingTextBoxFlag xmlns="" xmlns:m="http://schemas.openxmlformats.org/officeDocument/2006/math" xmlns:a14="http://schemas.microsoft.com/office/drawing/2010/main" xmlns:ma14="http://schemas.microsoft.com/office/mac/drawingml/2011/main" val="1"/>
+              <ma14:wrappingTextBoxFlag xmlns:ma14="http://schemas.microsoft.com/office/mac/drawingml/2011/main" xmlns:a14="http://schemas.microsoft.com/office/drawing/2010/main" xmlns:m="http://schemas.openxmlformats.org/officeDocument/2006/math" xmlns="" val="1"/>
             </a:ext>
           </a:extLst>
         </p:spPr>
@@ -15841,7 +15841,7 @@
             <a:effectLst/>
             <a:extLst>
               <a:ext uri="{C572A759-6A51-4108-AA02-DFA0A04FC94B}">
-                <ma14:wrappingTextBoxFlag xmlns="" xmlns:m="http://schemas.openxmlformats.org/officeDocument/2006/math" xmlns:a14="http://schemas.microsoft.com/office/drawing/2010/main" xmlns:ma14="http://schemas.microsoft.com/office/mac/drawingml/2011/main" val="1"/>
+                <ma14:wrappingTextBoxFlag xmlns:ma14="http://schemas.microsoft.com/office/mac/drawingml/2011/main" xmlns:a14="http://schemas.microsoft.com/office/drawing/2010/main" xmlns:m="http://schemas.openxmlformats.org/officeDocument/2006/math" xmlns="" val="1"/>
               </a:ext>
             </a:extLst>
           </p:spPr>
@@ -16132,7 +16132,7 @@
             <a:effectLst/>
             <a:extLst>
               <a:ext uri="{C572A759-6A51-4108-AA02-DFA0A04FC94B}">
-                <ma14:wrappingTextBoxFlag xmlns="" xmlns:m="http://schemas.openxmlformats.org/officeDocument/2006/math" xmlns:a14="http://schemas.microsoft.com/office/drawing/2010/main" xmlns:ma14="http://schemas.microsoft.com/office/mac/drawingml/2011/main" val="1"/>
+                <ma14:wrappingTextBoxFlag xmlns:ma14="http://schemas.microsoft.com/office/mac/drawingml/2011/main" xmlns:a14="http://schemas.microsoft.com/office/drawing/2010/main" xmlns:m="http://schemas.openxmlformats.org/officeDocument/2006/math" xmlns="" val="1"/>
               </a:ext>
             </a:extLst>
           </p:spPr>
@@ -16308,7 +16308,7 @@
             <a:effectLst/>
             <a:extLst>
               <a:ext uri="{C572A759-6A51-4108-AA02-DFA0A04FC94B}">
-                <ma14:wrappingTextBoxFlag xmlns="" xmlns:m="http://schemas.openxmlformats.org/officeDocument/2006/math" xmlns:a14="http://schemas.microsoft.com/office/drawing/2010/main" xmlns:ma14="http://schemas.microsoft.com/office/mac/drawingml/2011/main" val="1"/>
+                <ma14:wrappingTextBoxFlag xmlns:ma14="http://schemas.microsoft.com/office/mac/drawingml/2011/main" xmlns:a14="http://schemas.microsoft.com/office/drawing/2010/main" xmlns:m="http://schemas.openxmlformats.org/officeDocument/2006/math" xmlns="" val="1"/>
               </a:ext>
             </a:extLst>
           </p:spPr>
@@ -16752,7 +16752,7 @@
             <a:effectLst/>
             <a:extLst>
               <a:ext uri="{C572A759-6A51-4108-AA02-DFA0A04FC94B}">
-                <ma14:wrappingTextBoxFlag xmlns="" xmlns:m="http://schemas.openxmlformats.org/officeDocument/2006/math" xmlns:a14="http://schemas.microsoft.com/office/drawing/2010/main" xmlns:ma14="http://schemas.microsoft.com/office/mac/drawingml/2011/main" val="1"/>
+                <ma14:wrappingTextBoxFlag xmlns:ma14="http://schemas.microsoft.com/office/mac/drawingml/2011/main" xmlns:a14="http://schemas.microsoft.com/office/drawing/2010/main" xmlns:m="http://schemas.openxmlformats.org/officeDocument/2006/math" xmlns="" val="1"/>
               </a:ext>
             </a:extLst>
           </p:spPr>
@@ -16886,7 +16886,7 @@
           </a:ln>
           <a:extLst>
             <a:ext uri="{C572A759-6A51-4108-AA02-DFA0A04FC94B}">
-              <ma14:wrappingTextBoxFlag xmlns="" xmlns:m="http://schemas.openxmlformats.org/officeDocument/2006/math" xmlns:a14="http://schemas.microsoft.com/office/drawing/2010/main" xmlns:ma14="http://schemas.microsoft.com/office/mac/drawingml/2011/main" val="1"/>
+              <ma14:wrappingTextBoxFlag xmlns:ma14="http://schemas.microsoft.com/office/mac/drawingml/2011/main" xmlns:a14="http://schemas.microsoft.com/office/drawing/2010/main" xmlns:m="http://schemas.openxmlformats.org/officeDocument/2006/math" xmlns="" val="1"/>
             </a:ext>
           </a:extLst>
         </p:spPr>
@@ -16929,7 +16929,7 @@
           </a:ln>
           <a:extLst>
             <a:ext uri="{C572A759-6A51-4108-AA02-DFA0A04FC94B}">
-              <ma14:wrappingTextBoxFlag xmlns="" xmlns:m="http://schemas.openxmlformats.org/officeDocument/2006/math" xmlns:a14="http://schemas.microsoft.com/office/drawing/2010/main" xmlns:ma14="http://schemas.microsoft.com/office/mac/drawingml/2011/main" val="1"/>
+              <ma14:wrappingTextBoxFlag xmlns:ma14="http://schemas.microsoft.com/office/mac/drawingml/2011/main" xmlns:a14="http://schemas.microsoft.com/office/drawing/2010/main" xmlns:m="http://schemas.openxmlformats.org/officeDocument/2006/math" xmlns="" val="1"/>
             </a:ext>
           </a:extLst>
         </p:spPr>
@@ -17001,7 +17001,7 @@
           </a:ln>
           <a:extLst>
             <a:ext uri="{C572A759-6A51-4108-AA02-DFA0A04FC94B}">
-              <ma14:wrappingTextBoxFlag xmlns="" xmlns:m="http://schemas.openxmlformats.org/officeDocument/2006/math" xmlns:a14="http://schemas.microsoft.com/office/drawing/2010/main" xmlns:ma14="http://schemas.microsoft.com/office/mac/drawingml/2011/main" val="1"/>
+              <ma14:wrappingTextBoxFlag xmlns:ma14="http://schemas.microsoft.com/office/mac/drawingml/2011/main" xmlns:a14="http://schemas.microsoft.com/office/drawing/2010/main" xmlns:m="http://schemas.openxmlformats.org/officeDocument/2006/math" xmlns="" val="1"/>
             </a:ext>
           </a:extLst>
         </p:spPr>

</xml_diff>

<commit_message>
Updated lesson 1 slides slightly (graphics), removed slides frmo lesson 2 to streamline lesson.
</commit_message>
<xml_diff>
--- a/slides/Pythonlearn-01-Intro.pptx
+++ b/slides/Pythonlearn-01-Intro.pptx
@@ -1150,7 +1150,7 @@
           </a:ln>
           <a:extLst>
             <a:ext uri="{C572A759-6A51-4108-AA02-DFA0A04FC94B}">
-              <ma14:wrappingTextBoxFlag xmlns:ma14="http://schemas.microsoft.com/office/mac/drawingml/2011/main" xmlns:a14="http://schemas.microsoft.com/office/drawing/2010/main" xmlns:m="http://schemas.openxmlformats.org/officeDocument/2006/math" xmlns="" val="1"/>
+              <ma14:wrappingTextBoxFlag xmlns="" xmlns:m="http://schemas.openxmlformats.org/officeDocument/2006/math" xmlns:a14="http://schemas.microsoft.com/office/drawing/2010/main" xmlns:ma14="http://schemas.microsoft.com/office/mac/drawingml/2011/main" val="1"/>
             </a:ext>
           </a:extLst>
         </p:spPr>
@@ -1189,7 +1189,7 @@
           </a:ln>
           <a:extLst>
             <a:ext uri="{C572A759-6A51-4108-AA02-DFA0A04FC94B}">
-              <ma14:wrappingTextBoxFlag xmlns:ma14="http://schemas.microsoft.com/office/mac/drawingml/2011/main" xmlns:a14="http://schemas.microsoft.com/office/drawing/2010/main" xmlns:m="http://schemas.openxmlformats.org/officeDocument/2006/math" xmlns="" val="1"/>
+              <ma14:wrappingTextBoxFlag xmlns="" xmlns:m="http://schemas.openxmlformats.org/officeDocument/2006/math" xmlns:a14="http://schemas.microsoft.com/office/drawing/2010/main" xmlns:ma14="http://schemas.microsoft.com/office/mac/drawingml/2011/main" val="1"/>
             </a:ext>
           </a:extLst>
         </p:spPr>
@@ -2192,7 +2192,7 @@
           </a:ln>
           <a:extLst>
             <a:ext uri="{C572A759-6A51-4108-AA02-DFA0A04FC94B}">
-              <ma14:wrappingTextBoxFlag xmlns:ma14="http://schemas.microsoft.com/office/mac/drawingml/2011/main" xmlns:a14="http://schemas.microsoft.com/office/drawing/2010/main" xmlns:m="http://schemas.openxmlformats.org/officeDocument/2006/math" xmlns="" val="1"/>
+              <ma14:wrappingTextBoxFlag xmlns="" xmlns:m="http://schemas.openxmlformats.org/officeDocument/2006/math" xmlns:a14="http://schemas.microsoft.com/office/drawing/2010/main" xmlns:ma14="http://schemas.microsoft.com/office/mac/drawingml/2011/main" val="1"/>
             </a:ext>
           </a:extLst>
         </p:spPr>
@@ -2751,7 +2751,7 @@
           </a:ln>
           <a:extLst>
             <a:ext uri="{C572A759-6A51-4108-AA02-DFA0A04FC94B}">
-              <ma14:wrappingTextBoxFlag xmlns:ma14="http://schemas.microsoft.com/office/mac/drawingml/2011/main" xmlns:a14="http://schemas.microsoft.com/office/drawing/2010/main" xmlns:m="http://schemas.openxmlformats.org/officeDocument/2006/math" xmlns="" val="1"/>
+              <ma14:wrappingTextBoxFlag xmlns="" xmlns:m="http://schemas.openxmlformats.org/officeDocument/2006/math" xmlns:a14="http://schemas.microsoft.com/office/drawing/2010/main" xmlns:ma14="http://schemas.microsoft.com/office/mac/drawingml/2011/main" val="1"/>
             </a:ext>
           </a:extLst>
         </p:spPr>
@@ -3073,7 +3073,7 @@
             <a:effectLst/>
             <a:extLst>
               <a:ext uri="{C572A759-6A51-4108-AA02-DFA0A04FC94B}">
-                <ma14:wrappingTextBoxFlag xmlns:ma14="http://schemas.microsoft.com/office/mac/drawingml/2011/main" xmlns:a14="http://schemas.microsoft.com/office/drawing/2010/main" xmlns:m="http://schemas.openxmlformats.org/officeDocument/2006/math" xmlns="" val="1"/>
+                <ma14:wrappingTextBoxFlag xmlns="" xmlns:m="http://schemas.openxmlformats.org/officeDocument/2006/math" xmlns:a14="http://schemas.microsoft.com/office/drawing/2010/main" xmlns:ma14="http://schemas.microsoft.com/office/mac/drawingml/2011/main" val="1"/>
               </a:ext>
             </a:extLst>
           </p:spPr>
@@ -3185,7 +3185,7 @@
             <a:effectLst/>
             <a:extLst>
               <a:ext uri="{C572A759-6A51-4108-AA02-DFA0A04FC94B}">
-                <ma14:wrappingTextBoxFlag xmlns:ma14="http://schemas.microsoft.com/office/mac/drawingml/2011/main" xmlns:a14="http://schemas.microsoft.com/office/drawing/2010/main" xmlns:m="http://schemas.openxmlformats.org/officeDocument/2006/math" xmlns="" val="1"/>
+                <ma14:wrappingTextBoxFlag xmlns="" xmlns:m="http://schemas.openxmlformats.org/officeDocument/2006/math" xmlns:a14="http://schemas.microsoft.com/office/drawing/2010/main" xmlns:ma14="http://schemas.microsoft.com/office/mac/drawingml/2011/main" val="1"/>
               </a:ext>
             </a:extLst>
           </p:spPr>
@@ -3320,7 +3320,7 @@
             <a:effectLst/>
             <a:extLst>
               <a:ext uri="{C572A759-6A51-4108-AA02-DFA0A04FC94B}">
-                <ma14:wrappingTextBoxFlag xmlns:ma14="http://schemas.microsoft.com/office/mac/drawingml/2011/main" xmlns:a14="http://schemas.microsoft.com/office/drawing/2010/main" xmlns:m="http://schemas.openxmlformats.org/officeDocument/2006/math" xmlns="" val="1"/>
+                <ma14:wrappingTextBoxFlag xmlns="" xmlns:m="http://schemas.openxmlformats.org/officeDocument/2006/math" xmlns:a14="http://schemas.microsoft.com/office/drawing/2010/main" xmlns:ma14="http://schemas.microsoft.com/office/mac/drawingml/2011/main" val="1"/>
               </a:ext>
             </a:extLst>
           </p:spPr>
@@ -3455,7 +3455,7 @@
             <a:effectLst/>
             <a:extLst>
               <a:ext uri="{C572A759-6A51-4108-AA02-DFA0A04FC94B}">
-                <ma14:wrappingTextBoxFlag xmlns:ma14="http://schemas.microsoft.com/office/mac/drawingml/2011/main" xmlns:a14="http://schemas.microsoft.com/office/drawing/2010/main" xmlns:m="http://schemas.openxmlformats.org/officeDocument/2006/math" xmlns="" val="1"/>
+                <ma14:wrappingTextBoxFlag xmlns="" xmlns:m="http://schemas.openxmlformats.org/officeDocument/2006/math" xmlns:a14="http://schemas.microsoft.com/office/drawing/2010/main" xmlns:ma14="http://schemas.microsoft.com/office/mac/drawingml/2011/main" val="1"/>
               </a:ext>
             </a:extLst>
           </p:spPr>
@@ -3573,7 +3573,7 @@
             <a:effectLst/>
             <a:extLst>
               <a:ext uri="{C572A759-6A51-4108-AA02-DFA0A04FC94B}">
-                <ma14:wrappingTextBoxFlag xmlns:ma14="http://schemas.microsoft.com/office/mac/drawingml/2011/main" xmlns:a14="http://schemas.microsoft.com/office/drawing/2010/main" xmlns:m="http://schemas.openxmlformats.org/officeDocument/2006/math" xmlns="" val="1"/>
+                <ma14:wrappingTextBoxFlag xmlns="" xmlns:m="http://schemas.openxmlformats.org/officeDocument/2006/math" xmlns:a14="http://schemas.microsoft.com/office/drawing/2010/main" xmlns:ma14="http://schemas.microsoft.com/office/mac/drawingml/2011/main" val="1"/>
               </a:ext>
             </a:extLst>
           </p:spPr>
@@ -3784,7 +3784,7 @@
           </a:ln>
           <a:extLst>
             <a:ext uri="{C572A759-6A51-4108-AA02-DFA0A04FC94B}">
-              <ma14:wrappingTextBoxFlag xmlns:ma14="http://schemas.microsoft.com/office/mac/drawingml/2011/main" xmlns:a14="http://schemas.microsoft.com/office/drawing/2010/main" xmlns:m="http://schemas.openxmlformats.org/officeDocument/2006/math" xmlns="" val="1"/>
+              <ma14:wrappingTextBoxFlag xmlns="" xmlns:m="http://schemas.openxmlformats.org/officeDocument/2006/math" xmlns:a14="http://schemas.microsoft.com/office/drawing/2010/main" xmlns:ma14="http://schemas.microsoft.com/office/mac/drawingml/2011/main" val="1"/>
             </a:ext>
           </a:extLst>
         </p:spPr>
@@ -3911,7 +3911,7 @@
             <a:effectLst/>
             <a:extLst>
               <a:ext uri="{C572A759-6A51-4108-AA02-DFA0A04FC94B}">
-                <ma14:wrappingTextBoxFlag xmlns:ma14="http://schemas.microsoft.com/office/mac/drawingml/2011/main" xmlns:a14="http://schemas.microsoft.com/office/drawing/2010/main" xmlns:m="http://schemas.openxmlformats.org/officeDocument/2006/math" xmlns="" val="1"/>
+                <ma14:wrappingTextBoxFlag xmlns="" xmlns:m="http://schemas.openxmlformats.org/officeDocument/2006/math" xmlns:a14="http://schemas.microsoft.com/office/drawing/2010/main" xmlns:ma14="http://schemas.microsoft.com/office/mac/drawingml/2011/main" val="1"/>
               </a:ext>
             </a:extLst>
           </p:spPr>
@@ -4314,7 +4314,7 @@
             <a:effectLst/>
             <a:extLst>
               <a:ext uri="{C572A759-6A51-4108-AA02-DFA0A04FC94B}">
-                <ma14:wrappingTextBoxFlag xmlns:ma14="http://schemas.microsoft.com/office/mac/drawingml/2011/main" xmlns:a14="http://schemas.microsoft.com/office/drawing/2010/main" xmlns:m="http://schemas.openxmlformats.org/officeDocument/2006/math" xmlns="" val="1"/>
+                <ma14:wrappingTextBoxFlag xmlns="" xmlns:m="http://schemas.openxmlformats.org/officeDocument/2006/math" xmlns:a14="http://schemas.microsoft.com/office/drawing/2010/main" xmlns:ma14="http://schemas.microsoft.com/office/mac/drawingml/2011/main" val="1"/>
               </a:ext>
             </a:extLst>
           </p:spPr>
@@ -4456,7 +4456,7 @@
             <a:effectLst/>
             <a:extLst>
               <a:ext uri="{C572A759-6A51-4108-AA02-DFA0A04FC94B}">
-                <ma14:wrappingTextBoxFlag xmlns:ma14="http://schemas.microsoft.com/office/mac/drawingml/2011/main" xmlns:a14="http://schemas.microsoft.com/office/drawing/2010/main" xmlns:m="http://schemas.openxmlformats.org/officeDocument/2006/math" xmlns="" val="1"/>
+                <ma14:wrappingTextBoxFlag xmlns="" xmlns:m="http://schemas.openxmlformats.org/officeDocument/2006/math" xmlns:a14="http://schemas.microsoft.com/office/drawing/2010/main" xmlns:ma14="http://schemas.microsoft.com/office/mac/drawingml/2011/main" val="1"/>
               </a:ext>
             </a:extLst>
           </p:spPr>
@@ -4561,7 +4561,7 @@
             <a:effectLst/>
             <a:extLst>
               <a:ext uri="{C572A759-6A51-4108-AA02-DFA0A04FC94B}">
-                <ma14:wrappingTextBoxFlag xmlns:ma14="http://schemas.microsoft.com/office/mac/drawingml/2011/main" xmlns:a14="http://schemas.microsoft.com/office/drawing/2010/main" xmlns:m="http://schemas.openxmlformats.org/officeDocument/2006/math" xmlns="" val="1"/>
+                <ma14:wrappingTextBoxFlag xmlns="" xmlns:m="http://schemas.openxmlformats.org/officeDocument/2006/math" xmlns:a14="http://schemas.microsoft.com/office/drawing/2010/main" xmlns:ma14="http://schemas.microsoft.com/office/mac/drawingml/2011/main" val="1"/>
               </a:ext>
             </a:extLst>
           </p:spPr>
@@ -4696,7 +4696,7 @@
             <a:effectLst/>
             <a:extLst>
               <a:ext uri="{C572A759-6A51-4108-AA02-DFA0A04FC94B}">
-                <ma14:wrappingTextBoxFlag xmlns:ma14="http://schemas.microsoft.com/office/mac/drawingml/2011/main" xmlns:a14="http://schemas.microsoft.com/office/drawing/2010/main" xmlns:m="http://schemas.openxmlformats.org/officeDocument/2006/math" xmlns="" val="1"/>
+                <ma14:wrappingTextBoxFlag xmlns="" xmlns:m="http://schemas.openxmlformats.org/officeDocument/2006/math" xmlns:a14="http://schemas.microsoft.com/office/drawing/2010/main" xmlns:ma14="http://schemas.microsoft.com/office/mac/drawingml/2011/main" val="1"/>
               </a:ext>
             </a:extLst>
           </p:spPr>
@@ -4831,7 +4831,7 @@
             <a:effectLst/>
             <a:extLst>
               <a:ext uri="{C572A759-6A51-4108-AA02-DFA0A04FC94B}">
-                <ma14:wrappingTextBoxFlag xmlns:ma14="http://schemas.microsoft.com/office/mac/drawingml/2011/main" xmlns:a14="http://schemas.microsoft.com/office/drawing/2010/main" xmlns:m="http://schemas.openxmlformats.org/officeDocument/2006/math" xmlns="" val="1"/>
+                <ma14:wrappingTextBoxFlag xmlns="" xmlns:m="http://schemas.openxmlformats.org/officeDocument/2006/math" xmlns:a14="http://schemas.microsoft.com/office/drawing/2010/main" xmlns:ma14="http://schemas.microsoft.com/office/mac/drawingml/2011/main" val="1"/>
               </a:ext>
             </a:extLst>
           </p:spPr>
@@ -4949,7 +4949,7 @@
             <a:effectLst/>
             <a:extLst>
               <a:ext uri="{C572A759-6A51-4108-AA02-DFA0A04FC94B}">
-                <ma14:wrappingTextBoxFlag xmlns:ma14="http://schemas.microsoft.com/office/mac/drawingml/2011/main" xmlns:a14="http://schemas.microsoft.com/office/drawing/2010/main" xmlns:m="http://schemas.openxmlformats.org/officeDocument/2006/math" xmlns="" val="1"/>
+                <ma14:wrappingTextBoxFlag xmlns="" xmlns:m="http://schemas.openxmlformats.org/officeDocument/2006/math" xmlns:a14="http://schemas.microsoft.com/office/drawing/2010/main" xmlns:ma14="http://schemas.microsoft.com/office/mac/drawingml/2011/main" val="1"/>
               </a:ext>
             </a:extLst>
           </p:spPr>
@@ -5160,7 +5160,7 @@
           </a:ln>
           <a:extLst>
             <a:ext uri="{C572A759-6A51-4108-AA02-DFA0A04FC94B}">
-              <ma14:wrappingTextBoxFlag xmlns:ma14="http://schemas.microsoft.com/office/mac/drawingml/2011/main" xmlns:a14="http://schemas.microsoft.com/office/drawing/2010/main" xmlns:m="http://schemas.openxmlformats.org/officeDocument/2006/math" xmlns="" val="1"/>
+              <ma14:wrappingTextBoxFlag xmlns="" xmlns:m="http://schemas.openxmlformats.org/officeDocument/2006/math" xmlns:a14="http://schemas.microsoft.com/office/drawing/2010/main" xmlns:ma14="http://schemas.microsoft.com/office/mac/drawingml/2011/main" val="1"/>
             </a:ext>
           </a:extLst>
         </p:spPr>
@@ -5287,7 +5287,7 @@
             <a:effectLst/>
             <a:extLst>
               <a:ext uri="{C572A759-6A51-4108-AA02-DFA0A04FC94B}">
-                <ma14:wrappingTextBoxFlag xmlns:ma14="http://schemas.microsoft.com/office/mac/drawingml/2011/main" xmlns:a14="http://schemas.microsoft.com/office/drawing/2010/main" xmlns:m="http://schemas.openxmlformats.org/officeDocument/2006/math" xmlns="" val="1"/>
+                <ma14:wrappingTextBoxFlag xmlns="" xmlns:m="http://schemas.openxmlformats.org/officeDocument/2006/math" xmlns:a14="http://schemas.microsoft.com/office/drawing/2010/main" xmlns:ma14="http://schemas.microsoft.com/office/mac/drawingml/2011/main" val="1"/>
               </a:ext>
             </a:extLst>
           </p:spPr>
@@ -5361,9 +5361,9 @@
         <p:grpSpPr>
           <a:xfrm>
             <a:off x="7670800" y="4234769"/>
-            <a:ext cx="2768600" cy="1270001"/>
+            <a:ext cx="2768601" cy="1270001"/>
             <a:chOff x="0" y="0"/>
-            <a:chExt cx="2768599" cy="1270000"/>
+            <a:chExt cx="2768600" cy="1270000"/>
           </a:xfrm>
         </p:grpSpPr>
         <p:sp>
@@ -5420,8 +5420,8 @@
           </p:nvSpPr>
           <p:spPr>
             <a:xfrm>
-              <a:off x="405451" y="443551"/>
-              <a:ext cx="1957697" cy="382898"/>
+              <a:off x="405451" y="434945"/>
+              <a:ext cx="1957697" cy="400110"/>
             </a:xfrm>
             <a:prstGeom prst="rect">
               <a:avLst/>
@@ -5434,7 +5434,7 @@
             <a:effectLst/>
             <a:extLst>
               <a:ext uri="{C572A759-6A51-4108-AA02-DFA0A04FC94B}">
-                <ma14:wrappingTextBoxFlag xmlns:ma14="http://schemas.microsoft.com/office/mac/drawingml/2011/main" xmlns:a14="http://schemas.microsoft.com/office/drawing/2010/main" xmlns:m="http://schemas.openxmlformats.org/officeDocument/2006/math" xmlns="" val="1"/>
+                <ma14:wrappingTextBoxFlag xmlns="" xmlns:m="http://schemas.openxmlformats.org/officeDocument/2006/math" xmlns:a14="http://schemas.microsoft.com/office/drawing/2010/main" xmlns:ma14="http://schemas.microsoft.com/office/mac/drawingml/2011/main" val="1"/>
               </a:ext>
             </a:extLst>
           </p:spPr>
@@ -5453,7 +5453,16 @@
             </a:lstStyle>
             <a:p>
               <a:r>
-                <a:t>if x&lt; 3: print</a:t>
+                <a:rPr dirty="0"/>
+                <a:t>if x</a:t>
+              </a:r>
+              <a:r>
+                <a:rPr lang="en-US" dirty="0"/>
+                <a:t> </a:t>
+              </a:r>
+              <a:r>
+                <a:rPr dirty="0"/>
+                <a:t>&lt; 3: print</a:t>
               </a:r>
             </a:p>
           </p:txBody>
@@ -5565,7 +5574,7 @@
             <a:effectLst/>
             <a:extLst>
               <a:ext uri="{C572A759-6A51-4108-AA02-DFA0A04FC94B}">
-                <ma14:wrappingTextBoxFlag xmlns:ma14="http://schemas.microsoft.com/office/mac/drawingml/2011/main" xmlns:a14="http://schemas.microsoft.com/office/drawing/2010/main" xmlns:m="http://schemas.openxmlformats.org/officeDocument/2006/math" xmlns="" val="1"/>
+                <ma14:wrappingTextBoxFlag xmlns="" xmlns:m="http://schemas.openxmlformats.org/officeDocument/2006/math" xmlns:a14="http://schemas.microsoft.com/office/drawing/2010/main" xmlns:ma14="http://schemas.microsoft.com/office/mac/drawingml/2011/main" val="1"/>
               </a:ext>
             </a:extLst>
           </p:spPr>
@@ -5670,7 +5679,7 @@
             <a:effectLst/>
             <a:extLst>
               <a:ext uri="{C572A759-6A51-4108-AA02-DFA0A04FC94B}">
-                <ma14:wrappingTextBoxFlag xmlns:ma14="http://schemas.microsoft.com/office/mac/drawingml/2011/main" xmlns:a14="http://schemas.microsoft.com/office/drawing/2010/main" xmlns:m="http://schemas.openxmlformats.org/officeDocument/2006/math" xmlns="" val="1"/>
+                <ma14:wrappingTextBoxFlag xmlns="" xmlns:m="http://schemas.openxmlformats.org/officeDocument/2006/math" xmlns:a14="http://schemas.microsoft.com/office/drawing/2010/main" xmlns:ma14="http://schemas.microsoft.com/office/mac/drawingml/2011/main" val="1"/>
               </a:ext>
             </a:extLst>
           </p:spPr>
@@ -5805,7 +5814,7 @@
             <a:effectLst/>
             <a:extLst>
               <a:ext uri="{C572A759-6A51-4108-AA02-DFA0A04FC94B}">
-                <ma14:wrappingTextBoxFlag xmlns:ma14="http://schemas.microsoft.com/office/mac/drawingml/2011/main" xmlns:a14="http://schemas.microsoft.com/office/drawing/2010/main" xmlns:m="http://schemas.openxmlformats.org/officeDocument/2006/math" xmlns="" val="1"/>
+                <ma14:wrappingTextBoxFlag xmlns="" xmlns:m="http://schemas.openxmlformats.org/officeDocument/2006/math" xmlns:a14="http://schemas.microsoft.com/office/drawing/2010/main" xmlns:ma14="http://schemas.microsoft.com/office/mac/drawingml/2011/main" val="1"/>
               </a:ext>
             </a:extLst>
           </p:spPr>
@@ -5940,7 +5949,7 @@
             <a:effectLst/>
             <a:extLst>
               <a:ext uri="{C572A759-6A51-4108-AA02-DFA0A04FC94B}">
-                <ma14:wrappingTextBoxFlag xmlns:ma14="http://schemas.microsoft.com/office/mac/drawingml/2011/main" xmlns:a14="http://schemas.microsoft.com/office/drawing/2010/main" xmlns:m="http://schemas.openxmlformats.org/officeDocument/2006/math" xmlns="" val="1"/>
+                <ma14:wrappingTextBoxFlag xmlns="" xmlns:m="http://schemas.openxmlformats.org/officeDocument/2006/math" xmlns:a14="http://schemas.microsoft.com/office/drawing/2010/main" xmlns:ma14="http://schemas.microsoft.com/office/mac/drawingml/2011/main" val="1"/>
               </a:ext>
             </a:extLst>
           </p:spPr>
@@ -6058,7 +6067,7 @@
             <a:effectLst/>
             <a:extLst>
               <a:ext uri="{C572A759-6A51-4108-AA02-DFA0A04FC94B}">
-                <ma14:wrappingTextBoxFlag xmlns:ma14="http://schemas.microsoft.com/office/mac/drawingml/2011/main" xmlns:a14="http://schemas.microsoft.com/office/drawing/2010/main" xmlns:m="http://schemas.openxmlformats.org/officeDocument/2006/math" xmlns="" val="1"/>
+                <ma14:wrappingTextBoxFlag xmlns="" xmlns:m="http://schemas.openxmlformats.org/officeDocument/2006/math" xmlns:a14="http://schemas.microsoft.com/office/drawing/2010/main" xmlns:ma14="http://schemas.microsoft.com/office/mac/drawingml/2011/main" val="1"/>
               </a:ext>
             </a:extLst>
           </p:spPr>
@@ -6269,7 +6278,7 @@
           </a:ln>
           <a:extLst>
             <a:ext uri="{C572A759-6A51-4108-AA02-DFA0A04FC94B}">
-              <ma14:wrappingTextBoxFlag xmlns:ma14="http://schemas.microsoft.com/office/mac/drawingml/2011/main" xmlns:a14="http://schemas.microsoft.com/office/drawing/2010/main" xmlns:m="http://schemas.openxmlformats.org/officeDocument/2006/math" xmlns="" val="1"/>
+              <ma14:wrappingTextBoxFlag xmlns="" xmlns:m="http://schemas.openxmlformats.org/officeDocument/2006/math" xmlns:a14="http://schemas.microsoft.com/office/drawing/2010/main" xmlns:ma14="http://schemas.microsoft.com/office/mac/drawingml/2011/main" val="1"/>
             </a:ext>
           </a:extLst>
         </p:spPr>
@@ -6396,7 +6405,7 @@
             <a:effectLst/>
             <a:extLst>
               <a:ext uri="{C572A759-6A51-4108-AA02-DFA0A04FC94B}">
-                <ma14:wrappingTextBoxFlag xmlns:ma14="http://schemas.microsoft.com/office/mac/drawingml/2011/main" xmlns:a14="http://schemas.microsoft.com/office/drawing/2010/main" xmlns:m="http://schemas.openxmlformats.org/officeDocument/2006/math" xmlns="" val="1"/>
+                <ma14:wrappingTextBoxFlag xmlns="" xmlns:m="http://schemas.openxmlformats.org/officeDocument/2006/math" xmlns:a14="http://schemas.microsoft.com/office/drawing/2010/main" xmlns:ma14="http://schemas.microsoft.com/office/mac/drawingml/2011/main" val="1"/>
               </a:ext>
             </a:extLst>
           </p:spPr>
@@ -6480,7 +6489,7 @@
           </a:ln>
           <a:extLst>
             <a:ext uri="{C572A759-6A51-4108-AA02-DFA0A04FC94B}">
-              <ma14:wrappingTextBoxFlag xmlns:ma14="http://schemas.microsoft.com/office/mac/drawingml/2011/main" xmlns:a14="http://schemas.microsoft.com/office/drawing/2010/main" xmlns:m="http://schemas.openxmlformats.org/officeDocument/2006/math" xmlns="" val="1"/>
+              <ma14:wrappingTextBoxFlag xmlns="" xmlns:m="http://schemas.openxmlformats.org/officeDocument/2006/math" xmlns:a14="http://schemas.microsoft.com/office/drawing/2010/main" xmlns:ma14="http://schemas.microsoft.com/office/mac/drawingml/2011/main" val="1"/>
             </a:ext>
           </a:extLst>
         </p:spPr>
@@ -6602,7 +6611,7 @@
             <a:effectLst/>
             <a:extLst>
               <a:ext uri="{C572A759-6A51-4108-AA02-DFA0A04FC94B}">
-                <ma14:wrappingTextBoxFlag xmlns:ma14="http://schemas.microsoft.com/office/mac/drawingml/2011/main" xmlns:a14="http://schemas.microsoft.com/office/drawing/2010/main" xmlns:m="http://schemas.openxmlformats.org/officeDocument/2006/math" xmlns="" val="1"/>
+                <ma14:wrappingTextBoxFlag xmlns="" xmlns:m="http://schemas.openxmlformats.org/officeDocument/2006/math" xmlns:a14="http://schemas.microsoft.com/office/drawing/2010/main" xmlns:ma14="http://schemas.microsoft.com/office/mac/drawingml/2011/main" val="1"/>
               </a:ext>
             </a:extLst>
           </p:spPr>
@@ -6755,7 +6764,7 @@
           </a:ln>
           <a:extLst>
             <a:ext uri="{C572A759-6A51-4108-AA02-DFA0A04FC94B}">
-              <ma14:wrappingTextBoxFlag xmlns:ma14="http://schemas.microsoft.com/office/mac/drawingml/2011/main" xmlns:a14="http://schemas.microsoft.com/office/drawing/2010/main" xmlns:m="http://schemas.openxmlformats.org/officeDocument/2006/math" xmlns="" val="1"/>
+              <ma14:wrappingTextBoxFlag xmlns="" xmlns:m="http://schemas.openxmlformats.org/officeDocument/2006/math" xmlns:a14="http://schemas.microsoft.com/office/drawing/2010/main" xmlns:ma14="http://schemas.microsoft.com/office/mac/drawingml/2011/main" val="1"/>
             </a:ext>
           </a:extLst>
         </p:spPr>
@@ -7307,7 +7316,7 @@
           </a:ln>
           <a:extLst>
             <a:ext uri="{C572A759-6A51-4108-AA02-DFA0A04FC94B}">
-              <ma14:wrappingTextBoxFlag xmlns:ma14="http://schemas.microsoft.com/office/mac/drawingml/2011/main" xmlns:a14="http://schemas.microsoft.com/office/drawing/2010/main" xmlns:m="http://schemas.openxmlformats.org/officeDocument/2006/math" xmlns="" val="1"/>
+              <ma14:wrappingTextBoxFlag xmlns="" xmlns:m="http://schemas.openxmlformats.org/officeDocument/2006/math" xmlns:a14="http://schemas.microsoft.com/office/drawing/2010/main" xmlns:ma14="http://schemas.microsoft.com/office/mac/drawingml/2011/main" val="1"/>
             </a:ext>
           </a:extLst>
         </p:spPr>
@@ -7408,7 +7417,7 @@
             <a:effectLst/>
             <a:extLst>
               <a:ext uri="{C572A759-6A51-4108-AA02-DFA0A04FC94B}">
-                <ma14:wrappingTextBoxFlag xmlns:ma14="http://schemas.microsoft.com/office/mac/drawingml/2011/main" xmlns:a14="http://schemas.microsoft.com/office/drawing/2010/main" xmlns:m="http://schemas.openxmlformats.org/officeDocument/2006/math" xmlns="" val="1"/>
+                <ma14:wrappingTextBoxFlag xmlns="" xmlns:m="http://schemas.openxmlformats.org/officeDocument/2006/math" xmlns:a14="http://schemas.microsoft.com/office/drawing/2010/main" xmlns:ma14="http://schemas.microsoft.com/office/mac/drawingml/2011/main" val="1"/>
               </a:ext>
             </a:extLst>
           </p:spPr>
@@ -7513,7 +7522,7 @@
           </a:ln>
           <a:extLst>
             <a:ext uri="{C572A759-6A51-4108-AA02-DFA0A04FC94B}">
-              <ma14:wrappingTextBoxFlag xmlns:ma14="http://schemas.microsoft.com/office/mac/drawingml/2011/main" xmlns:a14="http://schemas.microsoft.com/office/drawing/2010/main" xmlns:m="http://schemas.openxmlformats.org/officeDocument/2006/math" xmlns="" val="1"/>
+              <ma14:wrappingTextBoxFlag xmlns="" xmlns:m="http://schemas.openxmlformats.org/officeDocument/2006/math" xmlns:a14="http://schemas.microsoft.com/office/drawing/2010/main" xmlns:ma14="http://schemas.microsoft.com/office/mac/drawingml/2011/main" val="1"/>
             </a:ext>
           </a:extLst>
         </p:spPr>
@@ -7742,7 +7751,7 @@
           </a:ln>
           <a:extLst>
             <a:ext uri="{C572A759-6A51-4108-AA02-DFA0A04FC94B}">
-              <ma14:wrappingTextBoxFlag xmlns:ma14="http://schemas.microsoft.com/office/mac/drawingml/2011/main" xmlns:a14="http://schemas.microsoft.com/office/drawing/2010/main" xmlns:m="http://schemas.openxmlformats.org/officeDocument/2006/math" xmlns="" val="1"/>
+              <ma14:wrappingTextBoxFlag xmlns="" xmlns:m="http://schemas.openxmlformats.org/officeDocument/2006/math" xmlns:a14="http://schemas.microsoft.com/office/drawing/2010/main" xmlns:ma14="http://schemas.microsoft.com/office/mac/drawingml/2011/main" val="1"/>
             </a:ext>
           </a:extLst>
         </p:spPr>
@@ -8024,7 +8033,7 @@
           </a:ln>
           <a:extLst>
             <a:ext uri="{C572A759-6A51-4108-AA02-DFA0A04FC94B}">
-              <ma14:wrappingTextBoxFlag xmlns:ma14="http://schemas.microsoft.com/office/mac/drawingml/2011/main" xmlns:a14="http://schemas.microsoft.com/office/drawing/2010/main" xmlns:m="http://schemas.openxmlformats.org/officeDocument/2006/math" xmlns="" val="1"/>
+              <ma14:wrappingTextBoxFlag xmlns="" xmlns:m="http://schemas.openxmlformats.org/officeDocument/2006/math" xmlns:a14="http://schemas.microsoft.com/office/drawing/2010/main" xmlns:ma14="http://schemas.microsoft.com/office/mac/drawingml/2011/main" val="1"/>
             </a:ext>
           </a:extLst>
         </p:spPr>
@@ -8455,7 +8464,7 @@
             <a:effectLst/>
             <a:extLst>
               <a:ext uri="{C572A759-6A51-4108-AA02-DFA0A04FC94B}">
-                <ma14:wrappingTextBoxFlag xmlns:ma14="http://schemas.microsoft.com/office/mac/drawingml/2011/main" xmlns:a14="http://schemas.microsoft.com/office/drawing/2010/main" xmlns:m="http://schemas.openxmlformats.org/officeDocument/2006/math" xmlns="" val="1"/>
+                <ma14:wrappingTextBoxFlag xmlns="" xmlns:m="http://schemas.openxmlformats.org/officeDocument/2006/math" xmlns:a14="http://schemas.microsoft.com/office/drawing/2010/main" xmlns:ma14="http://schemas.microsoft.com/office/mac/drawingml/2011/main" val="1"/>
               </a:ext>
             </a:extLst>
           </p:spPr>
@@ -8532,7 +8541,7 @@
           </a:ln>
           <a:extLst>
             <a:ext uri="{C572A759-6A51-4108-AA02-DFA0A04FC94B}">
-              <ma14:wrappingTextBoxFlag xmlns:ma14="http://schemas.microsoft.com/office/mac/drawingml/2011/main" xmlns:a14="http://schemas.microsoft.com/office/drawing/2010/main" xmlns:m="http://schemas.openxmlformats.org/officeDocument/2006/math" xmlns="" val="1"/>
+              <ma14:wrappingTextBoxFlag xmlns="" xmlns:m="http://schemas.openxmlformats.org/officeDocument/2006/math" xmlns:a14="http://schemas.microsoft.com/office/drawing/2010/main" xmlns:ma14="http://schemas.microsoft.com/office/mac/drawingml/2011/main" val="1"/>
             </a:ext>
           </a:extLst>
         </p:spPr>
@@ -8708,7 +8717,7 @@
           </a:ln>
           <a:extLst>
             <a:ext uri="{C572A759-6A51-4108-AA02-DFA0A04FC94B}">
-              <ma14:wrappingTextBoxFlag xmlns:ma14="http://schemas.microsoft.com/office/mac/drawingml/2011/main" xmlns:a14="http://schemas.microsoft.com/office/drawing/2010/main" xmlns:m="http://schemas.openxmlformats.org/officeDocument/2006/math" xmlns="" val="1"/>
+              <ma14:wrappingTextBoxFlag xmlns="" xmlns:m="http://schemas.openxmlformats.org/officeDocument/2006/math" xmlns:a14="http://schemas.microsoft.com/office/drawing/2010/main" xmlns:ma14="http://schemas.microsoft.com/office/mac/drawingml/2011/main" val="1"/>
             </a:ext>
           </a:extLst>
         </p:spPr>
@@ -8928,7 +8937,7 @@
           </a:ln>
           <a:extLst>
             <a:ext uri="{C572A759-6A51-4108-AA02-DFA0A04FC94B}">
-              <ma14:wrappingTextBoxFlag xmlns:ma14="http://schemas.microsoft.com/office/mac/drawingml/2011/main" xmlns:a14="http://schemas.microsoft.com/office/drawing/2010/main" xmlns:m="http://schemas.openxmlformats.org/officeDocument/2006/math" xmlns="" val="1"/>
+              <ma14:wrappingTextBoxFlag xmlns="" xmlns:m="http://schemas.openxmlformats.org/officeDocument/2006/math" xmlns:a14="http://schemas.microsoft.com/office/drawing/2010/main" xmlns:ma14="http://schemas.microsoft.com/office/mac/drawingml/2011/main" val="1"/>
             </a:ext>
           </a:extLst>
         </p:spPr>
@@ -9118,7 +9127,7 @@
           </a:ln>
           <a:extLst>
             <a:ext uri="{C572A759-6A51-4108-AA02-DFA0A04FC94B}">
-              <ma14:wrappingTextBoxFlag xmlns:ma14="http://schemas.microsoft.com/office/mac/drawingml/2011/main" xmlns:a14="http://schemas.microsoft.com/office/drawing/2010/main" xmlns:m="http://schemas.openxmlformats.org/officeDocument/2006/math" xmlns="" val="1"/>
+              <ma14:wrappingTextBoxFlag xmlns="" xmlns:m="http://schemas.openxmlformats.org/officeDocument/2006/math" xmlns:a14="http://schemas.microsoft.com/office/drawing/2010/main" xmlns:ma14="http://schemas.microsoft.com/office/mac/drawingml/2011/main" val="1"/>
             </a:ext>
           </a:extLst>
         </p:spPr>
@@ -9161,7 +9170,7 @@
           </a:ln>
           <a:extLst>
             <a:ext uri="{C572A759-6A51-4108-AA02-DFA0A04FC94B}">
-              <ma14:wrappingTextBoxFlag xmlns:ma14="http://schemas.microsoft.com/office/mac/drawingml/2011/main" xmlns:a14="http://schemas.microsoft.com/office/drawing/2010/main" xmlns:m="http://schemas.openxmlformats.org/officeDocument/2006/math" xmlns="" val="1"/>
+              <ma14:wrappingTextBoxFlag xmlns="" xmlns:m="http://schemas.openxmlformats.org/officeDocument/2006/math" xmlns:a14="http://schemas.microsoft.com/office/drawing/2010/main" xmlns:ma14="http://schemas.microsoft.com/office/mac/drawingml/2011/main" val="1"/>
             </a:ext>
           </a:extLst>
         </p:spPr>
@@ -9204,7 +9213,7 @@
           </a:ln>
           <a:extLst>
             <a:ext uri="{C572A759-6A51-4108-AA02-DFA0A04FC94B}">
-              <ma14:wrappingTextBoxFlag xmlns:ma14="http://schemas.microsoft.com/office/mac/drawingml/2011/main" xmlns:a14="http://schemas.microsoft.com/office/drawing/2010/main" xmlns:m="http://schemas.openxmlformats.org/officeDocument/2006/math" xmlns="" val="1"/>
+              <ma14:wrappingTextBoxFlag xmlns="" xmlns:m="http://schemas.openxmlformats.org/officeDocument/2006/math" xmlns:a14="http://schemas.microsoft.com/office/drawing/2010/main" xmlns:ma14="http://schemas.microsoft.com/office/mac/drawingml/2011/main" val="1"/>
             </a:ext>
           </a:extLst>
         </p:spPr>
@@ -9247,7 +9256,7 @@
           </a:ln>
           <a:extLst>
             <a:ext uri="{C572A759-6A51-4108-AA02-DFA0A04FC94B}">
-              <ma14:wrappingTextBoxFlag xmlns:ma14="http://schemas.microsoft.com/office/mac/drawingml/2011/main" xmlns:a14="http://schemas.microsoft.com/office/drawing/2010/main" xmlns:m="http://schemas.openxmlformats.org/officeDocument/2006/math" xmlns="" val="1"/>
+              <ma14:wrappingTextBoxFlag xmlns="" xmlns:m="http://schemas.openxmlformats.org/officeDocument/2006/math" xmlns:a14="http://schemas.microsoft.com/office/drawing/2010/main" xmlns:ma14="http://schemas.microsoft.com/office/mac/drawingml/2011/main" val="1"/>
             </a:ext>
           </a:extLst>
         </p:spPr>
@@ -9290,7 +9299,7 @@
           </a:ln>
           <a:extLst>
             <a:ext uri="{C572A759-6A51-4108-AA02-DFA0A04FC94B}">
-              <ma14:wrappingTextBoxFlag xmlns:ma14="http://schemas.microsoft.com/office/mac/drawingml/2011/main" xmlns:a14="http://schemas.microsoft.com/office/drawing/2010/main" xmlns:m="http://schemas.openxmlformats.org/officeDocument/2006/math" xmlns="" val="1"/>
+              <ma14:wrappingTextBoxFlag xmlns="" xmlns:m="http://schemas.openxmlformats.org/officeDocument/2006/math" xmlns:a14="http://schemas.microsoft.com/office/drawing/2010/main" xmlns:ma14="http://schemas.microsoft.com/office/mac/drawingml/2011/main" val="1"/>
             </a:ext>
           </a:extLst>
         </p:spPr>
@@ -10074,7 +10083,7 @@
           </a:ln>
           <a:extLst>
             <a:ext uri="{C572A759-6A51-4108-AA02-DFA0A04FC94B}">
-              <ma14:wrappingTextBoxFlag xmlns:ma14="http://schemas.microsoft.com/office/mac/drawingml/2011/main" xmlns:a14="http://schemas.microsoft.com/office/drawing/2010/main" xmlns:m="http://schemas.openxmlformats.org/officeDocument/2006/math" xmlns="" val="1"/>
+              <ma14:wrappingTextBoxFlag xmlns="" xmlns:m="http://schemas.openxmlformats.org/officeDocument/2006/math" xmlns:a14="http://schemas.microsoft.com/office/drawing/2010/main" xmlns:ma14="http://schemas.microsoft.com/office/mac/drawingml/2011/main" val="1"/>
             </a:ext>
           </a:extLst>
         </p:spPr>
@@ -10236,7 +10245,7 @@
           </a:ln>
           <a:extLst>
             <a:ext uri="{C572A759-6A51-4108-AA02-DFA0A04FC94B}">
-              <ma14:wrappingTextBoxFlag xmlns:ma14="http://schemas.microsoft.com/office/mac/drawingml/2011/main" xmlns:a14="http://schemas.microsoft.com/office/drawing/2010/main" xmlns:m="http://schemas.openxmlformats.org/officeDocument/2006/math" xmlns="" val="1"/>
+              <ma14:wrappingTextBoxFlag xmlns="" xmlns:m="http://schemas.openxmlformats.org/officeDocument/2006/math" xmlns:a14="http://schemas.microsoft.com/office/drawing/2010/main" xmlns:ma14="http://schemas.microsoft.com/office/mac/drawingml/2011/main" val="1"/>
             </a:ext>
           </a:extLst>
         </p:spPr>
@@ -10384,7 +10393,7 @@
             <a:effectLst/>
             <a:extLst>
               <a:ext uri="{C572A759-6A51-4108-AA02-DFA0A04FC94B}">
-                <ma14:wrappingTextBoxFlag xmlns:ma14="http://schemas.microsoft.com/office/mac/drawingml/2011/main" xmlns:a14="http://schemas.microsoft.com/office/drawing/2010/main" xmlns:m="http://schemas.openxmlformats.org/officeDocument/2006/math" xmlns="" val="1"/>
+                <ma14:wrappingTextBoxFlag xmlns="" xmlns:m="http://schemas.openxmlformats.org/officeDocument/2006/math" xmlns:a14="http://schemas.microsoft.com/office/drawing/2010/main" xmlns:ma14="http://schemas.microsoft.com/office/mac/drawingml/2011/main" val="1"/>
               </a:ext>
             </a:extLst>
           </p:spPr>
@@ -10486,7 +10495,7 @@
             <a:effectLst/>
             <a:extLst>
               <a:ext uri="{C572A759-6A51-4108-AA02-DFA0A04FC94B}">
-                <ma14:wrappingTextBoxFlag xmlns:ma14="http://schemas.microsoft.com/office/mac/drawingml/2011/main" xmlns:a14="http://schemas.microsoft.com/office/drawing/2010/main" xmlns:m="http://schemas.openxmlformats.org/officeDocument/2006/math" xmlns="" val="1"/>
+                <ma14:wrappingTextBoxFlag xmlns="" xmlns:m="http://schemas.openxmlformats.org/officeDocument/2006/math" xmlns:a14="http://schemas.microsoft.com/office/drawing/2010/main" xmlns:ma14="http://schemas.microsoft.com/office/mac/drawingml/2011/main" val="1"/>
               </a:ext>
             </a:extLst>
           </p:spPr>
@@ -10618,7 +10627,7 @@
             <a:effectLst/>
             <a:extLst>
               <a:ext uri="{C572A759-6A51-4108-AA02-DFA0A04FC94B}">
-                <ma14:wrappingTextBoxFlag xmlns:ma14="http://schemas.microsoft.com/office/mac/drawingml/2011/main" xmlns:a14="http://schemas.microsoft.com/office/drawing/2010/main" xmlns:m="http://schemas.openxmlformats.org/officeDocument/2006/math" xmlns="" val="1"/>
+                <ma14:wrappingTextBoxFlag xmlns="" xmlns:m="http://schemas.openxmlformats.org/officeDocument/2006/math" xmlns:a14="http://schemas.microsoft.com/office/drawing/2010/main" xmlns:ma14="http://schemas.microsoft.com/office/mac/drawingml/2011/main" val="1"/>
               </a:ext>
             </a:extLst>
           </p:spPr>
@@ -10750,7 +10759,7 @@
             <a:effectLst/>
             <a:extLst>
               <a:ext uri="{C572A759-6A51-4108-AA02-DFA0A04FC94B}">
-                <ma14:wrappingTextBoxFlag xmlns:ma14="http://schemas.microsoft.com/office/mac/drawingml/2011/main" xmlns:a14="http://schemas.microsoft.com/office/drawing/2010/main" xmlns:m="http://schemas.openxmlformats.org/officeDocument/2006/math" xmlns="" val="1"/>
+                <ma14:wrappingTextBoxFlag xmlns="" xmlns:m="http://schemas.openxmlformats.org/officeDocument/2006/math" xmlns:a14="http://schemas.microsoft.com/office/drawing/2010/main" xmlns:ma14="http://schemas.microsoft.com/office/mac/drawingml/2011/main" val="1"/>
               </a:ext>
             </a:extLst>
           </p:spPr>
@@ -10884,7 +10893,7 @@
           </a:ln>
           <a:extLst>
             <a:ext uri="{C572A759-6A51-4108-AA02-DFA0A04FC94B}">
-              <ma14:wrappingTextBoxFlag xmlns:ma14="http://schemas.microsoft.com/office/mac/drawingml/2011/main" xmlns:a14="http://schemas.microsoft.com/office/drawing/2010/main" xmlns:m="http://schemas.openxmlformats.org/officeDocument/2006/math" xmlns="" val="1"/>
+              <ma14:wrappingTextBoxFlag xmlns="" xmlns:m="http://schemas.openxmlformats.org/officeDocument/2006/math" xmlns:a14="http://schemas.microsoft.com/office/drawing/2010/main" xmlns:ma14="http://schemas.microsoft.com/office/mac/drawingml/2011/main" val="1"/>
             </a:ext>
           </a:extLst>
         </p:spPr>
@@ -10990,7 +10999,7 @@
           </a:ln>
           <a:extLst>
             <a:ext uri="{C572A759-6A51-4108-AA02-DFA0A04FC94B}">
-              <ma14:wrappingTextBoxFlag xmlns:ma14="http://schemas.microsoft.com/office/mac/drawingml/2011/main" xmlns:a14="http://schemas.microsoft.com/office/drawing/2010/main" xmlns:m="http://schemas.openxmlformats.org/officeDocument/2006/math" xmlns="" val="1"/>
+              <ma14:wrappingTextBoxFlag xmlns="" xmlns:m="http://schemas.openxmlformats.org/officeDocument/2006/math" xmlns:a14="http://schemas.microsoft.com/office/drawing/2010/main" xmlns:ma14="http://schemas.microsoft.com/office/mac/drawingml/2011/main" val="1"/>
             </a:ext>
           </a:extLst>
         </p:spPr>
@@ -11080,7 +11089,7 @@
           </a:ln>
           <a:extLst>
             <a:ext uri="{C572A759-6A51-4108-AA02-DFA0A04FC94B}">
-              <ma14:wrappingTextBoxFlag xmlns:ma14="http://schemas.microsoft.com/office/mac/drawingml/2011/main" xmlns:a14="http://schemas.microsoft.com/office/drawing/2010/main" xmlns:m="http://schemas.openxmlformats.org/officeDocument/2006/math" xmlns="" val="1"/>
+              <ma14:wrappingTextBoxFlag xmlns="" xmlns:m="http://schemas.openxmlformats.org/officeDocument/2006/math" xmlns:a14="http://schemas.microsoft.com/office/drawing/2010/main" xmlns:ma14="http://schemas.microsoft.com/office/mac/drawingml/2011/main" val="1"/>
             </a:ext>
           </a:extLst>
         </p:spPr>
@@ -11429,7 +11438,7 @@
             <a:effectLst/>
             <a:extLst>
               <a:ext uri="{C572A759-6A51-4108-AA02-DFA0A04FC94B}">
-                <ma14:wrappingTextBoxFlag xmlns:ma14="http://schemas.microsoft.com/office/mac/drawingml/2011/main" xmlns:a14="http://schemas.microsoft.com/office/drawing/2010/main" xmlns:m="http://schemas.openxmlformats.org/officeDocument/2006/math" xmlns="" val="1"/>
+                <ma14:wrappingTextBoxFlag xmlns="" xmlns:m="http://schemas.openxmlformats.org/officeDocument/2006/math" xmlns:a14="http://schemas.microsoft.com/office/drawing/2010/main" xmlns:ma14="http://schemas.microsoft.com/office/mac/drawingml/2011/main" val="1"/>
               </a:ext>
             </a:extLst>
           </p:spPr>
@@ -11591,7 +11600,7 @@
             <a:effectLst/>
             <a:extLst>
               <a:ext uri="{C572A759-6A51-4108-AA02-DFA0A04FC94B}">
-                <ma14:wrappingTextBoxFlag xmlns:ma14="http://schemas.microsoft.com/office/mac/drawingml/2011/main" xmlns:a14="http://schemas.microsoft.com/office/drawing/2010/main" xmlns:m="http://schemas.openxmlformats.org/officeDocument/2006/math" xmlns="" val="1"/>
+                <ma14:wrappingTextBoxFlag xmlns="" xmlns:m="http://schemas.openxmlformats.org/officeDocument/2006/math" xmlns:a14="http://schemas.microsoft.com/office/drawing/2010/main" xmlns:ma14="http://schemas.microsoft.com/office/mac/drawingml/2011/main" val="1"/>
               </a:ext>
             </a:extLst>
           </p:spPr>
@@ -11723,7 +11732,7 @@
             <a:effectLst/>
             <a:extLst>
               <a:ext uri="{C572A759-6A51-4108-AA02-DFA0A04FC94B}">
-                <ma14:wrappingTextBoxFlag xmlns:ma14="http://schemas.microsoft.com/office/mac/drawingml/2011/main" xmlns:a14="http://schemas.microsoft.com/office/drawing/2010/main" xmlns:m="http://schemas.openxmlformats.org/officeDocument/2006/math" xmlns="" val="1"/>
+                <ma14:wrappingTextBoxFlag xmlns="" xmlns:m="http://schemas.openxmlformats.org/officeDocument/2006/math" xmlns:a14="http://schemas.microsoft.com/office/drawing/2010/main" xmlns:ma14="http://schemas.microsoft.com/office/mac/drawingml/2011/main" val="1"/>
               </a:ext>
             </a:extLst>
           </p:spPr>
@@ -11943,7 +11952,7 @@
             <a:effectLst/>
             <a:extLst>
               <a:ext uri="{C572A759-6A51-4108-AA02-DFA0A04FC94B}">
-                <ma14:wrappingTextBoxFlag xmlns:ma14="http://schemas.microsoft.com/office/mac/drawingml/2011/main" xmlns:a14="http://schemas.microsoft.com/office/drawing/2010/main" xmlns:m="http://schemas.openxmlformats.org/officeDocument/2006/math" xmlns="" val="1"/>
+                <ma14:wrappingTextBoxFlag xmlns="" xmlns:m="http://schemas.openxmlformats.org/officeDocument/2006/math" xmlns:a14="http://schemas.microsoft.com/office/drawing/2010/main" xmlns:ma14="http://schemas.microsoft.com/office/mac/drawingml/2011/main" val="1"/>
               </a:ext>
             </a:extLst>
           </p:spPr>
@@ -12075,7 +12084,7 @@
             <a:effectLst/>
             <a:extLst>
               <a:ext uri="{C572A759-6A51-4108-AA02-DFA0A04FC94B}">
-                <ma14:wrappingTextBoxFlag xmlns:ma14="http://schemas.microsoft.com/office/mac/drawingml/2011/main" xmlns:a14="http://schemas.microsoft.com/office/drawing/2010/main" xmlns:m="http://schemas.openxmlformats.org/officeDocument/2006/math" xmlns="" val="1"/>
+                <ma14:wrappingTextBoxFlag xmlns="" xmlns:m="http://schemas.openxmlformats.org/officeDocument/2006/math" xmlns:a14="http://schemas.microsoft.com/office/drawing/2010/main" xmlns:ma14="http://schemas.microsoft.com/office/mac/drawingml/2011/main" val="1"/>
               </a:ext>
             </a:extLst>
           </p:spPr>
@@ -12325,7 +12334,7 @@
             <a:effectLst/>
             <a:extLst>
               <a:ext uri="{C572A759-6A51-4108-AA02-DFA0A04FC94B}">
-                <ma14:wrappingTextBoxFlag xmlns:ma14="http://schemas.microsoft.com/office/mac/drawingml/2011/main" xmlns:a14="http://schemas.microsoft.com/office/drawing/2010/main" xmlns:m="http://schemas.openxmlformats.org/officeDocument/2006/math" xmlns="" val="1"/>
+                <ma14:wrappingTextBoxFlag xmlns="" xmlns:m="http://schemas.openxmlformats.org/officeDocument/2006/math" xmlns:a14="http://schemas.microsoft.com/office/drawing/2010/main" xmlns:ma14="http://schemas.microsoft.com/office/mac/drawingml/2011/main" val="1"/>
               </a:ext>
             </a:extLst>
           </p:spPr>
@@ -12369,7 +12378,7 @@
           </a:ln>
           <a:extLst>
             <a:ext uri="{C572A759-6A51-4108-AA02-DFA0A04FC94B}">
-              <ma14:wrappingTextBoxFlag xmlns:ma14="http://schemas.microsoft.com/office/mac/drawingml/2011/main" xmlns:a14="http://schemas.microsoft.com/office/drawing/2010/main" xmlns:m="http://schemas.openxmlformats.org/officeDocument/2006/math" xmlns="" val="1"/>
+              <ma14:wrappingTextBoxFlag xmlns="" xmlns:m="http://schemas.openxmlformats.org/officeDocument/2006/math" xmlns:a14="http://schemas.microsoft.com/office/drawing/2010/main" xmlns:ma14="http://schemas.microsoft.com/office/mac/drawingml/2011/main" val="1"/>
             </a:ext>
           </a:extLst>
         </p:spPr>
@@ -12412,7 +12421,7 @@
           </a:ln>
           <a:extLst>
             <a:ext uri="{C572A759-6A51-4108-AA02-DFA0A04FC94B}">
-              <ma14:wrappingTextBoxFlag xmlns:ma14="http://schemas.microsoft.com/office/mac/drawingml/2011/main" xmlns:a14="http://schemas.microsoft.com/office/drawing/2010/main" xmlns:m="http://schemas.openxmlformats.org/officeDocument/2006/math" xmlns="" val="1"/>
+              <ma14:wrappingTextBoxFlag xmlns="" xmlns:m="http://schemas.openxmlformats.org/officeDocument/2006/math" xmlns:a14="http://schemas.microsoft.com/office/drawing/2010/main" xmlns:ma14="http://schemas.microsoft.com/office/mac/drawingml/2011/main" val="1"/>
             </a:ext>
           </a:extLst>
         </p:spPr>
@@ -12455,7 +12464,7 @@
           </a:ln>
           <a:extLst>
             <a:ext uri="{C572A759-6A51-4108-AA02-DFA0A04FC94B}">
-              <ma14:wrappingTextBoxFlag xmlns:ma14="http://schemas.microsoft.com/office/mac/drawingml/2011/main" xmlns:a14="http://schemas.microsoft.com/office/drawing/2010/main" xmlns:m="http://schemas.openxmlformats.org/officeDocument/2006/math" xmlns="" val="1"/>
+              <ma14:wrappingTextBoxFlag xmlns="" xmlns:m="http://schemas.openxmlformats.org/officeDocument/2006/math" xmlns:a14="http://schemas.microsoft.com/office/drawing/2010/main" xmlns:ma14="http://schemas.microsoft.com/office/mac/drawingml/2011/main" val="1"/>
             </a:ext>
           </a:extLst>
         </p:spPr>
@@ -12498,7 +12507,7 @@
           </a:ln>
           <a:extLst>
             <a:ext uri="{C572A759-6A51-4108-AA02-DFA0A04FC94B}">
-              <ma14:wrappingTextBoxFlag xmlns:ma14="http://schemas.microsoft.com/office/mac/drawingml/2011/main" xmlns:a14="http://schemas.microsoft.com/office/drawing/2010/main" xmlns:m="http://schemas.openxmlformats.org/officeDocument/2006/math" xmlns="" val="1"/>
+              <ma14:wrappingTextBoxFlag xmlns="" xmlns:m="http://schemas.openxmlformats.org/officeDocument/2006/math" xmlns:a14="http://schemas.microsoft.com/office/drawing/2010/main" xmlns:ma14="http://schemas.microsoft.com/office/mac/drawingml/2011/main" val="1"/>
             </a:ext>
           </a:extLst>
         </p:spPr>
@@ -12604,7 +12613,7 @@
           </a:ln>
           <a:extLst>
             <a:ext uri="{C572A759-6A51-4108-AA02-DFA0A04FC94B}">
-              <ma14:wrappingTextBoxFlag xmlns:ma14="http://schemas.microsoft.com/office/mac/drawingml/2011/main" xmlns:a14="http://schemas.microsoft.com/office/drawing/2010/main" xmlns:m="http://schemas.openxmlformats.org/officeDocument/2006/math" xmlns="" val="1"/>
+              <ma14:wrappingTextBoxFlag xmlns="" xmlns:m="http://schemas.openxmlformats.org/officeDocument/2006/math" xmlns:a14="http://schemas.microsoft.com/office/drawing/2010/main" xmlns:ma14="http://schemas.microsoft.com/office/mac/drawingml/2011/main" val="1"/>
             </a:ext>
           </a:extLst>
         </p:spPr>
@@ -12762,7 +12771,7 @@
           </a:ln>
           <a:extLst>
             <a:ext uri="{C572A759-6A51-4108-AA02-DFA0A04FC94B}">
-              <ma14:wrappingTextBoxFlag xmlns:ma14="http://schemas.microsoft.com/office/mac/drawingml/2011/main" xmlns:a14="http://schemas.microsoft.com/office/drawing/2010/main" xmlns:m="http://schemas.openxmlformats.org/officeDocument/2006/math" xmlns="" val="1"/>
+              <ma14:wrappingTextBoxFlag xmlns="" xmlns:m="http://schemas.openxmlformats.org/officeDocument/2006/math" xmlns:a14="http://schemas.microsoft.com/office/drawing/2010/main" xmlns:ma14="http://schemas.microsoft.com/office/mac/drawingml/2011/main" val="1"/>
             </a:ext>
           </a:extLst>
         </p:spPr>
@@ -13083,7 +13092,7 @@
             <a:effectLst/>
             <a:extLst>
               <a:ext uri="{C572A759-6A51-4108-AA02-DFA0A04FC94B}">
-                <ma14:wrappingTextBoxFlag xmlns:ma14="http://schemas.microsoft.com/office/mac/drawingml/2011/main" xmlns:a14="http://schemas.microsoft.com/office/drawing/2010/main" xmlns:m="http://schemas.openxmlformats.org/officeDocument/2006/math" xmlns="" val="1"/>
+                <ma14:wrappingTextBoxFlag xmlns="" xmlns:m="http://schemas.openxmlformats.org/officeDocument/2006/math" xmlns:a14="http://schemas.microsoft.com/office/drawing/2010/main" xmlns:ma14="http://schemas.microsoft.com/office/mac/drawingml/2011/main" val="1"/>
               </a:ext>
             </a:extLst>
           </p:spPr>
@@ -13423,7 +13432,7 @@
           </a:ln>
           <a:extLst>
             <a:ext uri="{C572A759-6A51-4108-AA02-DFA0A04FC94B}">
-              <ma14:wrappingTextBoxFlag xmlns:ma14="http://schemas.microsoft.com/office/mac/drawingml/2011/main" xmlns:a14="http://schemas.microsoft.com/office/drawing/2010/main" xmlns:m="http://schemas.openxmlformats.org/officeDocument/2006/math" xmlns="" val="1"/>
+              <ma14:wrappingTextBoxFlag xmlns="" xmlns:m="http://schemas.openxmlformats.org/officeDocument/2006/math" xmlns:a14="http://schemas.microsoft.com/office/drawing/2010/main" xmlns:ma14="http://schemas.microsoft.com/office/mac/drawingml/2011/main" val="1"/>
             </a:ext>
           </a:extLst>
         </p:spPr>
@@ -13484,7 +13493,7 @@
           </a:ln>
           <a:extLst>
             <a:ext uri="{C572A759-6A51-4108-AA02-DFA0A04FC94B}">
-              <ma14:wrappingTextBoxFlag xmlns:ma14="http://schemas.microsoft.com/office/mac/drawingml/2011/main" xmlns:a14="http://schemas.microsoft.com/office/drawing/2010/main" xmlns:m="http://schemas.openxmlformats.org/officeDocument/2006/math" xmlns="" val="1"/>
+              <ma14:wrappingTextBoxFlag xmlns="" xmlns:m="http://schemas.openxmlformats.org/officeDocument/2006/math" xmlns:a14="http://schemas.microsoft.com/office/drawing/2010/main" xmlns:ma14="http://schemas.microsoft.com/office/mac/drawingml/2011/main" val="1"/>
             </a:ext>
           </a:extLst>
         </p:spPr>
@@ -13585,7 +13594,7 @@
             <a:effectLst/>
             <a:extLst>
               <a:ext uri="{C572A759-6A51-4108-AA02-DFA0A04FC94B}">
-                <ma14:wrappingTextBoxFlag xmlns:ma14="http://schemas.microsoft.com/office/mac/drawingml/2011/main" xmlns:a14="http://schemas.microsoft.com/office/drawing/2010/main" xmlns:m="http://schemas.openxmlformats.org/officeDocument/2006/math" xmlns="" val="1"/>
+                <ma14:wrappingTextBoxFlag xmlns="" xmlns:m="http://schemas.openxmlformats.org/officeDocument/2006/math" xmlns:a14="http://schemas.microsoft.com/office/drawing/2010/main" xmlns:ma14="http://schemas.microsoft.com/office/mac/drawingml/2011/main" val="1"/>
               </a:ext>
             </a:extLst>
           </p:spPr>
@@ -13629,7 +13638,7 @@
           </a:ln>
           <a:extLst>
             <a:ext uri="{C572A759-6A51-4108-AA02-DFA0A04FC94B}">
-              <ma14:wrappingTextBoxFlag xmlns:ma14="http://schemas.microsoft.com/office/mac/drawingml/2011/main" xmlns:a14="http://schemas.microsoft.com/office/drawing/2010/main" xmlns:m="http://schemas.openxmlformats.org/officeDocument/2006/math" xmlns="" val="1"/>
+              <ma14:wrappingTextBoxFlag xmlns="" xmlns:m="http://schemas.openxmlformats.org/officeDocument/2006/math" xmlns:a14="http://schemas.microsoft.com/office/drawing/2010/main" xmlns:ma14="http://schemas.microsoft.com/office/mac/drawingml/2011/main" val="1"/>
             </a:ext>
           </a:extLst>
         </p:spPr>
@@ -13730,7 +13739,7 @@
             <a:effectLst/>
             <a:extLst>
               <a:ext uri="{C572A759-6A51-4108-AA02-DFA0A04FC94B}">
-                <ma14:wrappingTextBoxFlag xmlns:ma14="http://schemas.microsoft.com/office/mac/drawingml/2011/main" xmlns:a14="http://schemas.microsoft.com/office/drawing/2010/main" xmlns:m="http://schemas.openxmlformats.org/officeDocument/2006/math" xmlns="" val="1"/>
+                <ma14:wrappingTextBoxFlag xmlns="" xmlns:m="http://schemas.openxmlformats.org/officeDocument/2006/math" xmlns:a14="http://schemas.microsoft.com/office/drawing/2010/main" xmlns:ma14="http://schemas.microsoft.com/office/mac/drawingml/2011/main" val="1"/>
               </a:ext>
             </a:extLst>
           </p:spPr>
@@ -13832,7 +13841,7 @@
             <a:effectLst/>
             <a:extLst>
               <a:ext uri="{C572A759-6A51-4108-AA02-DFA0A04FC94B}">
-                <ma14:wrappingTextBoxFlag xmlns:ma14="http://schemas.microsoft.com/office/mac/drawingml/2011/main" xmlns:a14="http://schemas.microsoft.com/office/drawing/2010/main" xmlns:m="http://schemas.openxmlformats.org/officeDocument/2006/math" xmlns="" val="1"/>
+                <ma14:wrappingTextBoxFlag xmlns="" xmlns:m="http://schemas.openxmlformats.org/officeDocument/2006/math" xmlns:a14="http://schemas.microsoft.com/office/drawing/2010/main" xmlns:ma14="http://schemas.microsoft.com/office/mac/drawingml/2011/main" val="1"/>
               </a:ext>
             </a:extLst>
           </p:spPr>
@@ -13964,7 +13973,7 @@
             <a:effectLst/>
             <a:extLst>
               <a:ext uri="{C572A759-6A51-4108-AA02-DFA0A04FC94B}">
-                <ma14:wrappingTextBoxFlag xmlns:ma14="http://schemas.microsoft.com/office/mac/drawingml/2011/main" xmlns:a14="http://schemas.microsoft.com/office/drawing/2010/main" xmlns:m="http://schemas.openxmlformats.org/officeDocument/2006/math" xmlns="" val="1"/>
+                <ma14:wrappingTextBoxFlag xmlns="" xmlns:m="http://schemas.openxmlformats.org/officeDocument/2006/math" xmlns:a14="http://schemas.microsoft.com/office/drawing/2010/main" xmlns:ma14="http://schemas.microsoft.com/office/mac/drawingml/2011/main" val="1"/>
               </a:ext>
             </a:extLst>
           </p:spPr>
@@ -14091,7 +14100,7 @@
           </a:ln>
           <a:extLst>
             <a:ext uri="{C572A759-6A51-4108-AA02-DFA0A04FC94B}">
-              <ma14:wrappingTextBoxFlag xmlns:ma14="http://schemas.microsoft.com/office/mac/drawingml/2011/main" xmlns:a14="http://schemas.microsoft.com/office/drawing/2010/main" xmlns:m="http://schemas.openxmlformats.org/officeDocument/2006/math" xmlns="" val="1"/>
+              <ma14:wrappingTextBoxFlag xmlns="" xmlns:m="http://schemas.openxmlformats.org/officeDocument/2006/math" xmlns:a14="http://schemas.microsoft.com/office/drawing/2010/main" xmlns:ma14="http://schemas.microsoft.com/office/mac/drawingml/2011/main" val="1"/>
             </a:ext>
           </a:extLst>
         </p:spPr>
@@ -14475,7 +14484,7 @@
           </a:ln>
           <a:extLst>
             <a:ext uri="{C572A759-6A51-4108-AA02-DFA0A04FC94B}">
-              <ma14:wrappingTextBoxFlag xmlns:ma14="http://schemas.microsoft.com/office/mac/drawingml/2011/main" xmlns:a14="http://schemas.microsoft.com/office/drawing/2010/main" xmlns:m="http://schemas.openxmlformats.org/officeDocument/2006/math" xmlns="" val="1"/>
+              <ma14:wrappingTextBoxFlag xmlns="" xmlns:m="http://schemas.openxmlformats.org/officeDocument/2006/math" xmlns:a14="http://schemas.microsoft.com/office/drawing/2010/main" xmlns:ma14="http://schemas.microsoft.com/office/mac/drawingml/2011/main" val="1"/>
             </a:ext>
           </a:extLst>
         </p:spPr>
@@ -14586,7 +14595,7 @@
           </a:ln>
           <a:extLst>
             <a:ext uri="{C572A759-6A51-4108-AA02-DFA0A04FC94B}">
-              <ma14:wrappingTextBoxFlag xmlns:ma14="http://schemas.microsoft.com/office/mac/drawingml/2011/main" xmlns:a14="http://schemas.microsoft.com/office/drawing/2010/main" xmlns:m="http://schemas.openxmlformats.org/officeDocument/2006/math" xmlns="" val="1"/>
+              <ma14:wrappingTextBoxFlag xmlns="" xmlns:m="http://schemas.openxmlformats.org/officeDocument/2006/math" xmlns:a14="http://schemas.microsoft.com/office/drawing/2010/main" xmlns:ma14="http://schemas.microsoft.com/office/mac/drawingml/2011/main" val="1"/>
             </a:ext>
           </a:extLst>
         </p:spPr>
@@ -15047,7 +15056,7 @@
             <a:effectLst/>
             <a:extLst>
               <a:ext uri="{C572A759-6A51-4108-AA02-DFA0A04FC94B}">
-                <ma14:wrappingTextBoxFlag xmlns:ma14="http://schemas.microsoft.com/office/mac/drawingml/2011/main" xmlns:a14="http://schemas.microsoft.com/office/drawing/2010/main" xmlns:m="http://schemas.openxmlformats.org/officeDocument/2006/math" xmlns="" val="1"/>
+                <ma14:wrappingTextBoxFlag xmlns="" xmlns:m="http://schemas.openxmlformats.org/officeDocument/2006/math" xmlns:a14="http://schemas.microsoft.com/office/drawing/2010/main" xmlns:ma14="http://schemas.microsoft.com/office/mac/drawingml/2011/main" val="1"/>
               </a:ext>
             </a:extLst>
           </p:spPr>
@@ -15461,7 +15470,7 @@
           </a:ln>
           <a:extLst>
             <a:ext uri="{C572A759-6A51-4108-AA02-DFA0A04FC94B}">
-              <ma14:wrappingTextBoxFlag xmlns:ma14="http://schemas.microsoft.com/office/mac/drawingml/2011/main" xmlns:a14="http://schemas.microsoft.com/office/drawing/2010/main" xmlns:m="http://schemas.openxmlformats.org/officeDocument/2006/math" xmlns="" val="1"/>
+              <ma14:wrappingTextBoxFlag xmlns="" xmlns:m="http://schemas.openxmlformats.org/officeDocument/2006/math" xmlns:a14="http://schemas.microsoft.com/office/drawing/2010/main" xmlns:ma14="http://schemas.microsoft.com/office/mac/drawingml/2011/main" val="1"/>
             </a:ext>
           </a:extLst>
         </p:spPr>
@@ -15841,7 +15850,7 @@
             <a:effectLst/>
             <a:extLst>
               <a:ext uri="{C572A759-6A51-4108-AA02-DFA0A04FC94B}">
-                <ma14:wrappingTextBoxFlag xmlns:ma14="http://schemas.microsoft.com/office/mac/drawingml/2011/main" xmlns:a14="http://schemas.microsoft.com/office/drawing/2010/main" xmlns:m="http://schemas.openxmlformats.org/officeDocument/2006/math" xmlns="" val="1"/>
+                <ma14:wrappingTextBoxFlag xmlns="" xmlns:m="http://schemas.openxmlformats.org/officeDocument/2006/math" xmlns:a14="http://schemas.microsoft.com/office/drawing/2010/main" xmlns:ma14="http://schemas.microsoft.com/office/mac/drawingml/2011/main" val="1"/>
               </a:ext>
             </a:extLst>
           </p:spPr>
@@ -16132,7 +16141,7 @@
             <a:effectLst/>
             <a:extLst>
               <a:ext uri="{C572A759-6A51-4108-AA02-DFA0A04FC94B}">
-                <ma14:wrappingTextBoxFlag xmlns:ma14="http://schemas.microsoft.com/office/mac/drawingml/2011/main" xmlns:a14="http://schemas.microsoft.com/office/drawing/2010/main" xmlns:m="http://schemas.openxmlformats.org/officeDocument/2006/math" xmlns="" val="1"/>
+                <ma14:wrappingTextBoxFlag xmlns="" xmlns:m="http://schemas.openxmlformats.org/officeDocument/2006/math" xmlns:a14="http://schemas.microsoft.com/office/drawing/2010/main" xmlns:ma14="http://schemas.microsoft.com/office/mac/drawingml/2011/main" val="1"/>
               </a:ext>
             </a:extLst>
           </p:spPr>
@@ -16308,7 +16317,7 @@
             <a:effectLst/>
             <a:extLst>
               <a:ext uri="{C572A759-6A51-4108-AA02-DFA0A04FC94B}">
-                <ma14:wrappingTextBoxFlag xmlns:ma14="http://schemas.microsoft.com/office/mac/drawingml/2011/main" xmlns:a14="http://schemas.microsoft.com/office/drawing/2010/main" xmlns:m="http://schemas.openxmlformats.org/officeDocument/2006/math" xmlns="" val="1"/>
+                <ma14:wrappingTextBoxFlag xmlns="" xmlns:m="http://schemas.openxmlformats.org/officeDocument/2006/math" xmlns:a14="http://schemas.microsoft.com/office/drawing/2010/main" xmlns:ma14="http://schemas.microsoft.com/office/mac/drawingml/2011/main" val="1"/>
               </a:ext>
             </a:extLst>
           </p:spPr>
@@ -16752,7 +16761,7 @@
             <a:effectLst/>
             <a:extLst>
               <a:ext uri="{C572A759-6A51-4108-AA02-DFA0A04FC94B}">
-                <ma14:wrappingTextBoxFlag xmlns:ma14="http://schemas.microsoft.com/office/mac/drawingml/2011/main" xmlns:a14="http://schemas.microsoft.com/office/drawing/2010/main" xmlns:m="http://schemas.openxmlformats.org/officeDocument/2006/math" xmlns="" val="1"/>
+                <ma14:wrappingTextBoxFlag xmlns="" xmlns:m="http://schemas.openxmlformats.org/officeDocument/2006/math" xmlns:a14="http://schemas.microsoft.com/office/drawing/2010/main" xmlns:ma14="http://schemas.microsoft.com/office/mac/drawingml/2011/main" val="1"/>
               </a:ext>
             </a:extLst>
           </p:spPr>
@@ -16886,7 +16895,7 @@
           </a:ln>
           <a:extLst>
             <a:ext uri="{C572A759-6A51-4108-AA02-DFA0A04FC94B}">
-              <ma14:wrappingTextBoxFlag xmlns:ma14="http://schemas.microsoft.com/office/mac/drawingml/2011/main" xmlns:a14="http://schemas.microsoft.com/office/drawing/2010/main" xmlns:m="http://schemas.openxmlformats.org/officeDocument/2006/math" xmlns="" val="1"/>
+              <ma14:wrappingTextBoxFlag xmlns="" xmlns:m="http://schemas.openxmlformats.org/officeDocument/2006/math" xmlns:a14="http://schemas.microsoft.com/office/drawing/2010/main" xmlns:ma14="http://schemas.microsoft.com/office/mac/drawingml/2011/main" val="1"/>
             </a:ext>
           </a:extLst>
         </p:spPr>
@@ -16929,7 +16938,7 @@
           </a:ln>
           <a:extLst>
             <a:ext uri="{C572A759-6A51-4108-AA02-DFA0A04FC94B}">
-              <ma14:wrappingTextBoxFlag xmlns:ma14="http://schemas.microsoft.com/office/mac/drawingml/2011/main" xmlns:a14="http://schemas.microsoft.com/office/drawing/2010/main" xmlns:m="http://schemas.openxmlformats.org/officeDocument/2006/math" xmlns="" val="1"/>
+              <ma14:wrappingTextBoxFlag xmlns="" xmlns:m="http://schemas.openxmlformats.org/officeDocument/2006/math" xmlns:a14="http://schemas.microsoft.com/office/drawing/2010/main" xmlns:ma14="http://schemas.microsoft.com/office/mac/drawingml/2011/main" val="1"/>
             </a:ext>
           </a:extLst>
         </p:spPr>
@@ -17001,7 +17010,7 @@
           </a:ln>
           <a:extLst>
             <a:ext uri="{C572A759-6A51-4108-AA02-DFA0A04FC94B}">
-              <ma14:wrappingTextBoxFlag xmlns:ma14="http://schemas.microsoft.com/office/mac/drawingml/2011/main" xmlns:a14="http://schemas.microsoft.com/office/drawing/2010/main" xmlns:m="http://schemas.openxmlformats.org/officeDocument/2006/math" xmlns="" val="1"/>
+              <ma14:wrappingTextBoxFlag xmlns="" xmlns:m="http://schemas.openxmlformats.org/officeDocument/2006/math" xmlns:a14="http://schemas.microsoft.com/office/drawing/2010/main" xmlns:ma14="http://schemas.microsoft.com/office/mac/drawingml/2011/main" val="1"/>
             </a:ext>
           </a:extLst>
         </p:spPr>

</xml_diff>

<commit_message>
Made small cosmetic changes to slide sets 1 and 2. Added slides for class 3
</commit_message>
<xml_diff>
--- a/slides/Pythonlearn-01-Intro.pptx
+++ b/slides/Pythonlearn-01-Intro.pptx
@@ -1150,7 +1150,7 @@
           </a:ln>
           <a:extLst>
             <a:ext uri="{C572A759-6A51-4108-AA02-DFA0A04FC94B}">
-              <ma14:wrappingTextBoxFlag xmlns="" xmlns:m="http://schemas.openxmlformats.org/officeDocument/2006/math" xmlns:a14="http://schemas.microsoft.com/office/drawing/2010/main" xmlns:ma14="http://schemas.microsoft.com/office/mac/drawingml/2011/main" val="1"/>
+              <ma14:wrappingTextBoxFlag xmlns:ma14="http://schemas.microsoft.com/office/mac/drawingml/2011/main" xmlns:a14="http://schemas.microsoft.com/office/drawing/2010/main" xmlns:m="http://schemas.openxmlformats.org/officeDocument/2006/math" xmlns="" val="1"/>
             </a:ext>
           </a:extLst>
         </p:spPr>
@@ -1189,7 +1189,7 @@
           </a:ln>
           <a:extLst>
             <a:ext uri="{C572A759-6A51-4108-AA02-DFA0A04FC94B}">
-              <ma14:wrappingTextBoxFlag xmlns="" xmlns:m="http://schemas.openxmlformats.org/officeDocument/2006/math" xmlns:a14="http://schemas.microsoft.com/office/drawing/2010/main" xmlns:ma14="http://schemas.microsoft.com/office/mac/drawingml/2011/main" val="1"/>
+              <ma14:wrappingTextBoxFlag xmlns:ma14="http://schemas.microsoft.com/office/mac/drawingml/2011/main" xmlns:a14="http://schemas.microsoft.com/office/drawing/2010/main" xmlns:m="http://schemas.openxmlformats.org/officeDocument/2006/math" xmlns="" val="1"/>
             </a:ext>
           </a:extLst>
         </p:spPr>
@@ -2168,7 +2168,15 @@
           </a:lstStyle>
           <a:p>
             <a:r>
-              <a:t>Lesson 1 – Why Program?</a:t>
+              <a:rPr lang="en-US"/>
+              <a:t>Class</a:t>
+            </a:r>
+            <a:r>
+              <a:t> </a:t>
+            </a:r>
+            <a:r>
+              <a:rPr dirty="0"/>
+              <a:t>1 – Why Program?</a:t>
             </a:r>
           </a:p>
         </p:txBody>
@@ -2192,7 +2200,7 @@
           </a:ln>
           <a:extLst>
             <a:ext uri="{C572A759-6A51-4108-AA02-DFA0A04FC94B}">
-              <ma14:wrappingTextBoxFlag xmlns="" xmlns:m="http://schemas.openxmlformats.org/officeDocument/2006/math" xmlns:a14="http://schemas.microsoft.com/office/drawing/2010/main" xmlns:ma14="http://schemas.microsoft.com/office/mac/drawingml/2011/main" val="1"/>
+              <ma14:wrappingTextBoxFlag xmlns:ma14="http://schemas.microsoft.com/office/mac/drawingml/2011/main" xmlns:a14="http://schemas.microsoft.com/office/drawing/2010/main" xmlns:m="http://schemas.openxmlformats.org/officeDocument/2006/math" xmlns="" val="1"/>
             </a:ext>
           </a:extLst>
         </p:spPr>
@@ -2751,7 +2759,7 @@
           </a:ln>
           <a:extLst>
             <a:ext uri="{C572A759-6A51-4108-AA02-DFA0A04FC94B}">
-              <ma14:wrappingTextBoxFlag xmlns="" xmlns:m="http://schemas.openxmlformats.org/officeDocument/2006/math" xmlns:a14="http://schemas.microsoft.com/office/drawing/2010/main" xmlns:ma14="http://schemas.microsoft.com/office/mac/drawingml/2011/main" val="1"/>
+              <ma14:wrappingTextBoxFlag xmlns:ma14="http://schemas.microsoft.com/office/mac/drawingml/2011/main" xmlns:a14="http://schemas.microsoft.com/office/drawing/2010/main" xmlns:m="http://schemas.openxmlformats.org/officeDocument/2006/math" xmlns="" val="1"/>
             </a:ext>
           </a:extLst>
         </p:spPr>
@@ -3073,7 +3081,7 @@
             <a:effectLst/>
             <a:extLst>
               <a:ext uri="{C572A759-6A51-4108-AA02-DFA0A04FC94B}">
-                <ma14:wrappingTextBoxFlag xmlns="" xmlns:m="http://schemas.openxmlformats.org/officeDocument/2006/math" xmlns:a14="http://schemas.microsoft.com/office/drawing/2010/main" xmlns:ma14="http://schemas.microsoft.com/office/mac/drawingml/2011/main" val="1"/>
+                <ma14:wrappingTextBoxFlag xmlns:ma14="http://schemas.microsoft.com/office/mac/drawingml/2011/main" xmlns:a14="http://schemas.microsoft.com/office/drawing/2010/main" xmlns:m="http://schemas.openxmlformats.org/officeDocument/2006/math" xmlns="" val="1"/>
               </a:ext>
             </a:extLst>
           </p:spPr>
@@ -3185,7 +3193,7 @@
             <a:effectLst/>
             <a:extLst>
               <a:ext uri="{C572A759-6A51-4108-AA02-DFA0A04FC94B}">
-                <ma14:wrappingTextBoxFlag xmlns="" xmlns:m="http://schemas.openxmlformats.org/officeDocument/2006/math" xmlns:a14="http://schemas.microsoft.com/office/drawing/2010/main" xmlns:ma14="http://schemas.microsoft.com/office/mac/drawingml/2011/main" val="1"/>
+                <ma14:wrappingTextBoxFlag xmlns:ma14="http://schemas.microsoft.com/office/mac/drawingml/2011/main" xmlns:a14="http://schemas.microsoft.com/office/drawing/2010/main" xmlns:m="http://schemas.openxmlformats.org/officeDocument/2006/math" xmlns="" val="1"/>
               </a:ext>
             </a:extLst>
           </p:spPr>
@@ -3320,7 +3328,7 @@
             <a:effectLst/>
             <a:extLst>
               <a:ext uri="{C572A759-6A51-4108-AA02-DFA0A04FC94B}">
-                <ma14:wrappingTextBoxFlag xmlns="" xmlns:m="http://schemas.openxmlformats.org/officeDocument/2006/math" xmlns:a14="http://schemas.microsoft.com/office/drawing/2010/main" xmlns:ma14="http://schemas.microsoft.com/office/mac/drawingml/2011/main" val="1"/>
+                <ma14:wrappingTextBoxFlag xmlns:ma14="http://schemas.microsoft.com/office/mac/drawingml/2011/main" xmlns:a14="http://schemas.microsoft.com/office/drawing/2010/main" xmlns:m="http://schemas.openxmlformats.org/officeDocument/2006/math" xmlns="" val="1"/>
               </a:ext>
             </a:extLst>
           </p:spPr>
@@ -3455,7 +3463,7 @@
             <a:effectLst/>
             <a:extLst>
               <a:ext uri="{C572A759-6A51-4108-AA02-DFA0A04FC94B}">
-                <ma14:wrappingTextBoxFlag xmlns="" xmlns:m="http://schemas.openxmlformats.org/officeDocument/2006/math" xmlns:a14="http://schemas.microsoft.com/office/drawing/2010/main" xmlns:ma14="http://schemas.microsoft.com/office/mac/drawingml/2011/main" val="1"/>
+                <ma14:wrappingTextBoxFlag xmlns:ma14="http://schemas.microsoft.com/office/mac/drawingml/2011/main" xmlns:a14="http://schemas.microsoft.com/office/drawing/2010/main" xmlns:m="http://schemas.openxmlformats.org/officeDocument/2006/math" xmlns="" val="1"/>
               </a:ext>
             </a:extLst>
           </p:spPr>
@@ -3573,7 +3581,7 @@
             <a:effectLst/>
             <a:extLst>
               <a:ext uri="{C572A759-6A51-4108-AA02-DFA0A04FC94B}">
-                <ma14:wrappingTextBoxFlag xmlns="" xmlns:m="http://schemas.openxmlformats.org/officeDocument/2006/math" xmlns:a14="http://schemas.microsoft.com/office/drawing/2010/main" xmlns:ma14="http://schemas.microsoft.com/office/mac/drawingml/2011/main" val="1"/>
+                <ma14:wrappingTextBoxFlag xmlns:ma14="http://schemas.microsoft.com/office/mac/drawingml/2011/main" xmlns:a14="http://schemas.microsoft.com/office/drawing/2010/main" xmlns:m="http://schemas.openxmlformats.org/officeDocument/2006/math" xmlns="" val="1"/>
               </a:ext>
             </a:extLst>
           </p:spPr>
@@ -3784,7 +3792,7 @@
           </a:ln>
           <a:extLst>
             <a:ext uri="{C572A759-6A51-4108-AA02-DFA0A04FC94B}">
-              <ma14:wrappingTextBoxFlag xmlns="" xmlns:m="http://schemas.openxmlformats.org/officeDocument/2006/math" xmlns:a14="http://schemas.microsoft.com/office/drawing/2010/main" xmlns:ma14="http://schemas.microsoft.com/office/mac/drawingml/2011/main" val="1"/>
+              <ma14:wrappingTextBoxFlag xmlns:ma14="http://schemas.microsoft.com/office/mac/drawingml/2011/main" xmlns:a14="http://schemas.microsoft.com/office/drawing/2010/main" xmlns:m="http://schemas.openxmlformats.org/officeDocument/2006/math" xmlns="" val="1"/>
             </a:ext>
           </a:extLst>
         </p:spPr>
@@ -3911,7 +3919,7 @@
             <a:effectLst/>
             <a:extLst>
               <a:ext uri="{C572A759-6A51-4108-AA02-DFA0A04FC94B}">
-                <ma14:wrappingTextBoxFlag xmlns="" xmlns:m="http://schemas.openxmlformats.org/officeDocument/2006/math" xmlns:a14="http://schemas.microsoft.com/office/drawing/2010/main" xmlns:ma14="http://schemas.microsoft.com/office/mac/drawingml/2011/main" val="1"/>
+                <ma14:wrappingTextBoxFlag xmlns:ma14="http://schemas.microsoft.com/office/mac/drawingml/2011/main" xmlns:a14="http://schemas.microsoft.com/office/drawing/2010/main" xmlns:m="http://schemas.openxmlformats.org/officeDocument/2006/math" xmlns="" val="1"/>
               </a:ext>
             </a:extLst>
           </p:spPr>
@@ -4314,7 +4322,7 @@
             <a:effectLst/>
             <a:extLst>
               <a:ext uri="{C572A759-6A51-4108-AA02-DFA0A04FC94B}">
-                <ma14:wrappingTextBoxFlag xmlns="" xmlns:m="http://schemas.openxmlformats.org/officeDocument/2006/math" xmlns:a14="http://schemas.microsoft.com/office/drawing/2010/main" xmlns:ma14="http://schemas.microsoft.com/office/mac/drawingml/2011/main" val="1"/>
+                <ma14:wrappingTextBoxFlag xmlns:ma14="http://schemas.microsoft.com/office/mac/drawingml/2011/main" xmlns:a14="http://schemas.microsoft.com/office/drawing/2010/main" xmlns:m="http://schemas.openxmlformats.org/officeDocument/2006/math" xmlns="" val="1"/>
               </a:ext>
             </a:extLst>
           </p:spPr>
@@ -4456,7 +4464,7 @@
             <a:effectLst/>
             <a:extLst>
               <a:ext uri="{C572A759-6A51-4108-AA02-DFA0A04FC94B}">
-                <ma14:wrappingTextBoxFlag xmlns="" xmlns:m="http://schemas.openxmlformats.org/officeDocument/2006/math" xmlns:a14="http://schemas.microsoft.com/office/drawing/2010/main" xmlns:ma14="http://schemas.microsoft.com/office/mac/drawingml/2011/main" val="1"/>
+                <ma14:wrappingTextBoxFlag xmlns:ma14="http://schemas.microsoft.com/office/mac/drawingml/2011/main" xmlns:a14="http://schemas.microsoft.com/office/drawing/2010/main" xmlns:m="http://schemas.openxmlformats.org/officeDocument/2006/math" xmlns="" val="1"/>
               </a:ext>
             </a:extLst>
           </p:spPr>
@@ -4561,7 +4569,7 @@
             <a:effectLst/>
             <a:extLst>
               <a:ext uri="{C572A759-6A51-4108-AA02-DFA0A04FC94B}">
-                <ma14:wrappingTextBoxFlag xmlns="" xmlns:m="http://schemas.openxmlformats.org/officeDocument/2006/math" xmlns:a14="http://schemas.microsoft.com/office/drawing/2010/main" xmlns:ma14="http://schemas.microsoft.com/office/mac/drawingml/2011/main" val="1"/>
+                <ma14:wrappingTextBoxFlag xmlns:ma14="http://schemas.microsoft.com/office/mac/drawingml/2011/main" xmlns:a14="http://schemas.microsoft.com/office/drawing/2010/main" xmlns:m="http://schemas.openxmlformats.org/officeDocument/2006/math" xmlns="" val="1"/>
               </a:ext>
             </a:extLst>
           </p:spPr>
@@ -4696,7 +4704,7 @@
             <a:effectLst/>
             <a:extLst>
               <a:ext uri="{C572A759-6A51-4108-AA02-DFA0A04FC94B}">
-                <ma14:wrappingTextBoxFlag xmlns="" xmlns:m="http://schemas.openxmlformats.org/officeDocument/2006/math" xmlns:a14="http://schemas.microsoft.com/office/drawing/2010/main" xmlns:ma14="http://schemas.microsoft.com/office/mac/drawingml/2011/main" val="1"/>
+                <ma14:wrappingTextBoxFlag xmlns:ma14="http://schemas.microsoft.com/office/mac/drawingml/2011/main" xmlns:a14="http://schemas.microsoft.com/office/drawing/2010/main" xmlns:m="http://schemas.openxmlformats.org/officeDocument/2006/math" xmlns="" val="1"/>
               </a:ext>
             </a:extLst>
           </p:spPr>
@@ -4831,7 +4839,7 @@
             <a:effectLst/>
             <a:extLst>
               <a:ext uri="{C572A759-6A51-4108-AA02-DFA0A04FC94B}">
-                <ma14:wrappingTextBoxFlag xmlns="" xmlns:m="http://schemas.openxmlformats.org/officeDocument/2006/math" xmlns:a14="http://schemas.microsoft.com/office/drawing/2010/main" xmlns:ma14="http://schemas.microsoft.com/office/mac/drawingml/2011/main" val="1"/>
+                <ma14:wrappingTextBoxFlag xmlns:ma14="http://schemas.microsoft.com/office/mac/drawingml/2011/main" xmlns:a14="http://schemas.microsoft.com/office/drawing/2010/main" xmlns:m="http://schemas.openxmlformats.org/officeDocument/2006/math" xmlns="" val="1"/>
               </a:ext>
             </a:extLst>
           </p:spPr>
@@ -4949,7 +4957,7 @@
             <a:effectLst/>
             <a:extLst>
               <a:ext uri="{C572A759-6A51-4108-AA02-DFA0A04FC94B}">
-                <ma14:wrappingTextBoxFlag xmlns="" xmlns:m="http://schemas.openxmlformats.org/officeDocument/2006/math" xmlns:a14="http://schemas.microsoft.com/office/drawing/2010/main" xmlns:ma14="http://schemas.microsoft.com/office/mac/drawingml/2011/main" val="1"/>
+                <ma14:wrappingTextBoxFlag xmlns:ma14="http://schemas.microsoft.com/office/mac/drawingml/2011/main" xmlns:a14="http://schemas.microsoft.com/office/drawing/2010/main" xmlns:m="http://schemas.openxmlformats.org/officeDocument/2006/math" xmlns="" val="1"/>
               </a:ext>
             </a:extLst>
           </p:spPr>
@@ -5160,7 +5168,7 @@
           </a:ln>
           <a:extLst>
             <a:ext uri="{C572A759-6A51-4108-AA02-DFA0A04FC94B}">
-              <ma14:wrappingTextBoxFlag xmlns="" xmlns:m="http://schemas.openxmlformats.org/officeDocument/2006/math" xmlns:a14="http://schemas.microsoft.com/office/drawing/2010/main" xmlns:ma14="http://schemas.microsoft.com/office/mac/drawingml/2011/main" val="1"/>
+              <ma14:wrappingTextBoxFlag xmlns:ma14="http://schemas.microsoft.com/office/mac/drawingml/2011/main" xmlns:a14="http://schemas.microsoft.com/office/drawing/2010/main" xmlns:m="http://schemas.openxmlformats.org/officeDocument/2006/math" xmlns="" val="1"/>
             </a:ext>
           </a:extLst>
         </p:spPr>
@@ -5287,7 +5295,7 @@
             <a:effectLst/>
             <a:extLst>
               <a:ext uri="{C572A759-6A51-4108-AA02-DFA0A04FC94B}">
-                <ma14:wrappingTextBoxFlag xmlns="" xmlns:m="http://schemas.openxmlformats.org/officeDocument/2006/math" xmlns:a14="http://schemas.microsoft.com/office/drawing/2010/main" xmlns:ma14="http://schemas.microsoft.com/office/mac/drawingml/2011/main" val="1"/>
+                <ma14:wrappingTextBoxFlag xmlns:ma14="http://schemas.microsoft.com/office/mac/drawingml/2011/main" xmlns:a14="http://schemas.microsoft.com/office/drawing/2010/main" xmlns:m="http://schemas.openxmlformats.org/officeDocument/2006/math" xmlns="" val="1"/>
               </a:ext>
             </a:extLst>
           </p:spPr>
@@ -5434,7 +5442,7 @@
             <a:effectLst/>
             <a:extLst>
               <a:ext uri="{C572A759-6A51-4108-AA02-DFA0A04FC94B}">
-                <ma14:wrappingTextBoxFlag xmlns="" xmlns:m="http://schemas.openxmlformats.org/officeDocument/2006/math" xmlns:a14="http://schemas.microsoft.com/office/drawing/2010/main" xmlns:ma14="http://schemas.microsoft.com/office/mac/drawingml/2011/main" val="1"/>
+                <ma14:wrappingTextBoxFlag xmlns:ma14="http://schemas.microsoft.com/office/mac/drawingml/2011/main" xmlns:a14="http://schemas.microsoft.com/office/drawing/2010/main" xmlns:m="http://schemas.openxmlformats.org/officeDocument/2006/math" xmlns="" val="1"/>
               </a:ext>
             </a:extLst>
           </p:spPr>
@@ -5574,7 +5582,7 @@
             <a:effectLst/>
             <a:extLst>
               <a:ext uri="{C572A759-6A51-4108-AA02-DFA0A04FC94B}">
-                <ma14:wrappingTextBoxFlag xmlns="" xmlns:m="http://schemas.openxmlformats.org/officeDocument/2006/math" xmlns:a14="http://schemas.microsoft.com/office/drawing/2010/main" xmlns:ma14="http://schemas.microsoft.com/office/mac/drawingml/2011/main" val="1"/>
+                <ma14:wrappingTextBoxFlag xmlns:ma14="http://schemas.microsoft.com/office/mac/drawingml/2011/main" xmlns:a14="http://schemas.microsoft.com/office/drawing/2010/main" xmlns:m="http://schemas.openxmlformats.org/officeDocument/2006/math" xmlns="" val="1"/>
               </a:ext>
             </a:extLst>
           </p:spPr>
@@ -5679,7 +5687,7 @@
             <a:effectLst/>
             <a:extLst>
               <a:ext uri="{C572A759-6A51-4108-AA02-DFA0A04FC94B}">
-                <ma14:wrappingTextBoxFlag xmlns="" xmlns:m="http://schemas.openxmlformats.org/officeDocument/2006/math" xmlns:a14="http://schemas.microsoft.com/office/drawing/2010/main" xmlns:ma14="http://schemas.microsoft.com/office/mac/drawingml/2011/main" val="1"/>
+                <ma14:wrappingTextBoxFlag xmlns:ma14="http://schemas.microsoft.com/office/mac/drawingml/2011/main" xmlns:a14="http://schemas.microsoft.com/office/drawing/2010/main" xmlns:m="http://schemas.openxmlformats.org/officeDocument/2006/math" xmlns="" val="1"/>
               </a:ext>
             </a:extLst>
           </p:spPr>
@@ -5814,7 +5822,7 @@
             <a:effectLst/>
             <a:extLst>
               <a:ext uri="{C572A759-6A51-4108-AA02-DFA0A04FC94B}">
-                <ma14:wrappingTextBoxFlag xmlns="" xmlns:m="http://schemas.openxmlformats.org/officeDocument/2006/math" xmlns:a14="http://schemas.microsoft.com/office/drawing/2010/main" xmlns:ma14="http://schemas.microsoft.com/office/mac/drawingml/2011/main" val="1"/>
+                <ma14:wrappingTextBoxFlag xmlns:ma14="http://schemas.microsoft.com/office/mac/drawingml/2011/main" xmlns:a14="http://schemas.microsoft.com/office/drawing/2010/main" xmlns:m="http://schemas.openxmlformats.org/officeDocument/2006/math" xmlns="" val="1"/>
               </a:ext>
             </a:extLst>
           </p:spPr>
@@ -5949,7 +5957,7 @@
             <a:effectLst/>
             <a:extLst>
               <a:ext uri="{C572A759-6A51-4108-AA02-DFA0A04FC94B}">
-                <ma14:wrappingTextBoxFlag xmlns="" xmlns:m="http://schemas.openxmlformats.org/officeDocument/2006/math" xmlns:a14="http://schemas.microsoft.com/office/drawing/2010/main" xmlns:ma14="http://schemas.microsoft.com/office/mac/drawingml/2011/main" val="1"/>
+                <ma14:wrappingTextBoxFlag xmlns:ma14="http://schemas.microsoft.com/office/mac/drawingml/2011/main" xmlns:a14="http://schemas.microsoft.com/office/drawing/2010/main" xmlns:m="http://schemas.openxmlformats.org/officeDocument/2006/math" xmlns="" val="1"/>
               </a:ext>
             </a:extLst>
           </p:spPr>
@@ -6067,7 +6075,7 @@
             <a:effectLst/>
             <a:extLst>
               <a:ext uri="{C572A759-6A51-4108-AA02-DFA0A04FC94B}">
-                <ma14:wrappingTextBoxFlag xmlns="" xmlns:m="http://schemas.openxmlformats.org/officeDocument/2006/math" xmlns:a14="http://schemas.microsoft.com/office/drawing/2010/main" xmlns:ma14="http://schemas.microsoft.com/office/mac/drawingml/2011/main" val="1"/>
+                <ma14:wrappingTextBoxFlag xmlns:ma14="http://schemas.microsoft.com/office/mac/drawingml/2011/main" xmlns:a14="http://schemas.microsoft.com/office/drawing/2010/main" xmlns:m="http://schemas.openxmlformats.org/officeDocument/2006/math" xmlns="" val="1"/>
               </a:ext>
             </a:extLst>
           </p:spPr>
@@ -6278,7 +6286,7 @@
           </a:ln>
           <a:extLst>
             <a:ext uri="{C572A759-6A51-4108-AA02-DFA0A04FC94B}">
-              <ma14:wrappingTextBoxFlag xmlns="" xmlns:m="http://schemas.openxmlformats.org/officeDocument/2006/math" xmlns:a14="http://schemas.microsoft.com/office/drawing/2010/main" xmlns:ma14="http://schemas.microsoft.com/office/mac/drawingml/2011/main" val="1"/>
+              <ma14:wrappingTextBoxFlag xmlns:ma14="http://schemas.microsoft.com/office/mac/drawingml/2011/main" xmlns:a14="http://schemas.microsoft.com/office/drawing/2010/main" xmlns:m="http://schemas.openxmlformats.org/officeDocument/2006/math" xmlns="" val="1"/>
             </a:ext>
           </a:extLst>
         </p:spPr>
@@ -6405,7 +6413,7 @@
             <a:effectLst/>
             <a:extLst>
               <a:ext uri="{C572A759-6A51-4108-AA02-DFA0A04FC94B}">
-                <ma14:wrappingTextBoxFlag xmlns="" xmlns:m="http://schemas.openxmlformats.org/officeDocument/2006/math" xmlns:a14="http://schemas.microsoft.com/office/drawing/2010/main" xmlns:ma14="http://schemas.microsoft.com/office/mac/drawingml/2011/main" val="1"/>
+                <ma14:wrappingTextBoxFlag xmlns:ma14="http://schemas.microsoft.com/office/mac/drawingml/2011/main" xmlns:a14="http://schemas.microsoft.com/office/drawing/2010/main" xmlns:m="http://schemas.openxmlformats.org/officeDocument/2006/math" xmlns="" val="1"/>
               </a:ext>
             </a:extLst>
           </p:spPr>
@@ -6489,7 +6497,7 @@
           </a:ln>
           <a:extLst>
             <a:ext uri="{C572A759-6A51-4108-AA02-DFA0A04FC94B}">
-              <ma14:wrappingTextBoxFlag xmlns="" xmlns:m="http://schemas.openxmlformats.org/officeDocument/2006/math" xmlns:a14="http://schemas.microsoft.com/office/drawing/2010/main" xmlns:ma14="http://schemas.microsoft.com/office/mac/drawingml/2011/main" val="1"/>
+              <ma14:wrappingTextBoxFlag xmlns:ma14="http://schemas.microsoft.com/office/mac/drawingml/2011/main" xmlns:a14="http://schemas.microsoft.com/office/drawing/2010/main" xmlns:m="http://schemas.openxmlformats.org/officeDocument/2006/math" xmlns="" val="1"/>
             </a:ext>
           </a:extLst>
         </p:spPr>
@@ -6611,7 +6619,7 @@
             <a:effectLst/>
             <a:extLst>
               <a:ext uri="{C572A759-6A51-4108-AA02-DFA0A04FC94B}">
-                <ma14:wrappingTextBoxFlag xmlns="" xmlns:m="http://schemas.openxmlformats.org/officeDocument/2006/math" xmlns:a14="http://schemas.microsoft.com/office/drawing/2010/main" xmlns:ma14="http://schemas.microsoft.com/office/mac/drawingml/2011/main" val="1"/>
+                <ma14:wrappingTextBoxFlag xmlns:ma14="http://schemas.microsoft.com/office/mac/drawingml/2011/main" xmlns:a14="http://schemas.microsoft.com/office/drawing/2010/main" xmlns:m="http://schemas.openxmlformats.org/officeDocument/2006/math" xmlns="" val="1"/>
               </a:ext>
             </a:extLst>
           </p:spPr>
@@ -6764,7 +6772,7 @@
           </a:ln>
           <a:extLst>
             <a:ext uri="{C572A759-6A51-4108-AA02-DFA0A04FC94B}">
-              <ma14:wrappingTextBoxFlag xmlns="" xmlns:m="http://schemas.openxmlformats.org/officeDocument/2006/math" xmlns:a14="http://schemas.microsoft.com/office/drawing/2010/main" xmlns:ma14="http://schemas.microsoft.com/office/mac/drawingml/2011/main" val="1"/>
+              <ma14:wrappingTextBoxFlag xmlns:ma14="http://schemas.microsoft.com/office/mac/drawingml/2011/main" xmlns:a14="http://schemas.microsoft.com/office/drawing/2010/main" xmlns:m="http://schemas.openxmlformats.org/officeDocument/2006/math" xmlns="" val="1"/>
             </a:ext>
           </a:extLst>
         </p:spPr>
@@ -7316,7 +7324,7 @@
           </a:ln>
           <a:extLst>
             <a:ext uri="{C572A759-6A51-4108-AA02-DFA0A04FC94B}">
-              <ma14:wrappingTextBoxFlag xmlns="" xmlns:m="http://schemas.openxmlformats.org/officeDocument/2006/math" xmlns:a14="http://schemas.microsoft.com/office/drawing/2010/main" xmlns:ma14="http://schemas.microsoft.com/office/mac/drawingml/2011/main" val="1"/>
+              <ma14:wrappingTextBoxFlag xmlns:ma14="http://schemas.microsoft.com/office/mac/drawingml/2011/main" xmlns:a14="http://schemas.microsoft.com/office/drawing/2010/main" xmlns:m="http://schemas.openxmlformats.org/officeDocument/2006/math" xmlns="" val="1"/>
             </a:ext>
           </a:extLst>
         </p:spPr>
@@ -7417,7 +7425,7 @@
             <a:effectLst/>
             <a:extLst>
               <a:ext uri="{C572A759-6A51-4108-AA02-DFA0A04FC94B}">
-                <ma14:wrappingTextBoxFlag xmlns="" xmlns:m="http://schemas.openxmlformats.org/officeDocument/2006/math" xmlns:a14="http://schemas.microsoft.com/office/drawing/2010/main" xmlns:ma14="http://schemas.microsoft.com/office/mac/drawingml/2011/main" val="1"/>
+                <ma14:wrappingTextBoxFlag xmlns:ma14="http://schemas.microsoft.com/office/mac/drawingml/2011/main" xmlns:a14="http://schemas.microsoft.com/office/drawing/2010/main" xmlns:m="http://schemas.openxmlformats.org/officeDocument/2006/math" xmlns="" val="1"/>
               </a:ext>
             </a:extLst>
           </p:spPr>
@@ -7522,7 +7530,7 @@
           </a:ln>
           <a:extLst>
             <a:ext uri="{C572A759-6A51-4108-AA02-DFA0A04FC94B}">
-              <ma14:wrappingTextBoxFlag xmlns="" xmlns:m="http://schemas.openxmlformats.org/officeDocument/2006/math" xmlns:a14="http://schemas.microsoft.com/office/drawing/2010/main" xmlns:ma14="http://schemas.microsoft.com/office/mac/drawingml/2011/main" val="1"/>
+              <ma14:wrappingTextBoxFlag xmlns:ma14="http://schemas.microsoft.com/office/mac/drawingml/2011/main" xmlns:a14="http://schemas.microsoft.com/office/drawing/2010/main" xmlns:m="http://schemas.openxmlformats.org/officeDocument/2006/math" xmlns="" val="1"/>
             </a:ext>
           </a:extLst>
         </p:spPr>
@@ -7751,7 +7759,7 @@
           </a:ln>
           <a:extLst>
             <a:ext uri="{C572A759-6A51-4108-AA02-DFA0A04FC94B}">
-              <ma14:wrappingTextBoxFlag xmlns="" xmlns:m="http://schemas.openxmlformats.org/officeDocument/2006/math" xmlns:a14="http://schemas.microsoft.com/office/drawing/2010/main" xmlns:ma14="http://schemas.microsoft.com/office/mac/drawingml/2011/main" val="1"/>
+              <ma14:wrappingTextBoxFlag xmlns:ma14="http://schemas.microsoft.com/office/mac/drawingml/2011/main" xmlns:a14="http://schemas.microsoft.com/office/drawing/2010/main" xmlns:m="http://schemas.openxmlformats.org/officeDocument/2006/math" xmlns="" val="1"/>
             </a:ext>
           </a:extLst>
         </p:spPr>
@@ -8033,7 +8041,7 @@
           </a:ln>
           <a:extLst>
             <a:ext uri="{C572A759-6A51-4108-AA02-DFA0A04FC94B}">
-              <ma14:wrappingTextBoxFlag xmlns="" xmlns:m="http://schemas.openxmlformats.org/officeDocument/2006/math" xmlns:a14="http://schemas.microsoft.com/office/drawing/2010/main" xmlns:ma14="http://schemas.microsoft.com/office/mac/drawingml/2011/main" val="1"/>
+              <ma14:wrappingTextBoxFlag xmlns:ma14="http://schemas.microsoft.com/office/mac/drawingml/2011/main" xmlns:a14="http://schemas.microsoft.com/office/drawing/2010/main" xmlns:m="http://schemas.openxmlformats.org/officeDocument/2006/math" xmlns="" val="1"/>
             </a:ext>
           </a:extLst>
         </p:spPr>
@@ -8464,7 +8472,7 @@
             <a:effectLst/>
             <a:extLst>
               <a:ext uri="{C572A759-6A51-4108-AA02-DFA0A04FC94B}">
-                <ma14:wrappingTextBoxFlag xmlns="" xmlns:m="http://schemas.openxmlformats.org/officeDocument/2006/math" xmlns:a14="http://schemas.microsoft.com/office/drawing/2010/main" xmlns:ma14="http://schemas.microsoft.com/office/mac/drawingml/2011/main" val="1"/>
+                <ma14:wrappingTextBoxFlag xmlns:ma14="http://schemas.microsoft.com/office/mac/drawingml/2011/main" xmlns:a14="http://schemas.microsoft.com/office/drawing/2010/main" xmlns:m="http://schemas.openxmlformats.org/officeDocument/2006/math" xmlns="" val="1"/>
               </a:ext>
             </a:extLst>
           </p:spPr>
@@ -8541,7 +8549,7 @@
           </a:ln>
           <a:extLst>
             <a:ext uri="{C572A759-6A51-4108-AA02-DFA0A04FC94B}">
-              <ma14:wrappingTextBoxFlag xmlns="" xmlns:m="http://schemas.openxmlformats.org/officeDocument/2006/math" xmlns:a14="http://schemas.microsoft.com/office/drawing/2010/main" xmlns:ma14="http://schemas.microsoft.com/office/mac/drawingml/2011/main" val="1"/>
+              <ma14:wrappingTextBoxFlag xmlns:ma14="http://schemas.microsoft.com/office/mac/drawingml/2011/main" xmlns:a14="http://schemas.microsoft.com/office/drawing/2010/main" xmlns:m="http://schemas.openxmlformats.org/officeDocument/2006/math" xmlns="" val="1"/>
             </a:ext>
           </a:extLst>
         </p:spPr>
@@ -8717,7 +8725,7 @@
           </a:ln>
           <a:extLst>
             <a:ext uri="{C572A759-6A51-4108-AA02-DFA0A04FC94B}">
-              <ma14:wrappingTextBoxFlag xmlns="" xmlns:m="http://schemas.openxmlformats.org/officeDocument/2006/math" xmlns:a14="http://schemas.microsoft.com/office/drawing/2010/main" xmlns:ma14="http://schemas.microsoft.com/office/mac/drawingml/2011/main" val="1"/>
+              <ma14:wrappingTextBoxFlag xmlns:ma14="http://schemas.microsoft.com/office/mac/drawingml/2011/main" xmlns:a14="http://schemas.microsoft.com/office/drawing/2010/main" xmlns:m="http://schemas.openxmlformats.org/officeDocument/2006/math" xmlns="" val="1"/>
             </a:ext>
           </a:extLst>
         </p:spPr>
@@ -8937,7 +8945,7 @@
           </a:ln>
           <a:extLst>
             <a:ext uri="{C572A759-6A51-4108-AA02-DFA0A04FC94B}">
-              <ma14:wrappingTextBoxFlag xmlns="" xmlns:m="http://schemas.openxmlformats.org/officeDocument/2006/math" xmlns:a14="http://schemas.microsoft.com/office/drawing/2010/main" xmlns:ma14="http://schemas.microsoft.com/office/mac/drawingml/2011/main" val="1"/>
+              <ma14:wrappingTextBoxFlag xmlns:ma14="http://schemas.microsoft.com/office/mac/drawingml/2011/main" xmlns:a14="http://schemas.microsoft.com/office/drawing/2010/main" xmlns:m="http://schemas.openxmlformats.org/officeDocument/2006/math" xmlns="" val="1"/>
             </a:ext>
           </a:extLst>
         </p:spPr>
@@ -9127,7 +9135,7 @@
           </a:ln>
           <a:extLst>
             <a:ext uri="{C572A759-6A51-4108-AA02-DFA0A04FC94B}">
-              <ma14:wrappingTextBoxFlag xmlns="" xmlns:m="http://schemas.openxmlformats.org/officeDocument/2006/math" xmlns:a14="http://schemas.microsoft.com/office/drawing/2010/main" xmlns:ma14="http://schemas.microsoft.com/office/mac/drawingml/2011/main" val="1"/>
+              <ma14:wrappingTextBoxFlag xmlns:ma14="http://schemas.microsoft.com/office/mac/drawingml/2011/main" xmlns:a14="http://schemas.microsoft.com/office/drawing/2010/main" xmlns:m="http://schemas.openxmlformats.org/officeDocument/2006/math" xmlns="" val="1"/>
             </a:ext>
           </a:extLst>
         </p:spPr>
@@ -9170,7 +9178,7 @@
           </a:ln>
           <a:extLst>
             <a:ext uri="{C572A759-6A51-4108-AA02-DFA0A04FC94B}">
-              <ma14:wrappingTextBoxFlag xmlns="" xmlns:m="http://schemas.openxmlformats.org/officeDocument/2006/math" xmlns:a14="http://schemas.microsoft.com/office/drawing/2010/main" xmlns:ma14="http://schemas.microsoft.com/office/mac/drawingml/2011/main" val="1"/>
+              <ma14:wrappingTextBoxFlag xmlns:ma14="http://schemas.microsoft.com/office/mac/drawingml/2011/main" xmlns:a14="http://schemas.microsoft.com/office/drawing/2010/main" xmlns:m="http://schemas.openxmlformats.org/officeDocument/2006/math" xmlns="" val="1"/>
             </a:ext>
           </a:extLst>
         </p:spPr>
@@ -9213,7 +9221,7 @@
           </a:ln>
           <a:extLst>
             <a:ext uri="{C572A759-6A51-4108-AA02-DFA0A04FC94B}">
-              <ma14:wrappingTextBoxFlag xmlns="" xmlns:m="http://schemas.openxmlformats.org/officeDocument/2006/math" xmlns:a14="http://schemas.microsoft.com/office/drawing/2010/main" xmlns:ma14="http://schemas.microsoft.com/office/mac/drawingml/2011/main" val="1"/>
+              <ma14:wrappingTextBoxFlag xmlns:ma14="http://schemas.microsoft.com/office/mac/drawingml/2011/main" xmlns:a14="http://schemas.microsoft.com/office/drawing/2010/main" xmlns:m="http://schemas.openxmlformats.org/officeDocument/2006/math" xmlns="" val="1"/>
             </a:ext>
           </a:extLst>
         </p:spPr>
@@ -9256,7 +9264,7 @@
           </a:ln>
           <a:extLst>
             <a:ext uri="{C572A759-6A51-4108-AA02-DFA0A04FC94B}">
-              <ma14:wrappingTextBoxFlag xmlns="" xmlns:m="http://schemas.openxmlformats.org/officeDocument/2006/math" xmlns:a14="http://schemas.microsoft.com/office/drawing/2010/main" xmlns:ma14="http://schemas.microsoft.com/office/mac/drawingml/2011/main" val="1"/>
+              <ma14:wrappingTextBoxFlag xmlns:ma14="http://schemas.microsoft.com/office/mac/drawingml/2011/main" xmlns:a14="http://schemas.microsoft.com/office/drawing/2010/main" xmlns:m="http://schemas.openxmlformats.org/officeDocument/2006/math" xmlns="" val="1"/>
             </a:ext>
           </a:extLst>
         </p:spPr>
@@ -9299,7 +9307,7 @@
           </a:ln>
           <a:extLst>
             <a:ext uri="{C572A759-6A51-4108-AA02-DFA0A04FC94B}">
-              <ma14:wrappingTextBoxFlag xmlns="" xmlns:m="http://schemas.openxmlformats.org/officeDocument/2006/math" xmlns:a14="http://schemas.microsoft.com/office/drawing/2010/main" xmlns:ma14="http://schemas.microsoft.com/office/mac/drawingml/2011/main" val="1"/>
+              <ma14:wrappingTextBoxFlag xmlns:ma14="http://schemas.microsoft.com/office/mac/drawingml/2011/main" xmlns:a14="http://schemas.microsoft.com/office/drawing/2010/main" xmlns:m="http://schemas.openxmlformats.org/officeDocument/2006/math" xmlns="" val="1"/>
             </a:ext>
           </a:extLst>
         </p:spPr>
@@ -10083,7 +10091,7 @@
           </a:ln>
           <a:extLst>
             <a:ext uri="{C572A759-6A51-4108-AA02-DFA0A04FC94B}">
-              <ma14:wrappingTextBoxFlag xmlns="" xmlns:m="http://schemas.openxmlformats.org/officeDocument/2006/math" xmlns:a14="http://schemas.microsoft.com/office/drawing/2010/main" xmlns:ma14="http://schemas.microsoft.com/office/mac/drawingml/2011/main" val="1"/>
+              <ma14:wrappingTextBoxFlag xmlns:ma14="http://schemas.microsoft.com/office/mac/drawingml/2011/main" xmlns:a14="http://schemas.microsoft.com/office/drawing/2010/main" xmlns:m="http://schemas.openxmlformats.org/officeDocument/2006/math" xmlns="" val="1"/>
             </a:ext>
           </a:extLst>
         </p:spPr>
@@ -10245,7 +10253,7 @@
           </a:ln>
           <a:extLst>
             <a:ext uri="{C572A759-6A51-4108-AA02-DFA0A04FC94B}">
-              <ma14:wrappingTextBoxFlag xmlns="" xmlns:m="http://schemas.openxmlformats.org/officeDocument/2006/math" xmlns:a14="http://schemas.microsoft.com/office/drawing/2010/main" xmlns:ma14="http://schemas.microsoft.com/office/mac/drawingml/2011/main" val="1"/>
+              <ma14:wrappingTextBoxFlag xmlns:ma14="http://schemas.microsoft.com/office/mac/drawingml/2011/main" xmlns:a14="http://schemas.microsoft.com/office/drawing/2010/main" xmlns:m="http://schemas.openxmlformats.org/officeDocument/2006/math" xmlns="" val="1"/>
             </a:ext>
           </a:extLst>
         </p:spPr>
@@ -10393,7 +10401,7 @@
             <a:effectLst/>
             <a:extLst>
               <a:ext uri="{C572A759-6A51-4108-AA02-DFA0A04FC94B}">
-                <ma14:wrappingTextBoxFlag xmlns="" xmlns:m="http://schemas.openxmlformats.org/officeDocument/2006/math" xmlns:a14="http://schemas.microsoft.com/office/drawing/2010/main" xmlns:ma14="http://schemas.microsoft.com/office/mac/drawingml/2011/main" val="1"/>
+                <ma14:wrappingTextBoxFlag xmlns:ma14="http://schemas.microsoft.com/office/mac/drawingml/2011/main" xmlns:a14="http://schemas.microsoft.com/office/drawing/2010/main" xmlns:m="http://schemas.openxmlformats.org/officeDocument/2006/math" xmlns="" val="1"/>
               </a:ext>
             </a:extLst>
           </p:spPr>
@@ -10495,7 +10503,7 @@
             <a:effectLst/>
             <a:extLst>
               <a:ext uri="{C572A759-6A51-4108-AA02-DFA0A04FC94B}">
-                <ma14:wrappingTextBoxFlag xmlns="" xmlns:m="http://schemas.openxmlformats.org/officeDocument/2006/math" xmlns:a14="http://schemas.microsoft.com/office/drawing/2010/main" xmlns:ma14="http://schemas.microsoft.com/office/mac/drawingml/2011/main" val="1"/>
+                <ma14:wrappingTextBoxFlag xmlns:ma14="http://schemas.microsoft.com/office/mac/drawingml/2011/main" xmlns:a14="http://schemas.microsoft.com/office/drawing/2010/main" xmlns:m="http://schemas.openxmlformats.org/officeDocument/2006/math" xmlns="" val="1"/>
               </a:ext>
             </a:extLst>
           </p:spPr>
@@ -10627,7 +10635,7 @@
             <a:effectLst/>
             <a:extLst>
               <a:ext uri="{C572A759-6A51-4108-AA02-DFA0A04FC94B}">
-                <ma14:wrappingTextBoxFlag xmlns="" xmlns:m="http://schemas.openxmlformats.org/officeDocument/2006/math" xmlns:a14="http://schemas.microsoft.com/office/drawing/2010/main" xmlns:ma14="http://schemas.microsoft.com/office/mac/drawingml/2011/main" val="1"/>
+                <ma14:wrappingTextBoxFlag xmlns:ma14="http://schemas.microsoft.com/office/mac/drawingml/2011/main" xmlns:a14="http://schemas.microsoft.com/office/drawing/2010/main" xmlns:m="http://schemas.openxmlformats.org/officeDocument/2006/math" xmlns="" val="1"/>
               </a:ext>
             </a:extLst>
           </p:spPr>
@@ -10759,7 +10767,7 @@
             <a:effectLst/>
             <a:extLst>
               <a:ext uri="{C572A759-6A51-4108-AA02-DFA0A04FC94B}">
-                <ma14:wrappingTextBoxFlag xmlns="" xmlns:m="http://schemas.openxmlformats.org/officeDocument/2006/math" xmlns:a14="http://schemas.microsoft.com/office/drawing/2010/main" xmlns:ma14="http://schemas.microsoft.com/office/mac/drawingml/2011/main" val="1"/>
+                <ma14:wrappingTextBoxFlag xmlns:ma14="http://schemas.microsoft.com/office/mac/drawingml/2011/main" xmlns:a14="http://schemas.microsoft.com/office/drawing/2010/main" xmlns:m="http://schemas.openxmlformats.org/officeDocument/2006/math" xmlns="" val="1"/>
               </a:ext>
             </a:extLst>
           </p:spPr>
@@ -10893,7 +10901,7 @@
           </a:ln>
           <a:extLst>
             <a:ext uri="{C572A759-6A51-4108-AA02-DFA0A04FC94B}">
-              <ma14:wrappingTextBoxFlag xmlns="" xmlns:m="http://schemas.openxmlformats.org/officeDocument/2006/math" xmlns:a14="http://schemas.microsoft.com/office/drawing/2010/main" xmlns:ma14="http://schemas.microsoft.com/office/mac/drawingml/2011/main" val="1"/>
+              <ma14:wrappingTextBoxFlag xmlns:ma14="http://schemas.microsoft.com/office/mac/drawingml/2011/main" xmlns:a14="http://schemas.microsoft.com/office/drawing/2010/main" xmlns:m="http://schemas.openxmlformats.org/officeDocument/2006/math" xmlns="" val="1"/>
             </a:ext>
           </a:extLst>
         </p:spPr>
@@ -10999,7 +11007,7 @@
           </a:ln>
           <a:extLst>
             <a:ext uri="{C572A759-6A51-4108-AA02-DFA0A04FC94B}">
-              <ma14:wrappingTextBoxFlag xmlns="" xmlns:m="http://schemas.openxmlformats.org/officeDocument/2006/math" xmlns:a14="http://schemas.microsoft.com/office/drawing/2010/main" xmlns:ma14="http://schemas.microsoft.com/office/mac/drawingml/2011/main" val="1"/>
+              <ma14:wrappingTextBoxFlag xmlns:ma14="http://schemas.microsoft.com/office/mac/drawingml/2011/main" xmlns:a14="http://schemas.microsoft.com/office/drawing/2010/main" xmlns:m="http://schemas.openxmlformats.org/officeDocument/2006/math" xmlns="" val="1"/>
             </a:ext>
           </a:extLst>
         </p:spPr>
@@ -11089,7 +11097,7 @@
           </a:ln>
           <a:extLst>
             <a:ext uri="{C572A759-6A51-4108-AA02-DFA0A04FC94B}">
-              <ma14:wrappingTextBoxFlag xmlns="" xmlns:m="http://schemas.openxmlformats.org/officeDocument/2006/math" xmlns:a14="http://schemas.microsoft.com/office/drawing/2010/main" xmlns:ma14="http://schemas.microsoft.com/office/mac/drawingml/2011/main" val="1"/>
+              <ma14:wrappingTextBoxFlag xmlns:ma14="http://schemas.microsoft.com/office/mac/drawingml/2011/main" xmlns:a14="http://schemas.microsoft.com/office/drawing/2010/main" xmlns:m="http://schemas.openxmlformats.org/officeDocument/2006/math" xmlns="" val="1"/>
             </a:ext>
           </a:extLst>
         </p:spPr>
@@ -11438,7 +11446,7 @@
             <a:effectLst/>
             <a:extLst>
               <a:ext uri="{C572A759-6A51-4108-AA02-DFA0A04FC94B}">
-                <ma14:wrappingTextBoxFlag xmlns="" xmlns:m="http://schemas.openxmlformats.org/officeDocument/2006/math" xmlns:a14="http://schemas.microsoft.com/office/drawing/2010/main" xmlns:ma14="http://schemas.microsoft.com/office/mac/drawingml/2011/main" val="1"/>
+                <ma14:wrappingTextBoxFlag xmlns:ma14="http://schemas.microsoft.com/office/mac/drawingml/2011/main" xmlns:a14="http://schemas.microsoft.com/office/drawing/2010/main" xmlns:m="http://schemas.openxmlformats.org/officeDocument/2006/math" xmlns="" val="1"/>
               </a:ext>
             </a:extLst>
           </p:spPr>
@@ -11600,7 +11608,7 @@
             <a:effectLst/>
             <a:extLst>
               <a:ext uri="{C572A759-6A51-4108-AA02-DFA0A04FC94B}">
-                <ma14:wrappingTextBoxFlag xmlns="" xmlns:m="http://schemas.openxmlformats.org/officeDocument/2006/math" xmlns:a14="http://schemas.microsoft.com/office/drawing/2010/main" xmlns:ma14="http://schemas.microsoft.com/office/mac/drawingml/2011/main" val="1"/>
+                <ma14:wrappingTextBoxFlag xmlns:ma14="http://schemas.microsoft.com/office/mac/drawingml/2011/main" xmlns:a14="http://schemas.microsoft.com/office/drawing/2010/main" xmlns:m="http://schemas.openxmlformats.org/officeDocument/2006/math" xmlns="" val="1"/>
               </a:ext>
             </a:extLst>
           </p:spPr>
@@ -11732,7 +11740,7 @@
             <a:effectLst/>
             <a:extLst>
               <a:ext uri="{C572A759-6A51-4108-AA02-DFA0A04FC94B}">
-                <ma14:wrappingTextBoxFlag xmlns="" xmlns:m="http://schemas.openxmlformats.org/officeDocument/2006/math" xmlns:a14="http://schemas.microsoft.com/office/drawing/2010/main" xmlns:ma14="http://schemas.microsoft.com/office/mac/drawingml/2011/main" val="1"/>
+                <ma14:wrappingTextBoxFlag xmlns:ma14="http://schemas.microsoft.com/office/mac/drawingml/2011/main" xmlns:a14="http://schemas.microsoft.com/office/drawing/2010/main" xmlns:m="http://schemas.openxmlformats.org/officeDocument/2006/math" xmlns="" val="1"/>
               </a:ext>
             </a:extLst>
           </p:spPr>
@@ -11952,7 +11960,7 @@
             <a:effectLst/>
             <a:extLst>
               <a:ext uri="{C572A759-6A51-4108-AA02-DFA0A04FC94B}">
-                <ma14:wrappingTextBoxFlag xmlns="" xmlns:m="http://schemas.openxmlformats.org/officeDocument/2006/math" xmlns:a14="http://schemas.microsoft.com/office/drawing/2010/main" xmlns:ma14="http://schemas.microsoft.com/office/mac/drawingml/2011/main" val="1"/>
+                <ma14:wrappingTextBoxFlag xmlns:ma14="http://schemas.microsoft.com/office/mac/drawingml/2011/main" xmlns:a14="http://schemas.microsoft.com/office/drawing/2010/main" xmlns:m="http://schemas.openxmlformats.org/officeDocument/2006/math" xmlns="" val="1"/>
               </a:ext>
             </a:extLst>
           </p:spPr>
@@ -12084,7 +12092,7 @@
             <a:effectLst/>
             <a:extLst>
               <a:ext uri="{C572A759-6A51-4108-AA02-DFA0A04FC94B}">
-                <ma14:wrappingTextBoxFlag xmlns="" xmlns:m="http://schemas.openxmlformats.org/officeDocument/2006/math" xmlns:a14="http://schemas.microsoft.com/office/drawing/2010/main" xmlns:ma14="http://schemas.microsoft.com/office/mac/drawingml/2011/main" val="1"/>
+                <ma14:wrappingTextBoxFlag xmlns:ma14="http://schemas.microsoft.com/office/mac/drawingml/2011/main" xmlns:a14="http://schemas.microsoft.com/office/drawing/2010/main" xmlns:m="http://schemas.openxmlformats.org/officeDocument/2006/math" xmlns="" val="1"/>
               </a:ext>
             </a:extLst>
           </p:spPr>
@@ -12334,7 +12342,7 @@
             <a:effectLst/>
             <a:extLst>
               <a:ext uri="{C572A759-6A51-4108-AA02-DFA0A04FC94B}">
-                <ma14:wrappingTextBoxFlag xmlns="" xmlns:m="http://schemas.openxmlformats.org/officeDocument/2006/math" xmlns:a14="http://schemas.microsoft.com/office/drawing/2010/main" xmlns:ma14="http://schemas.microsoft.com/office/mac/drawingml/2011/main" val="1"/>
+                <ma14:wrappingTextBoxFlag xmlns:ma14="http://schemas.microsoft.com/office/mac/drawingml/2011/main" xmlns:a14="http://schemas.microsoft.com/office/drawing/2010/main" xmlns:m="http://schemas.openxmlformats.org/officeDocument/2006/math" xmlns="" val="1"/>
               </a:ext>
             </a:extLst>
           </p:spPr>
@@ -12378,7 +12386,7 @@
           </a:ln>
           <a:extLst>
             <a:ext uri="{C572A759-6A51-4108-AA02-DFA0A04FC94B}">
-              <ma14:wrappingTextBoxFlag xmlns="" xmlns:m="http://schemas.openxmlformats.org/officeDocument/2006/math" xmlns:a14="http://schemas.microsoft.com/office/drawing/2010/main" xmlns:ma14="http://schemas.microsoft.com/office/mac/drawingml/2011/main" val="1"/>
+              <ma14:wrappingTextBoxFlag xmlns:ma14="http://schemas.microsoft.com/office/mac/drawingml/2011/main" xmlns:a14="http://schemas.microsoft.com/office/drawing/2010/main" xmlns:m="http://schemas.openxmlformats.org/officeDocument/2006/math" xmlns="" val="1"/>
             </a:ext>
           </a:extLst>
         </p:spPr>
@@ -12421,7 +12429,7 @@
           </a:ln>
           <a:extLst>
             <a:ext uri="{C572A759-6A51-4108-AA02-DFA0A04FC94B}">
-              <ma14:wrappingTextBoxFlag xmlns="" xmlns:m="http://schemas.openxmlformats.org/officeDocument/2006/math" xmlns:a14="http://schemas.microsoft.com/office/drawing/2010/main" xmlns:ma14="http://schemas.microsoft.com/office/mac/drawingml/2011/main" val="1"/>
+              <ma14:wrappingTextBoxFlag xmlns:ma14="http://schemas.microsoft.com/office/mac/drawingml/2011/main" xmlns:a14="http://schemas.microsoft.com/office/drawing/2010/main" xmlns:m="http://schemas.openxmlformats.org/officeDocument/2006/math" xmlns="" val="1"/>
             </a:ext>
           </a:extLst>
         </p:spPr>
@@ -12464,7 +12472,7 @@
           </a:ln>
           <a:extLst>
             <a:ext uri="{C572A759-6A51-4108-AA02-DFA0A04FC94B}">
-              <ma14:wrappingTextBoxFlag xmlns="" xmlns:m="http://schemas.openxmlformats.org/officeDocument/2006/math" xmlns:a14="http://schemas.microsoft.com/office/drawing/2010/main" xmlns:ma14="http://schemas.microsoft.com/office/mac/drawingml/2011/main" val="1"/>
+              <ma14:wrappingTextBoxFlag xmlns:ma14="http://schemas.microsoft.com/office/mac/drawingml/2011/main" xmlns:a14="http://schemas.microsoft.com/office/drawing/2010/main" xmlns:m="http://schemas.openxmlformats.org/officeDocument/2006/math" xmlns="" val="1"/>
             </a:ext>
           </a:extLst>
         </p:spPr>
@@ -12507,7 +12515,7 @@
           </a:ln>
           <a:extLst>
             <a:ext uri="{C572A759-6A51-4108-AA02-DFA0A04FC94B}">
-              <ma14:wrappingTextBoxFlag xmlns="" xmlns:m="http://schemas.openxmlformats.org/officeDocument/2006/math" xmlns:a14="http://schemas.microsoft.com/office/drawing/2010/main" xmlns:ma14="http://schemas.microsoft.com/office/mac/drawingml/2011/main" val="1"/>
+              <ma14:wrappingTextBoxFlag xmlns:ma14="http://schemas.microsoft.com/office/mac/drawingml/2011/main" xmlns:a14="http://schemas.microsoft.com/office/drawing/2010/main" xmlns:m="http://schemas.openxmlformats.org/officeDocument/2006/math" xmlns="" val="1"/>
             </a:ext>
           </a:extLst>
         </p:spPr>
@@ -12613,7 +12621,7 @@
           </a:ln>
           <a:extLst>
             <a:ext uri="{C572A759-6A51-4108-AA02-DFA0A04FC94B}">
-              <ma14:wrappingTextBoxFlag xmlns="" xmlns:m="http://schemas.openxmlformats.org/officeDocument/2006/math" xmlns:a14="http://schemas.microsoft.com/office/drawing/2010/main" xmlns:ma14="http://schemas.microsoft.com/office/mac/drawingml/2011/main" val="1"/>
+              <ma14:wrappingTextBoxFlag xmlns:ma14="http://schemas.microsoft.com/office/mac/drawingml/2011/main" xmlns:a14="http://schemas.microsoft.com/office/drawing/2010/main" xmlns:m="http://schemas.openxmlformats.org/officeDocument/2006/math" xmlns="" val="1"/>
             </a:ext>
           </a:extLst>
         </p:spPr>
@@ -12771,7 +12779,7 @@
           </a:ln>
           <a:extLst>
             <a:ext uri="{C572A759-6A51-4108-AA02-DFA0A04FC94B}">
-              <ma14:wrappingTextBoxFlag xmlns="" xmlns:m="http://schemas.openxmlformats.org/officeDocument/2006/math" xmlns:a14="http://schemas.microsoft.com/office/drawing/2010/main" xmlns:ma14="http://schemas.microsoft.com/office/mac/drawingml/2011/main" val="1"/>
+              <ma14:wrappingTextBoxFlag xmlns:ma14="http://schemas.microsoft.com/office/mac/drawingml/2011/main" xmlns:a14="http://schemas.microsoft.com/office/drawing/2010/main" xmlns:m="http://schemas.openxmlformats.org/officeDocument/2006/math" xmlns="" val="1"/>
             </a:ext>
           </a:extLst>
         </p:spPr>
@@ -13092,7 +13100,7 @@
             <a:effectLst/>
             <a:extLst>
               <a:ext uri="{C572A759-6A51-4108-AA02-DFA0A04FC94B}">
-                <ma14:wrappingTextBoxFlag xmlns="" xmlns:m="http://schemas.openxmlformats.org/officeDocument/2006/math" xmlns:a14="http://schemas.microsoft.com/office/drawing/2010/main" xmlns:ma14="http://schemas.microsoft.com/office/mac/drawingml/2011/main" val="1"/>
+                <ma14:wrappingTextBoxFlag xmlns:ma14="http://schemas.microsoft.com/office/mac/drawingml/2011/main" xmlns:a14="http://schemas.microsoft.com/office/drawing/2010/main" xmlns:m="http://schemas.openxmlformats.org/officeDocument/2006/math" xmlns="" val="1"/>
               </a:ext>
             </a:extLst>
           </p:spPr>
@@ -13432,7 +13440,7 @@
           </a:ln>
           <a:extLst>
             <a:ext uri="{C572A759-6A51-4108-AA02-DFA0A04FC94B}">
-              <ma14:wrappingTextBoxFlag xmlns="" xmlns:m="http://schemas.openxmlformats.org/officeDocument/2006/math" xmlns:a14="http://schemas.microsoft.com/office/drawing/2010/main" xmlns:ma14="http://schemas.microsoft.com/office/mac/drawingml/2011/main" val="1"/>
+              <ma14:wrappingTextBoxFlag xmlns:ma14="http://schemas.microsoft.com/office/mac/drawingml/2011/main" xmlns:a14="http://schemas.microsoft.com/office/drawing/2010/main" xmlns:m="http://schemas.openxmlformats.org/officeDocument/2006/math" xmlns="" val="1"/>
             </a:ext>
           </a:extLst>
         </p:spPr>
@@ -13493,7 +13501,7 @@
           </a:ln>
           <a:extLst>
             <a:ext uri="{C572A759-6A51-4108-AA02-DFA0A04FC94B}">
-              <ma14:wrappingTextBoxFlag xmlns="" xmlns:m="http://schemas.openxmlformats.org/officeDocument/2006/math" xmlns:a14="http://schemas.microsoft.com/office/drawing/2010/main" xmlns:ma14="http://schemas.microsoft.com/office/mac/drawingml/2011/main" val="1"/>
+              <ma14:wrappingTextBoxFlag xmlns:ma14="http://schemas.microsoft.com/office/mac/drawingml/2011/main" xmlns:a14="http://schemas.microsoft.com/office/drawing/2010/main" xmlns:m="http://schemas.openxmlformats.org/officeDocument/2006/math" xmlns="" val="1"/>
             </a:ext>
           </a:extLst>
         </p:spPr>
@@ -13594,7 +13602,7 @@
             <a:effectLst/>
             <a:extLst>
               <a:ext uri="{C572A759-6A51-4108-AA02-DFA0A04FC94B}">
-                <ma14:wrappingTextBoxFlag xmlns="" xmlns:m="http://schemas.openxmlformats.org/officeDocument/2006/math" xmlns:a14="http://schemas.microsoft.com/office/drawing/2010/main" xmlns:ma14="http://schemas.microsoft.com/office/mac/drawingml/2011/main" val="1"/>
+                <ma14:wrappingTextBoxFlag xmlns:ma14="http://schemas.microsoft.com/office/mac/drawingml/2011/main" xmlns:a14="http://schemas.microsoft.com/office/drawing/2010/main" xmlns:m="http://schemas.openxmlformats.org/officeDocument/2006/math" xmlns="" val="1"/>
               </a:ext>
             </a:extLst>
           </p:spPr>
@@ -13638,7 +13646,7 @@
           </a:ln>
           <a:extLst>
             <a:ext uri="{C572A759-6A51-4108-AA02-DFA0A04FC94B}">
-              <ma14:wrappingTextBoxFlag xmlns="" xmlns:m="http://schemas.openxmlformats.org/officeDocument/2006/math" xmlns:a14="http://schemas.microsoft.com/office/drawing/2010/main" xmlns:ma14="http://schemas.microsoft.com/office/mac/drawingml/2011/main" val="1"/>
+              <ma14:wrappingTextBoxFlag xmlns:ma14="http://schemas.microsoft.com/office/mac/drawingml/2011/main" xmlns:a14="http://schemas.microsoft.com/office/drawing/2010/main" xmlns:m="http://schemas.openxmlformats.org/officeDocument/2006/math" xmlns="" val="1"/>
             </a:ext>
           </a:extLst>
         </p:spPr>
@@ -13739,7 +13747,7 @@
             <a:effectLst/>
             <a:extLst>
               <a:ext uri="{C572A759-6A51-4108-AA02-DFA0A04FC94B}">
-                <ma14:wrappingTextBoxFlag xmlns="" xmlns:m="http://schemas.openxmlformats.org/officeDocument/2006/math" xmlns:a14="http://schemas.microsoft.com/office/drawing/2010/main" xmlns:ma14="http://schemas.microsoft.com/office/mac/drawingml/2011/main" val="1"/>
+                <ma14:wrappingTextBoxFlag xmlns:ma14="http://schemas.microsoft.com/office/mac/drawingml/2011/main" xmlns:a14="http://schemas.microsoft.com/office/drawing/2010/main" xmlns:m="http://schemas.openxmlformats.org/officeDocument/2006/math" xmlns="" val="1"/>
               </a:ext>
             </a:extLst>
           </p:spPr>
@@ -13841,7 +13849,7 @@
             <a:effectLst/>
             <a:extLst>
               <a:ext uri="{C572A759-6A51-4108-AA02-DFA0A04FC94B}">
-                <ma14:wrappingTextBoxFlag xmlns="" xmlns:m="http://schemas.openxmlformats.org/officeDocument/2006/math" xmlns:a14="http://schemas.microsoft.com/office/drawing/2010/main" xmlns:ma14="http://schemas.microsoft.com/office/mac/drawingml/2011/main" val="1"/>
+                <ma14:wrappingTextBoxFlag xmlns:ma14="http://schemas.microsoft.com/office/mac/drawingml/2011/main" xmlns:a14="http://schemas.microsoft.com/office/drawing/2010/main" xmlns:m="http://schemas.openxmlformats.org/officeDocument/2006/math" xmlns="" val="1"/>
               </a:ext>
             </a:extLst>
           </p:spPr>
@@ -13973,7 +13981,7 @@
             <a:effectLst/>
             <a:extLst>
               <a:ext uri="{C572A759-6A51-4108-AA02-DFA0A04FC94B}">
-                <ma14:wrappingTextBoxFlag xmlns="" xmlns:m="http://schemas.openxmlformats.org/officeDocument/2006/math" xmlns:a14="http://schemas.microsoft.com/office/drawing/2010/main" xmlns:ma14="http://schemas.microsoft.com/office/mac/drawingml/2011/main" val="1"/>
+                <ma14:wrappingTextBoxFlag xmlns:ma14="http://schemas.microsoft.com/office/mac/drawingml/2011/main" xmlns:a14="http://schemas.microsoft.com/office/drawing/2010/main" xmlns:m="http://schemas.openxmlformats.org/officeDocument/2006/math" xmlns="" val="1"/>
               </a:ext>
             </a:extLst>
           </p:spPr>
@@ -14100,7 +14108,7 @@
           </a:ln>
           <a:extLst>
             <a:ext uri="{C572A759-6A51-4108-AA02-DFA0A04FC94B}">
-              <ma14:wrappingTextBoxFlag xmlns="" xmlns:m="http://schemas.openxmlformats.org/officeDocument/2006/math" xmlns:a14="http://schemas.microsoft.com/office/drawing/2010/main" xmlns:ma14="http://schemas.microsoft.com/office/mac/drawingml/2011/main" val="1"/>
+              <ma14:wrappingTextBoxFlag xmlns:ma14="http://schemas.microsoft.com/office/mac/drawingml/2011/main" xmlns:a14="http://schemas.microsoft.com/office/drawing/2010/main" xmlns:m="http://schemas.openxmlformats.org/officeDocument/2006/math" xmlns="" val="1"/>
             </a:ext>
           </a:extLst>
         </p:spPr>
@@ -14484,7 +14492,7 @@
           </a:ln>
           <a:extLst>
             <a:ext uri="{C572A759-6A51-4108-AA02-DFA0A04FC94B}">
-              <ma14:wrappingTextBoxFlag xmlns="" xmlns:m="http://schemas.openxmlformats.org/officeDocument/2006/math" xmlns:a14="http://schemas.microsoft.com/office/drawing/2010/main" xmlns:ma14="http://schemas.microsoft.com/office/mac/drawingml/2011/main" val="1"/>
+              <ma14:wrappingTextBoxFlag xmlns:ma14="http://schemas.microsoft.com/office/mac/drawingml/2011/main" xmlns:a14="http://schemas.microsoft.com/office/drawing/2010/main" xmlns:m="http://schemas.openxmlformats.org/officeDocument/2006/math" xmlns="" val="1"/>
             </a:ext>
           </a:extLst>
         </p:spPr>
@@ -14595,7 +14603,7 @@
           </a:ln>
           <a:extLst>
             <a:ext uri="{C572A759-6A51-4108-AA02-DFA0A04FC94B}">
-              <ma14:wrappingTextBoxFlag xmlns="" xmlns:m="http://schemas.openxmlformats.org/officeDocument/2006/math" xmlns:a14="http://schemas.microsoft.com/office/drawing/2010/main" xmlns:ma14="http://schemas.microsoft.com/office/mac/drawingml/2011/main" val="1"/>
+              <ma14:wrappingTextBoxFlag xmlns:ma14="http://schemas.microsoft.com/office/mac/drawingml/2011/main" xmlns:a14="http://schemas.microsoft.com/office/drawing/2010/main" xmlns:m="http://schemas.openxmlformats.org/officeDocument/2006/math" xmlns="" val="1"/>
             </a:ext>
           </a:extLst>
         </p:spPr>
@@ -15056,7 +15064,7 @@
             <a:effectLst/>
             <a:extLst>
               <a:ext uri="{C572A759-6A51-4108-AA02-DFA0A04FC94B}">
-                <ma14:wrappingTextBoxFlag xmlns="" xmlns:m="http://schemas.openxmlformats.org/officeDocument/2006/math" xmlns:a14="http://schemas.microsoft.com/office/drawing/2010/main" xmlns:ma14="http://schemas.microsoft.com/office/mac/drawingml/2011/main" val="1"/>
+                <ma14:wrappingTextBoxFlag xmlns:ma14="http://schemas.microsoft.com/office/mac/drawingml/2011/main" xmlns:a14="http://schemas.microsoft.com/office/drawing/2010/main" xmlns:m="http://schemas.openxmlformats.org/officeDocument/2006/math" xmlns="" val="1"/>
               </a:ext>
             </a:extLst>
           </p:spPr>
@@ -15470,7 +15478,7 @@
           </a:ln>
           <a:extLst>
             <a:ext uri="{C572A759-6A51-4108-AA02-DFA0A04FC94B}">
-              <ma14:wrappingTextBoxFlag xmlns="" xmlns:m="http://schemas.openxmlformats.org/officeDocument/2006/math" xmlns:a14="http://schemas.microsoft.com/office/drawing/2010/main" xmlns:ma14="http://schemas.microsoft.com/office/mac/drawingml/2011/main" val="1"/>
+              <ma14:wrappingTextBoxFlag xmlns:ma14="http://schemas.microsoft.com/office/mac/drawingml/2011/main" xmlns:a14="http://schemas.microsoft.com/office/drawing/2010/main" xmlns:m="http://schemas.openxmlformats.org/officeDocument/2006/math" xmlns="" val="1"/>
             </a:ext>
           </a:extLst>
         </p:spPr>
@@ -15850,7 +15858,7 @@
             <a:effectLst/>
             <a:extLst>
               <a:ext uri="{C572A759-6A51-4108-AA02-DFA0A04FC94B}">
-                <ma14:wrappingTextBoxFlag xmlns="" xmlns:m="http://schemas.openxmlformats.org/officeDocument/2006/math" xmlns:a14="http://schemas.microsoft.com/office/drawing/2010/main" xmlns:ma14="http://schemas.microsoft.com/office/mac/drawingml/2011/main" val="1"/>
+                <ma14:wrappingTextBoxFlag xmlns:ma14="http://schemas.microsoft.com/office/mac/drawingml/2011/main" xmlns:a14="http://schemas.microsoft.com/office/drawing/2010/main" xmlns:m="http://schemas.openxmlformats.org/officeDocument/2006/math" xmlns="" val="1"/>
               </a:ext>
             </a:extLst>
           </p:spPr>
@@ -16141,7 +16149,7 @@
             <a:effectLst/>
             <a:extLst>
               <a:ext uri="{C572A759-6A51-4108-AA02-DFA0A04FC94B}">
-                <ma14:wrappingTextBoxFlag xmlns="" xmlns:m="http://schemas.openxmlformats.org/officeDocument/2006/math" xmlns:a14="http://schemas.microsoft.com/office/drawing/2010/main" xmlns:ma14="http://schemas.microsoft.com/office/mac/drawingml/2011/main" val="1"/>
+                <ma14:wrappingTextBoxFlag xmlns:ma14="http://schemas.microsoft.com/office/mac/drawingml/2011/main" xmlns:a14="http://schemas.microsoft.com/office/drawing/2010/main" xmlns:m="http://schemas.openxmlformats.org/officeDocument/2006/math" xmlns="" val="1"/>
               </a:ext>
             </a:extLst>
           </p:spPr>
@@ -16317,7 +16325,7 @@
             <a:effectLst/>
             <a:extLst>
               <a:ext uri="{C572A759-6A51-4108-AA02-DFA0A04FC94B}">
-                <ma14:wrappingTextBoxFlag xmlns="" xmlns:m="http://schemas.openxmlformats.org/officeDocument/2006/math" xmlns:a14="http://schemas.microsoft.com/office/drawing/2010/main" xmlns:ma14="http://schemas.microsoft.com/office/mac/drawingml/2011/main" val="1"/>
+                <ma14:wrappingTextBoxFlag xmlns:ma14="http://schemas.microsoft.com/office/mac/drawingml/2011/main" xmlns:a14="http://schemas.microsoft.com/office/drawing/2010/main" xmlns:m="http://schemas.openxmlformats.org/officeDocument/2006/math" xmlns="" val="1"/>
               </a:ext>
             </a:extLst>
           </p:spPr>
@@ -16761,7 +16769,7 @@
             <a:effectLst/>
             <a:extLst>
               <a:ext uri="{C572A759-6A51-4108-AA02-DFA0A04FC94B}">
-                <ma14:wrappingTextBoxFlag xmlns="" xmlns:m="http://schemas.openxmlformats.org/officeDocument/2006/math" xmlns:a14="http://schemas.microsoft.com/office/drawing/2010/main" xmlns:ma14="http://schemas.microsoft.com/office/mac/drawingml/2011/main" val="1"/>
+                <ma14:wrappingTextBoxFlag xmlns:ma14="http://schemas.microsoft.com/office/mac/drawingml/2011/main" xmlns:a14="http://schemas.microsoft.com/office/drawing/2010/main" xmlns:m="http://schemas.openxmlformats.org/officeDocument/2006/math" xmlns="" val="1"/>
               </a:ext>
             </a:extLst>
           </p:spPr>
@@ -16895,7 +16903,7 @@
           </a:ln>
           <a:extLst>
             <a:ext uri="{C572A759-6A51-4108-AA02-DFA0A04FC94B}">
-              <ma14:wrappingTextBoxFlag xmlns="" xmlns:m="http://schemas.openxmlformats.org/officeDocument/2006/math" xmlns:a14="http://schemas.microsoft.com/office/drawing/2010/main" xmlns:ma14="http://schemas.microsoft.com/office/mac/drawingml/2011/main" val="1"/>
+              <ma14:wrappingTextBoxFlag xmlns:ma14="http://schemas.microsoft.com/office/mac/drawingml/2011/main" xmlns:a14="http://schemas.microsoft.com/office/drawing/2010/main" xmlns:m="http://schemas.openxmlformats.org/officeDocument/2006/math" xmlns="" val="1"/>
             </a:ext>
           </a:extLst>
         </p:spPr>
@@ -16938,7 +16946,7 @@
           </a:ln>
           <a:extLst>
             <a:ext uri="{C572A759-6A51-4108-AA02-DFA0A04FC94B}">
-              <ma14:wrappingTextBoxFlag xmlns="" xmlns:m="http://schemas.openxmlformats.org/officeDocument/2006/math" xmlns:a14="http://schemas.microsoft.com/office/drawing/2010/main" xmlns:ma14="http://schemas.microsoft.com/office/mac/drawingml/2011/main" val="1"/>
+              <ma14:wrappingTextBoxFlag xmlns:ma14="http://schemas.microsoft.com/office/mac/drawingml/2011/main" xmlns:a14="http://schemas.microsoft.com/office/drawing/2010/main" xmlns:m="http://schemas.openxmlformats.org/officeDocument/2006/math" xmlns="" val="1"/>
             </a:ext>
           </a:extLst>
         </p:spPr>
@@ -17010,7 +17018,7 @@
           </a:ln>
           <a:extLst>
             <a:ext uri="{C572A759-6A51-4108-AA02-DFA0A04FC94B}">
-              <ma14:wrappingTextBoxFlag xmlns="" xmlns:m="http://schemas.openxmlformats.org/officeDocument/2006/math" xmlns:a14="http://schemas.microsoft.com/office/drawing/2010/main" xmlns:ma14="http://schemas.microsoft.com/office/mac/drawingml/2011/main" val="1"/>
+              <ma14:wrappingTextBoxFlag xmlns:ma14="http://schemas.microsoft.com/office/mac/drawingml/2011/main" xmlns:a14="http://schemas.microsoft.com/office/drawing/2010/main" xmlns:m="http://schemas.openxmlformats.org/officeDocument/2006/math" xmlns="" val="1"/>
             </a:ext>
           </a:extLst>
         </p:spPr>

</xml_diff>

<commit_message>
Tried to reduce file size of class 1 slides
</commit_message>
<xml_diff>
--- a/slides/Pythonlearn-01-Intro.pptx
+++ b/slides/Pythonlearn-01-Intro.pptx
@@ -1150,7 +1150,7 @@
           </a:ln>
           <a:extLst>
             <a:ext uri="{C572A759-6A51-4108-AA02-DFA0A04FC94B}">
-              <ma14:wrappingTextBoxFlag xmlns:ma14="http://schemas.microsoft.com/office/mac/drawingml/2011/main" xmlns:a14="http://schemas.microsoft.com/office/drawing/2010/main" xmlns:m="http://schemas.openxmlformats.org/officeDocument/2006/math" xmlns="" val="1"/>
+              <ma14:wrappingTextBoxFlag xmlns="" xmlns:m="http://schemas.openxmlformats.org/officeDocument/2006/math" xmlns:a14="http://schemas.microsoft.com/office/drawing/2010/main" xmlns:ma14="http://schemas.microsoft.com/office/mac/drawingml/2011/main" val="1"/>
             </a:ext>
           </a:extLst>
         </p:spPr>
@@ -1189,7 +1189,7 @@
           </a:ln>
           <a:extLst>
             <a:ext uri="{C572A759-6A51-4108-AA02-DFA0A04FC94B}">
-              <ma14:wrappingTextBoxFlag xmlns:ma14="http://schemas.microsoft.com/office/mac/drawingml/2011/main" xmlns:a14="http://schemas.microsoft.com/office/drawing/2010/main" xmlns:m="http://schemas.openxmlformats.org/officeDocument/2006/math" xmlns="" val="1"/>
+              <ma14:wrappingTextBoxFlag xmlns="" xmlns:m="http://schemas.openxmlformats.org/officeDocument/2006/math" xmlns:a14="http://schemas.microsoft.com/office/drawing/2010/main" xmlns:ma14="http://schemas.microsoft.com/office/mac/drawingml/2011/main" val="1"/>
             </a:ext>
           </a:extLst>
         </p:spPr>
@@ -2200,7 +2200,7 @@
           </a:ln>
           <a:extLst>
             <a:ext uri="{C572A759-6A51-4108-AA02-DFA0A04FC94B}">
-              <ma14:wrappingTextBoxFlag xmlns:ma14="http://schemas.microsoft.com/office/mac/drawingml/2011/main" xmlns:a14="http://schemas.microsoft.com/office/drawing/2010/main" xmlns:m="http://schemas.openxmlformats.org/officeDocument/2006/math" xmlns="" val="1"/>
+              <ma14:wrappingTextBoxFlag xmlns="" xmlns:m="http://schemas.openxmlformats.org/officeDocument/2006/math" xmlns:a14="http://schemas.microsoft.com/office/drawing/2010/main" xmlns:ma14="http://schemas.microsoft.com/office/mac/drawingml/2011/main" val="1"/>
             </a:ext>
           </a:extLst>
         </p:spPr>
@@ -2759,7 +2759,7 @@
           </a:ln>
           <a:extLst>
             <a:ext uri="{C572A759-6A51-4108-AA02-DFA0A04FC94B}">
-              <ma14:wrappingTextBoxFlag xmlns:ma14="http://schemas.microsoft.com/office/mac/drawingml/2011/main" xmlns:a14="http://schemas.microsoft.com/office/drawing/2010/main" xmlns:m="http://schemas.openxmlformats.org/officeDocument/2006/math" xmlns="" val="1"/>
+              <ma14:wrappingTextBoxFlag xmlns="" xmlns:m="http://schemas.openxmlformats.org/officeDocument/2006/math" xmlns:a14="http://schemas.microsoft.com/office/drawing/2010/main" xmlns:ma14="http://schemas.microsoft.com/office/mac/drawingml/2011/main" val="1"/>
             </a:ext>
           </a:extLst>
         </p:spPr>
@@ -3081,7 +3081,7 @@
             <a:effectLst/>
             <a:extLst>
               <a:ext uri="{C572A759-6A51-4108-AA02-DFA0A04FC94B}">
-                <ma14:wrappingTextBoxFlag xmlns:ma14="http://schemas.microsoft.com/office/mac/drawingml/2011/main" xmlns:a14="http://schemas.microsoft.com/office/drawing/2010/main" xmlns:m="http://schemas.openxmlformats.org/officeDocument/2006/math" xmlns="" val="1"/>
+                <ma14:wrappingTextBoxFlag xmlns="" xmlns:m="http://schemas.openxmlformats.org/officeDocument/2006/math" xmlns:a14="http://schemas.microsoft.com/office/drawing/2010/main" xmlns:ma14="http://schemas.microsoft.com/office/mac/drawingml/2011/main" val="1"/>
               </a:ext>
             </a:extLst>
           </p:spPr>
@@ -3193,7 +3193,7 @@
             <a:effectLst/>
             <a:extLst>
               <a:ext uri="{C572A759-6A51-4108-AA02-DFA0A04FC94B}">
-                <ma14:wrappingTextBoxFlag xmlns:ma14="http://schemas.microsoft.com/office/mac/drawingml/2011/main" xmlns:a14="http://schemas.microsoft.com/office/drawing/2010/main" xmlns:m="http://schemas.openxmlformats.org/officeDocument/2006/math" xmlns="" val="1"/>
+                <ma14:wrappingTextBoxFlag xmlns="" xmlns:m="http://schemas.openxmlformats.org/officeDocument/2006/math" xmlns:a14="http://schemas.microsoft.com/office/drawing/2010/main" xmlns:ma14="http://schemas.microsoft.com/office/mac/drawingml/2011/main" val="1"/>
               </a:ext>
             </a:extLst>
           </p:spPr>
@@ -3328,7 +3328,7 @@
             <a:effectLst/>
             <a:extLst>
               <a:ext uri="{C572A759-6A51-4108-AA02-DFA0A04FC94B}">
-                <ma14:wrappingTextBoxFlag xmlns:ma14="http://schemas.microsoft.com/office/mac/drawingml/2011/main" xmlns:a14="http://schemas.microsoft.com/office/drawing/2010/main" xmlns:m="http://schemas.openxmlformats.org/officeDocument/2006/math" xmlns="" val="1"/>
+                <ma14:wrappingTextBoxFlag xmlns="" xmlns:m="http://schemas.openxmlformats.org/officeDocument/2006/math" xmlns:a14="http://schemas.microsoft.com/office/drawing/2010/main" xmlns:ma14="http://schemas.microsoft.com/office/mac/drawingml/2011/main" val="1"/>
               </a:ext>
             </a:extLst>
           </p:spPr>
@@ -3463,7 +3463,7 @@
             <a:effectLst/>
             <a:extLst>
               <a:ext uri="{C572A759-6A51-4108-AA02-DFA0A04FC94B}">
-                <ma14:wrappingTextBoxFlag xmlns:ma14="http://schemas.microsoft.com/office/mac/drawingml/2011/main" xmlns:a14="http://schemas.microsoft.com/office/drawing/2010/main" xmlns:m="http://schemas.openxmlformats.org/officeDocument/2006/math" xmlns="" val="1"/>
+                <ma14:wrappingTextBoxFlag xmlns="" xmlns:m="http://schemas.openxmlformats.org/officeDocument/2006/math" xmlns:a14="http://schemas.microsoft.com/office/drawing/2010/main" xmlns:ma14="http://schemas.microsoft.com/office/mac/drawingml/2011/main" val="1"/>
               </a:ext>
             </a:extLst>
           </p:spPr>
@@ -3581,7 +3581,7 @@
             <a:effectLst/>
             <a:extLst>
               <a:ext uri="{C572A759-6A51-4108-AA02-DFA0A04FC94B}">
-                <ma14:wrappingTextBoxFlag xmlns:ma14="http://schemas.microsoft.com/office/mac/drawingml/2011/main" xmlns:a14="http://schemas.microsoft.com/office/drawing/2010/main" xmlns:m="http://schemas.openxmlformats.org/officeDocument/2006/math" xmlns="" val="1"/>
+                <ma14:wrappingTextBoxFlag xmlns="" xmlns:m="http://schemas.openxmlformats.org/officeDocument/2006/math" xmlns:a14="http://schemas.microsoft.com/office/drawing/2010/main" xmlns:ma14="http://schemas.microsoft.com/office/mac/drawingml/2011/main" val="1"/>
               </a:ext>
             </a:extLst>
           </p:spPr>
@@ -3792,7 +3792,7 @@
           </a:ln>
           <a:extLst>
             <a:ext uri="{C572A759-6A51-4108-AA02-DFA0A04FC94B}">
-              <ma14:wrappingTextBoxFlag xmlns:ma14="http://schemas.microsoft.com/office/mac/drawingml/2011/main" xmlns:a14="http://schemas.microsoft.com/office/drawing/2010/main" xmlns:m="http://schemas.openxmlformats.org/officeDocument/2006/math" xmlns="" val="1"/>
+              <ma14:wrappingTextBoxFlag xmlns="" xmlns:m="http://schemas.openxmlformats.org/officeDocument/2006/math" xmlns:a14="http://schemas.microsoft.com/office/drawing/2010/main" xmlns:ma14="http://schemas.microsoft.com/office/mac/drawingml/2011/main" val="1"/>
             </a:ext>
           </a:extLst>
         </p:spPr>
@@ -3919,7 +3919,7 @@
             <a:effectLst/>
             <a:extLst>
               <a:ext uri="{C572A759-6A51-4108-AA02-DFA0A04FC94B}">
-                <ma14:wrappingTextBoxFlag xmlns:ma14="http://schemas.microsoft.com/office/mac/drawingml/2011/main" xmlns:a14="http://schemas.microsoft.com/office/drawing/2010/main" xmlns:m="http://schemas.openxmlformats.org/officeDocument/2006/math" xmlns="" val="1"/>
+                <ma14:wrappingTextBoxFlag xmlns="" xmlns:m="http://schemas.openxmlformats.org/officeDocument/2006/math" xmlns:a14="http://schemas.microsoft.com/office/drawing/2010/main" xmlns:ma14="http://schemas.microsoft.com/office/mac/drawingml/2011/main" val="1"/>
               </a:ext>
             </a:extLst>
           </p:spPr>
@@ -4322,7 +4322,7 @@
             <a:effectLst/>
             <a:extLst>
               <a:ext uri="{C572A759-6A51-4108-AA02-DFA0A04FC94B}">
-                <ma14:wrappingTextBoxFlag xmlns:ma14="http://schemas.microsoft.com/office/mac/drawingml/2011/main" xmlns:a14="http://schemas.microsoft.com/office/drawing/2010/main" xmlns:m="http://schemas.openxmlformats.org/officeDocument/2006/math" xmlns="" val="1"/>
+                <ma14:wrappingTextBoxFlag xmlns="" xmlns:m="http://schemas.openxmlformats.org/officeDocument/2006/math" xmlns:a14="http://schemas.microsoft.com/office/drawing/2010/main" xmlns:ma14="http://schemas.microsoft.com/office/mac/drawingml/2011/main" val="1"/>
               </a:ext>
             </a:extLst>
           </p:spPr>
@@ -4464,7 +4464,7 @@
             <a:effectLst/>
             <a:extLst>
               <a:ext uri="{C572A759-6A51-4108-AA02-DFA0A04FC94B}">
-                <ma14:wrappingTextBoxFlag xmlns:ma14="http://schemas.microsoft.com/office/mac/drawingml/2011/main" xmlns:a14="http://schemas.microsoft.com/office/drawing/2010/main" xmlns:m="http://schemas.openxmlformats.org/officeDocument/2006/math" xmlns="" val="1"/>
+                <ma14:wrappingTextBoxFlag xmlns="" xmlns:m="http://schemas.openxmlformats.org/officeDocument/2006/math" xmlns:a14="http://schemas.microsoft.com/office/drawing/2010/main" xmlns:ma14="http://schemas.microsoft.com/office/mac/drawingml/2011/main" val="1"/>
               </a:ext>
             </a:extLst>
           </p:spPr>
@@ -4569,7 +4569,7 @@
             <a:effectLst/>
             <a:extLst>
               <a:ext uri="{C572A759-6A51-4108-AA02-DFA0A04FC94B}">
-                <ma14:wrappingTextBoxFlag xmlns:ma14="http://schemas.microsoft.com/office/mac/drawingml/2011/main" xmlns:a14="http://schemas.microsoft.com/office/drawing/2010/main" xmlns:m="http://schemas.openxmlformats.org/officeDocument/2006/math" xmlns="" val="1"/>
+                <ma14:wrappingTextBoxFlag xmlns="" xmlns:m="http://schemas.openxmlformats.org/officeDocument/2006/math" xmlns:a14="http://schemas.microsoft.com/office/drawing/2010/main" xmlns:ma14="http://schemas.microsoft.com/office/mac/drawingml/2011/main" val="1"/>
               </a:ext>
             </a:extLst>
           </p:spPr>
@@ -4704,7 +4704,7 @@
             <a:effectLst/>
             <a:extLst>
               <a:ext uri="{C572A759-6A51-4108-AA02-DFA0A04FC94B}">
-                <ma14:wrappingTextBoxFlag xmlns:ma14="http://schemas.microsoft.com/office/mac/drawingml/2011/main" xmlns:a14="http://schemas.microsoft.com/office/drawing/2010/main" xmlns:m="http://schemas.openxmlformats.org/officeDocument/2006/math" xmlns="" val="1"/>
+                <ma14:wrappingTextBoxFlag xmlns="" xmlns:m="http://schemas.openxmlformats.org/officeDocument/2006/math" xmlns:a14="http://schemas.microsoft.com/office/drawing/2010/main" xmlns:ma14="http://schemas.microsoft.com/office/mac/drawingml/2011/main" val="1"/>
               </a:ext>
             </a:extLst>
           </p:spPr>
@@ -4839,7 +4839,7 @@
             <a:effectLst/>
             <a:extLst>
               <a:ext uri="{C572A759-6A51-4108-AA02-DFA0A04FC94B}">
-                <ma14:wrappingTextBoxFlag xmlns:ma14="http://schemas.microsoft.com/office/mac/drawingml/2011/main" xmlns:a14="http://schemas.microsoft.com/office/drawing/2010/main" xmlns:m="http://schemas.openxmlformats.org/officeDocument/2006/math" xmlns="" val="1"/>
+                <ma14:wrappingTextBoxFlag xmlns="" xmlns:m="http://schemas.openxmlformats.org/officeDocument/2006/math" xmlns:a14="http://schemas.microsoft.com/office/drawing/2010/main" xmlns:ma14="http://schemas.microsoft.com/office/mac/drawingml/2011/main" val="1"/>
               </a:ext>
             </a:extLst>
           </p:spPr>
@@ -4957,7 +4957,7 @@
             <a:effectLst/>
             <a:extLst>
               <a:ext uri="{C572A759-6A51-4108-AA02-DFA0A04FC94B}">
-                <ma14:wrappingTextBoxFlag xmlns:ma14="http://schemas.microsoft.com/office/mac/drawingml/2011/main" xmlns:a14="http://schemas.microsoft.com/office/drawing/2010/main" xmlns:m="http://schemas.openxmlformats.org/officeDocument/2006/math" xmlns="" val="1"/>
+                <ma14:wrappingTextBoxFlag xmlns="" xmlns:m="http://schemas.openxmlformats.org/officeDocument/2006/math" xmlns:a14="http://schemas.microsoft.com/office/drawing/2010/main" xmlns:ma14="http://schemas.microsoft.com/office/mac/drawingml/2011/main" val="1"/>
               </a:ext>
             </a:extLst>
           </p:spPr>
@@ -5168,7 +5168,7 @@
           </a:ln>
           <a:extLst>
             <a:ext uri="{C572A759-6A51-4108-AA02-DFA0A04FC94B}">
-              <ma14:wrappingTextBoxFlag xmlns:ma14="http://schemas.microsoft.com/office/mac/drawingml/2011/main" xmlns:a14="http://schemas.microsoft.com/office/drawing/2010/main" xmlns:m="http://schemas.openxmlformats.org/officeDocument/2006/math" xmlns="" val="1"/>
+              <ma14:wrappingTextBoxFlag xmlns="" xmlns:m="http://schemas.openxmlformats.org/officeDocument/2006/math" xmlns:a14="http://schemas.microsoft.com/office/drawing/2010/main" xmlns:ma14="http://schemas.microsoft.com/office/mac/drawingml/2011/main" val="1"/>
             </a:ext>
           </a:extLst>
         </p:spPr>
@@ -5295,7 +5295,7 @@
             <a:effectLst/>
             <a:extLst>
               <a:ext uri="{C572A759-6A51-4108-AA02-DFA0A04FC94B}">
-                <ma14:wrappingTextBoxFlag xmlns:ma14="http://schemas.microsoft.com/office/mac/drawingml/2011/main" xmlns:a14="http://schemas.microsoft.com/office/drawing/2010/main" xmlns:m="http://schemas.openxmlformats.org/officeDocument/2006/math" xmlns="" val="1"/>
+                <ma14:wrappingTextBoxFlag xmlns="" xmlns:m="http://schemas.openxmlformats.org/officeDocument/2006/math" xmlns:a14="http://schemas.microsoft.com/office/drawing/2010/main" xmlns:ma14="http://schemas.microsoft.com/office/mac/drawingml/2011/main" val="1"/>
               </a:ext>
             </a:extLst>
           </p:spPr>
@@ -5442,7 +5442,7 @@
             <a:effectLst/>
             <a:extLst>
               <a:ext uri="{C572A759-6A51-4108-AA02-DFA0A04FC94B}">
-                <ma14:wrappingTextBoxFlag xmlns:ma14="http://schemas.microsoft.com/office/mac/drawingml/2011/main" xmlns:a14="http://schemas.microsoft.com/office/drawing/2010/main" xmlns:m="http://schemas.openxmlformats.org/officeDocument/2006/math" xmlns="" val="1"/>
+                <ma14:wrappingTextBoxFlag xmlns="" xmlns:m="http://schemas.openxmlformats.org/officeDocument/2006/math" xmlns:a14="http://schemas.microsoft.com/office/drawing/2010/main" xmlns:ma14="http://schemas.microsoft.com/office/mac/drawingml/2011/main" val="1"/>
               </a:ext>
             </a:extLst>
           </p:spPr>
@@ -5582,7 +5582,7 @@
             <a:effectLst/>
             <a:extLst>
               <a:ext uri="{C572A759-6A51-4108-AA02-DFA0A04FC94B}">
-                <ma14:wrappingTextBoxFlag xmlns:ma14="http://schemas.microsoft.com/office/mac/drawingml/2011/main" xmlns:a14="http://schemas.microsoft.com/office/drawing/2010/main" xmlns:m="http://schemas.openxmlformats.org/officeDocument/2006/math" xmlns="" val="1"/>
+                <ma14:wrappingTextBoxFlag xmlns="" xmlns:m="http://schemas.openxmlformats.org/officeDocument/2006/math" xmlns:a14="http://schemas.microsoft.com/office/drawing/2010/main" xmlns:ma14="http://schemas.microsoft.com/office/mac/drawingml/2011/main" val="1"/>
               </a:ext>
             </a:extLst>
           </p:spPr>
@@ -5687,7 +5687,7 @@
             <a:effectLst/>
             <a:extLst>
               <a:ext uri="{C572A759-6A51-4108-AA02-DFA0A04FC94B}">
-                <ma14:wrappingTextBoxFlag xmlns:ma14="http://schemas.microsoft.com/office/mac/drawingml/2011/main" xmlns:a14="http://schemas.microsoft.com/office/drawing/2010/main" xmlns:m="http://schemas.openxmlformats.org/officeDocument/2006/math" xmlns="" val="1"/>
+                <ma14:wrappingTextBoxFlag xmlns="" xmlns:m="http://schemas.openxmlformats.org/officeDocument/2006/math" xmlns:a14="http://schemas.microsoft.com/office/drawing/2010/main" xmlns:ma14="http://schemas.microsoft.com/office/mac/drawingml/2011/main" val="1"/>
               </a:ext>
             </a:extLst>
           </p:spPr>
@@ -5822,7 +5822,7 @@
             <a:effectLst/>
             <a:extLst>
               <a:ext uri="{C572A759-6A51-4108-AA02-DFA0A04FC94B}">
-                <ma14:wrappingTextBoxFlag xmlns:ma14="http://schemas.microsoft.com/office/mac/drawingml/2011/main" xmlns:a14="http://schemas.microsoft.com/office/drawing/2010/main" xmlns:m="http://schemas.openxmlformats.org/officeDocument/2006/math" xmlns="" val="1"/>
+                <ma14:wrappingTextBoxFlag xmlns="" xmlns:m="http://schemas.openxmlformats.org/officeDocument/2006/math" xmlns:a14="http://schemas.microsoft.com/office/drawing/2010/main" xmlns:ma14="http://schemas.microsoft.com/office/mac/drawingml/2011/main" val="1"/>
               </a:ext>
             </a:extLst>
           </p:spPr>
@@ -5957,7 +5957,7 @@
             <a:effectLst/>
             <a:extLst>
               <a:ext uri="{C572A759-6A51-4108-AA02-DFA0A04FC94B}">
-                <ma14:wrappingTextBoxFlag xmlns:ma14="http://schemas.microsoft.com/office/mac/drawingml/2011/main" xmlns:a14="http://schemas.microsoft.com/office/drawing/2010/main" xmlns:m="http://schemas.openxmlformats.org/officeDocument/2006/math" xmlns="" val="1"/>
+                <ma14:wrappingTextBoxFlag xmlns="" xmlns:m="http://schemas.openxmlformats.org/officeDocument/2006/math" xmlns:a14="http://schemas.microsoft.com/office/drawing/2010/main" xmlns:ma14="http://schemas.microsoft.com/office/mac/drawingml/2011/main" val="1"/>
               </a:ext>
             </a:extLst>
           </p:spPr>
@@ -6075,7 +6075,7 @@
             <a:effectLst/>
             <a:extLst>
               <a:ext uri="{C572A759-6A51-4108-AA02-DFA0A04FC94B}">
-                <ma14:wrappingTextBoxFlag xmlns:ma14="http://schemas.microsoft.com/office/mac/drawingml/2011/main" xmlns:a14="http://schemas.microsoft.com/office/drawing/2010/main" xmlns:m="http://schemas.openxmlformats.org/officeDocument/2006/math" xmlns="" val="1"/>
+                <ma14:wrappingTextBoxFlag xmlns="" xmlns:m="http://schemas.openxmlformats.org/officeDocument/2006/math" xmlns:a14="http://schemas.microsoft.com/office/drawing/2010/main" xmlns:ma14="http://schemas.microsoft.com/office/mac/drawingml/2011/main" val="1"/>
               </a:ext>
             </a:extLst>
           </p:spPr>
@@ -6286,7 +6286,7 @@
           </a:ln>
           <a:extLst>
             <a:ext uri="{C572A759-6A51-4108-AA02-DFA0A04FC94B}">
-              <ma14:wrappingTextBoxFlag xmlns:ma14="http://schemas.microsoft.com/office/mac/drawingml/2011/main" xmlns:a14="http://schemas.microsoft.com/office/drawing/2010/main" xmlns:m="http://schemas.openxmlformats.org/officeDocument/2006/math" xmlns="" val="1"/>
+              <ma14:wrappingTextBoxFlag xmlns="" xmlns:m="http://schemas.openxmlformats.org/officeDocument/2006/math" xmlns:a14="http://schemas.microsoft.com/office/drawing/2010/main" xmlns:ma14="http://schemas.microsoft.com/office/mac/drawingml/2011/main" val="1"/>
             </a:ext>
           </a:extLst>
         </p:spPr>
@@ -6413,7 +6413,7 @@
             <a:effectLst/>
             <a:extLst>
               <a:ext uri="{C572A759-6A51-4108-AA02-DFA0A04FC94B}">
-                <ma14:wrappingTextBoxFlag xmlns:ma14="http://schemas.microsoft.com/office/mac/drawingml/2011/main" xmlns:a14="http://schemas.microsoft.com/office/drawing/2010/main" xmlns:m="http://schemas.openxmlformats.org/officeDocument/2006/math" xmlns="" val="1"/>
+                <ma14:wrappingTextBoxFlag xmlns="" xmlns:m="http://schemas.openxmlformats.org/officeDocument/2006/math" xmlns:a14="http://schemas.microsoft.com/office/drawing/2010/main" xmlns:ma14="http://schemas.microsoft.com/office/mac/drawingml/2011/main" val="1"/>
               </a:ext>
             </a:extLst>
           </p:spPr>
@@ -6497,7 +6497,7 @@
           </a:ln>
           <a:extLst>
             <a:ext uri="{C572A759-6A51-4108-AA02-DFA0A04FC94B}">
-              <ma14:wrappingTextBoxFlag xmlns:ma14="http://schemas.microsoft.com/office/mac/drawingml/2011/main" xmlns:a14="http://schemas.microsoft.com/office/drawing/2010/main" xmlns:m="http://schemas.openxmlformats.org/officeDocument/2006/math" xmlns="" val="1"/>
+              <ma14:wrappingTextBoxFlag xmlns="" xmlns:m="http://schemas.openxmlformats.org/officeDocument/2006/math" xmlns:a14="http://schemas.microsoft.com/office/drawing/2010/main" xmlns:ma14="http://schemas.microsoft.com/office/mac/drawingml/2011/main" val="1"/>
             </a:ext>
           </a:extLst>
         </p:spPr>
@@ -6619,7 +6619,7 @@
             <a:effectLst/>
             <a:extLst>
               <a:ext uri="{C572A759-6A51-4108-AA02-DFA0A04FC94B}">
-                <ma14:wrappingTextBoxFlag xmlns:ma14="http://schemas.microsoft.com/office/mac/drawingml/2011/main" xmlns:a14="http://schemas.microsoft.com/office/drawing/2010/main" xmlns:m="http://schemas.openxmlformats.org/officeDocument/2006/math" xmlns="" val="1"/>
+                <ma14:wrappingTextBoxFlag xmlns="" xmlns:m="http://schemas.openxmlformats.org/officeDocument/2006/math" xmlns:a14="http://schemas.microsoft.com/office/drawing/2010/main" xmlns:ma14="http://schemas.microsoft.com/office/mac/drawingml/2011/main" val="1"/>
               </a:ext>
             </a:extLst>
           </p:spPr>
@@ -6772,7 +6772,7 @@
           </a:ln>
           <a:extLst>
             <a:ext uri="{C572A759-6A51-4108-AA02-DFA0A04FC94B}">
-              <ma14:wrappingTextBoxFlag xmlns:ma14="http://schemas.microsoft.com/office/mac/drawingml/2011/main" xmlns:a14="http://schemas.microsoft.com/office/drawing/2010/main" xmlns:m="http://schemas.openxmlformats.org/officeDocument/2006/math" xmlns="" val="1"/>
+              <ma14:wrappingTextBoxFlag xmlns="" xmlns:m="http://schemas.openxmlformats.org/officeDocument/2006/math" xmlns:a14="http://schemas.microsoft.com/office/drawing/2010/main" xmlns:ma14="http://schemas.microsoft.com/office/mac/drawingml/2011/main" val="1"/>
             </a:ext>
           </a:extLst>
         </p:spPr>
@@ -7324,7 +7324,7 @@
           </a:ln>
           <a:extLst>
             <a:ext uri="{C572A759-6A51-4108-AA02-DFA0A04FC94B}">
-              <ma14:wrappingTextBoxFlag xmlns:ma14="http://schemas.microsoft.com/office/mac/drawingml/2011/main" xmlns:a14="http://schemas.microsoft.com/office/drawing/2010/main" xmlns:m="http://schemas.openxmlformats.org/officeDocument/2006/math" xmlns="" val="1"/>
+              <ma14:wrappingTextBoxFlag xmlns="" xmlns:m="http://schemas.openxmlformats.org/officeDocument/2006/math" xmlns:a14="http://schemas.microsoft.com/office/drawing/2010/main" xmlns:ma14="http://schemas.microsoft.com/office/mac/drawingml/2011/main" val="1"/>
             </a:ext>
           </a:extLst>
         </p:spPr>
@@ -7425,7 +7425,7 @@
             <a:effectLst/>
             <a:extLst>
               <a:ext uri="{C572A759-6A51-4108-AA02-DFA0A04FC94B}">
-                <ma14:wrappingTextBoxFlag xmlns:ma14="http://schemas.microsoft.com/office/mac/drawingml/2011/main" xmlns:a14="http://schemas.microsoft.com/office/drawing/2010/main" xmlns:m="http://schemas.openxmlformats.org/officeDocument/2006/math" xmlns="" val="1"/>
+                <ma14:wrappingTextBoxFlag xmlns="" xmlns:m="http://schemas.openxmlformats.org/officeDocument/2006/math" xmlns:a14="http://schemas.microsoft.com/office/drawing/2010/main" xmlns:ma14="http://schemas.microsoft.com/office/mac/drawingml/2011/main" val="1"/>
               </a:ext>
             </a:extLst>
           </p:spPr>
@@ -7530,7 +7530,7 @@
           </a:ln>
           <a:extLst>
             <a:ext uri="{C572A759-6A51-4108-AA02-DFA0A04FC94B}">
-              <ma14:wrappingTextBoxFlag xmlns:ma14="http://schemas.microsoft.com/office/mac/drawingml/2011/main" xmlns:a14="http://schemas.microsoft.com/office/drawing/2010/main" xmlns:m="http://schemas.openxmlformats.org/officeDocument/2006/math" xmlns="" val="1"/>
+              <ma14:wrappingTextBoxFlag xmlns="" xmlns:m="http://schemas.openxmlformats.org/officeDocument/2006/math" xmlns:a14="http://schemas.microsoft.com/office/drawing/2010/main" xmlns:ma14="http://schemas.microsoft.com/office/mac/drawingml/2011/main" val="1"/>
             </a:ext>
           </a:extLst>
         </p:spPr>
@@ -7759,7 +7759,7 @@
           </a:ln>
           <a:extLst>
             <a:ext uri="{C572A759-6A51-4108-AA02-DFA0A04FC94B}">
-              <ma14:wrappingTextBoxFlag xmlns:ma14="http://schemas.microsoft.com/office/mac/drawingml/2011/main" xmlns:a14="http://schemas.microsoft.com/office/drawing/2010/main" xmlns:m="http://schemas.openxmlformats.org/officeDocument/2006/math" xmlns="" val="1"/>
+              <ma14:wrappingTextBoxFlag xmlns="" xmlns:m="http://schemas.openxmlformats.org/officeDocument/2006/math" xmlns:a14="http://schemas.microsoft.com/office/drawing/2010/main" xmlns:ma14="http://schemas.microsoft.com/office/mac/drawingml/2011/main" val="1"/>
             </a:ext>
           </a:extLst>
         </p:spPr>
@@ -8041,7 +8041,7 @@
           </a:ln>
           <a:extLst>
             <a:ext uri="{C572A759-6A51-4108-AA02-DFA0A04FC94B}">
-              <ma14:wrappingTextBoxFlag xmlns:ma14="http://schemas.microsoft.com/office/mac/drawingml/2011/main" xmlns:a14="http://schemas.microsoft.com/office/drawing/2010/main" xmlns:m="http://schemas.openxmlformats.org/officeDocument/2006/math" xmlns="" val="1"/>
+              <ma14:wrappingTextBoxFlag xmlns="" xmlns:m="http://schemas.openxmlformats.org/officeDocument/2006/math" xmlns:a14="http://schemas.microsoft.com/office/drawing/2010/main" xmlns:ma14="http://schemas.microsoft.com/office/mac/drawingml/2011/main" val="1"/>
             </a:ext>
           </a:extLst>
         </p:spPr>
@@ -8472,7 +8472,7 @@
             <a:effectLst/>
             <a:extLst>
               <a:ext uri="{C572A759-6A51-4108-AA02-DFA0A04FC94B}">
-                <ma14:wrappingTextBoxFlag xmlns:ma14="http://schemas.microsoft.com/office/mac/drawingml/2011/main" xmlns:a14="http://schemas.microsoft.com/office/drawing/2010/main" xmlns:m="http://schemas.openxmlformats.org/officeDocument/2006/math" xmlns="" val="1"/>
+                <ma14:wrappingTextBoxFlag xmlns="" xmlns:m="http://schemas.openxmlformats.org/officeDocument/2006/math" xmlns:a14="http://schemas.microsoft.com/office/drawing/2010/main" xmlns:ma14="http://schemas.microsoft.com/office/mac/drawingml/2011/main" val="1"/>
               </a:ext>
             </a:extLst>
           </p:spPr>
@@ -8549,7 +8549,7 @@
           </a:ln>
           <a:extLst>
             <a:ext uri="{C572A759-6A51-4108-AA02-DFA0A04FC94B}">
-              <ma14:wrappingTextBoxFlag xmlns:ma14="http://schemas.microsoft.com/office/mac/drawingml/2011/main" xmlns:a14="http://schemas.microsoft.com/office/drawing/2010/main" xmlns:m="http://schemas.openxmlformats.org/officeDocument/2006/math" xmlns="" val="1"/>
+              <ma14:wrappingTextBoxFlag xmlns="" xmlns:m="http://schemas.openxmlformats.org/officeDocument/2006/math" xmlns:a14="http://schemas.microsoft.com/office/drawing/2010/main" xmlns:ma14="http://schemas.microsoft.com/office/mac/drawingml/2011/main" val="1"/>
             </a:ext>
           </a:extLst>
         </p:spPr>
@@ -8725,7 +8725,7 @@
           </a:ln>
           <a:extLst>
             <a:ext uri="{C572A759-6A51-4108-AA02-DFA0A04FC94B}">
-              <ma14:wrappingTextBoxFlag xmlns:ma14="http://schemas.microsoft.com/office/mac/drawingml/2011/main" xmlns:a14="http://schemas.microsoft.com/office/drawing/2010/main" xmlns:m="http://schemas.openxmlformats.org/officeDocument/2006/math" xmlns="" val="1"/>
+              <ma14:wrappingTextBoxFlag xmlns="" xmlns:m="http://schemas.openxmlformats.org/officeDocument/2006/math" xmlns:a14="http://schemas.microsoft.com/office/drawing/2010/main" xmlns:ma14="http://schemas.microsoft.com/office/mac/drawingml/2011/main" val="1"/>
             </a:ext>
           </a:extLst>
         </p:spPr>
@@ -8945,7 +8945,7 @@
           </a:ln>
           <a:extLst>
             <a:ext uri="{C572A759-6A51-4108-AA02-DFA0A04FC94B}">
-              <ma14:wrappingTextBoxFlag xmlns:ma14="http://schemas.microsoft.com/office/mac/drawingml/2011/main" xmlns:a14="http://schemas.microsoft.com/office/drawing/2010/main" xmlns:m="http://schemas.openxmlformats.org/officeDocument/2006/math" xmlns="" val="1"/>
+              <ma14:wrappingTextBoxFlag xmlns="" xmlns:m="http://schemas.openxmlformats.org/officeDocument/2006/math" xmlns:a14="http://schemas.microsoft.com/office/drawing/2010/main" xmlns:ma14="http://schemas.microsoft.com/office/mac/drawingml/2011/main" val="1"/>
             </a:ext>
           </a:extLst>
         </p:spPr>
@@ -9135,7 +9135,7 @@
           </a:ln>
           <a:extLst>
             <a:ext uri="{C572A759-6A51-4108-AA02-DFA0A04FC94B}">
-              <ma14:wrappingTextBoxFlag xmlns:ma14="http://schemas.microsoft.com/office/mac/drawingml/2011/main" xmlns:a14="http://schemas.microsoft.com/office/drawing/2010/main" xmlns:m="http://schemas.openxmlformats.org/officeDocument/2006/math" xmlns="" val="1"/>
+              <ma14:wrappingTextBoxFlag xmlns="" xmlns:m="http://schemas.openxmlformats.org/officeDocument/2006/math" xmlns:a14="http://schemas.microsoft.com/office/drawing/2010/main" xmlns:ma14="http://schemas.microsoft.com/office/mac/drawingml/2011/main" val="1"/>
             </a:ext>
           </a:extLst>
         </p:spPr>
@@ -9178,7 +9178,7 @@
           </a:ln>
           <a:extLst>
             <a:ext uri="{C572A759-6A51-4108-AA02-DFA0A04FC94B}">
-              <ma14:wrappingTextBoxFlag xmlns:ma14="http://schemas.microsoft.com/office/mac/drawingml/2011/main" xmlns:a14="http://schemas.microsoft.com/office/drawing/2010/main" xmlns:m="http://schemas.openxmlformats.org/officeDocument/2006/math" xmlns="" val="1"/>
+              <ma14:wrappingTextBoxFlag xmlns="" xmlns:m="http://schemas.openxmlformats.org/officeDocument/2006/math" xmlns:a14="http://schemas.microsoft.com/office/drawing/2010/main" xmlns:ma14="http://schemas.microsoft.com/office/mac/drawingml/2011/main" val="1"/>
             </a:ext>
           </a:extLst>
         </p:spPr>
@@ -9221,7 +9221,7 @@
           </a:ln>
           <a:extLst>
             <a:ext uri="{C572A759-6A51-4108-AA02-DFA0A04FC94B}">
-              <ma14:wrappingTextBoxFlag xmlns:ma14="http://schemas.microsoft.com/office/mac/drawingml/2011/main" xmlns:a14="http://schemas.microsoft.com/office/drawing/2010/main" xmlns:m="http://schemas.openxmlformats.org/officeDocument/2006/math" xmlns="" val="1"/>
+              <ma14:wrappingTextBoxFlag xmlns="" xmlns:m="http://schemas.openxmlformats.org/officeDocument/2006/math" xmlns:a14="http://schemas.microsoft.com/office/drawing/2010/main" xmlns:ma14="http://schemas.microsoft.com/office/mac/drawingml/2011/main" val="1"/>
             </a:ext>
           </a:extLst>
         </p:spPr>
@@ -9264,7 +9264,7 @@
           </a:ln>
           <a:extLst>
             <a:ext uri="{C572A759-6A51-4108-AA02-DFA0A04FC94B}">
-              <ma14:wrappingTextBoxFlag xmlns:ma14="http://schemas.microsoft.com/office/mac/drawingml/2011/main" xmlns:a14="http://schemas.microsoft.com/office/drawing/2010/main" xmlns:m="http://schemas.openxmlformats.org/officeDocument/2006/math" xmlns="" val="1"/>
+              <ma14:wrappingTextBoxFlag xmlns="" xmlns:m="http://schemas.openxmlformats.org/officeDocument/2006/math" xmlns:a14="http://schemas.microsoft.com/office/drawing/2010/main" xmlns:ma14="http://schemas.microsoft.com/office/mac/drawingml/2011/main" val="1"/>
             </a:ext>
           </a:extLst>
         </p:spPr>
@@ -9307,7 +9307,7 @@
           </a:ln>
           <a:extLst>
             <a:ext uri="{C572A759-6A51-4108-AA02-DFA0A04FC94B}">
-              <ma14:wrappingTextBoxFlag xmlns:ma14="http://schemas.microsoft.com/office/mac/drawingml/2011/main" xmlns:a14="http://schemas.microsoft.com/office/drawing/2010/main" xmlns:m="http://schemas.openxmlformats.org/officeDocument/2006/math" xmlns="" val="1"/>
+              <ma14:wrappingTextBoxFlag xmlns="" xmlns:m="http://schemas.openxmlformats.org/officeDocument/2006/math" xmlns:a14="http://schemas.microsoft.com/office/drawing/2010/main" xmlns:ma14="http://schemas.microsoft.com/office/mac/drawingml/2011/main" val="1"/>
             </a:ext>
           </a:extLst>
         </p:spPr>
@@ -10091,7 +10091,7 @@
           </a:ln>
           <a:extLst>
             <a:ext uri="{C572A759-6A51-4108-AA02-DFA0A04FC94B}">
-              <ma14:wrappingTextBoxFlag xmlns:ma14="http://schemas.microsoft.com/office/mac/drawingml/2011/main" xmlns:a14="http://schemas.microsoft.com/office/drawing/2010/main" xmlns:m="http://schemas.openxmlformats.org/officeDocument/2006/math" xmlns="" val="1"/>
+              <ma14:wrappingTextBoxFlag xmlns="" xmlns:m="http://schemas.openxmlformats.org/officeDocument/2006/math" xmlns:a14="http://schemas.microsoft.com/office/drawing/2010/main" xmlns:ma14="http://schemas.microsoft.com/office/mac/drawingml/2011/main" val="1"/>
             </a:ext>
           </a:extLst>
         </p:spPr>
@@ -10253,7 +10253,7 @@
           </a:ln>
           <a:extLst>
             <a:ext uri="{C572A759-6A51-4108-AA02-DFA0A04FC94B}">
-              <ma14:wrappingTextBoxFlag xmlns:ma14="http://schemas.microsoft.com/office/mac/drawingml/2011/main" xmlns:a14="http://schemas.microsoft.com/office/drawing/2010/main" xmlns:m="http://schemas.openxmlformats.org/officeDocument/2006/math" xmlns="" val="1"/>
+              <ma14:wrappingTextBoxFlag xmlns="" xmlns:m="http://schemas.openxmlformats.org/officeDocument/2006/math" xmlns:a14="http://schemas.microsoft.com/office/drawing/2010/main" xmlns:ma14="http://schemas.microsoft.com/office/mac/drawingml/2011/main" val="1"/>
             </a:ext>
           </a:extLst>
         </p:spPr>
@@ -10401,7 +10401,7 @@
             <a:effectLst/>
             <a:extLst>
               <a:ext uri="{C572A759-6A51-4108-AA02-DFA0A04FC94B}">
-                <ma14:wrappingTextBoxFlag xmlns:ma14="http://schemas.microsoft.com/office/mac/drawingml/2011/main" xmlns:a14="http://schemas.microsoft.com/office/drawing/2010/main" xmlns:m="http://schemas.openxmlformats.org/officeDocument/2006/math" xmlns="" val="1"/>
+                <ma14:wrappingTextBoxFlag xmlns="" xmlns:m="http://schemas.openxmlformats.org/officeDocument/2006/math" xmlns:a14="http://schemas.microsoft.com/office/drawing/2010/main" xmlns:ma14="http://schemas.microsoft.com/office/mac/drawingml/2011/main" val="1"/>
               </a:ext>
             </a:extLst>
           </p:spPr>
@@ -10503,7 +10503,7 @@
             <a:effectLst/>
             <a:extLst>
               <a:ext uri="{C572A759-6A51-4108-AA02-DFA0A04FC94B}">
-                <ma14:wrappingTextBoxFlag xmlns:ma14="http://schemas.microsoft.com/office/mac/drawingml/2011/main" xmlns:a14="http://schemas.microsoft.com/office/drawing/2010/main" xmlns:m="http://schemas.openxmlformats.org/officeDocument/2006/math" xmlns="" val="1"/>
+                <ma14:wrappingTextBoxFlag xmlns="" xmlns:m="http://schemas.openxmlformats.org/officeDocument/2006/math" xmlns:a14="http://schemas.microsoft.com/office/drawing/2010/main" xmlns:ma14="http://schemas.microsoft.com/office/mac/drawingml/2011/main" val="1"/>
               </a:ext>
             </a:extLst>
           </p:spPr>
@@ -10635,7 +10635,7 @@
             <a:effectLst/>
             <a:extLst>
               <a:ext uri="{C572A759-6A51-4108-AA02-DFA0A04FC94B}">
-                <ma14:wrappingTextBoxFlag xmlns:ma14="http://schemas.microsoft.com/office/mac/drawingml/2011/main" xmlns:a14="http://schemas.microsoft.com/office/drawing/2010/main" xmlns:m="http://schemas.openxmlformats.org/officeDocument/2006/math" xmlns="" val="1"/>
+                <ma14:wrappingTextBoxFlag xmlns="" xmlns:m="http://schemas.openxmlformats.org/officeDocument/2006/math" xmlns:a14="http://schemas.microsoft.com/office/drawing/2010/main" xmlns:ma14="http://schemas.microsoft.com/office/mac/drawingml/2011/main" val="1"/>
               </a:ext>
             </a:extLst>
           </p:spPr>
@@ -10767,7 +10767,7 @@
             <a:effectLst/>
             <a:extLst>
               <a:ext uri="{C572A759-6A51-4108-AA02-DFA0A04FC94B}">
-                <ma14:wrappingTextBoxFlag xmlns:ma14="http://schemas.microsoft.com/office/mac/drawingml/2011/main" xmlns:a14="http://schemas.microsoft.com/office/drawing/2010/main" xmlns:m="http://schemas.openxmlformats.org/officeDocument/2006/math" xmlns="" val="1"/>
+                <ma14:wrappingTextBoxFlag xmlns="" xmlns:m="http://schemas.openxmlformats.org/officeDocument/2006/math" xmlns:a14="http://schemas.microsoft.com/office/drawing/2010/main" xmlns:ma14="http://schemas.microsoft.com/office/mac/drawingml/2011/main" val="1"/>
               </a:ext>
             </a:extLst>
           </p:spPr>
@@ -10901,7 +10901,7 @@
           </a:ln>
           <a:extLst>
             <a:ext uri="{C572A759-6A51-4108-AA02-DFA0A04FC94B}">
-              <ma14:wrappingTextBoxFlag xmlns:ma14="http://schemas.microsoft.com/office/mac/drawingml/2011/main" xmlns:a14="http://schemas.microsoft.com/office/drawing/2010/main" xmlns:m="http://schemas.openxmlformats.org/officeDocument/2006/math" xmlns="" val="1"/>
+              <ma14:wrappingTextBoxFlag xmlns="" xmlns:m="http://schemas.openxmlformats.org/officeDocument/2006/math" xmlns:a14="http://schemas.microsoft.com/office/drawing/2010/main" xmlns:ma14="http://schemas.microsoft.com/office/mac/drawingml/2011/main" val="1"/>
             </a:ext>
           </a:extLst>
         </p:spPr>
@@ -11007,7 +11007,7 @@
           </a:ln>
           <a:extLst>
             <a:ext uri="{C572A759-6A51-4108-AA02-DFA0A04FC94B}">
-              <ma14:wrappingTextBoxFlag xmlns:ma14="http://schemas.microsoft.com/office/mac/drawingml/2011/main" xmlns:a14="http://schemas.microsoft.com/office/drawing/2010/main" xmlns:m="http://schemas.openxmlformats.org/officeDocument/2006/math" xmlns="" val="1"/>
+              <ma14:wrappingTextBoxFlag xmlns="" xmlns:m="http://schemas.openxmlformats.org/officeDocument/2006/math" xmlns:a14="http://schemas.microsoft.com/office/drawing/2010/main" xmlns:ma14="http://schemas.microsoft.com/office/mac/drawingml/2011/main" val="1"/>
             </a:ext>
           </a:extLst>
         </p:spPr>
@@ -11097,7 +11097,7 @@
           </a:ln>
           <a:extLst>
             <a:ext uri="{C572A759-6A51-4108-AA02-DFA0A04FC94B}">
-              <ma14:wrappingTextBoxFlag xmlns:ma14="http://schemas.microsoft.com/office/mac/drawingml/2011/main" xmlns:a14="http://schemas.microsoft.com/office/drawing/2010/main" xmlns:m="http://schemas.openxmlformats.org/officeDocument/2006/math" xmlns="" val="1"/>
+              <ma14:wrappingTextBoxFlag xmlns="" xmlns:m="http://schemas.openxmlformats.org/officeDocument/2006/math" xmlns:a14="http://schemas.microsoft.com/office/drawing/2010/main" xmlns:ma14="http://schemas.microsoft.com/office/mac/drawingml/2011/main" val="1"/>
             </a:ext>
           </a:extLst>
         </p:spPr>
@@ -11446,7 +11446,7 @@
             <a:effectLst/>
             <a:extLst>
               <a:ext uri="{C572A759-6A51-4108-AA02-DFA0A04FC94B}">
-                <ma14:wrappingTextBoxFlag xmlns:ma14="http://schemas.microsoft.com/office/mac/drawingml/2011/main" xmlns:a14="http://schemas.microsoft.com/office/drawing/2010/main" xmlns:m="http://schemas.openxmlformats.org/officeDocument/2006/math" xmlns="" val="1"/>
+                <ma14:wrappingTextBoxFlag xmlns="" xmlns:m="http://schemas.openxmlformats.org/officeDocument/2006/math" xmlns:a14="http://schemas.microsoft.com/office/drawing/2010/main" xmlns:ma14="http://schemas.microsoft.com/office/mac/drawingml/2011/main" val="1"/>
               </a:ext>
             </a:extLst>
           </p:spPr>
@@ -11608,7 +11608,7 @@
             <a:effectLst/>
             <a:extLst>
               <a:ext uri="{C572A759-6A51-4108-AA02-DFA0A04FC94B}">
-                <ma14:wrappingTextBoxFlag xmlns:ma14="http://schemas.microsoft.com/office/mac/drawingml/2011/main" xmlns:a14="http://schemas.microsoft.com/office/drawing/2010/main" xmlns:m="http://schemas.openxmlformats.org/officeDocument/2006/math" xmlns="" val="1"/>
+                <ma14:wrappingTextBoxFlag xmlns="" xmlns:m="http://schemas.openxmlformats.org/officeDocument/2006/math" xmlns:a14="http://schemas.microsoft.com/office/drawing/2010/main" xmlns:ma14="http://schemas.microsoft.com/office/mac/drawingml/2011/main" val="1"/>
               </a:ext>
             </a:extLst>
           </p:spPr>
@@ -11740,7 +11740,7 @@
             <a:effectLst/>
             <a:extLst>
               <a:ext uri="{C572A759-6A51-4108-AA02-DFA0A04FC94B}">
-                <ma14:wrappingTextBoxFlag xmlns:ma14="http://schemas.microsoft.com/office/mac/drawingml/2011/main" xmlns:a14="http://schemas.microsoft.com/office/drawing/2010/main" xmlns:m="http://schemas.openxmlformats.org/officeDocument/2006/math" xmlns="" val="1"/>
+                <ma14:wrappingTextBoxFlag xmlns="" xmlns:m="http://schemas.openxmlformats.org/officeDocument/2006/math" xmlns:a14="http://schemas.microsoft.com/office/drawing/2010/main" xmlns:ma14="http://schemas.microsoft.com/office/mac/drawingml/2011/main" val="1"/>
               </a:ext>
             </a:extLst>
           </p:spPr>
@@ -11960,7 +11960,7 @@
             <a:effectLst/>
             <a:extLst>
               <a:ext uri="{C572A759-6A51-4108-AA02-DFA0A04FC94B}">
-                <ma14:wrappingTextBoxFlag xmlns:ma14="http://schemas.microsoft.com/office/mac/drawingml/2011/main" xmlns:a14="http://schemas.microsoft.com/office/drawing/2010/main" xmlns:m="http://schemas.openxmlformats.org/officeDocument/2006/math" xmlns="" val="1"/>
+                <ma14:wrappingTextBoxFlag xmlns="" xmlns:m="http://schemas.openxmlformats.org/officeDocument/2006/math" xmlns:a14="http://schemas.microsoft.com/office/drawing/2010/main" xmlns:ma14="http://schemas.microsoft.com/office/mac/drawingml/2011/main" val="1"/>
               </a:ext>
             </a:extLst>
           </p:spPr>
@@ -12092,7 +12092,7 @@
             <a:effectLst/>
             <a:extLst>
               <a:ext uri="{C572A759-6A51-4108-AA02-DFA0A04FC94B}">
-                <ma14:wrappingTextBoxFlag xmlns:ma14="http://schemas.microsoft.com/office/mac/drawingml/2011/main" xmlns:a14="http://schemas.microsoft.com/office/drawing/2010/main" xmlns:m="http://schemas.openxmlformats.org/officeDocument/2006/math" xmlns="" val="1"/>
+                <ma14:wrappingTextBoxFlag xmlns="" xmlns:m="http://schemas.openxmlformats.org/officeDocument/2006/math" xmlns:a14="http://schemas.microsoft.com/office/drawing/2010/main" xmlns:ma14="http://schemas.microsoft.com/office/mac/drawingml/2011/main" val="1"/>
               </a:ext>
             </a:extLst>
           </p:spPr>
@@ -12342,7 +12342,7 @@
             <a:effectLst/>
             <a:extLst>
               <a:ext uri="{C572A759-6A51-4108-AA02-DFA0A04FC94B}">
-                <ma14:wrappingTextBoxFlag xmlns:ma14="http://schemas.microsoft.com/office/mac/drawingml/2011/main" xmlns:a14="http://schemas.microsoft.com/office/drawing/2010/main" xmlns:m="http://schemas.openxmlformats.org/officeDocument/2006/math" xmlns="" val="1"/>
+                <ma14:wrappingTextBoxFlag xmlns="" xmlns:m="http://schemas.openxmlformats.org/officeDocument/2006/math" xmlns:a14="http://schemas.microsoft.com/office/drawing/2010/main" xmlns:ma14="http://schemas.microsoft.com/office/mac/drawingml/2011/main" val="1"/>
               </a:ext>
             </a:extLst>
           </p:spPr>
@@ -12386,7 +12386,7 @@
           </a:ln>
           <a:extLst>
             <a:ext uri="{C572A759-6A51-4108-AA02-DFA0A04FC94B}">
-              <ma14:wrappingTextBoxFlag xmlns:ma14="http://schemas.microsoft.com/office/mac/drawingml/2011/main" xmlns:a14="http://schemas.microsoft.com/office/drawing/2010/main" xmlns:m="http://schemas.openxmlformats.org/officeDocument/2006/math" xmlns="" val="1"/>
+              <ma14:wrappingTextBoxFlag xmlns="" xmlns:m="http://schemas.openxmlformats.org/officeDocument/2006/math" xmlns:a14="http://schemas.microsoft.com/office/drawing/2010/main" xmlns:ma14="http://schemas.microsoft.com/office/mac/drawingml/2011/main" val="1"/>
             </a:ext>
           </a:extLst>
         </p:spPr>
@@ -12429,7 +12429,7 @@
           </a:ln>
           <a:extLst>
             <a:ext uri="{C572A759-6A51-4108-AA02-DFA0A04FC94B}">
-              <ma14:wrappingTextBoxFlag xmlns:ma14="http://schemas.microsoft.com/office/mac/drawingml/2011/main" xmlns:a14="http://schemas.microsoft.com/office/drawing/2010/main" xmlns:m="http://schemas.openxmlformats.org/officeDocument/2006/math" xmlns="" val="1"/>
+              <ma14:wrappingTextBoxFlag xmlns="" xmlns:m="http://schemas.openxmlformats.org/officeDocument/2006/math" xmlns:a14="http://schemas.microsoft.com/office/drawing/2010/main" xmlns:ma14="http://schemas.microsoft.com/office/mac/drawingml/2011/main" val="1"/>
             </a:ext>
           </a:extLst>
         </p:spPr>
@@ -12472,7 +12472,7 @@
           </a:ln>
           <a:extLst>
             <a:ext uri="{C572A759-6A51-4108-AA02-DFA0A04FC94B}">
-              <ma14:wrappingTextBoxFlag xmlns:ma14="http://schemas.microsoft.com/office/mac/drawingml/2011/main" xmlns:a14="http://schemas.microsoft.com/office/drawing/2010/main" xmlns:m="http://schemas.openxmlformats.org/officeDocument/2006/math" xmlns="" val="1"/>
+              <ma14:wrappingTextBoxFlag xmlns="" xmlns:m="http://schemas.openxmlformats.org/officeDocument/2006/math" xmlns:a14="http://schemas.microsoft.com/office/drawing/2010/main" xmlns:ma14="http://schemas.microsoft.com/office/mac/drawingml/2011/main" val="1"/>
             </a:ext>
           </a:extLst>
         </p:spPr>
@@ -12515,7 +12515,7 @@
           </a:ln>
           <a:extLst>
             <a:ext uri="{C572A759-6A51-4108-AA02-DFA0A04FC94B}">
-              <ma14:wrappingTextBoxFlag xmlns:ma14="http://schemas.microsoft.com/office/mac/drawingml/2011/main" xmlns:a14="http://schemas.microsoft.com/office/drawing/2010/main" xmlns:m="http://schemas.openxmlformats.org/officeDocument/2006/math" xmlns="" val="1"/>
+              <ma14:wrappingTextBoxFlag xmlns="" xmlns:m="http://schemas.openxmlformats.org/officeDocument/2006/math" xmlns:a14="http://schemas.microsoft.com/office/drawing/2010/main" xmlns:ma14="http://schemas.microsoft.com/office/mac/drawingml/2011/main" val="1"/>
             </a:ext>
           </a:extLst>
         </p:spPr>
@@ -12621,7 +12621,7 @@
           </a:ln>
           <a:extLst>
             <a:ext uri="{C572A759-6A51-4108-AA02-DFA0A04FC94B}">
-              <ma14:wrappingTextBoxFlag xmlns:ma14="http://schemas.microsoft.com/office/mac/drawingml/2011/main" xmlns:a14="http://schemas.microsoft.com/office/drawing/2010/main" xmlns:m="http://schemas.openxmlformats.org/officeDocument/2006/math" xmlns="" val="1"/>
+              <ma14:wrappingTextBoxFlag xmlns="" xmlns:m="http://schemas.openxmlformats.org/officeDocument/2006/math" xmlns:a14="http://schemas.microsoft.com/office/drawing/2010/main" xmlns:ma14="http://schemas.microsoft.com/office/mac/drawingml/2011/main" val="1"/>
             </a:ext>
           </a:extLst>
         </p:spPr>
@@ -12779,7 +12779,7 @@
           </a:ln>
           <a:extLst>
             <a:ext uri="{C572A759-6A51-4108-AA02-DFA0A04FC94B}">
-              <ma14:wrappingTextBoxFlag xmlns:ma14="http://schemas.microsoft.com/office/mac/drawingml/2011/main" xmlns:a14="http://schemas.microsoft.com/office/drawing/2010/main" xmlns:m="http://schemas.openxmlformats.org/officeDocument/2006/math" xmlns="" val="1"/>
+              <ma14:wrappingTextBoxFlag xmlns="" xmlns:m="http://schemas.openxmlformats.org/officeDocument/2006/math" xmlns:a14="http://schemas.microsoft.com/office/drawing/2010/main" xmlns:ma14="http://schemas.microsoft.com/office/mac/drawingml/2011/main" val="1"/>
             </a:ext>
           </a:extLst>
         </p:spPr>
@@ -13100,7 +13100,7 @@
             <a:effectLst/>
             <a:extLst>
               <a:ext uri="{C572A759-6A51-4108-AA02-DFA0A04FC94B}">
-                <ma14:wrappingTextBoxFlag xmlns:ma14="http://schemas.microsoft.com/office/mac/drawingml/2011/main" xmlns:a14="http://schemas.microsoft.com/office/drawing/2010/main" xmlns:m="http://schemas.openxmlformats.org/officeDocument/2006/math" xmlns="" val="1"/>
+                <ma14:wrappingTextBoxFlag xmlns="" xmlns:m="http://schemas.openxmlformats.org/officeDocument/2006/math" xmlns:a14="http://schemas.microsoft.com/office/drawing/2010/main" xmlns:ma14="http://schemas.microsoft.com/office/mac/drawingml/2011/main" val="1"/>
               </a:ext>
             </a:extLst>
           </p:spPr>
@@ -13440,7 +13440,7 @@
           </a:ln>
           <a:extLst>
             <a:ext uri="{C572A759-6A51-4108-AA02-DFA0A04FC94B}">
-              <ma14:wrappingTextBoxFlag xmlns:ma14="http://schemas.microsoft.com/office/mac/drawingml/2011/main" xmlns:a14="http://schemas.microsoft.com/office/drawing/2010/main" xmlns:m="http://schemas.openxmlformats.org/officeDocument/2006/math" xmlns="" val="1"/>
+              <ma14:wrappingTextBoxFlag xmlns="" xmlns:m="http://schemas.openxmlformats.org/officeDocument/2006/math" xmlns:a14="http://schemas.microsoft.com/office/drawing/2010/main" xmlns:ma14="http://schemas.microsoft.com/office/mac/drawingml/2011/main" val="1"/>
             </a:ext>
           </a:extLst>
         </p:spPr>
@@ -13501,7 +13501,7 @@
           </a:ln>
           <a:extLst>
             <a:ext uri="{C572A759-6A51-4108-AA02-DFA0A04FC94B}">
-              <ma14:wrappingTextBoxFlag xmlns:ma14="http://schemas.microsoft.com/office/mac/drawingml/2011/main" xmlns:a14="http://schemas.microsoft.com/office/drawing/2010/main" xmlns:m="http://schemas.openxmlformats.org/officeDocument/2006/math" xmlns="" val="1"/>
+              <ma14:wrappingTextBoxFlag xmlns="" xmlns:m="http://schemas.openxmlformats.org/officeDocument/2006/math" xmlns:a14="http://schemas.microsoft.com/office/drawing/2010/main" xmlns:ma14="http://schemas.microsoft.com/office/mac/drawingml/2011/main" val="1"/>
             </a:ext>
           </a:extLst>
         </p:spPr>
@@ -13602,7 +13602,7 @@
             <a:effectLst/>
             <a:extLst>
               <a:ext uri="{C572A759-6A51-4108-AA02-DFA0A04FC94B}">
-                <ma14:wrappingTextBoxFlag xmlns:ma14="http://schemas.microsoft.com/office/mac/drawingml/2011/main" xmlns:a14="http://schemas.microsoft.com/office/drawing/2010/main" xmlns:m="http://schemas.openxmlformats.org/officeDocument/2006/math" xmlns="" val="1"/>
+                <ma14:wrappingTextBoxFlag xmlns="" xmlns:m="http://schemas.openxmlformats.org/officeDocument/2006/math" xmlns:a14="http://schemas.microsoft.com/office/drawing/2010/main" xmlns:ma14="http://schemas.microsoft.com/office/mac/drawingml/2011/main" val="1"/>
               </a:ext>
             </a:extLst>
           </p:spPr>
@@ -13646,7 +13646,7 @@
           </a:ln>
           <a:extLst>
             <a:ext uri="{C572A759-6A51-4108-AA02-DFA0A04FC94B}">
-              <ma14:wrappingTextBoxFlag xmlns:ma14="http://schemas.microsoft.com/office/mac/drawingml/2011/main" xmlns:a14="http://schemas.microsoft.com/office/drawing/2010/main" xmlns:m="http://schemas.openxmlformats.org/officeDocument/2006/math" xmlns="" val="1"/>
+              <ma14:wrappingTextBoxFlag xmlns="" xmlns:m="http://schemas.openxmlformats.org/officeDocument/2006/math" xmlns:a14="http://schemas.microsoft.com/office/drawing/2010/main" xmlns:ma14="http://schemas.microsoft.com/office/mac/drawingml/2011/main" val="1"/>
             </a:ext>
           </a:extLst>
         </p:spPr>
@@ -13747,7 +13747,7 @@
             <a:effectLst/>
             <a:extLst>
               <a:ext uri="{C572A759-6A51-4108-AA02-DFA0A04FC94B}">
-                <ma14:wrappingTextBoxFlag xmlns:ma14="http://schemas.microsoft.com/office/mac/drawingml/2011/main" xmlns:a14="http://schemas.microsoft.com/office/drawing/2010/main" xmlns:m="http://schemas.openxmlformats.org/officeDocument/2006/math" xmlns="" val="1"/>
+                <ma14:wrappingTextBoxFlag xmlns="" xmlns:m="http://schemas.openxmlformats.org/officeDocument/2006/math" xmlns:a14="http://schemas.microsoft.com/office/drawing/2010/main" xmlns:ma14="http://schemas.microsoft.com/office/mac/drawingml/2011/main" val="1"/>
               </a:ext>
             </a:extLst>
           </p:spPr>
@@ -13849,7 +13849,7 @@
             <a:effectLst/>
             <a:extLst>
               <a:ext uri="{C572A759-6A51-4108-AA02-DFA0A04FC94B}">
-                <ma14:wrappingTextBoxFlag xmlns:ma14="http://schemas.microsoft.com/office/mac/drawingml/2011/main" xmlns:a14="http://schemas.microsoft.com/office/drawing/2010/main" xmlns:m="http://schemas.openxmlformats.org/officeDocument/2006/math" xmlns="" val="1"/>
+                <ma14:wrappingTextBoxFlag xmlns="" xmlns:m="http://schemas.openxmlformats.org/officeDocument/2006/math" xmlns:a14="http://schemas.microsoft.com/office/drawing/2010/main" xmlns:ma14="http://schemas.microsoft.com/office/mac/drawingml/2011/main" val="1"/>
               </a:ext>
             </a:extLst>
           </p:spPr>
@@ -13981,7 +13981,7 @@
             <a:effectLst/>
             <a:extLst>
               <a:ext uri="{C572A759-6A51-4108-AA02-DFA0A04FC94B}">
-                <ma14:wrappingTextBoxFlag xmlns:ma14="http://schemas.microsoft.com/office/mac/drawingml/2011/main" xmlns:a14="http://schemas.microsoft.com/office/drawing/2010/main" xmlns:m="http://schemas.openxmlformats.org/officeDocument/2006/math" xmlns="" val="1"/>
+                <ma14:wrappingTextBoxFlag xmlns="" xmlns:m="http://schemas.openxmlformats.org/officeDocument/2006/math" xmlns:a14="http://schemas.microsoft.com/office/drawing/2010/main" xmlns:ma14="http://schemas.microsoft.com/office/mac/drawingml/2011/main" val="1"/>
               </a:ext>
             </a:extLst>
           </p:spPr>
@@ -14108,7 +14108,7 @@
           </a:ln>
           <a:extLst>
             <a:ext uri="{C572A759-6A51-4108-AA02-DFA0A04FC94B}">
-              <ma14:wrappingTextBoxFlag xmlns:ma14="http://schemas.microsoft.com/office/mac/drawingml/2011/main" xmlns:a14="http://schemas.microsoft.com/office/drawing/2010/main" xmlns:m="http://schemas.openxmlformats.org/officeDocument/2006/math" xmlns="" val="1"/>
+              <ma14:wrappingTextBoxFlag xmlns="" xmlns:m="http://schemas.openxmlformats.org/officeDocument/2006/math" xmlns:a14="http://schemas.microsoft.com/office/drawing/2010/main" xmlns:ma14="http://schemas.microsoft.com/office/mac/drawingml/2011/main" val="1"/>
             </a:ext>
           </a:extLst>
         </p:spPr>
@@ -14492,7 +14492,7 @@
           </a:ln>
           <a:extLst>
             <a:ext uri="{C572A759-6A51-4108-AA02-DFA0A04FC94B}">
-              <ma14:wrappingTextBoxFlag xmlns:ma14="http://schemas.microsoft.com/office/mac/drawingml/2011/main" xmlns:a14="http://schemas.microsoft.com/office/drawing/2010/main" xmlns:m="http://schemas.openxmlformats.org/officeDocument/2006/math" xmlns="" val="1"/>
+              <ma14:wrappingTextBoxFlag xmlns="" xmlns:m="http://schemas.openxmlformats.org/officeDocument/2006/math" xmlns:a14="http://schemas.microsoft.com/office/drawing/2010/main" xmlns:ma14="http://schemas.microsoft.com/office/mac/drawingml/2011/main" val="1"/>
             </a:ext>
           </a:extLst>
         </p:spPr>
@@ -14603,7 +14603,7 @@
           </a:ln>
           <a:extLst>
             <a:ext uri="{C572A759-6A51-4108-AA02-DFA0A04FC94B}">
-              <ma14:wrappingTextBoxFlag xmlns:ma14="http://schemas.microsoft.com/office/mac/drawingml/2011/main" xmlns:a14="http://schemas.microsoft.com/office/drawing/2010/main" xmlns:m="http://schemas.openxmlformats.org/officeDocument/2006/math" xmlns="" val="1"/>
+              <ma14:wrappingTextBoxFlag xmlns="" xmlns:m="http://schemas.openxmlformats.org/officeDocument/2006/math" xmlns:a14="http://schemas.microsoft.com/office/drawing/2010/main" xmlns:ma14="http://schemas.microsoft.com/office/mac/drawingml/2011/main" val="1"/>
             </a:ext>
           </a:extLst>
         </p:spPr>
@@ -15064,7 +15064,7 @@
             <a:effectLst/>
             <a:extLst>
               <a:ext uri="{C572A759-6A51-4108-AA02-DFA0A04FC94B}">
-                <ma14:wrappingTextBoxFlag xmlns:ma14="http://schemas.microsoft.com/office/mac/drawingml/2011/main" xmlns:a14="http://schemas.microsoft.com/office/drawing/2010/main" xmlns:m="http://schemas.openxmlformats.org/officeDocument/2006/math" xmlns="" val="1"/>
+                <ma14:wrappingTextBoxFlag xmlns="" xmlns:m="http://schemas.openxmlformats.org/officeDocument/2006/math" xmlns:a14="http://schemas.microsoft.com/office/drawing/2010/main" xmlns:ma14="http://schemas.microsoft.com/office/mac/drawingml/2011/main" val="1"/>
               </a:ext>
             </a:extLst>
           </p:spPr>
@@ -15478,7 +15478,7 @@
           </a:ln>
           <a:extLst>
             <a:ext uri="{C572A759-6A51-4108-AA02-DFA0A04FC94B}">
-              <ma14:wrappingTextBoxFlag xmlns:ma14="http://schemas.microsoft.com/office/mac/drawingml/2011/main" xmlns:a14="http://schemas.microsoft.com/office/drawing/2010/main" xmlns:m="http://schemas.openxmlformats.org/officeDocument/2006/math" xmlns="" val="1"/>
+              <ma14:wrappingTextBoxFlag xmlns="" xmlns:m="http://schemas.openxmlformats.org/officeDocument/2006/math" xmlns:a14="http://schemas.microsoft.com/office/drawing/2010/main" xmlns:ma14="http://schemas.microsoft.com/office/mac/drawingml/2011/main" val="1"/>
             </a:ext>
           </a:extLst>
         </p:spPr>
@@ -15858,7 +15858,7 @@
             <a:effectLst/>
             <a:extLst>
               <a:ext uri="{C572A759-6A51-4108-AA02-DFA0A04FC94B}">
-                <ma14:wrappingTextBoxFlag xmlns:ma14="http://schemas.microsoft.com/office/mac/drawingml/2011/main" xmlns:a14="http://schemas.microsoft.com/office/drawing/2010/main" xmlns:m="http://schemas.openxmlformats.org/officeDocument/2006/math" xmlns="" val="1"/>
+                <ma14:wrappingTextBoxFlag xmlns="" xmlns:m="http://schemas.openxmlformats.org/officeDocument/2006/math" xmlns:a14="http://schemas.microsoft.com/office/drawing/2010/main" xmlns:ma14="http://schemas.microsoft.com/office/mac/drawingml/2011/main" val="1"/>
               </a:ext>
             </a:extLst>
           </p:spPr>
@@ -16149,7 +16149,7 @@
             <a:effectLst/>
             <a:extLst>
               <a:ext uri="{C572A759-6A51-4108-AA02-DFA0A04FC94B}">
-                <ma14:wrappingTextBoxFlag xmlns:ma14="http://schemas.microsoft.com/office/mac/drawingml/2011/main" xmlns:a14="http://schemas.microsoft.com/office/drawing/2010/main" xmlns:m="http://schemas.openxmlformats.org/officeDocument/2006/math" xmlns="" val="1"/>
+                <ma14:wrappingTextBoxFlag xmlns="" xmlns:m="http://schemas.openxmlformats.org/officeDocument/2006/math" xmlns:a14="http://schemas.microsoft.com/office/drawing/2010/main" xmlns:ma14="http://schemas.microsoft.com/office/mac/drawingml/2011/main" val="1"/>
               </a:ext>
             </a:extLst>
           </p:spPr>
@@ -16325,7 +16325,7 @@
             <a:effectLst/>
             <a:extLst>
               <a:ext uri="{C572A759-6A51-4108-AA02-DFA0A04FC94B}">
-                <ma14:wrappingTextBoxFlag xmlns:ma14="http://schemas.microsoft.com/office/mac/drawingml/2011/main" xmlns:a14="http://schemas.microsoft.com/office/drawing/2010/main" xmlns:m="http://schemas.openxmlformats.org/officeDocument/2006/math" xmlns="" val="1"/>
+                <ma14:wrappingTextBoxFlag xmlns="" xmlns:m="http://schemas.openxmlformats.org/officeDocument/2006/math" xmlns:a14="http://schemas.microsoft.com/office/drawing/2010/main" xmlns:ma14="http://schemas.microsoft.com/office/mac/drawingml/2011/main" val="1"/>
               </a:ext>
             </a:extLst>
           </p:spPr>
@@ -16769,7 +16769,7 @@
             <a:effectLst/>
             <a:extLst>
               <a:ext uri="{C572A759-6A51-4108-AA02-DFA0A04FC94B}">
-                <ma14:wrappingTextBoxFlag xmlns:ma14="http://schemas.microsoft.com/office/mac/drawingml/2011/main" xmlns:a14="http://schemas.microsoft.com/office/drawing/2010/main" xmlns:m="http://schemas.openxmlformats.org/officeDocument/2006/math" xmlns="" val="1"/>
+                <ma14:wrappingTextBoxFlag xmlns="" xmlns:m="http://schemas.openxmlformats.org/officeDocument/2006/math" xmlns:a14="http://schemas.microsoft.com/office/drawing/2010/main" xmlns:ma14="http://schemas.microsoft.com/office/mac/drawingml/2011/main" val="1"/>
               </a:ext>
             </a:extLst>
           </p:spPr>
@@ -16903,7 +16903,7 @@
           </a:ln>
           <a:extLst>
             <a:ext uri="{C572A759-6A51-4108-AA02-DFA0A04FC94B}">
-              <ma14:wrappingTextBoxFlag xmlns:ma14="http://schemas.microsoft.com/office/mac/drawingml/2011/main" xmlns:a14="http://schemas.microsoft.com/office/drawing/2010/main" xmlns:m="http://schemas.openxmlformats.org/officeDocument/2006/math" xmlns="" val="1"/>
+              <ma14:wrappingTextBoxFlag xmlns="" xmlns:m="http://schemas.openxmlformats.org/officeDocument/2006/math" xmlns:a14="http://schemas.microsoft.com/office/drawing/2010/main" xmlns:ma14="http://schemas.microsoft.com/office/mac/drawingml/2011/main" val="1"/>
             </a:ext>
           </a:extLst>
         </p:spPr>
@@ -16946,7 +16946,7 @@
           </a:ln>
           <a:extLst>
             <a:ext uri="{C572A759-6A51-4108-AA02-DFA0A04FC94B}">
-              <ma14:wrappingTextBoxFlag xmlns:ma14="http://schemas.microsoft.com/office/mac/drawingml/2011/main" xmlns:a14="http://schemas.microsoft.com/office/drawing/2010/main" xmlns:m="http://schemas.openxmlformats.org/officeDocument/2006/math" xmlns="" val="1"/>
+              <ma14:wrappingTextBoxFlag xmlns="" xmlns:m="http://schemas.openxmlformats.org/officeDocument/2006/math" xmlns:a14="http://schemas.microsoft.com/office/drawing/2010/main" xmlns:ma14="http://schemas.microsoft.com/office/mac/drawingml/2011/main" val="1"/>
             </a:ext>
           </a:extLst>
         </p:spPr>
@@ -17018,7 +17018,7 @@
           </a:ln>
           <a:extLst>
             <a:ext uri="{C572A759-6A51-4108-AA02-DFA0A04FC94B}">
-              <ma14:wrappingTextBoxFlag xmlns:ma14="http://schemas.microsoft.com/office/mac/drawingml/2011/main" xmlns:a14="http://schemas.microsoft.com/office/drawing/2010/main" xmlns:m="http://schemas.openxmlformats.org/officeDocument/2006/math" xmlns="" val="1"/>
+              <ma14:wrappingTextBoxFlag xmlns="" xmlns:m="http://schemas.openxmlformats.org/officeDocument/2006/math" xmlns:a14="http://schemas.microsoft.com/office/drawing/2010/main" xmlns:ma14="http://schemas.microsoft.com/office/mac/drawingml/2011/main" val="1"/>
             </a:ext>
           </a:extLst>
         </p:spPr>

</xml_diff>

<commit_message>
Reduced size of class 1 slides, added new slides for class 5
</commit_message>
<xml_diff>
--- a/slides/Pythonlearn-01-Intro.pptx
+++ b/slides/Pythonlearn-01-Intro.pptx
@@ -1150,7 +1150,7 @@
           </a:ln>
           <a:extLst>
             <a:ext uri="{C572A759-6A51-4108-AA02-DFA0A04FC94B}">
-              <ma14:wrappingTextBoxFlag xmlns="" xmlns:m="http://schemas.openxmlformats.org/officeDocument/2006/math" xmlns:a14="http://schemas.microsoft.com/office/drawing/2010/main" xmlns:ma14="http://schemas.microsoft.com/office/mac/drawingml/2011/main" val="1"/>
+              <ma14:wrappingTextBoxFlag xmlns:ma14="http://schemas.microsoft.com/office/mac/drawingml/2011/main" xmlns:a14="http://schemas.microsoft.com/office/drawing/2010/main" xmlns:m="http://schemas.openxmlformats.org/officeDocument/2006/math" xmlns="" val="1"/>
             </a:ext>
           </a:extLst>
         </p:spPr>
@@ -1189,7 +1189,7 @@
           </a:ln>
           <a:extLst>
             <a:ext uri="{C572A759-6A51-4108-AA02-DFA0A04FC94B}">
-              <ma14:wrappingTextBoxFlag xmlns="" xmlns:m="http://schemas.openxmlformats.org/officeDocument/2006/math" xmlns:a14="http://schemas.microsoft.com/office/drawing/2010/main" xmlns:ma14="http://schemas.microsoft.com/office/mac/drawingml/2011/main" val="1"/>
+              <ma14:wrappingTextBoxFlag xmlns:ma14="http://schemas.microsoft.com/office/mac/drawingml/2011/main" xmlns:a14="http://schemas.microsoft.com/office/drawing/2010/main" xmlns:m="http://schemas.openxmlformats.org/officeDocument/2006/math" xmlns="" val="1"/>
             </a:ext>
           </a:extLst>
         </p:spPr>
@@ -2200,7 +2200,7 @@
           </a:ln>
           <a:extLst>
             <a:ext uri="{C572A759-6A51-4108-AA02-DFA0A04FC94B}">
-              <ma14:wrappingTextBoxFlag xmlns="" xmlns:m="http://schemas.openxmlformats.org/officeDocument/2006/math" xmlns:a14="http://schemas.microsoft.com/office/drawing/2010/main" xmlns:ma14="http://schemas.microsoft.com/office/mac/drawingml/2011/main" val="1"/>
+              <ma14:wrappingTextBoxFlag xmlns:ma14="http://schemas.microsoft.com/office/mac/drawingml/2011/main" xmlns:a14="http://schemas.microsoft.com/office/drawing/2010/main" xmlns:m="http://schemas.openxmlformats.org/officeDocument/2006/math" xmlns="" val="1"/>
             </a:ext>
           </a:extLst>
         </p:spPr>
@@ -2759,7 +2759,7 @@
           </a:ln>
           <a:extLst>
             <a:ext uri="{C572A759-6A51-4108-AA02-DFA0A04FC94B}">
-              <ma14:wrappingTextBoxFlag xmlns="" xmlns:m="http://schemas.openxmlformats.org/officeDocument/2006/math" xmlns:a14="http://schemas.microsoft.com/office/drawing/2010/main" xmlns:ma14="http://schemas.microsoft.com/office/mac/drawingml/2011/main" val="1"/>
+              <ma14:wrappingTextBoxFlag xmlns:ma14="http://schemas.microsoft.com/office/mac/drawingml/2011/main" xmlns:a14="http://schemas.microsoft.com/office/drawing/2010/main" xmlns:m="http://schemas.openxmlformats.org/officeDocument/2006/math" xmlns="" val="1"/>
             </a:ext>
           </a:extLst>
         </p:spPr>
@@ -3081,7 +3081,7 @@
             <a:effectLst/>
             <a:extLst>
               <a:ext uri="{C572A759-6A51-4108-AA02-DFA0A04FC94B}">
-                <ma14:wrappingTextBoxFlag xmlns="" xmlns:m="http://schemas.openxmlformats.org/officeDocument/2006/math" xmlns:a14="http://schemas.microsoft.com/office/drawing/2010/main" xmlns:ma14="http://schemas.microsoft.com/office/mac/drawingml/2011/main" val="1"/>
+                <ma14:wrappingTextBoxFlag xmlns:ma14="http://schemas.microsoft.com/office/mac/drawingml/2011/main" xmlns:a14="http://schemas.microsoft.com/office/drawing/2010/main" xmlns:m="http://schemas.openxmlformats.org/officeDocument/2006/math" xmlns="" val="1"/>
               </a:ext>
             </a:extLst>
           </p:spPr>
@@ -3193,7 +3193,7 @@
             <a:effectLst/>
             <a:extLst>
               <a:ext uri="{C572A759-6A51-4108-AA02-DFA0A04FC94B}">
-                <ma14:wrappingTextBoxFlag xmlns="" xmlns:m="http://schemas.openxmlformats.org/officeDocument/2006/math" xmlns:a14="http://schemas.microsoft.com/office/drawing/2010/main" xmlns:ma14="http://schemas.microsoft.com/office/mac/drawingml/2011/main" val="1"/>
+                <ma14:wrappingTextBoxFlag xmlns:ma14="http://schemas.microsoft.com/office/mac/drawingml/2011/main" xmlns:a14="http://schemas.microsoft.com/office/drawing/2010/main" xmlns:m="http://schemas.openxmlformats.org/officeDocument/2006/math" xmlns="" val="1"/>
               </a:ext>
             </a:extLst>
           </p:spPr>
@@ -3328,7 +3328,7 @@
             <a:effectLst/>
             <a:extLst>
               <a:ext uri="{C572A759-6A51-4108-AA02-DFA0A04FC94B}">
-                <ma14:wrappingTextBoxFlag xmlns="" xmlns:m="http://schemas.openxmlformats.org/officeDocument/2006/math" xmlns:a14="http://schemas.microsoft.com/office/drawing/2010/main" xmlns:ma14="http://schemas.microsoft.com/office/mac/drawingml/2011/main" val="1"/>
+                <ma14:wrappingTextBoxFlag xmlns:ma14="http://schemas.microsoft.com/office/mac/drawingml/2011/main" xmlns:a14="http://schemas.microsoft.com/office/drawing/2010/main" xmlns:m="http://schemas.openxmlformats.org/officeDocument/2006/math" xmlns="" val="1"/>
               </a:ext>
             </a:extLst>
           </p:spPr>
@@ -3463,7 +3463,7 @@
             <a:effectLst/>
             <a:extLst>
               <a:ext uri="{C572A759-6A51-4108-AA02-DFA0A04FC94B}">
-                <ma14:wrappingTextBoxFlag xmlns="" xmlns:m="http://schemas.openxmlformats.org/officeDocument/2006/math" xmlns:a14="http://schemas.microsoft.com/office/drawing/2010/main" xmlns:ma14="http://schemas.microsoft.com/office/mac/drawingml/2011/main" val="1"/>
+                <ma14:wrappingTextBoxFlag xmlns:ma14="http://schemas.microsoft.com/office/mac/drawingml/2011/main" xmlns:a14="http://schemas.microsoft.com/office/drawing/2010/main" xmlns:m="http://schemas.openxmlformats.org/officeDocument/2006/math" xmlns="" val="1"/>
               </a:ext>
             </a:extLst>
           </p:spPr>
@@ -3581,7 +3581,7 @@
             <a:effectLst/>
             <a:extLst>
               <a:ext uri="{C572A759-6A51-4108-AA02-DFA0A04FC94B}">
-                <ma14:wrappingTextBoxFlag xmlns="" xmlns:m="http://schemas.openxmlformats.org/officeDocument/2006/math" xmlns:a14="http://schemas.microsoft.com/office/drawing/2010/main" xmlns:ma14="http://schemas.microsoft.com/office/mac/drawingml/2011/main" val="1"/>
+                <ma14:wrappingTextBoxFlag xmlns:ma14="http://schemas.microsoft.com/office/mac/drawingml/2011/main" xmlns:a14="http://schemas.microsoft.com/office/drawing/2010/main" xmlns:m="http://schemas.openxmlformats.org/officeDocument/2006/math" xmlns="" val="1"/>
               </a:ext>
             </a:extLst>
           </p:spPr>
@@ -3792,7 +3792,7 @@
           </a:ln>
           <a:extLst>
             <a:ext uri="{C572A759-6A51-4108-AA02-DFA0A04FC94B}">
-              <ma14:wrappingTextBoxFlag xmlns="" xmlns:m="http://schemas.openxmlformats.org/officeDocument/2006/math" xmlns:a14="http://schemas.microsoft.com/office/drawing/2010/main" xmlns:ma14="http://schemas.microsoft.com/office/mac/drawingml/2011/main" val="1"/>
+              <ma14:wrappingTextBoxFlag xmlns:ma14="http://schemas.microsoft.com/office/mac/drawingml/2011/main" xmlns:a14="http://schemas.microsoft.com/office/drawing/2010/main" xmlns:m="http://schemas.openxmlformats.org/officeDocument/2006/math" xmlns="" val="1"/>
             </a:ext>
           </a:extLst>
         </p:spPr>
@@ -3919,7 +3919,7 @@
             <a:effectLst/>
             <a:extLst>
               <a:ext uri="{C572A759-6A51-4108-AA02-DFA0A04FC94B}">
-                <ma14:wrappingTextBoxFlag xmlns="" xmlns:m="http://schemas.openxmlformats.org/officeDocument/2006/math" xmlns:a14="http://schemas.microsoft.com/office/drawing/2010/main" xmlns:ma14="http://schemas.microsoft.com/office/mac/drawingml/2011/main" val="1"/>
+                <ma14:wrappingTextBoxFlag xmlns:ma14="http://schemas.microsoft.com/office/mac/drawingml/2011/main" xmlns:a14="http://schemas.microsoft.com/office/drawing/2010/main" xmlns:m="http://schemas.openxmlformats.org/officeDocument/2006/math" xmlns="" val="1"/>
               </a:ext>
             </a:extLst>
           </p:spPr>
@@ -4322,7 +4322,7 @@
             <a:effectLst/>
             <a:extLst>
               <a:ext uri="{C572A759-6A51-4108-AA02-DFA0A04FC94B}">
-                <ma14:wrappingTextBoxFlag xmlns="" xmlns:m="http://schemas.openxmlformats.org/officeDocument/2006/math" xmlns:a14="http://schemas.microsoft.com/office/drawing/2010/main" xmlns:ma14="http://schemas.microsoft.com/office/mac/drawingml/2011/main" val="1"/>
+                <ma14:wrappingTextBoxFlag xmlns:ma14="http://schemas.microsoft.com/office/mac/drawingml/2011/main" xmlns:a14="http://schemas.microsoft.com/office/drawing/2010/main" xmlns:m="http://schemas.openxmlformats.org/officeDocument/2006/math" xmlns="" val="1"/>
               </a:ext>
             </a:extLst>
           </p:spPr>
@@ -4464,7 +4464,7 @@
             <a:effectLst/>
             <a:extLst>
               <a:ext uri="{C572A759-6A51-4108-AA02-DFA0A04FC94B}">
-                <ma14:wrappingTextBoxFlag xmlns="" xmlns:m="http://schemas.openxmlformats.org/officeDocument/2006/math" xmlns:a14="http://schemas.microsoft.com/office/drawing/2010/main" xmlns:ma14="http://schemas.microsoft.com/office/mac/drawingml/2011/main" val="1"/>
+                <ma14:wrappingTextBoxFlag xmlns:ma14="http://schemas.microsoft.com/office/mac/drawingml/2011/main" xmlns:a14="http://schemas.microsoft.com/office/drawing/2010/main" xmlns:m="http://schemas.openxmlformats.org/officeDocument/2006/math" xmlns="" val="1"/>
               </a:ext>
             </a:extLst>
           </p:spPr>
@@ -4569,7 +4569,7 @@
             <a:effectLst/>
             <a:extLst>
               <a:ext uri="{C572A759-6A51-4108-AA02-DFA0A04FC94B}">
-                <ma14:wrappingTextBoxFlag xmlns="" xmlns:m="http://schemas.openxmlformats.org/officeDocument/2006/math" xmlns:a14="http://schemas.microsoft.com/office/drawing/2010/main" xmlns:ma14="http://schemas.microsoft.com/office/mac/drawingml/2011/main" val="1"/>
+                <ma14:wrappingTextBoxFlag xmlns:ma14="http://schemas.microsoft.com/office/mac/drawingml/2011/main" xmlns:a14="http://schemas.microsoft.com/office/drawing/2010/main" xmlns:m="http://schemas.openxmlformats.org/officeDocument/2006/math" xmlns="" val="1"/>
               </a:ext>
             </a:extLst>
           </p:spPr>
@@ -4704,7 +4704,7 @@
             <a:effectLst/>
             <a:extLst>
               <a:ext uri="{C572A759-6A51-4108-AA02-DFA0A04FC94B}">
-                <ma14:wrappingTextBoxFlag xmlns="" xmlns:m="http://schemas.openxmlformats.org/officeDocument/2006/math" xmlns:a14="http://schemas.microsoft.com/office/drawing/2010/main" xmlns:ma14="http://schemas.microsoft.com/office/mac/drawingml/2011/main" val="1"/>
+                <ma14:wrappingTextBoxFlag xmlns:ma14="http://schemas.microsoft.com/office/mac/drawingml/2011/main" xmlns:a14="http://schemas.microsoft.com/office/drawing/2010/main" xmlns:m="http://schemas.openxmlformats.org/officeDocument/2006/math" xmlns="" val="1"/>
               </a:ext>
             </a:extLst>
           </p:spPr>
@@ -4839,7 +4839,7 @@
             <a:effectLst/>
             <a:extLst>
               <a:ext uri="{C572A759-6A51-4108-AA02-DFA0A04FC94B}">
-                <ma14:wrappingTextBoxFlag xmlns="" xmlns:m="http://schemas.openxmlformats.org/officeDocument/2006/math" xmlns:a14="http://schemas.microsoft.com/office/drawing/2010/main" xmlns:ma14="http://schemas.microsoft.com/office/mac/drawingml/2011/main" val="1"/>
+                <ma14:wrappingTextBoxFlag xmlns:ma14="http://schemas.microsoft.com/office/mac/drawingml/2011/main" xmlns:a14="http://schemas.microsoft.com/office/drawing/2010/main" xmlns:m="http://schemas.openxmlformats.org/officeDocument/2006/math" xmlns="" val="1"/>
               </a:ext>
             </a:extLst>
           </p:spPr>
@@ -4957,7 +4957,7 @@
             <a:effectLst/>
             <a:extLst>
               <a:ext uri="{C572A759-6A51-4108-AA02-DFA0A04FC94B}">
-                <ma14:wrappingTextBoxFlag xmlns="" xmlns:m="http://schemas.openxmlformats.org/officeDocument/2006/math" xmlns:a14="http://schemas.microsoft.com/office/drawing/2010/main" xmlns:ma14="http://schemas.microsoft.com/office/mac/drawingml/2011/main" val="1"/>
+                <ma14:wrappingTextBoxFlag xmlns:ma14="http://schemas.microsoft.com/office/mac/drawingml/2011/main" xmlns:a14="http://schemas.microsoft.com/office/drawing/2010/main" xmlns:m="http://schemas.openxmlformats.org/officeDocument/2006/math" xmlns="" val="1"/>
               </a:ext>
             </a:extLst>
           </p:spPr>
@@ -5168,7 +5168,7 @@
           </a:ln>
           <a:extLst>
             <a:ext uri="{C572A759-6A51-4108-AA02-DFA0A04FC94B}">
-              <ma14:wrappingTextBoxFlag xmlns="" xmlns:m="http://schemas.openxmlformats.org/officeDocument/2006/math" xmlns:a14="http://schemas.microsoft.com/office/drawing/2010/main" xmlns:ma14="http://schemas.microsoft.com/office/mac/drawingml/2011/main" val="1"/>
+              <ma14:wrappingTextBoxFlag xmlns:ma14="http://schemas.microsoft.com/office/mac/drawingml/2011/main" xmlns:a14="http://schemas.microsoft.com/office/drawing/2010/main" xmlns:m="http://schemas.openxmlformats.org/officeDocument/2006/math" xmlns="" val="1"/>
             </a:ext>
           </a:extLst>
         </p:spPr>
@@ -5295,7 +5295,7 @@
             <a:effectLst/>
             <a:extLst>
               <a:ext uri="{C572A759-6A51-4108-AA02-DFA0A04FC94B}">
-                <ma14:wrappingTextBoxFlag xmlns="" xmlns:m="http://schemas.openxmlformats.org/officeDocument/2006/math" xmlns:a14="http://schemas.microsoft.com/office/drawing/2010/main" xmlns:ma14="http://schemas.microsoft.com/office/mac/drawingml/2011/main" val="1"/>
+                <ma14:wrappingTextBoxFlag xmlns:ma14="http://schemas.microsoft.com/office/mac/drawingml/2011/main" xmlns:a14="http://schemas.microsoft.com/office/drawing/2010/main" xmlns:m="http://schemas.openxmlformats.org/officeDocument/2006/math" xmlns="" val="1"/>
               </a:ext>
             </a:extLst>
           </p:spPr>
@@ -5442,7 +5442,7 @@
             <a:effectLst/>
             <a:extLst>
               <a:ext uri="{C572A759-6A51-4108-AA02-DFA0A04FC94B}">
-                <ma14:wrappingTextBoxFlag xmlns="" xmlns:m="http://schemas.openxmlformats.org/officeDocument/2006/math" xmlns:a14="http://schemas.microsoft.com/office/drawing/2010/main" xmlns:ma14="http://schemas.microsoft.com/office/mac/drawingml/2011/main" val="1"/>
+                <ma14:wrappingTextBoxFlag xmlns:ma14="http://schemas.microsoft.com/office/mac/drawingml/2011/main" xmlns:a14="http://schemas.microsoft.com/office/drawing/2010/main" xmlns:m="http://schemas.openxmlformats.org/officeDocument/2006/math" xmlns="" val="1"/>
               </a:ext>
             </a:extLst>
           </p:spPr>
@@ -5582,7 +5582,7 @@
             <a:effectLst/>
             <a:extLst>
               <a:ext uri="{C572A759-6A51-4108-AA02-DFA0A04FC94B}">
-                <ma14:wrappingTextBoxFlag xmlns="" xmlns:m="http://schemas.openxmlformats.org/officeDocument/2006/math" xmlns:a14="http://schemas.microsoft.com/office/drawing/2010/main" xmlns:ma14="http://schemas.microsoft.com/office/mac/drawingml/2011/main" val="1"/>
+                <ma14:wrappingTextBoxFlag xmlns:ma14="http://schemas.microsoft.com/office/mac/drawingml/2011/main" xmlns:a14="http://schemas.microsoft.com/office/drawing/2010/main" xmlns:m="http://schemas.openxmlformats.org/officeDocument/2006/math" xmlns="" val="1"/>
               </a:ext>
             </a:extLst>
           </p:spPr>
@@ -5687,7 +5687,7 @@
             <a:effectLst/>
             <a:extLst>
               <a:ext uri="{C572A759-6A51-4108-AA02-DFA0A04FC94B}">
-                <ma14:wrappingTextBoxFlag xmlns="" xmlns:m="http://schemas.openxmlformats.org/officeDocument/2006/math" xmlns:a14="http://schemas.microsoft.com/office/drawing/2010/main" xmlns:ma14="http://schemas.microsoft.com/office/mac/drawingml/2011/main" val="1"/>
+                <ma14:wrappingTextBoxFlag xmlns:ma14="http://schemas.microsoft.com/office/mac/drawingml/2011/main" xmlns:a14="http://schemas.microsoft.com/office/drawing/2010/main" xmlns:m="http://schemas.openxmlformats.org/officeDocument/2006/math" xmlns="" val="1"/>
               </a:ext>
             </a:extLst>
           </p:spPr>
@@ -5822,7 +5822,7 @@
             <a:effectLst/>
             <a:extLst>
               <a:ext uri="{C572A759-6A51-4108-AA02-DFA0A04FC94B}">
-                <ma14:wrappingTextBoxFlag xmlns="" xmlns:m="http://schemas.openxmlformats.org/officeDocument/2006/math" xmlns:a14="http://schemas.microsoft.com/office/drawing/2010/main" xmlns:ma14="http://schemas.microsoft.com/office/mac/drawingml/2011/main" val="1"/>
+                <ma14:wrappingTextBoxFlag xmlns:ma14="http://schemas.microsoft.com/office/mac/drawingml/2011/main" xmlns:a14="http://schemas.microsoft.com/office/drawing/2010/main" xmlns:m="http://schemas.openxmlformats.org/officeDocument/2006/math" xmlns="" val="1"/>
               </a:ext>
             </a:extLst>
           </p:spPr>
@@ -5957,7 +5957,7 @@
             <a:effectLst/>
             <a:extLst>
               <a:ext uri="{C572A759-6A51-4108-AA02-DFA0A04FC94B}">
-                <ma14:wrappingTextBoxFlag xmlns="" xmlns:m="http://schemas.openxmlformats.org/officeDocument/2006/math" xmlns:a14="http://schemas.microsoft.com/office/drawing/2010/main" xmlns:ma14="http://schemas.microsoft.com/office/mac/drawingml/2011/main" val="1"/>
+                <ma14:wrappingTextBoxFlag xmlns:ma14="http://schemas.microsoft.com/office/mac/drawingml/2011/main" xmlns:a14="http://schemas.microsoft.com/office/drawing/2010/main" xmlns:m="http://schemas.openxmlformats.org/officeDocument/2006/math" xmlns="" val="1"/>
               </a:ext>
             </a:extLst>
           </p:spPr>
@@ -6075,7 +6075,7 @@
             <a:effectLst/>
             <a:extLst>
               <a:ext uri="{C572A759-6A51-4108-AA02-DFA0A04FC94B}">
-                <ma14:wrappingTextBoxFlag xmlns="" xmlns:m="http://schemas.openxmlformats.org/officeDocument/2006/math" xmlns:a14="http://schemas.microsoft.com/office/drawing/2010/main" xmlns:ma14="http://schemas.microsoft.com/office/mac/drawingml/2011/main" val="1"/>
+                <ma14:wrappingTextBoxFlag xmlns:ma14="http://schemas.microsoft.com/office/mac/drawingml/2011/main" xmlns:a14="http://schemas.microsoft.com/office/drawing/2010/main" xmlns:m="http://schemas.openxmlformats.org/officeDocument/2006/math" xmlns="" val="1"/>
               </a:ext>
             </a:extLst>
           </p:spPr>
@@ -6286,7 +6286,7 @@
           </a:ln>
           <a:extLst>
             <a:ext uri="{C572A759-6A51-4108-AA02-DFA0A04FC94B}">
-              <ma14:wrappingTextBoxFlag xmlns="" xmlns:m="http://schemas.openxmlformats.org/officeDocument/2006/math" xmlns:a14="http://schemas.microsoft.com/office/drawing/2010/main" xmlns:ma14="http://schemas.microsoft.com/office/mac/drawingml/2011/main" val="1"/>
+              <ma14:wrappingTextBoxFlag xmlns:ma14="http://schemas.microsoft.com/office/mac/drawingml/2011/main" xmlns:a14="http://schemas.microsoft.com/office/drawing/2010/main" xmlns:m="http://schemas.openxmlformats.org/officeDocument/2006/math" xmlns="" val="1"/>
             </a:ext>
           </a:extLst>
         </p:spPr>
@@ -6413,7 +6413,7 @@
             <a:effectLst/>
             <a:extLst>
               <a:ext uri="{C572A759-6A51-4108-AA02-DFA0A04FC94B}">
-                <ma14:wrappingTextBoxFlag xmlns="" xmlns:m="http://schemas.openxmlformats.org/officeDocument/2006/math" xmlns:a14="http://schemas.microsoft.com/office/drawing/2010/main" xmlns:ma14="http://schemas.microsoft.com/office/mac/drawingml/2011/main" val="1"/>
+                <ma14:wrappingTextBoxFlag xmlns:ma14="http://schemas.microsoft.com/office/mac/drawingml/2011/main" xmlns:a14="http://schemas.microsoft.com/office/drawing/2010/main" xmlns:m="http://schemas.openxmlformats.org/officeDocument/2006/math" xmlns="" val="1"/>
               </a:ext>
             </a:extLst>
           </p:spPr>
@@ -6497,7 +6497,7 @@
           </a:ln>
           <a:extLst>
             <a:ext uri="{C572A759-6A51-4108-AA02-DFA0A04FC94B}">
-              <ma14:wrappingTextBoxFlag xmlns="" xmlns:m="http://schemas.openxmlformats.org/officeDocument/2006/math" xmlns:a14="http://schemas.microsoft.com/office/drawing/2010/main" xmlns:ma14="http://schemas.microsoft.com/office/mac/drawingml/2011/main" val="1"/>
+              <ma14:wrappingTextBoxFlag xmlns:ma14="http://schemas.microsoft.com/office/mac/drawingml/2011/main" xmlns:a14="http://schemas.microsoft.com/office/drawing/2010/main" xmlns:m="http://schemas.openxmlformats.org/officeDocument/2006/math" xmlns="" val="1"/>
             </a:ext>
           </a:extLst>
         </p:spPr>
@@ -6619,7 +6619,7 @@
             <a:effectLst/>
             <a:extLst>
               <a:ext uri="{C572A759-6A51-4108-AA02-DFA0A04FC94B}">
-                <ma14:wrappingTextBoxFlag xmlns="" xmlns:m="http://schemas.openxmlformats.org/officeDocument/2006/math" xmlns:a14="http://schemas.microsoft.com/office/drawing/2010/main" xmlns:ma14="http://schemas.microsoft.com/office/mac/drawingml/2011/main" val="1"/>
+                <ma14:wrappingTextBoxFlag xmlns:ma14="http://schemas.microsoft.com/office/mac/drawingml/2011/main" xmlns:a14="http://schemas.microsoft.com/office/drawing/2010/main" xmlns:m="http://schemas.openxmlformats.org/officeDocument/2006/math" xmlns="" val="1"/>
               </a:ext>
             </a:extLst>
           </p:spPr>
@@ -6772,7 +6772,7 @@
           </a:ln>
           <a:extLst>
             <a:ext uri="{C572A759-6A51-4108-AA02-DFA0A04FC94B}">
-              <ma14:wrappingTextBoxFlag xmlns="" xmlns:m="http://schemas.openxmlformats.org/officeDocument/2006/math" xmlns:a14="http://schemas.microsoft.com/office/drawing/2010/main" xmlns:ma14="http://schemas.microsoft.com/office/mac/drawingml/2011/main" val="1"/>
+              <ma14:wrappingTextBoxFlag xmlns:ma14="http://schemas.microsoft.com/office/mac/drawingml/2011/main" xmlns:a14="http://schemas.microsoft.com/office/drawing/2010/main" xmlns:m="http://schemas.openxmlformats.org/officeDocument/2006/math" xmlns="" val="1"/>
             </a:ext>
           </a:extLst>
         </p:spPr>
@@ -7324,7 +7324,7 @@
           </a:ln>
           <a:extLst>
             <a:ext uri="{C572A759-6A51-4108-AA02-DFA0A04FC94B}">
-              <ma14:wrappingTextBoxFlag xmlns="" xmlns:m="http://schemas.openxmlformats.org/officeDocument/2006/math" xmlns:a14="http://schemas.microsoft.com/office/drawing/2010/main" xmlns:ma14="http://schemas.microsoft.com/office/mac/drawingml/2011/main" val="1"/>
+              <ma14:wrappingTextBoxFlag xmlns:ma14="http://schemas.microsoft.com/office/mac/drawingml/2011/main" xmlns:a14="http://schemas.microsoft.com/office/drawing/2010/main" xmlns:m="http://schemas.openxmlformats.org/officeDocument/2006/math" xmlns="" val="1"/>
             </a:ext>
           </a:extLst>
         </p:spPr>
@@ -7425,7 +7425,7 @@
             <a:effectLst/>
             <a:extLst>
               <a:ext uri="{C572A759-6A51-4108-AA02-DFA0A04FC94B}">
-                <ma14:wrappingTextBoxFlag xmlns="" xmlns:m="http://schemas.openxmlformats.org/officeDocument/2006/math" xmlns:a14="http://schemas.microsoft.com/office/drawing/2010/main" xmlns:ma14="http://schemas.microsoft.com/office/mac/drawingml/2011/main" val="1"/>
+                <ma14:wrappingTextBoxFlag xmlns:ma14="http://schemas.microsoft.com/office/mac/drawingml/2011/main" xmlns:a14="http://schemas.microsoft.com/office/drawing/2010/main" xmlns:m="http://schemas.openxmlformats.org/officeDocument/2006/math" xmlns="" val="1"/>
               </a:ext>
             </a:extLst>
           </p:spPr>
@@ -7530,7 +7530,7 @@
           </a:ln>
           <a:extLst>
             <a:ext uri="{C572A759-6A51-4108-AA02-DFA0A04FC94B}">
-              <ma14:wrappingTextBoxFlag xmlns="" xmlns:m="http://schemas.openxmlformats.org/officeDocument/2006/math" xmlns:a14="http://schemas.microsoft.com/office/drawing/2010/main" xmlns:ma14="http://schemas.microsoft.com/office/mac/drawingml/2011/main" val="1"/>
+              <ma14:wrappingTextBoxFlag xmlns:ma14="http://schemas.microsoft.com/office/mac/drawingml/2011/main" xmlns:a14="http://schemas.microsoft.com/office/drawing/2010/main" xmlns:m="http://schemas.openxmlformats.org/officeDocument/2006/math" xmlns="" val="1"/>
             </a:ext>
           </a:extLst>
         </p:spPr>
@@ -7759,7 +7759,7 @@
           </a:ln>
           <a:extLst>
             <a:ext uri="{C572A759-6A51-4108-AA02-DFA0A04FC94B}">
-              <ma14:wrappingTextBoxFlag xmlns="" xmlns:m="http://schemas.openxmlformats.org/officeDocument/2006/math" xmlns:a14="http://schemas.microsoft.com/office/drawing/2010/main" xmlns:ma14="http://schemas.microsoft.com/office/mac/drawingml/2011/main" val="1"/>
+              <ma14:wrappingTextBoxFlag xmlns:ma14="http://schemas.microsoft.com/office/mac/drawingml/2011/main" xmlns:a14="http://schemas.microsoft.com/office/drawing/2010/main" xmlns:m="http://schemas.openxmlformats.org/officeDocument/2006/math" xmlns="" val="1"/>
             </a:ext>
           </a:extLst>
         </p:spPr>
@@ -8041,7 +8041,7 @@
           </a:ln>
           <a:extLst>
             <a:ext uri="{C572A759-6A51-4108-AA02-DFA0A04FC94B}">
-              <ma14:wrappingTextBoxFlag xmlns="" xmlns:m="http://schemas.openxmlformats.org/officeDocument/2006/math" xmlns:a14="http://schemas.microsoft.com/office/drawing/2010/main" xmlns:ma14="http://schemas.microsoft.com/office/mac/drawingml/2011/main" val="1"/>
+              <ma14:wrappingTextBoxFlag xmlns:ma14="http://schemas.microsoft.com/office/mac/drawingml/2011/main" xmlns:a14="http://schemas.microsoft.com/office/drawing/2010/main" xmlns:m="http://schemas.openxmlformats.org/officeDocument/2006/math" xmlns="" val="1"/>
             </a:ext>
           </a:extLst>
         </p:spPr>
@@ -8472,7 +8472,7 @@
             <a:effectLst/>
             <a:extLst>
               <a:ext uri="{C572A759-6A51-4108-AA02-DFA0A04FC94B}">
-                <ma14:wrappingTextBoxFlag xmlns="" xmlns:m="http://schemas.openxmlformats.org/officeDocument/2006/math" xmlns:a14="http://schemas.microsoft.com/office/drawing/2010/main" xmlns:ma14="http://schemas.microsoft.com/office/mac/drawingml/2011/main" val="1"/>
+                <ma14:wrappingTextBoxFlag xmlns:ma14="http://schemas.microsoft.com/office/mac/drawingml/2011/main" xmlns:a14="http://schemas.microsoft.com/office/drawing/2010/main" xmlns:m="http://schemas.openxmlformats.org/officeDocument/2006/math" xmlns="" val="1"/>
               </a:ext>
             </a:extLst>
           </p:spPr>
@@ -8549,7 +8549,7 @@
           </a:ln>
           <a:extLst>
             <a:ext uri="{C572A759-6A51-4108-AA02-DFA0A04FC94B}">
-              <ma14:wrappingTextBoxFlag xmlns="" xmlns:m="http://schemas.openxmlformats.org/officeDocument/2006/math" xmlns:a14="http://schemas.microsoft.com/office/drawing/2010/main" xmlns:ma14="http://schemas.microsoft.com/office/mac/drawingml/2011/main" val="1"/>
+              <ma14:wrappingTextBoxFlag xmlns:ma14="http://schemas.microsoft.com/office/mac/drawingml/2011/main" xmlns:a14="http://schemas.microsoft.com/office/drawing/2010/main" xmlns:m="http://schemas.openxmlformats.org/officeDocument/2006/math" xmlns="" val="1"/>
             </a:ext>
           </a:extLst>
         </p:spPr>
@@ -8725,7 +8725,7 @@
           </a:ln>
           <a:extLst>
             <a:ext uri="{C572A759-6A51-4108-AA02-DFA0A04FC94B}">
-              <ma14:wrappingTextBoxFlag xmlns="" xmlns:m="http://schemas.openxmlformats.org/officeDocument/2006/math" xmlns:a14="http://schemas.microsoft.com/office/drawing/2010/main" xmlns:ma14="http://schemas.microsoft.com/office/mac/drawingml/2011/main" val="1"/>
+              <ma14:wrappingTextBoxFlag xmlns:ma14="http://schemas.microsoft.com/office/mac/drawingml/2011/main" xmlns:a14="http://schemas.microsoft.com/office/drawing/2010/main" xmlns:m="http://schemas.openxmlformats.org/officeDocument/2006/math" xmlns="" val="1"/>
             </a:ext>
           </a:extLst>
         </p:spPr>
@@ -8945,7 +8945,7 @@
           </a:ln>
           <a:extLst>
             <a:ext uri="{C572A759-6A51-4108-AA02-DFA0A04FC94B}">
-              <ma14:wrappingTextBoxFlag xmlns="" xmlns:m="http://schemas.openxmlformats.org/officeDocument/2006/math" xmlns:a14="http://schemas.microsoft.com/office/drawing/2010/main" xmlns:ma14="http://schemas.microsoft.com/office/mac/drawingml/2011/main" val="1"/>
+              <ma14:wrappingTextBoxFlag xmlns:ma14="http://schemas.microsoft.com/office/mac/drawingml/2011/main" xmlns:a14="http://schemas.microsoft.com/office/drawing/2010/main" xmlns:m="http://schemas.openxmlformats.org/officeDocument/2006/math" xmlns="" val="1"/>
             </a:ext>
           </a:extLst>
         </p:spPr>
@@ -9135,7 +9135,7 @@
           </a:ln>
           <a:extLst>
             <a:ext uri="{C572A759-6A51-4108-AA02-DFA0A04FC94B}">
-              <ma14:wrappingTextBoxFlag xmlns="" xmlns:m="http://schemas.openxmlformats.org/officeDocument/2006/math" xmlns:a14="http://schemas.microsoft.com/office/drawing/2010/main" xmlns:ma14="http://schemas.microsoft.com/office/mac/drawingml/2011/main" val="1"/>
+              <ma14:wrappingTextBoxFlag xmlns:ma14="http://schemas.microsoft.com/office/mac/drawingml/2011/main" xmlns:a14="http://schemas.microsoft.com/office/drawing/2010/main" xmlns:m="http://schemas.openxmlformats.org/officeDocument/2006/math" xmlns="" val="1"/>
             </a:ext>
           </a:extLst>
         </p:spPr>
@@ -9178,7 +9178,7 @@
           </a:ln>
           <a:extLst>
             <a:ext uri="{C572A759-6A51-4108-AA02-DFA0A04FC94B}">
-              <ma14:wrappingTextBoxFlag xmlns="" xmlns:m="http://schemas.openxmlformats.org/officeDocument/2006/math" xmlns:a14="http://schemas.microsoft.com/office/drawing/2010/main" xmlns:ma14="http://schemas.microsoft.com/office/mac/drawingml/2011/main" val="1"/>
+              <ma14:wrappingTextBoxFlag xmlns:ma14="http://schemas.microsoft.com/office/mac/drawingml/2011/main" xmlns:a14="http://schemas.microsoft.com/office/drawing/2010/main" xmlns:m="http://schemas.openxmlformats.org/officeDocument/2006/math" xmlns="" val="1"/>
             </a:ext>
           </a:extLst>
         </p:spPr>
@@ -9221,7 +9221,7 @@
           </a:ln>
           <a:extLst>
             <a:ext uri="{C572A759-6A51-4108-AA02-DFA0A04FC94B}">
-              <ma14:wrappingTextBoxFlag xmlns="" xmlns:m="http://schemas.openxmlformats.org/officeDocument/2006/math" xmlns:a14="http://schemas.microsoft.com/office/drawing/2010/main" xmlns:ma14="http://schemas.microsoft.com/office/mac/drawingml/2011/main" val="1"/>
+              <ma14:wrappingTextBoxFlag xmlns:ma14="http://schemas.microsoft.com/office/mac/drawingml/2011/main" xmlns:a14="http://schemas.microsoft.com/office/drawing/2010/main" xmlns:m="http://schemas.openxmlformats.org/officeDocument/2006/math" xmlns="" val="1"/>
             </a:ext>
           </a:extLst>
         </p:spPr>
@@ -9264,7 +9264,7 @@
           </a:ln>
           <a:extLst>
             <a:ext uri="{C572A759-6A51-4108-AA02-DFA0A04FC94B}">
-              <ma14:wrappingTextBoxFlag xmlns="" xmlns:m="http://schemas.openxmlformats.org/officeDocument/2006/math" xmlns:a14="http://schemas.microsoft.com/office/drawing/2010/main" xmlns:ma14="http://schemas.microsoft.com/office/mac/drawingml/2011/main" val="1"/>
+              <ma14:wrappingTextBoxFlag xmlns:ma14="http://schemas.microsoft.com/office/mac/drawingml/2011/main" xmlns:a14="http://schemas.microsoft.com/office/drawing/2010/main" xmlns:m="http://schemas.openxmlformats.org/officeDocument/2006/math" xmlns="" val="1"/>
             </a:ext>
           </a:extLst>
         </p:spPr>
@@ -9307,7 +9307,7 @@
           </a:ln>
           <a:extLst>
             <a:ext uri="{C572A759-6A51-4108-AA02-DFA0A04FC94B}">
-              <ma14:wrappingTextBoxFlag xmlns="" xmlns:m="http://schemas.openxmlformats.org/officeDocument/2006/math" xmlns:a14="http://schemas.microsoft.com/office/drawing/2010/main" xmlns:ma14="http://schemas.microsoft.com/office/mac/drawingml/2011/main" val="1"/>
+              <ma14:wrappingTextBoxFlag xmlns:ma14="http://schemas.microsoft.com/office/mac/drawingml/2011/main" xmlns:a14="http://schemas.microsoft.com/office/drawing/2010/main" xmlns:m="http://schemas.openxmlformats.org/officeDocument/2006/math" xmlns="" val="1"/>
             </a:ext>
           </a:extLst>
         </p:spPr>
@@ -10091,7 +10091,7 @@
           </a:ln>
           <a:extLst>
             <a:ext uri="{C572A759-6A51-4108-AA02-DFA0A04FC94B}">
-              <ma14:wrappingTextBoxFlag xmlns="" xmlns:m="http://schemas.openxmlformats.org/officeDocument/2006/math" xmlns:a14="http://schemas.microsoft.com/office/drawing/2010/main" xmlns:ma14="http://schemas.microsoft.com/office/mac/drawingml/2011/main" val="1"/>
+              <ma14:wrappingTextBoxFlag xmlns:ma14="http://schemas.microsoft.com/office/mac/drawingml/2011/main" xmlns:a14="http://schemas.microsoft.com/office/drawing/2010/main" xmlns:m="http://schemas.openxmlformats.org/officeDocument/2006/math" xmlns="" val="1"/>
             </a:ext>
           </a:extLst>
         </p:spPr>
@@ -10253,7 +10253,7 @@
           </a:ln>
           <a:extLst>
             <a:ext uri="{C572A759-6A51-4108-AA02-DFA0A04FC94B}">
-              <ma14:wrappingTextBoxFlag xmlns="" xmlns:m="http://schemas.openxmlformats.org/officeDocument/2006/math" xmlns:a14="http://schemas.microsoft.com/office/drawing/2010/main" xmlns:ma14="http://schemas.microsoft.com/office/mac/drawingml/2011/main" val="1"/>
+              <ma14:wrappingTextBoxFlag xmlns:ma14="http://schemas.microsoft.com/office/mac/drawingml/2011/main" xmlns:a14="http://schemas.microsoft.com/office/drawing/2010/main" xmlns:m="http://schemas.openxmlformats.org/officeDocument/2006/math" xmlns="" val="1"/>
             </a:ext>
           </a:extLst>
         </p:spPr>
@@ -10401,7 +10401,7 @@
             <a:effectLst/>
             <a:extLst>
               <a:ext uri="{C572A759-6A51-4108-AA02-DFA0A04FC94B}">
-                <ma14:wrappingTextBoxFlag xmlns="" xmlns:m="http://schemas.openxmlformats.org/officeDocument/2006/math" xmlns:a14="http://schemas.microsoft.com/office/drawing/2010/main" xmlns:ma14="http://schemas.microsoft.com/office/mac/drawingml/2011/main" val="1"/>
+                <ma14:wrappingTextBoxFlag xmlns:ma14="http://schemas.microsoft.com/office/mac/drawingml/2011/main" xmlns:a14="http://schemas.microsoft.com/office/drawing/2010/main" xmlns:m="http://schemas.openxmlformats.org/officeDocument/2006/math" xmlns="" val="1"/>
               </a:ext>
             </a:extLst>
           </p:spPr>
@@ -10503,7 +10503,7 @@
             <a:effectLst/>
             <a:extLst>
               <a:ext uri="{C572A759-6A51-4108-AA02-DFA0A04FC94B}">
-                <ma14:wrappingTextBoxFlag xmlns="" xmlns:m="http://schemas.openxmlformats.org/officeDocument/2006/math" xmlns:a14="http://schemas.microsoft.com/office/drawing/2010/main" xmlns:ma14="http://schemas.microsoft.com/office/mac/drawingml/2011/main" val="1"/>
+                <ma14:wrappingTextBoxFlag xmlns:ma14="http://schemas.microsoft.com/office/mac/drawingml/2011/main" xmlns:a14="http://schemas.microsoft.com/office/drawing/2010/main" xmlns:m="http://schemas.openxmlformats.org/officeDocument/2006/math" xmlns="" val="1"/>
               </a:ext>
             </a:extLst>
           </p:spPr>
@@ -10635,7 +10635,7 @@
             <a:effectLst/>
             <a:extLst>
               <a:ext uri="{C572A759-6A51-4108-AA02-DFA0A04FC94B}">
-                <ma14:wrappingTextBoxFlag xmlns="" xmlns:m="http://schemas.openxmlformats.org/officeDocument/2006/math" xmlns:a14="http://schemas.microsoft.com/office/drawing/2010/main" xmlns:ma14="http://schemas.microsoft.com/office/mac/drawingml/2011/main" val="1"/>
+                <ma14:wrappingTextBoxFlag xmlns:ma14="http://schemas.microsoft.com/office/mac/drawingml/2011/main" xmlns:a14="http://schemas.microsoft.com/office/drawing/2010/main" xmlns:m="http://schemas.openxmlformats.org/officeDocument/2006/math" xmlns="" val="1"/>
               </a:ext>
             </a:extLst>
           </p:spPr>
@@ -10767,7 +10767,7 @@
             <a:effectLst/>
             <a:extLst>
               <a:ext uri="{C572A759-6A51-4108-AA02-DFA0A04FC94B}">
-                <ma14:wrappingTextBoxFlag xmlns="" xmlns:m="http://schemas.openxmlformats.org/officeDocument/2006/math" xmlns:a14="http://schemas.microsoft.com/office/drawing/2010/main" xmlns:ma14="http://schemas.microsoft.com/office/mac/drawingml/2011/main" val="1"/>
+                <ma14:wrappingTextBoxFlag xmlns:ma14="http://schemas.microsoft.com/office/mac/drawingml/2011/main" xmlns:a14="http://schemas.microsoft.com/office/drawing/2010/main" xmlns:m="http://schemas.openxmlformats.org/officeDocument/2006/math" xmlns="" val="1"/>
               </a:ext>
             </a:extLst>
           </p:spPr>
@@ -10901,7 +10901,7 @@
           </a:ln>
           <a:extLst>
             <a:ext uri="{C572A759-6A51-4108-AA02-DFA0A04FC94B}">
-              <ma14:wrappingTextBoxFlag xmlns="" xmlns:m="http://schemas.openxmlformats.org/officeDocument/2006/math" xmlns:a14="http://schemas.microsoft.com/office/drawing/2010/main" xmlns:ma14="http://schemas.microsoft.com/office/mac/drawingml/2011/main" val="1"/>
+              <ma14:wrappingTextBoxFlag xmlns:ma14="http://schemas.microsoft.com/office/mac/drawingml/2011/main" xmlns:a14="http://schemas.microsoft.com/office/drawing/2010/main" xmlns:m="http://schemas.openxmlformats.org/officeDocument/2006/math" xmlns="" val="1"/>
             </a:ext>
           </a:extLst>
         </p:spPr>
@@ -11007,7 +11007,7 @@
           </a:ln>
           <a:extLst>
             <a:ext uri="{C572A759-6A51-4108-AA02-DFA0A04FC94B}">
-              <ma14:wrappingTextBoxFlag xmlns="" xmlns:m="http://schemas.openxmlformats.org/officeDocument/2006/math" xmlns:a14="http://schemas.microsoft.com/office/drawing/2010/main" xmlns:ma14="http://schemas.microsoft.com/office/mac/drawingml/2011/main" val="1"/>
+              <ma14:wrappingTextBoxFlag xmlns:ma14="http://schemas.microsoft.com/office/mac/drawingml/2011/main" xmlns:a14="http://schemas.microsoft.com/office/drawing/2010/main" xmlns:m="http://schemas.openxmlformats.org/officeDocument/2006/math" xmlns="" val="1"/>
             </a:ext>
           </a:extLst>
         </p:spPr>
@@ -11097,7 +11097,7 @@
           </a:ln>
           <a:extLst>
             <a:ext uri="{C572A759-6A51-4108-AA02-DFA0A04FC94B}">
-              <ma14:wrappingTextBoxFlag xmlns="" xmlns:m="http://schemas.openxmlformats.org/officeDocument/2006/math" xmlns:a14="http://schemas.microsoft.com/office/drawing/2010/main" xmlns:ma14="http://schemas.microsoft.com/office/mac/drawingml/2011/main" val="1"/>
+              <ma14:wrappingTextBoxFlag xmlns:ma14="http://schemas.microsoft.com/office/mac/drawingml/2011/main" xmlns:a14="http://schemas.microsoft.com/office/drawing/2010/main" xmlns:m="http://schemas.openxmlformats.org/officeDocument/2006/math" xmlns="" val="1"/>
             </a:ext>
           </a:extLst>
         </p:spPr>
@@ -11446,7 +11446,7 @@
             <a:effectLst/>
             <a:extLst>
               <a:ext uri="{C572A759-6A51-4108-AA02-DFA0A04FC94B}">
-                <ma14:wrappingTextBoxFlag xmlns="" xmlns:m="http://schemas.openxmlformats.org/officeDocument/2006/math" xmlns:a14="http://schemas.microsoft.com/office/drawing/2010/main" xmlns:ma14="http://schemas.microsoft.com/office/mac/drawingml/2011/main" val="1"/>
+                <ma14:wrappingTextBoxFlag xmlns:ma14="http://schemas.microsoft.com/office/mac/drawingml/2011/main" xmlns:a14="http://schemas.microsoft.com/office/drawing/2010/main" xmlns:m="http://schemas.openxmlformats.org/officeDocument/2006/math" xmlns="" val="1"/>
               </a:ext>
             </a:extLst>
           </p:spPr>
@@ -11608,7 +11608,7 @@
             <a:effectLst/>
             <a:extLst>
               <a:ext uri="{C572A759-6A51-4108-AA02-DFA0A04FC94B}">
-                <ma14:wrappingTextBoxFlag xmlns="" xmlns:m="http://schemas.openxmlformats.org/officeDocument/2006/math" xmlns:a14="http://schemas.microsoft.com/office/drawing/2010/main" xmlns:ma14="http://schemas.microsoft.com/office/mac/drawingml/2011/main" val="1"/>
+                <ma14:wrappingTextBoxFlag xmlns:ma14="http://schemas.microsoft.com/office/mac/drawingml/2011/main" xmlns:a14="http://schemas.microsoft.com/office/drawing/2010/main" xmlns:m="http://schemas.openxmlformats.org/officeDocument/2006/math" xmlns="" val="1"/>
               </a:ext>
             </a:extLst>
           </p:spPr>
@@ -11740,7 +11740,7 @@
             <a:effectLst/>
             <a:extLst>
               <a:ext uri="{C572A759-6A51-4108-AA02-DFA0A04FC94B}">
-                <ma14:wrappingTextBoxFlag xmlns="" xmlns:m="http://schemas.openxmlformats.org/officeDocument/2006/math" xmlns:a14="http://schemas.microsoft.com/office/drawing/2010/main" xmlns:ma14="http://schemas.microsoft.com/office/mac/drawingml/2011/main" val="1"/>
+                <ma14:wrappingTextBoxFlag xmlns:ma14="http://schemas.microsoft.com/office/mac/drawingml/2011/main" xmlns:a14="http://schemas.microsoft.com/office/drawing/2010/main" xmlns:m="http://schemas.openxmlformats.org/officeDocument/2006/math" xmlns="" val="1"/>
               </a:ext>
             </a:extLst>
           </p:spPr>
@@ -11960,7 +11960,7 @@
             <a:effectLst/>
             <a:extLst>
               <a:ext uri="{C572A759-6A51-4108-AA02-DFA0A04FC94B}">
-                <ma14:wrappingTextBoxFlag xmlns="" xmlns:m="http://schemas.openxmlformats.org/officeDocument/2006/math" xmlns:a14="http://schemas.microsoft.com/office/drawing/2010/main" xmlns:ma14="http://schemas.microsoft.com/office/mac/drawingml/2011/main" val="1"/>
+                <ma14:wrappingTextBoxFlag xmlns:ma14="http://schemas.microsoft.com/office/mac/drawingml/2011/main" xmlns:a14="http://schemas.microsoft.com/office/drawing/2010/main" xmlns:m="http://schemas.openxmlformats.org/officeDocument/2006/math" xmlns="" val="1"/>
               </a:ext>
             </a:extLst>
           </p:spPr>
@@ -12092,7 +12092,7 @@
             <a:effectLst/>
             <a:extLst>
               <a:ext uri="{C572A759-6A51-4108-AA02-DFA0A04FC94B}">
-                <ma14:wrappingTextBoxFlag xmlns="" xmlns:m="http://schemas.openxmlformats.org/officeDocument/2006/math" xmlns:a14="http://schemas.microsoft.com/office/drawing/2010/main" xmlns:ma14="http://schemas.microsoft.com/office/mac/drawingml/2011/main" val="1"/>
+                <ma14:wrappingTextBoxFlag xmlns:ma14="http://schemas.microsoft.com/office/mac/drawingml/2011/main" xmlns:a14="http://schemas.microsoft.com/office/drawing/2010/main" xmlns:m="http://schemas.openxmlformats.org/officeDocument/2006/math" xmlns="" val="1"/>
               </a:ext>
             </a:extLst>
           </p:spPr>
@@ -12342,7 +12342,7 @@
             <a:effectLst/>
             <a:extLst>
               <a:ext uri="{C572A759-6A51-4108-AA02-DFA0A04FC94B}">
-                <ma14:wrappingTextBoxFlag xmlns="" xmlns:m="http://schemas.openxmlformats.org/officeDocument/2006/math" xmlns:a14="http://schemas.microsoft.com/office/drawing/2010/main" xmlns:ma14="http://schemas.microsoft.com/office/mac/drawingml/2011/main" val="1"/>
+                <ma14:wrappingTextBoxFlag xmlns:ma14="http://schemas.microsoft.com/office/mac/drawingml/2011/main" xmlns:a14="http://schemas.microsoft.com/office/drawing/2010/main" xmlns:m="http://schemas.openxmlformats.org/officeDocument/2006/math" xmlns="" val="1"/>
               </a:ext>
             </a:extLst>
           </p:spPr>
@@ -12386,7 +12386,7 @@
           </a:ln>
           <a:extLst>
             <a:ext uri="{C572A759-6A51-4108-AA02-DFA0A04FC94B}">
-              <ma14:wrappingTextBoxFlag xmlns="" xmlns:m="http://schemas.openxmlformats.org/officeDocument/2006/math" xmlns:a14="http://schemas.microsoft.com/office/drawing/2010/main" xmlns:ma14="http://schemas.microsoft.com/office/mac/drawingml/2011/main" val="1"/>
+              <ma14:wrappingTextBoxFlag xmlns:ma14="http://schemas.microsoft.com/office/mac/drawingml/2011/main" xmlns:a14="http://schemas.microsoft.com/office/drawing/2010/main" xmlns:m="http://schemas.openxmlformats.org/officeDocument/2006/math" xmlns="" val="1"/>
             </a:ext>
           </a:extLst>
         </p:spPr>
@@ -12429,7 +12429,7 @@
           </a:ln>
           <a:extLst>
             <a:ext uri="{C572A759-6A51-4108-AA02-DFA0A04FC94B}">
-              <ma14:wrappingTextBoxFlag xmlns="" xmlns:m="http://schemas.openxmlformats.org/officeDocument/2006/math" xmlns:a14="http://schemas.microsoft.com/office/drawing/2010/main" xmlns:ma14="http://schemas.microsoft.com/office/mac/drawingml/2011/main" val="1"/>
+              <ma14:wrappingTextBoxFlag xmlns:ma14="http://schemas.microsoft.com/office/mac/drawingml/2011/main" xmlns:a14="http://schemas.microsoft.com/office/drawing/2010/main" xmlns:m="http://schemas.openxmlformats.org/officeDocument/2006/math" xmlns="" val="1"/>
             </a:ext>
           </a:extLst>
         </p:spPr>
@@ -12472,7 +12472,7 @@
           </a:ln>
           <a:extLst>
             <a:ext uri="{C572A759-6A51-4108-AA02-DFA0A04FC94B}">
-              <ma14:wrappingTextBoxFlag xmlns="" xmlns:m="http://schemas.openxmlformats.org/officeDocument/2006/math" xmlns:a14="http://schemas.microsoft.com/office/drawing/2010/main" xmlns:ma14="http://schemas.microsoft.com/office/mac/drawingml/2011/main" val="1"/>
+              <ma14:wrappingTextBoxFlag xmlns:ma14="http://schemas.microsoft.com/office/mac/drawingml/2011/main" xmlns:a14="http://schemas.microsoft.com/office/drawing/2010/main" xmlns:m="http://schemas.openxmlformats.org/officeDocument/2006/math" xmlns="" val="1"/>
             </a:ext>
           </a:extLst>
         </p:spPr>
@@ -12515,7 +12515,7 @@
           </a:ln>
           <a:extLst>
             <a:ext uri="{C572A759-6A51-4108-AA02-DFA0A04FC94B}">
-              <ma14:wrappingTextBoxFlag xmlns="" xmlns:m="http://schemas.openxmlformats.org/officeDocument/2006/math" xmlns:a14="http://schemas.microsoft.com/office/drawing/2010/main" xmlns:ma14="http://schemas.microsoft.com/office/mac/drawingml/2011/main" val="1"/>
+              <ma14:wrappingTextBoxFlag xmlns:ma14="http://schemas.microsoft.com/office/mac/drawingml/2011/main" xmlns:a14="http://schemas.microsoft.com/office/drawing/2010/main" xmlns:m="http://schemas.openxmlformats.org/officeDocument/2006/math" xmlns="" val="1"/>
             </a:ext>
           </a:extLst>
         </p:spPr>
@@ -12621,7 +12621,7 @@
           </a:ln>
           <a:extLst>
             <a:ext uri="{C572A759-6A51-4108-AA02-DFA0A04FC94B}">
-              <ma14:wrappingTextBoxFlag xmlns="" xmlns:m="http://schemas.openxmlformats.org/officeDocument/2006/math" xmlns:a14="http://schemas.microsoft.com/office/drawing/2010/main" xmlns:ma14="http://schemas.microsoft.com/office/mac/drawingml/2011/main" val="1"/>
+              <ma14:wrappingTextBoxFlag xmlns:ma14="http://schemas.microsoft.com/office/mac/drawingml/2011/main" xmlns:a14="http://schemas.microsoft.com/office/drawing/2010/main" xmlns:m="http://schemas.openxmlformats.org/officeDocument/2006/math" xmlns="" val="1"/>
             </a:ext>
           </a:extLst>
         </p:spPr>
@@ -12779,7 +12779,7 @@
           </a:ln>
           <a:extLst>
             <a:ext uri="{C572A759-6A51-4108-AA02-DFA0A04FC94B}">
-              <ma14:wrappingTextBoxFlag xmlns="" xmlns:m="http://schemas.openxmlformats.org/officeDocument/2006/math" xmlns:a14="http://schemas.microsoft.com/office/drawing/2010/main" xmlns:ma14="http://schemas.microsoft.com/office/mac/drawingml/2011/main" val="1"/>
+              <ma14:wrappingTextBoxFlag xmlns:ma14="http://schemas.microsoft.com/office/mac/drawingml/2011/main" xmlns:a14="http://schemas.microsoft.com/office/drawing/2010/main" xmlns:m="http://schemas.openxmlformats.org/officeDocument/2006/math" xmlns="" val="1"/>
             </a:ext>
           </a:extLst>
         </p:spPr>
@@ -13100,7 +13100,7 @@
             <a:effectLst/>
             <a:extLst>
               <a:ext uri="{C572A759-6A51-4108-AA02-DFA0A04FC94B}">
-                <ma14:wrappingTextBoxFlag xmlns="" xmlns:m="http://schemas.openxmlformats.org/officeDocument/2006/math" xmlns:a14="http://schemas.microsoft.com/office/drawing/2010/main" xmlns:ma14="http://schemas.microsoft.com/office/mac/drawingml/2011/main" val="1"/>
+                <ma14:wrappingTextBoxFlag xmlns:ma14="http://schemas.microsoft.com/office/mac/drawingml/2011/main" xmlns:a14="http://schemas.microsoft.com/office/drawing/2010/main" xmlns:m="http://schemas.openxmlformats.org/officeDocument/2006/math" xmlns="" val="1"/>
               </a:ext>
             </a:extLst>
           </p:spPr>
@@ -13440,7 +13440,7 @@
           </a:ln>
           <a:extLst>
             <a:ext uri="{C572A759-6A51-4108-AA02-DFA0A04FC94B}">
-              <ma14:wrappingTextBoxFlag xmlns="" xmlns:m="http://schemas.openxmlformats.org/officeDocument/2006/math" xmlns:a14="http://schemas.microsoft.com/office/drawing/2010/main" xmlns:ma14="http://schemas.microsoft.com/office/mac/drawingml/2011/main" val="1"/>
+              <ma14:wrappingTextBoxFlag xmlns:ma14="http://schemas.microsoft.com/office/mac/drawingml/2011/main" xmlns:a14="http://schemas.microsoft.com/office/drawing/2010/main" xmlns:m="http://schemas.openxmlformats.org/officeDocument/2006/math" xmlns="" val="1"/>
             </a:ext>
           </a:extLst>
         </p:spPr>
@@ -13501,7 +13501,7 @@
           </a:ln>
           <a:extLst>
             <a:ext uri="{C572A759-6A51-4108-AA02-DFA0A04FC94B}">
-              <ma14:wrappingTextBoxFlag xmlns="" xmlns:m="http://schemas.openxmlformats.org/officeDocument/2006/math" xmlns:a14="http://schemas.microsoft.com/office/drawing/2010/main" xmlns:ma14="http://schemas.microsoft.com/office/mac/drawingml/2011/main" val="1"/>
+              <ma14:wrappingTextBoxFlag xmlns:ma14="http://schemas.microsoft.com/office/mac/drawingml/2011/main" xmlns:a14="http://schemas.microsoft.com/office/drawing/2010/main" xmlns:m="http://schemas.openxmlformats.org/officeDocument/2006/math" xmlns="" val="1"/>
             </a:ext>
           </a:extLst>
         </p:spPr>
@@ -13602,7 +13602,7 @@
             <a:effectLst/>
             <a:extLst>
               <a:ext uri="{C572A759-6A51-4108-AA02-DFA0A04FC94B}">
-                <ma14:wrappingTextBoxFlag xmlns="" xmlns:m="http://schemas.openxmlformats.org/officeDocument/2006/math" xmlns:a14="http://schemas.microsoft.com/office/drawing/2010/main" xmlns:ma14="http://schemas.microsoft.com/office/mac/drawingml/2011/main" val="1"/>
+                <ma14:wrappingTextBoxFlag xmlns:ma14="http://schemas.microsoft.com/office/mac/drawingml/2011/main" xmlns:a14="http://schemas.microsoft.com/office/drawing/2010/main" xmlns:m="http://schemas.openxmlformats.org/officeDocument/2006/math" xmlns="" val="1"/>
               </a:ext>
             </a:extLst>
           </p:spPr>
@@ -13646,7 +13646,7 @@
           </a:ln>
           <a:extLst>
             <a:ext uri="{C572A759-6A51-4108-AA02-DFA0A04FC94B}">
-              <ma14:wrappingTextBoxFlag xmlns="" xmlns:m="http://schemas.openxmlformats.org/officeDocument/2006/math" xmlns:a14="http://schemas.microsoft.com/office/drawing/2010/main" xmlns:ma14="http://schemas.microsoft.com/office/mac/drawingml/2011/main" val="1"/>
+              <ma14:wrappingTextBoxFlag xmlns:ma14="http://schemas.microsoft.com/office/mac/drawingml/2011/main" xmlns:a14="http://schemas.microsoft.com/office/drawing/2010/main" xmlns:m="http://schemas.openxmlformats.org/officeDocument/2006/math" xmlns="" val="1"/>
             </a:ext>
           </a:extLst>
         </p:spPr>
@@ -13747,7 +13747,7 @@
             <a:effectLst/>
             <a:extLst>
               <a:ext uri="{C572A759-6A51-4108-AA02-DFA0A04FC94B}">
-                <ma14:wrappingTextBoxFlag xmlns="" xmlns:m="http://schemas.openxmlformats.org/officeDocument/2006/math" xmlns:a14="http://schemas.microsoft.com/office/drawing/2010/main" xmlns:ma14="http://schemas.microsoft.com/office/mac/drawingml/2011/main" val="1"/>
+                <ma14:wrappingTextBoxFlag xmlns:ma14="http://schemas.microsoft.com/office/mac/drawingml/2011/main" xmlns:a14="http://schemas.microsoft.com/office/drawing/2010/main" xmlns:m="http://schemas.openxmlformats.org/officeDocument/2006/math" xmlns="" val="1"/>
               </a:ext>
             </a:extLst>
           </p:spPr>
@@ -13849,7 +13849,7 @@
             <a:effectLst/>
             <a:extLst>
               <a:ext uri="{C572A759-6A51-4108-AA02-DFA0A04FC94B}">
-                <ma14:wrappingTextBoxFlag xmlns="" xmlns:m="http://schemas.openxmlformats.org/officeDocument/2006/math" xmlns:a14="http://schemas.microsoft.com/office/drawing/2010/main" xmlns:ma14="http://schemas.microsoft.com/office/mac/drawingml/2011/main" val="1"/>
+                <ma14:wrappingTextBoxFlag xmlns:ma14="http://schemas.microsoft.com/office/mac/drawingml/2011/main" xmlns:a14="http://schemas.microsoft.com/office/drawing/2010/main" xmlns:m="http://schemas.openxmlformats.org/officeDocument/2006/math" xmlns="" val="1"/>
               </a:ext>
             </a:extLst>
           </p:spPr>
@@ -13981,7 +13981,7 @@
             <a:effectLst/>
             <a:extLst>
               <a:ext uri="{C572A759-6A51-4108-AA02-DFA0A04FC94B}">
-                <ma14:wrappingTextBoxFlag xmlns="" xmlns:m="http://schemas.openxmlformats.org/officeDocument/2006/math" xmlns:a14="http://schemas.microsoft.com/office/drawing/2010/main" xmlns:ma14="http://schemas.microsoft.com/office/mac/drawingml/2011/main" val="1"/>
+                <ma14:wrappingTextBoxFlag xmlns:ma14="http://schemas.microsoft.com/office/mac/drawingml/2011/main" xmlns:a14="http://schemas.microsoft.com/office/drawing/2010/main" xmlns:m="http://schemas.openxmlformats.org/officeDocument/2006/math" xmlns="" val="1"/>
               </a:ext>
             </a:extLst>
           </p:spPr>
@@ -14108,7 +14108,7 @@
           </a:ln>
           <a:extLst>
             <a:ext uri="{C572A759-6A51-4108-AA02-DFA0A04FC94B}">
-              <ma14:wrappingTextBoxFlag xmlns="" xmlns:m="http://schemas.openxmlformats.org/officeDocument/2006/math" xmlns:a14="http://schemas.microsoft.com/office/drawing/2010/main" xmlns:ma14="http://schemas.microsoft.com/office/mac/drawingml/2011/main" val="1"/>
+              <ma14:wrappingTextBoxFlag xmlns:ma14="http://schemas.microsoft.com/office/mac/drawingml/2011/main" xmlns:a14="http://schemas.microsoft.com/office/drawing/2010/main" xmlns:m="http://schemas.openxmlformats.org/officeDocument/2006/math" xmlns="" val="1"/>
             </a:ext>
           </a:extLst>
         </p:spPr>
@@ -14492,7 +14492,7 @@
           </a:ln>
           <a:extLst>
             <a:ext uri="{C572A759-6A51-4108-AA02-DFA0A04FC94B}">
-              <ma14:wrappingTextBoxFlag xmlns="" xmlns:m="http://schemas.openxmlformats.org/officeDocument/2006/math" xmlns:a14="http://schemas.microsoft.com/office/drawing/2010/main" xmlns:ma14="http://schemas.microsoft.com/office/mac/drawingml/2011/main" val="1"/>
+              <ma14:wrappingTextBoxFlag xmlns:ma14="http://schemas.microsoft.com/office/mac/drawingml/2011/main" xmlns:a14="http://schemas.microsoft.com/office/drawing/2010/main" xmlns:m="http://schemas.openxmlformats.org/officeDocument/2006/math" xmlns="" val="1"/>
             </a:ext>
           </a:extLst>
         </p:spPr>
@@ -14603,7 +14603,7 @@
           </a:ln>
           <a:extLst>
             <a:ext uri="{C572A759-6A51-4108-AA02-DFA0A04FC94B}">
-              <ma14:wrappingTextBoxFlag xmlns="" xmlns:m="http://schemas.openxmlformats.org/officeDocument/2006/math" xmlns:a14="http://schemas.microsoft.com/office/drawing/2010/main" xmlns:ma14="http://schemas.microsoft.com/office/mac/drawingml/2011/main" val="1"/>
+              <ma14:wrappingTextBoxFlag xmlns:ma14="http://schemas.microsoft.com/office/mac/drawingml/2011/main" xmlns:a14="http://schemas.microsoft.com/office/drawing/2010/main" xmlns:m="http://schemas.openxmlformats.org/officeDocument/2006/math" xmlns="" val="1"/>
             </a:ext>
           </a:extLst>
         </p:spPr>
@@ -15064,7 +15064,7 @@
             <a:effectLst/>
             <a:extLst>
               <a:ext uri="{C572A759-6A51-4108-AA02-DFA0A04FC94B}">
-                <ma14:wrappingTextBoxFlag xmlns="" xmlns:m="http://schemas.openxmlformats.org/officeDocument/2006/math" xmlns:a14="http://schemas.microsoft.com/office/drawing/2010/main" xmlns:ma14="http://schemas.microsoft.com/office/mac/drawingml/2011/main" val="1"/>
+                <ma14:wrappingTextBoxFlag xmlns:ma14="http://schemas.microsoft.com/office/mac/drawingml/2011/main" xmlns:a14="http://schemas.microsoft.com/office/drawing/2010/main" xmlns:m="http://schemas.openxmlformats.org/officeDocument/2006/math" xmlns="" val="1"/>
               </a:ext>
             </a:extLst>
           </p:spPr>
@@ -15478,7 +15478,7 @@
           </a:ln>
           <a:extLst>
             <a:ext uri="{C572A759-6A51-4108-AA02-DFA0A04FC94B}">
-              <ma14:wrappingTextBoxFlag xmlns="" xmlns:m="http://schemas.openxmlformats.org/officeDocument/2006/math" xmlns:a14="http://schemas.microsoft.com/office/drawing/2010/main" xmlns:ma14="http://schemas.microsoft.com/office/mac/drawingml/2011/main" val="1"/>
+              <ma14:wrappingTextBoxFlag xmlns:ma14="http://schemas.microsoft.com/office/mac/drawingml/2011/main" xmlns:a14="http://schemas.microsoft.com/office/drawing/2010/main" xmlns:m="http://schemas.openxmlformats.org/officeDocument/2006/math" xmlns="" val="1"/>
             </a:ext>
           </a:extLst>
         </p:spPr>
@@ -15858,7 +15858,7 @@
             <a:effectLst/>
             <a:extLst>
               <a:ext uri="{C572A759-6A51-4108-AA02-DFA0A04FC94B}">
-                <ma14:wrappingTextBoxFlag xmlns="" xmlns:m="http://schemas.openxmlformats.org/officeDocument/2006/math" xmlns:a14="http://schemas.microsoft.com/office/drawing/2010/main" xmlns:ma14="http://schemas.microsoft.com/office/mac/drawingml/2011/main" val="1"/>
+                <ma14:wrappingTextBoxFlag xmlns:ma14="http://schemas.microsoft.com/office/mac/drawingml/2011/main" xmlns:a14="http://schemas.microsoft.com/office/drawing/2010/main" xmlns:m="http://schemas.openxmlformats.org/officeDocument/2006/math" xmlns="" val="1"/>
               </a:ext>
             </a:extLst>
           </p:spPr>
@@ -16149,7 +16149,7 @@
             <a:effectLst/>
             <a:extLst>
               <a:ext uri="{C572A759-6A51-4108-AA02-DFA0A04FC94B}">
-                <ma14:wrappingTextBoxFlag xmlns="" xmlns:m="http://schemas.openxmlformats.org/officeDocument/2006/math" xmlns:a14="http://schemas.microsoft.com/office/drawing/2010/main" xmlns:ma14="http://schemas.microsoft.com/office/mac/drawingml/2011/main" val="1"/>
+                <ma14:wrappingTextBoxFlag xmlns:ma14="http://schemas.microsoft.com/office/mac/drawingml/2011/main" xmlns:a14="http://schemas.microsoft.com/office/drawing/2010/main" xmlns:m="http://schemas.openxmlformats.org/officeDocument/2006/math" xmlns="" val="1"/>
               </a:ext>
             </a:extLst>
           </p:spPr>
@@ -16325,7 +16325,7 @@
             <a:effectLst/>
             <a:extLst>
               <a:ext uri="{C572A759-6A51-4108-AA02-DFA0A04FC94B}">
-                <ma14:wrappingTextBoxFlag xmlns="" xmlns:m="http://schemas.openxmlformats.org/officeDocument/2006/math" xmlns:a14="http://schemas.microsoft.com/office/drawing/2010/main" xmlns:ma14="http://schemas.microsoft.com/office/mac/drawingml/2011/main" val="1"/>
+                <ma14:wrappingTextBoxFlag xmlns:ma14="http://schemas.microsoft.com/office/mac/drawingml/2011/main" xmlns:a14="http://schemas.microsoft.com/office/drawing/2010/main" xmlns:m="http://schemas.openxmlformats.org/officeDocument/2006/math" xmlns="" val="1"/>
               </a:ext>
             </a:extLst>
           </p:spPr>
@@ -16769,7 +16769,7 @@
             <a:effectLst/>
             <a:extLst>
               <a:ext uri="{C572A759-6A51-4108-AA02-DFA0A04FC94B}">
-                <ma14:wrappingTextBoxFlag xmlns="" xmlns:m="http://schemas.openxmlformats.org/officeDocument/2006/math" xmlns:a14="http://schemas.microsoft.com/office/drawing/2010/main" xmlns:ma14="http://schemas.microsoft.com/office/mac/drawingml/2011/main" val="1"/>
+                <ma14:wrappingTextBoxFlag xmlns:ma14="http://schemas.microsoft.com/office/mac/drawingml/2011/main" xmlns:a14="http://schemas.microsoft.com/office/drawing/2010/main" xmlns:m="http://schemas.openxmlformats.org/officeDocument/2006/math" xmlns="" val="1"/>
               </a:ext>
             </a:extLst>
           </p:spPr>
@@ -16903,7 +16903,7 @@
           </a:ln>
           <a:extLst>
             <a:ext uri="{C572A759-6A51-4108-AA02-DFA0A04FC94B}">
-              <ma14:wrappingTextBoxFlag xmlns="" xmlns:m="http://schemas.openxmlformats.org/officeDocument/2006/math" xmlns:a14="http://schemas.microsoft.com/office/drawing/2010/main" xmlns:ma14="http://schemas.microsoft.com/office/mac/drawingml/2011/main" val="1"/>
+              <ma14:wrappingTextBoxFlag xmlns:ma14="http://schemas.microsoft.com/office/mac/drawingml/2011/main" xmlns:a14="http://schemas.microsoft.com/office/drawing/2010/main" xmlns:m="http://schemas.openxmlformats.org/officeDocument/2006/math" xmlns="" val="1"/>
             </a:ext>
           </a:extLst>
         </p:spPr>
@@ -16946,7 +16946,7 @@
           </a:ln>
           <a:extLst>
             <a:ext uri="{C572A759-6A51-4108-AA02-DFA0A04FC94B}">
-              <ma14:wrappingTextBoxFlag xmlns="" xmlns:m="http://schemas.openxmlformats.org/officeDocument/2006/math" xmlns:a14="http://schemas.microsoft.com/office/drawing/2010/main" xmlns:ma14="http://schemas.microsoft.com/office/mac/drawingml/2011/main" val="1"/>
+              <ma14:wrappingTextBoxFlag xmlns:ma14="http://schemas.microsoft.com/office/mac/drawingml/2011/main" xmlns:a14="http://schemas.microsoft.com/office/drawing/2010/main" xmlns:m="http://schemas.openxmlformats.org/officeDocument/2006/math" xmlns="" val="1"/>
             </a:ext>
           </a:extLst>
         </p:spPr>
@@ -17018,7 +17018,7 @@
           </a:ln>
           <a:extLst>
             <a:ext uri="{C572A759-6A51-4108-AA02-DFA0A04FC94B}">
-              <ma14:wrappingTextBoxFlag xmlns="" xmlns:m="http://schemas.openxmlformats.org/officeDocument/2006/math" xmlns:a14="http://schemas.microsoft.com/office/drawing/2010/main" xmlns:ma14="http://schemas.microsoft.com/office/mac/drawingml/2011/main" val="1"/>
+              <ma14:wrappingTextBoxFlag xmlns:ma14="http://schemas.microsoft.com/office/mac/drawingml/2011/main" xmlns:a14="http://schemas.microsoft.com/office/drawing/2010/main" xmlns:m="http://schemas.openxmlformats.org/officeDocument/2006/math" xmlns="" val="1"/>
             </a:ext>
           </a:extLst>
         </p:spPr>

</xml_diff>